<commit_message>
Updated things to work with the new split data providers Added Object Factories to Data.Sql and Data.Virtuoso libraries and ensured that they get serialized when SerializeConfiguration is called on the relevant classes
</commit_message>
<xml_diff>
--- a/Slides/Roadmap.pptx
+++ b/Slides/Roadmap.pptx
@@ -237,7 +237,8 @@
           <a:p>
             <a:fld id="{A4EFCF4D-B222-4BDE-9F21-361A6D2DD5DC}" type="datetimeFigureOut">
               <a:rPr lang="en-GB" smtClean="0"/>
-              <a:t>04/07/2011</a:t>
+              <a:pPr/>
+              <a:t>05/07/2011</a:t>
             </a:fld>
             <a:endParaRPr lang="en-GB"/>
           </a:p>
@@ -396,6 +397,7 @@
           <a:p>
             <a:fld id="{62BAB909-6E45-45BB-A68B-B7C0D89A88D2}" type="slidenum">
               <a:rPr lang="en-GB" smtClean="0"/>
+              <a:pPr/>
               <a:t>‹#›</a:t>
             </a:fld>
             <a:endParaRPr lang="en-GB"/>
@@ -405,7 +407,7 @@
     </p:spTree>
     <p:extLst>
       <p:ext uri="{BB962C8B-B14F-4D97-AF65-F5344CB8AC3E}">
-        <p14:creationId xmlns:p14="http://schemas.microsoft.com/office/powerpoint/2010/main" val="3764111685"/>
+        <p14:creationId xmlns:p14="http://schemas.microsoft.com/office/powerpoint/2010/main" xmlns="" val="3764111685"/>
       </p:ext>
     </p:extLst>
   </p:cSld>
@@ -692,7 +694,8 @@
           <a:p>
             <a:fld id="{7DDF2E66-A8D8-4938-9770-803246E1F4D9}" type="datetime1">
               <a:rPr lang="en-US" smtClean="0"/>
-              <a:t>7/4/2011</a:t>
+              <a:pPr/>
+              <a:t>7/5/2011</a:t>
             </a:fld>
             <a:endParaRPr lang="en-GB"/>
           </a:p>
@@ -882,7 +885,8 @@
           <a:p>
             <a:fld id="{CDAEE9B0-25E7-4C28-AF1D-B3DDCE7EBBDB}" type="datetime1">
               <a:rPr lang="en-US" smtClean="0"/>
-              <a:t>7/4/2011</a:t>
+              <a:pPr/>
+              <a:t>7/5/2011</a:t>
             </a:fld>
             <a:endParaRPr lang="en-GB"/>
           </a:p>
@@ -1128,7 +1132,8 @@
           <a:p>
             <a:fld id="{B4D3D433-0AB0-44F2-9244-5C7078B0628D}" type="datetime1">
               <a:rPr lang="en-US" smtClean="0"/>
-              <a:t>7/4/2011</a:t>
+              <a:pPr/>
+              <a:t>7/5/2011</a:t>
             </a:fld>
             <a:endParaRPr lang="en-GB"/>
           </a:p>
@@ -1431,7 +1436,8 @@
           <a:p>
             <a:fld id="{603E95A3-71BD-4303-BDB5-8A36882C7B2B}" type="datetime1">
               <a:rPr lang="en-US" smtClean="0"/>
-              <a:t>7/4/2011</a:t>
+              <a:pPr/>
+              <a:t>7/5/2011</a:t>
             </a:fld>
             <a:endParaRPr lang="en-GB"/>
           </a:p>
@@ -1838,7 +1844,8 @@
           <a:p>
             <a:fld id="{DA3AB10B-EC00-4A9D-ADD6-A8B68613B4D2}" type="datetime1">
               <a:rPr lang="en-US" smtClean="0"/>
-              <a:t>7/4/2011</a:t>
+              <a:pPr/>
+              <a:t>7/5/2011</a:t>
             </a:fld>
             <a:endParaRPr lang="en-GB"/>
           </a:p>
@@ -1969,7 +1976,8 @@
           <a:p>
             <a:fld id="{EA5D455B-ECD0-44E3-BA0C-3649A3FCD15C}" type="datetime1">
               <a:rPr lang="en-US" smtClean="0"/>
-              <a:t>7/4/2011</a:t>
+              <a:pPr/>
+              <a:t>7/5/2011</a:t>
             </a:fld>
             <a:endParaRPr lang="en-GB"/>
           </a:p>
@@ -2064,7 +2072,8 @@
           <a:p>
             <a:fld id="{F83BA156-88F6-4A85-BCB0-63F0774EAEDC}" type="datetime1">
               <a:rPr lang="en-US" smtClean="0"/>
-              <a:t>7/4/2011</a:t>
+              <a:pPr/>
+              <a:t>7/5/2011</a:t>
             </a:fld>
             <a:endParaRPr lang="en-GB"/>
           </a:p>
@@ -2347,7 +2356,8 @@
           <a:p>
             <a:fld id="{044DBA34-05AD-44A3-A0F1-C917A9CE0E42}" type="datetime1">
               <a:rPr lang="en-US" smtClean="0"/>
-              <a:t>7/4/2011</a:t>
+              <a:pPr/>
+              <a:t>7/5/2011</a:t>
             </a:fld>
             <a:endParaRPr lang="en-GB"/>
           </a:p>
@@ -2610,7 +2620,8 @@
           <a:p>
             <a:fld id="{3FDD57B1-846D-42C4-9FE3-5B43FAB1C846}" type="datetime1">
               <a:rPr lang="en-US" smtClean="0"/>
-              <a:t>7/4/2011</a:t>
+              <a:pPr/>
+              <a:t>7/5/2011</a:t>
             </a:fld>
             <a:endParaRPr lang="en-GB"/>
           </a:p>
@@ -2761,7 +2772,8 @@
           <a:p>
             <a:fld id="{8EDAB77D-6898-4F92-AE07-90DBD2DF1995}" type="datetime1">
               <a:rPr lang="en-US" smtClean="0"/>
-              <a:t>7/4/2011</a:t>
+              <a:pPr/>
+              <a:t>7/5/2011</a:t>
             </a:fld>
             <a:endParaRPr lang="en-GB" dirty="0"/>
           </a:p>
@@ -3321,7 +3333,8 @@
           <a:p>
             <a:fld id="{ADB3C27C-C00A-40F0-A166-0452DE5EF4FD}" type="datetime1">
               <a:rPr lang="en-US" smtClean="0"/>
-              <a:t>7/4/2011</a:t>
+              <a:pPr/>
+              <a:t>7/5/2011</a:t>
             </a:fld>
             <a:endParaRPr lang="en-GB"/>
           </a:p>
@@ -3494,7 +3507,8 @@
           <a:p>
             <a:fld id="{EA5D455B-ECD0-44E3-BA0C-3649A3FCD15C}" type="datetime1">
               <a:rPr lang="en-US" smtClean="0"/>
-              <a:t>7/4/2011</a:t>
+              <a:pPr/>
+              <a:t>7/5/2011</a:t>
             </a:fld>
             <a:endParaRPr lang="en-GB"/>
           </a:p>
@@ -3550,7 +3564,7 @@
     </p:spTree>
     <p:extLst>
       <p:ext uri="{BB962C8B-B14F-4D97-AF65-F5344CB8AC3E}">
-        <p14:creationId xmlns:p14="http://schemas.microsoft.com/office/powerpoint/2010/main" val="3728461749"/>
+        <p14:creationId xmlns:p14="http://schemas.microsoft.com/office/powerpoint/2010/main" xmlns="" val="3728461749"/>
       </p:ext>
     </p:extLst>
   </p:cSld>
@@ -3671,7 +3685,8 @@
           <a:p>
             <a:fld id="{CDAEE9B0-25E7-4C28-AF1D-B3DDCE7EBBDB}" type="datetime1">
               <a:rPr lang="en-US" smtClean="0"/>
-              <a:t>7/4/2011</a:t>
+              <a:pPr/>
+              <a:t>7/5/2011</a:t>
             </a:fld>
             <a:endParaRPr lang="en-GB"/>
           </a:p>
@@ -3727,7 +3742,7 @@
     </p:spTree>
     <p:extLst>
       <p:ext uri="{BB962C8B-B14F-4D97-AF65-F5344CB8AC3E}">
-        <p14:creationId xmlns:p14="http://schemas.microsoft.com/office/powerpoint/2010/main" val="3573922916"/>
+        <p14:creationId xmlns:p14="http://schemas.microsoft.com/office/powerpoint/2010/main" xmlns="" val="3573922916"/>
       </p:ext>
     </p:extLst>
   </p:cSld>
@@ -3834,7 +3849,8 @@
           <a:p>
             <a:fld id="{CDAEE9B0-25E7-4C28-AF1D-B3DDCE7EBBDB}" type="datetime1">
               <a:rPr lang="en-US" smtClean="0"/>
-              <a:t>7/4/2011</a:t>
+              <a:pPr/>
+              <a:t>7/5/2011</a:t>
             </a:fld>
             <a:endParaRPr lang="en-GB"/>
           </a:p>
@@ -3890,7 +3906,7 @@
     </p:spTree>
     <p:extLst>
       <p:ext uri="{BB962C8B-B14F-4D97-AF65-F5344CB8AC3E}">
-        <p14:creationId xmlns:p14="http://schemas.microsoft.com/office/powerpoint/2010/main" val="2108512158"/>
+        <p14:creationId xmlns:p14="http://schemas.microsoft.com/office/powerpoint/2010/main" xmlns="" val="2108512158"/>
       </p:ext>
     </p:extLst>
   </p:cSld>
@@ -3992,7 +4008,8 @@
           <a:p>
             <a:fld id="{CDAEE9B0-25E7-4C28-AF1D-B3DDCE7EBBDB}" type="datetime1">
               <a:rPr lang="en-US" smtClean="0"/>
-              <a:t>7/4/2011</a:t>
+              <a:pPr/>
+              <a:t>7/5/2011</a:t>
             </a:fld>
             <a:endParaRPr lang="en-GB" dirty="0"/>
           </a:p>
@@ -4048,7 +4065,7 @@
     </p:spTree>
     <p:extLst>
       <p:ext uri="{BB962C8B-B14F-4D97-AF65-F5344CB8AC3E}">
-        <p14:creationId xmlns:p14="http://schemas.microsoft.com/office/powerpoint/2010/main" val="3738179165"/>
+        <p14:creationId xmlns:p14="http://schemas.microsoft.com/office/powerpoint/2010/main" xmlns="" val="3738179165"/>
       </p:ext>
     </p:extLst>
   </p:cSld>
@@ -4176,7 +4193,8 @@
           <a:p>
             <a:fld id="{CDAEE9B0-25E7-4C28-AF1D-B3DDCE7EBBDB}" type="datetime1">
               <a:rPr lang="en-US" smtClean="0"/>
-              <a:t>7/4/2011</a:t>
+              <a:pPr/>
+              <a:t>7/5/2011</a:t>
             </a:fld>
             <a:endParaRPr lang="en-GB"/>
           </a:p>
@@ -4232,7 +4250,7 @@
     </p:spTree>
     <p:extLst>
       <p:ext uri="{BB962C8B-B14F-4D97-AF65-F5344CB8AC3E}">
-        <p14:creationId xmlns:p14="http://schemas.microsoft.com/office/powerpoint/2010/main" val="1957182481"/>
+        <p14:creationId xmlns:p14="http://schemas.microsoft.com/office/powerpoint/2010/main" xmlns="" val="1957182481"/>
       </p:ext>
     </p:extLst>
   </p:cSld>
@@ -4362,7 +4380,8 @@
           <a:p>
             <a:fld id="{CDAEE9B0-25E7-4C28-AF1D-B3DDCE7EBBDB}" type="datetime1">
               <a:rPr lang="en-US" smtClean="0"/>
-              <a:t>7/4/2011</a:t>
+              <a:pPr/>
+              <a:t>7/5/2011</a:t>
             </a:fld>
             <a:endParaRPr lang="en-GB"/>
           </a:p>
@@ -4418,7 +4437,7 @@
     </p:spTree>
     <p:extLst>
       <p:ext uri="{BB962C8B-B14F-4D97-AF65-F5344CB8AC3E}">
-        <p14:creationId xmlns:p14="http://schemas.microsoft.com/office/powerpoint/2010/main" val="2909703350"/>
+        <p14:creationId xmlns:p14="http://schemas.microsoft.com/office/powerpoint/2010/main" xmlns="" val="2909703350"/>
       </p:ext>
     </p:extLst>
   </p:cSld>
@@ -4524,7 +4543,8 @@
           <a:p>
             <a:fld id="{CDAEE9B0-25E7-4C28-AF1D-B3DDCE7EBBDB}" type="datetime1">
               <a:rPr lang="en-US" smtClean="0"/>
-              <a:t>7/4/2011</a:t>
+              <a:pPr/>
+              <a:t>7/5/2011</a:t>
             </a:fld>
             <a:endParaRPr lang="en-GB"/>
           </a:p>
@@ -4580,7 +4600,7 @@
     </p:spTree>
     <p:extLst>
       <p:ext uri="{BB962C8B-B14F-4D97-AF65-F5344CB8AC3E}">
-        <p14:creationId xmlns:p14="http://schemas.microsoft.com/office/powerpoint/2010/main" val="3472818035"/>
+        <p14:creationId xmlns:p14="http://schemas.microsoft.com/office/powerpoint/2010/main" xmlns="" val="3472818035"/>
       </p:ext>
     </p:extLst>
   </p:cSld>
@@ -4692,7 +4712,8 @@
           <a:p>
             <a:fld id="{CDAEE9B0-25E7-4C28-AF1D-B3DDCE7EBBDB}" type="datetime1">
               <a:rPr lang="en-US" smtClean="0"/>
-              <a:t>7/4/2011</a:t>
+              <a:pPr/>
+              <a:t>7/5/2011</a:t>
             </a:fld>
             <a:endParaRPr lang="en-GB"/>
           </a:p>
@@ -4748,7 +4769,7 @@
     </p:spTree>
     <p:extLst>
       <p:ext uri="{BB962C8B-B14F-4D97-AF65-F5344CB8AC3E}">
-        <p14:creationId xmlns:p14="http://schemas.microsoft.com/office/powerpoint/2010/main" val="1034858646"/>
+        <p14:creationId xmlns:p14="http://schemas.microsoft.com/office/powerpoint/2010/main" xmlns="" val="1034858646"/>
       </p:ext>
     </p:extLst>
   </p:cSld>
@@ -4869,7 +4890,8 @@
           <a:p>
             <a:fld id="{CDAEE9B0-25E7-4C28-AF1D-B3DDCE7EBBDB}" type="datetime1">
               <a:rPr lang="en-US" smtClean="0"/>
-              <a:t>7/4/2011</a:t>
+              <a:pPr/>
+              <a:t>7/5/2011</a:t>
             </a:fld>
             <a:endParaRPr lang="en-GB"/>
           </a:p>
@@ -4925,7 +4947,7 @@
     </p:spTree>
     <p:extLst>
       <p:ext uri="{BB962C8B-B14F-4D97-AF65-F5344CB8AC3E}">
-        <p14:creationId xmlns:p14="http://schemas.microsoft.com/office/powerpoint/2010/main" val="3849529298"/>
+        <p14:creationId xmlns:p14="http://schemas.microsoft.com/office/powerpoint/2010/main" xmlns="" val="3849529298"/>
       </p:ext>
     </p:extLst>
   </p:cSld>
@@ -5083,7 +5105,8 @@
           <a:p>
             <a:fld id="{CDAEE9B0-25E7-4C28-AF1D-B3DDCE7EBBDB}" type="datetime1">
               <a:rPr lang="en-US" smtClean="0"/>
-              <a:t>7/4/2011</a:t>
+              <a:pPr/>
+              <a:t>7/5/2011</a:t>
             </a:fld>
             <a:endParaRPr lang="en-GB"/>
           </a:p>
@@ -5139,7 +5162,7 @@
     </p:spTree>
     <p:extLst>
       <p:ext uri="{BB962C8B-B14F-4D97-AF65-F5344CB8AC3E}">
-        <p14:creationId xmlns:p14="http://schemas.microsoft.com/office/powerpoint/2010/main" val="4093170207"/>
+        <p14:creationId xmlns:p14="http://schemas.microsoft.com/office/powerpoint/2010/main" xmlns="" val="4093170207"/>
       </p:ext>
     </p:extLst>
   </p:cSld>
@@ -5274,7 +5297,8 @@
           <a:p>
             <a:fld id="{CDAEE9B0-25E7-4C28-AF1D-B3DDCE7EBBDB}" type="datetime1">
               <a:rPr lang="en-US" smtClean="0"/>
-              <a:t>7/4/2011</a:t>
+              <a:pPr/>
+              <a:t>7/5/2011</a:t>
             </a:fld>
             <a:endParaRPr lang="en-GB"/>
           </a:p>
@@ -5330,7 +5354,7 @@
     </p:spTree>
     <p:extLst>
       <p:ext uri="{BB962C8B-B14F-4D97-AF65-F5344CB8AC3E}">
-        <p14:creationId xmlns:p14="http://schemas.microsoft.com/office/powerpoint/2010/main" val="2357537943"/>
+        <p14:creationId xmlns:p14="http://schemas.microsoft.com/office/powerpoint/2010/main" xmlns="" val="2357537943"/>
       </p:ext>
     </p:extLst>
   </p:cSld>
@@ -5451,7 +5475,8 @@
           <a:p>
             <a:fld id="{CDAEE9B0-25E7-4C28-AF1D-B3DDCE7EBBDB}" type="datetime1">
               <a:rPr lang="en-US" smtClean="0"/>
-              <a:t>7/4/2011</a:t>
+              <a:pPr/>
+              <a:t>7/5/2011</a:t>
             </a:fld>
             <a:endParaRPr lang="en-GB"/>
           </a:p>
@@ -5507,7 +5532,7 @@
     </p:spTree>
     <p:extLst>
       <p:ext uri="{BB962C8B-B14F-4D97-AF65-F5344CB8AC3E}">
-        <p14:creationId xmlns:p14="http://schemas.microsoft.com/office/powerpoint/2010/main" val="509411177"/>
+        <p14:creationId xmlns:p14="http://schemas.microsoft.com/office/powerpoint/2010/main" xmlns="" val="509411177"/>
       </p:ext>
     </p:extLst>
   </p:cSld>
@@ -5630,7 +5655,8 @@
           <a:p>
             <a:fld id="{CDAEE9B0-25E7-4C28-AF1D-B3DDCE7EBBDB}" type="datetime1">
               <a:rPr lang="en-US" smtClean="0"/>
-              <a:t>7/4/2011</a:t>
+              <a:pPr/>
+              <a:t>7/5/2011</a:t>
             </a:fld>
             <a:endParaRPr lang="en-GB"/>
           </a:p>
@@ -5686,7 +5712,7 @@
     </p:spTree>
     <p:extLst>
       <p:ext uri="{BB962C8B-B14F-4D97-AF65-F5344CB8AC3E}">
-        <p14:creationId xmlns:p14="http://schemas.microsoft.com/office/powerpoint/2010/main" val="673125997"/>
+        <p14:creationId xmlns:p14="http://schemas.microsoft.com/office/powerpoint/2010/main" xmlns="" val="673125997"/>
       </p:ext>
     </p:extLst>
   </p:cSld>
@@ -5783,7 +5809,8 @@
           <a:p>
             <a:fld id="{CDAEE9B0-25E7-4C28-AF1D-B3DDCE7EBBDB}" type="datetime1">
               <a:rPr lang="en-US" smtClean="0"/>
-              <a:t>7/4/2011</a:t>
+              <a:pPr/>
+              <a:t>7/5/2011</a:t>
             </a:fld>
             <a:endParaRPr lang="en-GB"/>
           </a:p>
@@ -5839,7 +5866,7 @@
     </p:spTree>
     <p:extLst>
       <p:ext uri="{BB962C8B-B14F-4D97-AF65-F5344CB8AC3E}">
-        <p14:creationId xmlns:p14="http://schemas.microsoft.com/office/powerpoint/2010/main" val="2964860377"/>
+        <p14:creationId xmlns:p14="http://schemas.microsoft.com/office/powerpoint/2010/main" xmlns="" val="2964860377"/>
       </p:ext>
     </p:extLst>
   </p:cSld>
@@ -5892,7 +5919,7 @@
     </p:spTree>
     <p:extLst>
       <p:ext uri="{BB962C8B-B14F-4D97-AF65-F5344CB8AC3E}">
-        <p14:creationId xmlns:p14="http://schemas.microsoft.com/office/powerpoint/2010/main" val="798346359"/>
+        <p14:creationId xmlns:p14="http://schemas.microsoft.com/office/powerpoint/2010/main" xmlns="" val="798346359"/>
       </p:ext>
     </p:extLst>
   </p:cSld>
@@ -6023,7 +6050,8 @@
           <a:p>
             <a:fld id="{EA5D455B-ECD0-44E3-BA0C-3649A3FCD15C}" type="datetime1">
               <a:rPr lang="en-US" smtClean="0"/>
-              <a:t>7/4/2011</a:t>
+              <a:pPr/>
+              <a:t>7/5/2011</a:t>
             </a:fld>
             <a:endParaRPr lang="en-GB"/>
           </a:p>
@@ -6079,7 +6107,7 @@
     </p:spTree>
     <p:extLst>
       <p:ext uri="{BB962C8B-B14F-4D97-AF65-F5344CB8AC3E}">
-        <p14:creationId xmlns:p14="http://schemas.microsoft.com/office/powerpoint/2010/main" val="118536430"/>
+        <p14:creationId xmlns:p14="http://schemas.microsoft.com/office/powerpoint/2010/main" xmlns="" val="118536430"/>
       </p:ext>
     </p:extLst>
   </p:cSld>
@@ -6215,7 +6243,8 @@
           <a:p>
             <a:fld id="{CDAEE9B0-25E7-4C28-AF1D-B3DDCE7EBBDB}" type="datetime1">
               <a:rPr lang="en-US" smtClean="0"/>
-              <a:t>7/4/2011</a:t>
+              <a:pPr/>
+              <a:t>7/5/2011</a:t>
             </a:fld>
             <a:endParaRPr lang="en-GB"/>
           </a:p>
@@ -6271,7 +6300,7 @@
     </p:spTree>
     <p:extLst>
       <p:ext uri="{BB962C8B-B14F-4D97-AF65-F5344CB8AC3E}">
-        <p14:creationId xmlns:p14="http://schemas.microsoft.com/office/powerpoint/2010/main" val="299555438"/>
+        <p14:creationId xmlns:p14="http://schemas.microsoft.com/office/powerpoint/2010/main" xmlns="" val="299555438"/>
       </p:ext>
     </p:extLst>
   </p:cSld>
@@ -6367,7 +6396,8 @@
           <a:p>
             <a:fld id="{CDAEE9B0-25E7-4C28-AF1D-B3DDCE7EBBDB}" type="datetime1">
               <a:rPr lang="en-US" smtClean="0"/>
-              <a:t>7/4/2011</a:t>
+              <a:pPr/>
+              <a:t>7/5/2011</a:t>
             </a:fld>
             <a:endParaRPr lang="en-GB"/>
           </a:p>
@@ -6423,7 +6453,7 @@
     </p:spTree>
     <p:extLst>
       <p:ext uri="{BB962C8B-B14F-4D97-AF65-F5344CB8AC3E}">
-        <p14:creationId xmlns:p14="http://schemas.microsoft.com/office/powerpoint/2010/main" val="1002032322"/>
+        <p14:creationId xmlns:p14="http://schemas.microsoft.com/office/powerpoint/2010/main" xmlns="" val="1002032322"/>
       </p:ext>
     </p:extLst>
   </p:cSld>
@@ -6529,7 +6559,8 @@
           <a:p>
             <a:fld id="{CDAEE9B0-25E7-4C28-AF1D-B3DDCE7EBBDB}" type="datetime1">
               <a:rPr lang="en-US" smtClean="0"/>
-              <a:t>7/4/2011</a:t>
+              <a:pPr/>
+              <a:t>7/5/2011</a:t>
             </a:fld>
             <a:endParaRPr lang="en-GB"/>
           </a:p>
@@ -6585,7 +6616,7 @@
     </p:spTree>
     <p:extLst>
       <p:ext uri="{BB962C8B-B14F-4D97-AF65-F5344CB8AC3E}">
-        <p14:creationId xmlns:p14="http://schemas.microsoft.com/office/powerpoint/2010/main" val="1473382163"/>
+        <p14:creationId xmlns:p14="http://schemas.microsoft.com/office/powerpoint/2010/main" xmlns="" val="1473382163"/>
       </p:ext>
     </p:extLst>
   </p:cSld>
@@ -6726,7 +6757,8 @@
           <a:p>
             <a:fld id="{CDAEE9B0-25E7-4C28-AF1D-B3DDCE7EBBDB}" type="datetime1">
               <a:rPr lang="en-US" smtClean="0"/>
-              <a:t>7/4/2011</a:t>
+              <a:pPr/>
+              <a:t>7/5/2011</a:t>
             </a:fld>
             <a:endParaRPr lang="en-GB"/>
           </a:p>
@@ -6782,7 +6814,7 @@
     </p:spTree>
     <p:extLst>
       <p:ext uri="{BB962C8B-B14F-4D97-AF65-F5344CB8AC3E}">
-        <p14:creationId xmlns:p14="http://schemas.microsoft.com/office/powerpoint/2010/main" val="370317736"/>
+        <p14:creationId xmlns:p14="http://schemas.microsoft.com/office/powerpoint/2010/main" xmlns="" val="370317736"/>
       </p:ext>
     </p:extLst>
   </p:cSld>
@@ -6849,7 +6881,8 @@
           <a:p>
             <a:fld id="{EA5D455B-ECD0-44E3-BA0C-3649A3FCD15C}" type="datetime1">
               <a:rPr lang="en-US" smtClean="0"/>
-              <a:t>7/4/2011</a:t>
+              <a:pPr/>
+              <a:t>7/5/2011</a:t>
             </a:fld>
             <a:endParaRPr lang="en-GB"/>
           </a:p>
@@ -6905,7 +6938,7 @@
     </p:spTree>
     <p:extLst>
       <p:ext uri="{BB962C8B-B14F-4D97-AF65-F5344CB8AC3E}">
-        <p14:creationId xmlns:p14="http://schemas.microsoft.com/office/powerpoint/2010/main" val="106888204"/>
+        <p14:creationId xmlns:p14="http://schemas.microsoft.com/office/powerpoint/2010/main" xmlns="" val="106888204"/>
       </p:ext>
     </p:extLst>
   </p:cSld>
@@ -7042,7 +7075,8 @@
           <a:p>
             <a:fld id="{CDAEE9B0-25E7-4C28-AF1D-B3DDCE7EBBDB}" type="datetime1">
               <a:rPr lang="en-US" smtClean="0"/>
-              <a:t>7/4/2011</a:t>
+              <a:pPr/>
+              <a:t>7/5/2011</a:t>
             </a:fld>
             <a:endParaRPr lang="en-GB"/>
           </a:p>
@@ -7098,7 +7132,7 @@
     </p:spTree>
     <p:extLst>
       <p:ext uri="{BB962C8B-B14F-4D97-AF65-F5344CB8AC3E}">
-        <p14:creationId xmlns:p14="http://schemas.microsoft.com/office/powerpoint/2010/main" val="3702788433"/>
+        <p14:creationId xmlns:p14="http://schemas.microsoft.com/office/powerpoint/2010/main" xmlns="" val="3702788433"/>
       </p:ext>
     </p:extLst>
   </p:cSld>
@@ -7201,7 +7235,8 @@
           <a:p>
             <a:fld id="{EA5D455B-ECD0-44E3-BA0C-3649A3FCD15C}" type="datetime1">
               <a:rPr lang="en-US" smtClean="0"/>
-              <a:t>7/4/2011</a:t>
+              <a:pPr/>
+              <a:t>7/5/2011</a:t>
             </a:fld>
             <a:endParaRPr lang="en-GB"/>
           </a:p>
@@ -7257,7 +7292,7 @@
     </p:spTree>
     <p:extLst>
       <p:ext uri="{BB962C8B-B14F-4D97-AF65-F5344CB8AC3E}">
-        <p14:creationId xmlns:p14="http://schemas.microsoft.com/office/powerpoint/2010/main" val="1934465878"/>
+        <p14:creationId xmlns:p14="http://schemas.microsoft.com/office/powerpoint/2010/main" xmlns="" val="1934465878"/>
       </p:ext>
     </p:extLst>
   </p:cSld>
@@ -7367,7 +7402,8 @@
           <a:p>
             <a:fld id="{CDAEE9B0-25E7-4C28-AF1D-B3DDCE7EBBDB}" type="datetime1">
               <a:rPr lang="en-US" smtClean="0"/>
-              <a:t>7/4/2011</a:t>
+              <a:pPr/>
+              <a:t>7/5/2011</a:t>
             </a:fld>
             <a:endParaRPr lang="en-GB"/>
           </a:p>
@@ -7423,7 +7459,7 @@
     </p:spTree>
     <p:extLst>
       <p:ext uri="{BB962C8B-B14F-4D97-AF65-F5344CB8AC3E}">
-        <p14:creationId xmlns:p14="http://schemas.microsoft.com/office/powerpoint/2010/main" val="3933745380"/>
+        <p14:creationId xmlns:p14="http://schemas.microsoft.com/office/powerpoint/2010/main" xmlns="" val="3933745380"/>
       </p:ext>
     </p:extLst>
   </p:cSld>
@@ -7563,7 +7599,8 @@
           <a:p>
             <a:fld id="{CDAEE9B0-25E7-4C28-AF1D-B3DDCE7EBBDB}" type="datetime1">
               <a:rPr lang="en-US" smtClean="0"/>
-              <a:t>7/4/2011</a:t>
+              <a:pPr/>
+              <a:t>7/5/2011</a:t>
             </a:fld>
             <a:endParaRPr lang="en-GB"/>
           </a:p>
@@ -7619,7 +7656,7 @@
     </p:spTree>
     <p:extLst>
       <p:ext uri="{BB962C8B-B14F-4D97-AF65-F5344CB8AC3E}">
-        <p14:creationId xmlns:p14="http://schemas.microsoft.com/office/powerpoint/2010/main" val="4089701815"/>
+        <p14:creationId xmlns:p14="http://schemas.microsoft.com/office/powerpoint/2010/main" xmlns="" val="4089701815"/>
       </p:ext>
     </p:extLst>
   </p:cSld>
@@ -7731,7 +7768,8 @@
           <a:p>
             <a:fld id="{CDAEE9B0-25E7-4C28-AF1D-B3DDCE7EBBDB}" type="datetime1">
               <a:rPr lang="en-US" smtClean="0"/>
-              <a:t>7/4/2011</a:t>
+              <a:pPr/>
+              <a:t>7/5/2011</a:t>
             </a:fld>
             <a:endParaRPr lang="en-GB"/>
           </a:p>
@@ -7787,7 +7825,7 @@
     </p:spTree>
     <p:extLst>
       <p:ext uri="{BB962C8B-B14F-4D97-AF65-F5344CB8AC3E}">
-        <p14:creationId xmlns:p14="http://schemas.microsoft.com/office/powerpoint/2010/main" val="1078110969"/>
+        <p14:creationId xmlns:p14="http://schemas.microsoft.com/office/powerpoint/2010/main" xmlns="" val="1078110969"/>
       </p:ext>
     </p:extLst>
   </p:cSld>
@@ -7884,7 +7922,8 @@
           <a:p>
             <a:fld id="{CDAEE9B0-25E7-4C28-AF1D-B3DDCE7EBBDB}" type="datetime1">
               <a:rPr lang="en-US" smtClean="0"/>
-              <a:t>7/4/2011</a:t>
+              <a:pPr/>
+              <a:t>7/5/2011</a:t>
             </a:fld>
             <a:endParaRPr lang="en-GB"/>
           </a:p>
@@ -7940,7 +7979,7 @@
     </p:spTree>
     <p:extLst>
       <p:ext uri="{BB962C8B-B14F-4D97-AF65-F5344CB8AC3E}">
-        <p14:creationId xmlns:p14="http://schemas.microsoft.com/office/powerpoint/2010/main" val="3038176013"/>
+        <p14:creationId xmlns:p14="http://schemas.microsoft.com/office/powerpoint/2010/main" xmlns="" val="3038176013"/>
       </p:ext>
     </p:extLst>
   </p:cSld>
@@ -8083,7 +8122,8 @@
           <a:p>
             <a:fld id="{CDAEE9B0-25E7-4C28-AF1D-B3DDCE7EBBDB}" type="datetime1">
               <a:rPr lang="en-US" smtClean="0"/>
-              <a:t>7/4/2011</a:t>
+              <a:pPr/>
+              <a:t>7/5/2011</a:t>
             </a:fld>
             <a:endParaRPr lang="en-GB"/>
           </a:p>
@@ -8139,7 +8179,7 @@
     </p:spTree>
     <p:extLst>
       <p:ext uri="{BB962C8B-B14F-4D97-AF65-F5344CB8AC3E}">
-        <p14:creationId xmlns:p14="http://schemas.microsoft.com/office/powerpoint/2010/main" val="687733986"/>
+        <p14:creationId xmlns:p14="http://schemas.microsoft.com/office/powerpoint/2010/main" xmlns="" val="687733986"/>
       </p:ext>
     </p:extLst>
   </p:cSld>
@@ -8254,7 +8294,8 @@
           <a:p>
             <a:fld id="{CDAEE9B0-25E7-4C28-AF1D-B3DDCE7EBBDB}" type="datetime1">
               <a:rPr lang="en-US" smtClean="0"/>
-              <a:t>7/4/2011</a:t>
+              <a:pPr/>
+              <a:t>7/5/2011</a:t>
             </a:fld>
             <a:endParaRPr lang="en-GB"/>
           </a:p>
@@ -8310,7 +8351,7 @@
     </p:spTree>
     <p:extLst>
       <p:ext uri="{BB962C8B-B14F-4D97-AF65-F5344CB8AC3E}">
-        <p14:creationId xmlns:p14="http://schemas.microsoft.com/office/powerpoint/2010/main" val="3219753914"/>
+        <p14:creationId xmlns:p14="http://schemas.microsoft.com/office/powerpoint/2010/main" xmlns="" val="3219753914"/>
       </p:ext>
     </p:extLst>
   </p:cSld>
@@ -8433,7 +8474,8 @@
           <a:p>
             <a:fld id="{CDAEE9B0-25E7-4C28-AF1D-B3DDCE7EBBDB}" type="datetime1">
               <a:rPr lang="en-US" smtClean="0"/>
-              <a:t>7/4/2011</a:t>
+              <a:pPr/>
+              <a:t>7/5/2011</a:t>
             </a:fld>
             <a:endParaRPr lang="en-GB"/>
           </a:p>
@@ -8489,7 +8531,7 @@
     </p:spTree>
     <p:extLst>
       <p:ext uri="{BB962C8B-B14F-4D97-AF65-F5344CB8AC3E}">
-        <p14:creationId xmlns:p14="http://schemas.microsoft.com/office/powerpoint/2010/main" val="3035919924"/>
+        <p14:creationId xmlns:p14="http://schemas.microsoft.com/office/powerpoint/2010/main" xmlns="" val="3035919924"/>
       </p:ext>
     </p:extLst>
   </p:cSld>
@@ -8558,7 +8600,8 @@
           <a:p>
             <a:fld id="{EA5D455B-ECD0-44E3-BA0C-3649A3FCD15C}" type="datetime1">
               <a:rPr lang="en-US" smtClean="0"/>
-              <a:t>7/4/2011</a:t>
+              <a:pPr/>
+              <a:t>7/5/2011</a:t>
             </a:fld>
             <a:endParaRPr lang="en-GB"/>
           </a:p>
@@ -8614,7 +8657,7 @@
     </p:spTree>
     <p:extLst>
       <p:ext uri="{BB962C8B-B14F-4D97-AF65-F5344CB8AC3E}">
-        <p14:creationId xmlns:p14="http://schemas.microsoft.com/office/powerpoint/2010/main" val="2482877072"/>
+        <p14:creationId xmlns:p14="http://schemas.microsoft.com/office/powerpoint/2010/main" xmlns="" val="2482877072"/>
       </p:ext>
     </p:extLst>
   </p:cSld>
@@ -8721,7 +8764,8 @@
           <a:p>
             <a:fld id="{EA5D455B-ECD0-44E3-BA0C-3649A3FCD15C}" type="datetime1">
               <a:rPr lang="en-US" smtClean="0"/>
-              <a:t>7/4/2011</a:t>
+              <a:pPr/>
+              <a:t>7/5/2011</a:t>
             </a:fld>
             <a:endParaRPr lang="en-GB"/>
           </a:p>
@@ -8777,7 +8821,7 @@
     </p:spTree>
     <p:extLst>
       <p:ext uri="{BB962C8B-B14F-4D97-AF65-F5344CB8AC3E}">
-        <p14:creationId xmlns:p14="http://schemas.microsoft.com/office/powerpoint/2010/main" val="381284594"/>
+        <p14:creationId xmlns:p14="http://schemas.microsoft.com/office/powerpoint/2010/main" xmlns="" val="381284594"/>
       </p:ext>
     </p:extLst>
   </p:cSld>
@@ -8844,7 +8888,8 @@
           <a:p>
             <a:fld id="{EA5D455B-ECD0-44E3-BA0C-3649A3FCD15C}" type="datetime1">
               <a:rPr lang="en-US" smtClean="0"/>
-              <a:t>7/4/2011</a:t>
+              <a:pPr/>
+              <a:t>7/5/2011</a:t>
             </a:fld>
             <a:endParaRPr lang="en-GB"/>
           </a:p>
@@ -8900,7 +8945,7 @@
     </p:spTree>
     <p:extLst>
       <p:ext uri="{BB962C8B-B14F-4D97-AF65-F5344CB8AC3E}">
-        <p14:creationId xmlns:p14="http://schemas.microsoft.com/office/powerpoint/2010/main" val="4095227198"/>
+        <p14:creationId xmlns:p14="http://schemas.microsoft.com/office/powerpoint/2010/main" xmlns="" val="4095227198"/>
       </p:ext>
     </p:extLst>
   </p:cSld>
@@ -9005,7 +9050,8 @@
           <a:p>
             <a:fld id="{CDAEE9B0-25E7-4C28-AF1D-B3DDCE7EBBDB}" type="datetime1">
               <a:rPr lang="en-US" smtClean="0"/>
-              <a:t>7/4/2011</a:t>
+              <a:pPr/>
+              <a:t>7/5/2011</a:t>
             </a:fld>
             <a:endParaRPr lang="en-GB"/>
           </a:p>
@@ -9061,7 +9107,7 @@
     </p:spTree>
     <p:extLst>
       <p:ext uri="{BB962C8B-B14F-4D97-AF65-F5344CB8AC3E}">
-        <p14:creationId xmlns:p14="http://schemas.microsoft.com/office/powerpoint/2010/main" val="3357694366"/>
+        <p14:creationId xmlns:p14="http://schemas.microsoft.com/office/powerpoint/2010/main" xmlns="" val="3357694366"/>
       </p:ext>
     </p:extLst>
   </p:cSld>
@@ -9182,7 +9228,8 @@
           <a:p>
             <a:fld id="{CDAEE9B0-25E7-4C28-AF1D-B3DDCE7EBBDB}" type="datetime1">
               <a:rPr lang="en-US" smtClean="0"/>
-              <a:t>7/4/2011</a:t>
+              <a:pPr/>
+              <a:t>7/5/2011</a:t>
             </a:fld>
             <a:endParaRPr lang="en-GB"/>
           </a:p>
@@ -9238,7 +9285,7 @@
     </p:spTree>
     <p:extLst>
       <p:ext uri="{BB962C8B-B14F-4D97-AF65-F5344CB8AC3E}">
-        <p14:creationId xmlns:p14="http://schemas.microsoft.com/office/powerpoint/2010/main" val="912609684"/>
+        <p14:creationId xmlns:p14="http://schemas.microsoft.com/office/powerpoint/2010/main" xmlns="" val="912609684"/>
       </p:ext>
     </p:extLst>
   </p:cSld>
@@ -9354,7 +9401,8 @@
           <a:p>
             <a:fld id="{CDAEE9B0-25E7-4C28-AF1D-B3DDCE7EBBDB}" type="datetime1">
               <a:rPr lang="en-US" smtClean="0"/>
-              <a:t>7/4/2011</a:t>
+              <a:pPr/>
+              <a:t>7/5/2011</a:t>
             </a:fld>
             <a:endParaRPr lang="en-GB"/>
           </a:p>
@@ -9410,7 +9458,7 @@
     </p:spTree>
     <p:extLst>
       <p:ext uri="{BB962C8B-B14F-4D97-AF65-F5344CB8AC3E}">
-        <p14:creationId xmlns:p14="http://schemas.microsoft.com/office/powerpoint/2010/main" val="585871984"/>
+        <p14:creationId xmlns:p14="http://schemas.microsoft.com/office/powerpoint/2010/main" xmlns="" val="585871984"/>
       </p:ext>
     </p:extLst>
   </p:cSld>
@@ -9477,8 +9525,24 @@
           <a:p>
             <a:r>
               <a:rPr lang="en-GB" dirty="0" smtClean="0"/>
-              <a:t>Currently the following features have been suggested/requested by the community:</a:t>
-            </a:r>
+              <a:t>Currently the following features have been suggested/requested by the community</a:t>
+            </a:r>
+            <a:r>
+              <a:rPr lang="en-GB" dirty="0" smtClean="0"/>
+              <a:t>:</a:t>
+            </a:r>
+          </a:p>
+          <a:p>
+            <a:pPr lvl="1"/>
+            <a:r>
+              <a:rPr lang="en-GB" dirty="0" err="1" smtClean="0"/>
+              <a:t>.Net</a:t>
+            </a:r>
+            <a:r>
+              <a:rPr lang="en-GB" dirty="0" smtClean="0"/>
+              <a:t> Serialization support</a:t>
+            </a:r>
+            <a:endParaRPr lang="en-GB" dirty="0" smtClean="0"/>
           </a:p>
           <a:p>
             <a:pPr lvl="1"/>
@@ -9495,8 +9559,28 @@
             </a:r>
             <a:r>
               <a:rPr lang="en-GB" dirty="0" smtClean="0"/>
-              <a:t> for non-Windows systems – as it is WPF based it does not run under Mono which limits it to Windows only</a:t>
-            </a:r>
+              <a:t> for non-Windows </a:t>
+            </a:r>
+            <a:r>
+              <a:rPr lang="en-GB" dirty="0" smtClean="0"/>
+              <a:t>systems</a:t>
+            </a:r>
+          </a:p>
+          <a:p>
+            <a:pPr lvl="2"/>
+            <a:r>
+              <a:rPr lang="en-GB" dirty="0" smtClean="0"/>
+              <a:t>As </a:t>
+            </a:r>
+            <a:r>
+              <a:rPr lang="en-GB" dirty="0" smtClean="0"/>
+              <a:t>it is WPF based it does not run under Mono which limits it to Windows </a:t>
+            </a:r>
+            <a:r>
+              <a:rPr lang="en-GB" smtClean="0"/>
+              <a:t>only currently</a:t>
+            </a:r>
+            <a:endParaRPr lang="en-GB" dirty="0" smtClean="0"/>
           </a:p>
           <a:p>
             <a:pPr lvl="1"/>
@@ -9525,7 +9609,8 @@
           <a:p>
             <a:fld id="{CDAEE9B0-25E7-4C28-AF1D-B3DDCE7EBBDB}" type="datetime1">
               <a:rPr lang="en-US" smtClean="0"/>
-              <a:t>7/4/2011</a:t>
+              <a:pPr/>
+              <a:t>7/5/2011</a:t>
             </a:fld>
             <a:endParaRPr lang="en-GB"/>
           </a:p>
@@ -9581,7 +9666,7 @@
     </p:spTree>
     <p:extLst>
       <p:ext uri="{BB962C8B-B14F-4D97-AF65-F5344CB8AC3E}">
-        <p14:creationId xmlns:p14="http://schemas.microsoft.com/office/powerpoint/2010/main" val="2152085500"/>
+        <p14:creationId xmlns:p14="http://schemas.microsoft.com/office/powerpoint/2010/main" xmlns="" val="2152085500"/>
       </p:ext>
     </p:extLst>
   </p:cSld>
@@ -9648,7 +9733,8 @@
           <a:p>
             <a:fld id="{CDAEE9B0-25E7-4C28-AF1D-B3DDCE7EBBDB}" type="datetime1">
               <a:rPr lang="en-US" smtClean="0"/>
-              <a:t>7/4/2011</a:t>
+              <a:pPr/>
+              <a:t>7/5/2011</a:t>
             </a:fld>
             <a:endParaRPr lang="en-GB"/>
           </a:p>
@@ -9704,7 +9790,7 @@
     </p:spTree>
     <p:extLst>
       <p:ext uri="{BB962C8B-B14F-4D97-AF65-F5344CB8AC3E}">
-        <p14:creationId xmlns:p14="http://schemas.microsoft.com/office/powerpoint/2010/main" val="3258641840"/>
+        <p14:creationId xmlns:p14="http://schemas.microsoft.com/office/powerpoint/2010/main" xmlns="" val="3258641840"/>
       </p:ext>
     </p:extLst>
   </p:cSld>
@@ -9843,7 +9929,8 @@
           <a:p>
             <a:fld id="{CDAEE9B0-25E7-4C28-AF1D-B3DDCE7EBBDB}" type="datetime1">
               <a:rPr lang="en-US" smtClean="0"/>
-              <a:t>7/4/2011</a:t>
+              <a:pPr/>
+              <a:t>7/5/2011</a:t>
             </a:fld>
             <a:endParaRPr lang="en-GB"/>
           </a:p>
@@ -9899,7 +9986,7 @@
     </p:spTree>
     <p:extLst>
       <p:ext uri="{BB962C8B-B14F-4D97-AF65-F5344CB8AC3E}">
-        <p14:creationId xmlns:p14="http://schemas.microsoft.com/office/powerpoint/2010/main" val="1264147251"/>
+        <p14:creationId xmlns:p14="http://schemas.microsoft.com/office/powerpoint/2010/main" xmlns="" val="1264147251"/>
       </p:ext>
     </p:extLst>
   </p:cSld>
@@ -10042,7 +10129,8 @@
           <a:p>
             <a:fld id="{CDAEE9B0-25E7-4C28-AF1D-B3DDCE7EBBDB}" type="datetime1">
               <a:rPr lang="en-US" smtClean="0"/>
-              <a:t>7/4/2011</a:t>
+              <a:pPr/>
+              <a:t>7/5/2011</a:t>
             </a:fld>
             <a:endParaRPr lang="en-GB"/>
           </a:p>
@@ -10098,7 +10186,7 @@
     </p:spTree>
     <p:extLst>
       <p:ext uri="{BB962C8B-B14F-4D97-AF65-F5344CB8AC3E}">
-        <p14:creationId xmlns:p14="http://schemas.microsoft.com/office/powerpoint/2010/main" val="798761902"/>
+        <p14:creationId xmlns:p14="http://schemas.microsoft.com/office/powerpoint/2010/main" xmlns="" val="798761902"/>
       </p:ext>
     </p:extLst>
   </p:cSld>
@@ -10222,7 +10310,8 @@
           <a:p>
             <a:fld id="{CDAEE9B0-25E7-4C28-AF1D-B3DDCE7EBBDB}" type="datetime1">
               <a:rPr lang="en-US" smtClean="0"/>
-              <a:t>7/4/2011</a:t>
+              <a:pPr/>
+              <a:t>7/5/2011</a:t>
             </a:fld>
             <a:endParaRPr lang="en-GB"/>
           </a:p>
@@ -10278,7 +10367,7 @@
     </p:spTree>
     <p:extLst>
       <p:ext uri="{BB962C8B-B14F-4D97-AF65-F5344CB8AC3E}">
-        <p14:creationId xmlns:p14="http://schemas.microsoft.com/office/powerpoint/2010/main" val="685525953"/>
+        <p14:creationId xmlns:p14="http://schemas.microsoft.com/office/powerpoint/2010/main" xmlns="" val="685525953"/>
       </p:ext>
     </p:extLst>
   </p:cSld>
@@ -10345,7 +10434,8 @@
           <a:p>
             <a:fld id="{EA5D455B-ECD0-44E3-BA0C-3649A3FCD15C}" type="datetime1">
               <a:rPr lang="en-US" smtClean="0"/>
-              <a:t>7/4/2011</a:t>
+              <a:pPr/>
+              <a:t>7/5/2011</a:t>
             </a:fld>
             <a:endParaRPr lang="en-GB"/>
           </a:p>
@@ -10401,7 +10491,7 @@
     </p:spTree>
     <p:extLst>
       <p:ext uri="{BB962C8B-B14F-4D97-AF65-F5344CB8AC3E}">
-        <p14:creationId xmlns:p14="http://schemas.microsoft.com/office/powerpoint/2010/main" val="2062332550"/>
+        <p14:creationId xmlns:p14="http://schemas.microsoft.com/office/powerpoint/2010/main" xmlns="" val="2062332550"/>
       </p:ext>
     </p:extLst>
   </p:cSld>
@@ -10506,7 +10596,8 @@
           <a:p>
             <a:fld id="{CDAEE9B0-25E7-4C28-AF1D-B3DDCE7EBBDB}" type="datetime1">
               <a:rPr lang="en-US" smtClean="0"/>
-              <a:t>7/4/2011</a:t>
+              <a:pPr/>
+              <a:t>7/5/2011</a:t>
             </a:fld>
             <a:endParaRPr lang="en-GB"/>
           </a:p>
@@ -10562,7 +10653,7 @@
     </p:spTree>
     <p:extLst>
       <p:ext uri="{BB962C8B-B14F-4D97-AF65-F5344CB8AC3E}">
-        <p14:creationId xmlns:p14="http://schemas.microsoft.com/office/powerpoint/2010/main" val="2752513629"/>
+        <p14:creationId xmlns:p14="http://schemas.microsoft.com/office/powerpoint/2010/main" xmlns="" val="2752513629"/>
       </p:ext>
     </p:extLst>
   </p:cSld>
@@ -10685,7 +10776,8 @@
           <a:p>
             <a:fld id="{CDAEE9B0-25E7-4C28-AF1D-B3DDCE7EBBDB}" type="datetime1">
               <a:rPr lang="en-US" smtClean="0"/>
-              <a:t>7/4/2011</a:t>
+              <a:pPr/>
+              <a:t>7/5/2011</a:t>
             </a:fld>
             <a:endParaRPr lang="en-GB"/>
           </a:p>
@@ -10741,7 +10833,7 @@
     </p:spTree>
     <p:extLst>
       <p:ext uri="{BB962C8B-B14F-4D97-AF65-F5344CB8AC3E}">
-        <p14:creationId xmlns:p14="http://schemas.microsoft.com/office/powerpoint/2010/main" val="1884836899"/>
+        <p14:creationId xmlns:p14="http://schemas.microsoft.com/office/powerpoint/2010/main" xmlns="" val="1884836899"/>
       </p:ext>
     </p:extLst>
   </p:cSld>
@@ -10837,7 +10929,8 @@
           <a:p>
             <a:fld id="{CDAEE9B0-25E7-4C28-AF1D-B3DDCE7EBBDB}" type="datetime1">
               <a:rPr lang="en-US" smtClean="0"/>
-              <a:t>7/4/2011</a:t>
+              <a:pPr/>
+              <a:t>7/5/2011</a:t>
             </a:fld>
             <a:endParaRPr lang="en-GB"/>
           </a:p>
@@ -10893,7 +10986,7 @@
     </p:spTree>
     <p:extLst>
       <p:ext uri="{BB962C8B-B14F-4D97-AF65-F5344CB8AC3E}">
-        <p14:creationId xmlns:p14="http://schemas.microsoft.com/office/powerpoint/2010/main" val="1547614895"/>
+        <p14:creationId xmlns:p14="http://schemas.microsoft.com/office/powerpoint/2010/main" xmlns="" val="1547614895"/>
       </p:ext>
     </p:extLst>
   </p:cSld>

</xml_diff>

<commit_message>
More tweaks re: .Net serialization
</commit_message>
<xml_diff>
--- a/Slides/Roadmap.pptx
+++ b/Slides/Roadmap.pptx
@@ -5,7 +5,7 @@
     <p:sldMasterId id="2147483648" r:id="rId1"/>
   </p:sldMasterIdLst>
   <p:notesMasterIdLst>
-    <p:notesMasterId r:id="rId48"/>
+    <p:notesMasterId r:id="rId49"/>
   </p:notesMasterIdLst>
   <p:sldIdLst>
     <p:sldId id="256" r:id="rId2"/>
@@ -30,30 +30,31 @@
     <p:sldId id="272" r:id="rId21"/>
     <p:sldId id="273" r:id="rId22"/>
     <p:sldId id="274" r:id="rId23"/>
-    <p:sldId id="276" r:id="rId24"/>
-    <p:sldId id="279" r:id="rId25"/>
-    <p:sldId id="280" r:id="rId26"/>
-    <p:sldId id="281" r:id="rId27"/>
-    <p:sldId id="282" r:id="rId28"/>
-    <p:sldId id="283" r:id="rId29"/>
-    <p:sldId id="287" r:id="rId30"/>
-    <p:sldId id="288" r:id="rId31"/>
-    <p:sldId id="289" r:id="rId32"/>
-    <p:sldId id="299" r:id="rId33"/>
-    <p:sldId id="290" r:id="rId34"/>
-    <p:sldId id="291" r:id="rId35"/>
-    <p:sldId id="292" r:id="rId36"/>
-    <p:sldId id="293" r:id="rId37"/>
-    <p:sldId id="294" r:id="rId38"/>
-    <p:sldId id="295" r:id="rId39"/>
-    <p:sldId id="296" r:id="rId40"/>
-    <p:sldId id="297" r:id="rId41"/>
-    <p:sldId id="298" r:id="rId42"/>
-    <p:sldId id="300" r:id="rId43"/>
-    <p:sldId id="301" r:id="rId44"/>
-    <p:sldId id="303" r:id="rId45"/>
-    <p:sldId id="302" r:id="rId46"/>
-    <p:sldId id="304" r:id="rId47"/>
+    <p:sldId id="307" r:id="rId24"/>
+    <p:sldId id="276" r:id="rId25"/>
+    <p:sldId id="279" r:id="rId26"/>
+    <p:sldId id="280" r:id="rId27"/>
+    <p:sldId id="281" r:id="rId28"/>
+    <p:sldId id="282" r:id="rId29"/>
+    <p:sldId id="283" r:id="rId30"/>
+    <p:sldId id="287" r:id="rId31"/>
+    <p:sldId id="288" r:id="rId32"/>
+    <p:sldId id="289" r:id="rId33"/>
+    <p:sldId id="299" r:id="rId34"/>
+    <p:sldId id="290" r:id="rId35"/>
+    <p:sldId id="291" r:id="rId36"/>
+    <p:sldId id="292" r:id="rId37"/>
+    <p:sldId id="293" r:id="rId38"/>
+    <p:sldId id="294" r:id="rId39"/>
+    <p:sldId id="295" r:id="rId40"/>
+    <p:sldId id="296" r:id="rId41"/>
+    <p:sldId id="297" r:id="rId42"/>
+    <p:sldId id="298" r:id="rId43"/>
+    <p:sldId id="300" r:id="rId44"/>
+    <p:sldId id="301" r:id="rId45"/>
+    <p:sldId id="303" r:id="rId46"/>
+    <p:sldId id="302" r:id="rId47"/>
+    <p:sldId id="304" r:id="rId48"/>
   </p:sldIdLst>
   <p:sldSz cx="9144000" cy="6858000" type="screen4x3"/>
   <p:notesSz cx="7099300" cy="10223500"/>
@@ -238,7 +239,7 @@
             <a:fld id="{A4EFCF4D-B222-4BDE-9F21-361A6D2DD5DC}" type="datetimeFigureOut">
               <a:rPr lang="en-GB" smtClean="0"/>
               <a:pPr/>
-              <a:t>05/07/2011</a:t>
+              <a:t>13/07/2011</a:t>
             </a:fld>
             <a:endParaRPr lang="en-GB"/>
           </a:p>
@@ -407,7 +408,7 @@
     </p:spTree>
     <p:extLst>
       <p:ext uri="{BB962C8B-B14F-4D97-AF65-F5344CB8AC3E}">
-        <p14:creationId xmlns:p14="http://schemas.microsoft.com/office/powerpoint/2010/main" xmlns="" val="3764111685"/>
+        <p14:creationId xmlns:p14="http://schemas.microsoft.com/office/powerpoint/2010/main" val="3764111685"/>
       </p:ext>
     </p:extLst>
   </p:cSld>
@@ -695,7 +696,7 @@
             <a:fld id="{7DDF2E66-A8D8-4938-9770-803246E1F4D9}" type="datetime1">
               <a:rPr lang="en-US" smtClean="0"/>
               <a:pPr/>
-              <a:t>7/5/2011</a:t>
+              <a:t>7/13/2011</a:t>
             </a:fld>
             <a:endParaRPr lang="en-GB"/>
           </a:p>
@@ -886,7 +887,7 @@
             <a:fld id="{CDAEE9B0-25E7-4C28-AF1D-B3DDCE7EBBDB}" type="datetime1">
               <a:rPr lang="en-US" smtClean="0"/>
               <a:pPr/>
-              <a:t>7/5/2011</a:t>
+              <a:t>7/13/2011</a:t>
             </a:fld>
             <a:endParaRPr lang="en-GB"/>
           </a:p>
@@ -1133,7 +1134,7 @@
             <a:fld id="{B4D3D433-0AB0-44F2-9244-5C7078B0628D}" type="datetime1">
               <a:rPr lang="en-US" smtClean="0"/>
               <a:pPr/>
-              <a:t>7/5/2011</a:t>
+              <a:t>7/13/2011</a:t>
             </a:fld>
             <a:endParaRPr lang="en-GB"/>
           </a:p>
@@ -1437,7 +1438,7 @@
             <a:fld id="{603E95A3-71BD-4303-BDB5-8A36882C7B2B}" type="datetime1">
               <a:rPr lang="en-US" smtClean="0"/>
               <a:pPr/>
-              <a:t>7/5/2011</a:t>
+              <a:t>7/13/2011</a:t>
             </a:fld>
             <a:endParaRPr lang="en-GB"/>
           </a:p>
@@ -1845,7 +1846,7 @@
             <a:fld id="{DA3AB10B-EC00-4A9D-ADD6-A8B68613B4D2}" type="datetime1">
               <a:rPr lang="en-US" smtClean="0"/>
               <a:pPr/>
-              <a:t>7/5/2011</a:t>
+              <a:t>7/13/2011</a:t>
             </a:fld>
             <a:endParaRPr lang="en-GB"/>
           </a:p>
@@ -1977,7 +1978,7 @@
             <a:fld id="{EA5D455B-ECD0-44E3-BA0C-3649A3FCD15C}" type="datetime1">
               <a:rPr lang="en-US" smtClean="0"/>
               <a:pPr/>
-              <a:t>7/5/2011</a:t>
+              <a:t>7/13/2011</a:t>
             </a:fld>
             <a:endParaRPr lang="en-GB"/>
           </a:p>
@@ -2073,7 +2074,7 @@
             <a:fld id="{F83BA156-88F6-4A85-BCB0-63F0774EAEDC}" type="datetime1">
               <a:rPr lang="en-US" smtClean="0"/>
               <a:pPr/>
-              <a:t>7/5/2011</a:t>
+              <a:t>7/13/2011</a:t>
             </a:fld>
             <a:endParaRPr lang="en-GB"/>
           </a:p>
@@ -2357,7 +2358,7 @@
             <a:fld id="{044DBA34-05AD-44A3-A0F1-C917A9CE0E42}" type="datetime1">
               <a:rPr lang="en-US" smtClean="0"/>
               <a:pPr/>
-              <a:t>7/5/2011</a:t>
+              <a:t>7/13/2011</a:t>
             </a:fld>
             <a:endParaRPr lang="en-GB"/>
           </a:p>
@@ -2621,7 +2622,7 @@
             <a:fld id="{3FDD57B1-846D-42C4-9FE3-5B43FAB1C846}" type="datetime1">
               <a:rPr lang="en-US" smtClean="0"/>
               <a:pPr/>
-              <a:t>7/5/2011</a:t>
+              <a:t>7/13/2011</a:t>
             </a:fld>
             <a:endParaRPr lang="en-GB"/>
           </a:p>
@@ -2773,7 +2774,7 @@
             <a:fld id="{8EDAB77D-6898-4F92-AE07-90DBD2DF1995}" type="datetime1">
               <a:rPr lang="en-US" smtClean="0"/>
               <a:pPr/>
-              <a:t>7/5/2011</a:t>
+              <a:t>7/13/2011</a:t>
             </a:fld>
             <a:endParaRPr lang="en-GB" dirty="0"/>
           </a:p>
@@ -3334,7 +3335,7 @@
             <a:fld id="{ADB3C27C-C00A-40F0-A166-0452DE5EF4FD}" type="datetime1">
               <a:rPr lang="en-US" smtClean="0"/>
               <a:pPr/>
-              <a:t>7/5/2011</a:t>
+              <a:t>7/13/2011</a:t>
             </a:fld>
             <a:endParaRPr lang="en-GB"/>
           </a:p>
@@ -3508,7 +3509,7 @@
             <a:fld id="{EA5D455B-ECD0-44E3-BA0C-3649A3FCD15C}" type="datetime1">
               <a:rPr lang="en-US" smtClean="0"/>
               <a:pPr/>
-              <a:t>7/5/2011</a:t>
+              <a:t>7/13/2011</a:t>
             </a:fld>
             <a:endParaRPr lang="en-GB"/>
           </a:p>
@@ -3564,7 +3565,7 @@
     </p:spTree>
     <p:extLst>
       <p:ext uri="{BB962C8B-B14F-4D97-AF65-F5344CB8AC3E}">
-        <p14:creationId xmlns:p14="http://schemas.microsoft.com/office/powerpoint/2010/main" xmlns="" val="3728461749"/>
+        <p14:creationId xmlns:p14="http://schemas.microsoft.com/office/powerpoint/2010/main" val="3728461749"/>
       </p:ext>
     </p:extLst>
   </p:cSld>
@@ -3686,7 +3687,7 @@
             <a:fld id="{CDAEE9B0-25E7-4C28-AF1D-B3DDCE7EBBDB}" type="datetime1">
               <a:rPr lang="en-US" smtClean="0"/>
               <a:pPr/>
-              <a:t>7/5/2011</a:t>
+              <a:t>7/13/2011</a:t>
             </a:fld>
             <a:endParaRPr lang="en-GB"/>
           </a:p>
@@ -3742,7 +3743,7 @@
     </p:spTree>
     <p:extLst>
       <p:ext uri="{BB962C8B-B14F-4D97-AF65-F5344CB8AC3E}">
-        <p14:creationId xmlns:p14="http://schemas.microsoft.com/office/powerpoint/2010/main" xmlns="" val="3573922916"/>
+        <p14:creationId xmlns:p14="http://schemas.microsoft.com/office/powerpoint/2010/main" val="3573922916"/>
       </p:ext>
     </p:extLst>
   </p:cSld>
@@ -3826,7 +3827,23 @@
           <a:p>
             <a:r>
               <a:rPr lang="en-GB" dirty="0" smtClean="0"/>
-              <a:t>Combines with new virtualised storage subsystem for improved SPARQL performance without need to load entire dataset into memory</a:t>
+              <a:t>Combines with new virtualised storage subsystem for </a:t>
+            </a:r>
+            <a:r>
+              <a:rPr lang="en-GB" dirty="0" smtClean="0"/>
+              <a:t>reasonable</a:t>
+            </a:r>
+            <a:r>
+              <a:rPr lang="en-GB" dirty="0" smtClean="0"/>
+              <a:t> </a:t>
+            </a:r>
+            <a:r>
+              <a:rPr lang="en-GB" dirty="0" smtClean="0"/>
+              <a:t>SPARQL performance </a:t>
+            </a:r>
+            <a:r>
+              <a:rPr lang="en-GB" dirty="0" smtClean="0"/>
+              <a:t>with much lower memory requirements</a:t>
             </a:r>
             <a:endParaRPr lang="en-GB" dirty="0"/>
           </a:p>
@@ -3850,7 +3867,7 @@
             <a:fld id="{CDAEE9B0-25E7-4C28-AF1D-B3DDCE7EBBDB}" type="datetime1">
               <a:rPr lang="en-US" smtClean="0"/>
               <a:pPr/>
-              <a:t>7/5/2011</a:t>
+              <a:t>7/13/2011</a:t>
             </a:fld>
             <a:endParaRPr lang="en-GB"/>
           </a:p>
@@ -3906,7 +3923,7 @@
     </p:spTree>
     <p:extLst>
       <p:ext uri="{BB962C8B-B14F-4D97-AF65-F5344CB8AC3E}">
-        <p14:creationId xmlns:p14="http://schemas.microsoft.com/office/powerpoint/2010/main" xmlns="" val="2108512158"/>
+        <p14:creationId xmlns:p14="http://schemas.microsoft.com/office/powerpoint/2010/main" val="2108512158"/>
       </p:ext>
     </p:extLst>
   </p:cSld>
@@ -4009,7 +4026,7 @@
             <a:fld id="{CDAEE9B0-25E7-4C28-AF1D-B3DDCE7EBBDB}" type="datetime1">
               <a:rPr lang="en-US" smtClean="0"/>
               <a:pPr/>
-              <a:t>7/5/2011</a:t>
+              <a:t>7/13/2011</a:t>
             </a:fld>
             <a:endParaRPr lang="en-GB" dirty="0"/>
           </a:p>
@@ -4065,7 +4082,7 @@
     </p:spTree>
     <p:extLst>
       <p:ext uri="{BB962C8B-B14F-4D97-AF65-F5344CB8AC3E}">
-        <p14:creationId xmlns:p14="http://schemas.microsoft.com/office/powerpoint/2010/main" xmlns="" val="3738179165"/>
+        <p14:creationId xmlns:p14="http://schemas.microsoft.com/office/powerpoint/2010/main" val="3738179165"/>
       </p:ext>
     </p:extLst>
   </p:cSld>
@@ -4194,7 +4211,7 @@
             <a:fld id="{CDAEE9B0-25E7-4C28-AF1D-B3DDCE7EBBDB}" type="datetime1">
               <a:rPr lang="en-US" smtClean="0"/>
               <a:pPr/>
-              <a:t>7/5/2011</a:t>
+              <a:t>7/13/2011</a:t>
             </a:fld>
             <a:endParaRPr lang="en-GB"/>
           </a:p>
@@ -4250,7 +4267,7 @@
     </p:spTree>
     <p:extLst>
       <p:ext uri="{BB962C8B-B14F-4D97-AF65-F5344CB8AC3E}">
-        <p14:creationId xmlns:p14="http://schemas.microsoft.com/office/powerpoint/2010/main" xmlns="" val="1957182481"/>
+        <p14:creationId xmlns:p14="http://schemas.microsoft.com/office/powerpoint/2010/main" val="1957182481"/>
       </p:ext>
     </p:extLst>
   </p:cSld>
@@ -4351,7 +4368,23 @@
             <a:pPr lvl="1"/>
             <a:r>
               <a:rPr lang="en-GB" dirty="0" smtClean="0"/>
-              <a:t>Designed primarily to improve performance for out of memory SPARQL datasets</a:t>
+              <a:t>Designed primarily to improve </a:t>
+            </a:r>
+            <a:r>
+              <a:rPr lang="en-GB" dirty="0" smtClean="0"/>
+              <a:t>performance (and memor</a:t>
+            </a:r>
+            <a:r>
+              <a:rPr lang="en-GB" dirty="0" smtClean="0"/>
+              <a:t>y usage)</a:t>
+            </a:r>
+            <a:r>
+              <a:rPr lang="en-GB" dirty="0" smtClean="0"/>
+              <a:t> </a:t>
+            </a:r>
+            <a:r>
+              <a:rPr lang="en-GB" dirty="0" smtClean="0"/>
+              <a:t>for out of memory SPARQL datasets</a:t>
             </a:r>
           </a:p>
           <a:p>
@@ -4381,7 +4414,7 @@
             <a:fld id="{CDAEE9B0-25E7-4C28-AF1D-B3DDCE7EBBDB}" type="datetime1">
               <a:rPr lang="en-US" smtClean="0"/>
               <a:pPr/>
-              <a:t>7/5/2011</a:t>
+              <a:t>7/13/2011</a:t>
             </a:fld>
             <a:endParaRPr lang="en-GB"/>
           </a:p>
@@ -4437,7 +4470,7 @@
     </p:spTree>
     <p:extLst>
       <p:ext uri="{BB962C8B-B14F-4D97-AF65-F5344CB8AC3E}">
-        <p14:creationId xmlns:p14="http://schemas.microsoft.com/office/powerpoint/2010/main" xmlns="" val="2909703350"/>
+        <p14:creationId xmlns:p14="http://schemas.microsoft.com/office/powerpoint/2010/main" val="2909703350"/>
       </p:ext>
     </p:extLst>
   </p:cSld>
@@ -4544,7 +4577,7 @@
             <a:fld id="{CDAEE9B0-25E7-4C28-AF1D-B3DDCE7EBBDB}" type="datetime1">
               <a:rPr lang="en-US" smtClean="0"/>
               <a:pPr/>
-              <a:t>7/5/2011</a:t>
+              <a:t>7/13/2011</a:t>
             </a:fld>
             <a:endParaRPr lang="en-GB"/>
           </a:p>
@@ -4600,7 +4633,7 @@
     </p:spTree>
     <p:extLst>
       <p:ext uri="{BB962C8B-B14F-4D97-AF65-F5344CB8AC3E}">
-        <p14:creationId xmlns:p14="http://schemas.microsoft.com/office/powerpoint/2010/main" xmlns="" val="3472818035"/>
+        <p14:creationId xmlns:p14="http://schemas.microsoft.com/office/powerpoint/2010/main" val="3472818035"/>
       </p:ext>
     </p:extLst>
   </p:cSld>
@@ -4713,7 +4746,7 @@
             <a:fld id="{CDAEE9B0-25E7-4C28-AF1D-B3DDCE7EBBDB}" type="datetime1">
               <a:rPr lang="en-US" smtClean="0"/>
               <a:pPr/>
-              <a:t>7/5/2011</a:t>
+              <a:t>7/13/2011</a:t>
             </a:fld>
             <a:endParaRPr lang="en-GB"/>
           </a:p>
@@ -4769,7 +4802,7 @@
     </p:spTree>
     <p:extLst>
       <p:ext uri="{BB962C8B-B14F-4D97-AF65-F5344CB8AC3E}">
-        <p14:creationId xmlns:p14="http://schemas.microsoft.com/office/powerpoint/2010/main" xmlns="" val="1034858646"/>
+        <p14:creationId xmlns:p14="http://schemas.microsoft.com/office/powerpoint/2010/main" val="1034858646"/>
       </p:ext>
     </p:extLst>
   </p:cSld>
@@ -4891,7 +4924,7 @@
             <a:fld id="{CDAEE9B0-25E7-4C28-AF1D-B3DDCE7EBBDB}" type="datetime1">
               <a:rPr lang="en-US" smtClean="0"/>
               <a:pPr/>
-              <a:t>7/5/2011</a:t>
+              <a:t>7/13/2011</a:t>
             </a:fld>
             <a:endParaRPr lang="en-GB"/>
           </a:p>
@@ -4947,7 +4980,7 @@
     </p:spTree>
     <p:extLst>
       <p:ext uri="{BB962C8B-B14F-4D97-AF65-F5344CB8AC3E}">
-        <p14:creationId xmlns:p14="http://schemas.microsoft.com/office/powerpoint/2010/main" xmlns="" val="3849529298"/>
+        <p14:creationId xmlns:p14="http://schemas.microsoft.com/office/powerpoint/2010/main" val="3849529298"/>
       </p:ext>
     </p:extLst>
   </p:cSld>
@@ -5106,7 +5139,7 @@
             <a:fld id="{CDAEE9B0-25E7-4C28-AF1D-B3DDCE7EBBDB}" type="datetime1">
               <a:rPr lang="en-US" smtClean="0"/>
               <a:pPr/>
-              <a:t>7/5/2011</a:t>
+              <a:t>7/13/2011</a:t>
             </a:fld>
             <a:endParaRPr lang="en-GB"/>
           </a:p>
@@ -5162,7 +5195,7 @@
     </p:spTree>
     <p:extLst>
       <p:ext uri="{BB962C8B-B14F-4D97-AF65-F5344CB8AC3E}">
-        <p14:creationId xmlns:p14="http://schemas.microsoft.com/office/powerpoint/2010/main" xmlns="" val="4093170207"/>
+        <p14:creationId xmlns:p14="http://schemas.microsoft.com/office/powerpoint/2010/main" val="4093170207"/>
       </p:ext>
     </p:extLst>
   </p:cSld>
@@ -5298,7 +5331,7 @@
             <a:fld id="{CDAEE9B0-25E7-4C28-AF1D-B3DDCE7EBBDB}" type="datetime1">
               <a:rPr lang="en-US" smtClean="0"/>
               <a:pPr/>
-              <a:t>7/5/2011</a:t>
+              <a:t>7/13/2011</a:t>
             </a:fld>
             <a:endParaRPr lang="en-GB"/>
           </a:p>
@@ -5354,7 +5387,7 @@
     </p:spTree>
     <p:extLst>
       <p:ext uri="{BB962C8B-B14F-4D97-AF65-F5344CB8AC3E}">
-        <p14:creationId xmlns:p14="http://schemas.microsoft.com/office/powerpoint/2010/main" xmlns="" val="2357537943"/>
+        <p14:creationId xmlns:p14="http://schemas.microsoft.com/office/powerpoint/2010/main" val="2357537943"/>
       </p:ext>
     </p:extLst>
   </p:cSld>
@@ -5476,7 +5509,7 @@
             <a:fld id="{CDAEE9B0-25E7-4C28-AF1D-B3DDCE7EBBDB}" type="datetime1">
               <a:rPr lang="en-US" smtClean="0"/>
               <a:pPr/>
-              <a:t>7/5/2011</a:t>
+              <a:t>7/13/2011</a:t>
             </a:fld>
             <a:endParaRPr lang="en-GB"/>
           </a:p>
@@ -5532,7 +5565,7 @@
     </p:spTree>
     <p:extLst>
       <p:ext uri="{BB962C8B-B14F-4D97-AF65-F5344CB8AC3E}">
-        <p14:creationId xmlns:p14="http://schemas.microsoft.com/office/powerpoint/2010/main" xmlns="" val="509411177"/>
+        <p14:creationId xmlns:p14="http://schemas.microsoft.com/office/powerpoint/2010/main" val="509411177"/>
       </p:ext>
     </p:extLst>
   </p:cSld>
@@ -5656,7 +5689,7 @@
             <a:fld id="{CDAEE9B0-25E7-4C28-AF1D-B3DDCE7EBBDB}" type="datetime1">
               <a:rPr lang="en-US" smtClean="0"/>
               <a:pPr/>
-              <a:t>7/5/2011</a:t>
+              <a:t>7/13/2011</a:t>
             </a:fld>
             <a:endParaRPr lang="en-GB"/>
           </a:p>
@@ -5712,7 +5745,7 @@
     </p:spTree>
     <p:extLst>
       <p:ext uri="{BB962C8B-B14F-4D97-AF65-F5344CB8AC3E}">
-        <p14:creationId xmlns:p14="http://schemas.microsoft.com/office/powerpoint/2010/main" xmlns="" val="673125997"/>
+        <p14:creationId xmlns:p14="http://schemas.microsoft.com/office/powerpoint/2010/main" val="673125997"/>
       </p:ext>
     </p:extLst>
   </p:cSld>
@@ -5810,7 +5843,7 @@
             <a:fld id="{CDAEE9B0-25E7-4C28-AF1D-B3DDCE7EBBDB}" type="datetime1">
               <a:rPr lang="en-US" smtClean="0"/>
               <a:pPr/>
-              <a:t>7/5/2011</a:t>
+              <a:t>7/13/2011</a:t>
             </a:fld>
             <a:endParaRPr lang="en-GB"/>
           </a:p>
@@ -5866,7 +5899,7 @@
     </p:spTree>
     <p:extLst>
       <p:ext uri="{BB962C8B-B14F-4D97-AF65-F5344CB8AC3E}">
-        <p14:creationId xmlns:p14="http://schemas.microsoft.com/office/powerpoint/2010/main" xmlns="" val="2964860377"/>
+        <p14:creationId xmlns:p14="http://schemas.microsoft.com/office/powerpoint/2010/main" val="2964860377"/>
       </p:ext>
     </p:extLst>
   </p:cSld>
@@ -5909,17 +5942,190 @@
           <a:lstStyle/>
           <a:p>
             <a:r>
-              <a:rPr lang="en-GB" dirty="0" smtClean="0"/>
-              <a:t>Upcoming Features - Toolkit</a:t>
+              <a:rPr lang="en-GB" dirty="0" err="1" smtClean="0"/>
+              <a:t>.Net</a:t>
+            </a:r>
+            <a:r>
+              <a:rPr lang="en-GB" dirty="0" smtClean="0"/>
+              <a:t> Serialization Support</a:t>
             </a:r>
             <a:endParaRPr lang="en-GB" dirty="0"/>
+          </a:p>
+        </p:txBody>
+      </p:sp>
+      <p:sp>
+        <p:nvSpPr>
+          <p:cNvPr id="3" name="Content Placeholder 2"/>
+          <p:cNvSpPr>
+            <a:spLocks noGrp="1"/>
+          </p:cNvSpPr>
+          <p:nvPr>
+            <p:ph idx="1"/>
+          </p:nvPr>
+        </p:nvSpPr>
+        <p:spPr/>
+        <p:txBody>
+          <a:bodyPr/>
+          <a:lstStyle/>
+          <a:p>
+            <a:r>
+              <a:rPr lang="en-GB" dirty="0" smtClean="0"/>
+              <a:t>Initial support for </a:t>
+            </a:r>
+            <a:r>
+              <a:rPr lang="en-GB" dirty="0" err="1" smtClean="0"/>
+              <a:t>.Net</a:t>
+            </a:r>
+            <a:r>
+              <a:rPr lang="en-GB" dirty="0" smtClean="0"/>
+              <a:t> serialization</a:t>
+            </a:r>
+          </a:p>
+          <a:p>
+            <a:pPr lvl="1"/>
+            <a:r>
+              <a:rPr lang="en-GB" dirty="0" smtClean="0"/>
+              <a:t>Core interfaces and classes (</a:t>
+            </a:r>
+            <a:r>
+              <a:rPr lang="en-GB" dirty="0" err="1" smtClean="0"/>
+              <a:t>INode</a:t>
+            </a:r>
+            <a:r>
+              <a:rPr lang="en-GB" dirty="0" smtClean="0"/>
+              <a:t>, Triple, </a:t>
+            </a:r>
+            <a:r>
+              <a:rPr lang="en-GB" dirty="0" err="1" smtClean="0"/>
+              <a:t>IGraph</a:t>
+            </a:r>
+            <a:r>
+              <a:rPr lang="en-GB" dirty="0" smtClean="0"/>
+              <a:t>, </a:t>
+            </a:r>
+            <a:r>
+              <a:rPr lang="en-GB" dirty="0" err="1" smtClean="0"/>
+              <a:t>SparqlResult</a:t>
+            </a:r>
+            <a:r>
+              <a:rPr lang="en-GB" dirty="0" smtClean="0"/>
+              <a:t>, </a:t>
+            </a:r>
+            <a:r>
+              <a:rPr lang="en-GB" dirty="0" err="1" smtClean="0"/>
+              <a:t>SparqlResultSet</a:t>
+            </a:r>
+            <a:r>
+              <a:rPr lang="en-GB" dirty="0" smtClean="0"/>
+              <a:t>) will implement </a:t>
+            </a:r>
+            <a:r>
+              <a:rPr lang="en-GB" dirty="0" err="1" smtClean="0"/>
+              <a:t>ISerializable</a:t>
+            </a:r>
+            <a:r>
+              <a:rPr lang="en-GB" dirty="0" smtClean="0"/>
+              <a:t> and </a:t>
+            </a:r>
+            <a:r>
+              <a:rPr lang="en-GB" dirty="0" err="1" smtClean="0"/>
+              <a:t>IXmlSerializable</a:t>
+            </a:r>
+            <a:endParaRPr lang="en-GB" dirty="0"/>
+          </a:p>
+          <a:p>
+            <a:pPr lvl="1"/>
+            <a:r>
+              <a:rPr lang="en-GB" dirty="0" smtClean="0"/>
+              <a:t>All relevant implementations marked [</a:t>
+            </a:r>
+            <a:r>
+              <a:rPr lang="en-GB" dirty="0" err="1" smtClean="0"/>
+              <a:t>Serializable</a:t>
+            </a:r>
+            <a:r>
+              <a:rPr lang="en-GB" dirty="0" smtClean="0"/>
+              <a:t>]</a:t>
+            </a:r>
+            <a:endParaRPr lang="en-GB" dirty="0"/>
+          </a:p>
+        </p:txBody>
+      </p:sp>
+      <p:sp>
+        <p:nvSpPr>
+          <p:cNvPr id="4" name="Date Placeholder 3"/>
+          <p:cNvSpPr>
+            <a:spLocks noGrp="1"/>
+          </p:cNvSpPr>
+          <p:nvPr>
+            <p:ph type="dt" sz="half" idx="10"/>
+          </p:nvPr>
+        </p:nvSpPr>
+        <p:spPr/>
+        <p:txBody>
+          <a:bodyPr/>
+          <a:lstStyle/>
+          <a:p>
+            <a:fld id="{CDAEE9B0-25E7-4C28-AF1D-B3DDCE7EBBDB}" type="datetime1">
+              <a:rPr lang="en-US" smtClean="0"/>
+              <a:pPr/>
+              <a:t>7/13/2011</a:t>
+            </a:fld>
+            <a:endParaRPr lang="en-GB"/>
+          </a:p>
+        </p:txBody>
+      </p:sp>
+      <p:sp>
+        <p:nvSpPr>
+          <p:cNvPr id="5" name="Footer Placeholder 4"/>
+          <p:cNvSpPr>
+            <a:spLocks noGrp="1"/>
+          </p:cNvSpPr>
+          <p:nvPr>
+            <p:ph type="ftr" sz="quarter" idx="11"/>
+          </p:nvPr>
+        </p:nvSpPr>
+        <p:spPr/>
+        <p:txBody>
+          <a:bodyPr/>
+          <a:lstStyle/>
+          <a:p>
+            <a:r>
+              <a:rPr lang="en-GB" smtClean="0"/>
+              <a:t>http://www.dotnetrdf.org</a:t>
+            </a:r>
+            <a:endParaRPr lang="en-GB"/>
+          </a:p>
+        </p:txBody>
+      </p:sp>
+      <p:sp>
+        <p:nvSpPr>
+          <p:cNvPr id="6" name="Slide Number Placeholder 5"/>
+          <p:cNvSpPr>
+            <a:spLocks noGrp="1"/>
+          </p:cNvSpPr>
+          <p:nvPr>
+            <p:ph type="sldNum" sz="quarter" idx="12"/>
+          </p:nvPr>
+        </p:nvSpPr>
+        <p:spPr/>
+        <p:txBody>
+          <a:bodyPr/>
+          <a:lstStyle/>
+          <a:p>
+            <a:fld id="{35128F56-7434-487A-8B29-0C024560A5F4}" type="slidenum">
+              <a:rPr lang="en-GB" smtClean="0"/>
+              <a:pPr/>
+              <a:t>23</a:t>
+            </a:fld>
+            <a:endParaRPr lang="en-GB"/>
           </a:p>
         </p:txBody>
       </p:sp>
     </p:spTree>
     <p:extLst>
       <p:ext uri="{BB962C8B-B14F-4D97-AF65-F5344CB8AC3E}">
-        <p14:creationId xmlns:p14="http://schemas.microsoft.com/office/powerpoint/2010/main" xmlns="" val="798346359"/>
+        <p14:creationId xmlns:p14="http://schemas.microsoft.com/office/powerpoint/2010/main" val="322844269"/>
       </p:ext>
     </p:extLst>
   </p:cSld>
@@ -5948,7 +6154,7 @@
       </p:grpSpPr>
       <p:sp>
         <p:nvSpPr>
-          <p:cNvPr id="6" name="Title 5"/>
+          <p:cNvPr id="2" name="Title 1"/>
           <p:cNvSpPr>
             <a:spLocks noGrp="1"/>
           </p:cNvSpPr>
@@ -5966,148 +6172,13 @@
               <a:t>Upcoming Features - Toolkit</a:t>
             </a:r>
             <a:endParaRPr lang="en-GB" dirty="0"/>
-          </a:p>
-        </p:txBody>
-      </p:sp>
-      <p:sp>
-        <p:nvSpPr>
-          <p:cNvPr id="7" name="Content Placeholder 6"/>
-          <p:cNvSpPr>
-            <a:spLocks noGrp="1"/>
-          </p:cNvSpPr>
-          <p:nvPr>
-            <p:ph idx="1"/>
-          </p:nvPr>
-        </p:nvSpPr>
-        <p:spPr/>
-        <p:txBody>
-          <a:bodyPr>
-            <a:normAutofit fontScale="92500"/>
-          </a:bodyPr>
-          <a:lstStyle/>
-          <a:p>
-            <a:r>
-              <a:rPr lang="en-GB" dirty="0" smtClean="0"/>
-              <a:t>There will likely be minimal changes to the Toolkit for the next release (0.3.0) but the following will see some changes/minor upgrades:</a:t>
-            </a:r>
-          </a:p>
-          <a:p>
-            <a:pPr lvl="1"/>
-            <a:r>
-              <a:rPr lang="en-GB" dirty="0" err="1" smtClean="0"/>
-              <a:t>rdfConvert</a:t>
-            </a:r>
-            <a:endParaRPr lang="en-GB" dirty="0" smtClean="0"/>
-          </a:p>
-          <a:p>
-            <a:pPr lvl="1"/>
-            <a:r>
-              <a:rPr lang="en-GB" dirty="0" err="1" smtClean="0"/>
-              <a:t>rdfQuery</a:t>
-            </a:r>
-            <a:endParaRPr lang="en-GB" dirty="0" smtClean="0"/>
-          </a:p>
-          <a:p>
-            <a:pPr lvl="1"/>
-            <a:r>
-              <a:rPr lang="en-GB" dirty="0" err="1" smtClean="0"/>
-              <a:t>rdfEditor</a:t>
-            </a:r>
-            <a:endParaRPr lang="en-GB" dirty="0" smtClean="0"/>
-          </a:p>
-          <a:p>
-            <a:pPr lvl="1"/>
-            <a:r>
-              <a:rPr lang="en-GB" dirty="0" err="1" smtClean="0"/>
-              <a:t>SparqlGUI</a:t>
-            </a:r>
-            <a:endParaRPr lang="en-GB" dirty="0" smtClean="0"/>
-          </a:p>
-          <a:p>
-            <a:pPr lvl="1"/>
-            <a:r>
-              <a:rPr lang="en-GB" dirty="0" err="1" smtClean="0"/>
-              <a:t>StoreManager</a:t>
-            </a:r>
-            <a:endParaRPr lang="en-GB" dirty="0" smtClean="0"/>
-          </a:p>
-        </p:txBody>
-      </p:sp>
-      <p:sp>
-        <p:nvSpPr>
-          <p:cNvPr id="3" name="Date Placeholder 2"/>
-          <p:cNvSpPr>
-            <a:spLocks noGrp="1"/>
-          </p:cNvSpPr>
-          <p:nvPr>
-            <p:ph type="dt" sz="half" idx="10"/>
-          </p:nvPr>
-        </p:nvSpPr>
-        <p:spPr/>
-        <p:txBody>
-          <a:bodyPr/>
-          <a:lstStyle/>
-          <a:p>
-            <a:fld id="{EA5D455B-ECD0-44E3-BA0C-3649A3FCD15C}" type="datetime1">
-              <a:rPr lang="en-US" smtClean="0"/>
-              <a:pPr/>
-              <a:t>7/5/2011</a:t>
-            </a:fld>
-            <a:endParaRPr lang="en-GB"/>
-          </a:p>
-        </p:txBody>
-      </p:sp>
-      <p:sp>
-        <p:nvSpPr>
-          <p:cNvPr id="4" name="Footer Placeholder 3"/>
-          <p:cNvSpPr>
-            <a:spLocks noGrp="1"/>
-          </p:cNvSpPr>
-          <p:nvPr>
-            <p:ph type="ftr" sz="quarter" idx="11"/>
-          </p:nvPr>
-        </p:nvSpPr>
-        <p:spPr/>
-        <p:txBody>
-          <a:bodyPr/>
-          <a:lstStyle/>
-          <a:p>
-            <a:r>
-              <a:rPr lang="en-GB" smtClean="0"/>
-              <a:t>http://www.dotnetrdf.org</a:t>
-            </a:r>
-            <a:endParaRPr lang="en-GB"/>
-          </a:p>
-        </p:txBody>
-      </p:sp>
-      <p:sp>
-        <p:nvSpPr>
-          <p:cNvPr id="5" name="Slide Number Placeholder 4"/>
-          <p:cNvSpPr>
-            <a:spLocks noGrp="1"/>
-          </p:cNvSpPr>
-          <p:nvPr>
-            <p:ph type="sldNum" sz="quarter" idx="12"/>
-          </p:nvPr>
-        </p:nvSpPr>
-        <p:spPr/>
-        <p:txBody>
-          <a:bodyPr/>
-          <a:lstStyle/>
-          <a:p>
-            <a:fld id="{35128F56-7434-487A-8B29-0C024560A5F4}" type="slidenum">
-              <a:rPr lang="en-GB" smtClean="0"/>
-              <a:pPr/>
-              <a:t>24</a:t>
-            </a:fld>
-            <a:endParaRPr lang="en-GB"/>
           </a:p>
         </p:txBody>
       </p:sp>
     </p:spTree>
     <p:extLst>
       <p:ext uri="{BB962C8B-B14F-4D97-AF65-F5344CB8AC3E}">
-        <p14:creationId xmlns:p14="http://schemas.microsoft.com/office/powerpoint/2010/main" xmlns="" val="118536430"/>
+        <p14:creationId xmlns:p14="http://schemas.microsoft.com/office/powerpoint/2010/main" val="798346359"/>
       </p:ext>
     </p:extLst>
   </p:cSld>
@@ -6136,99 +6207,94 @@
       </p:grpSpPr>
       <p:sp>
         <p:nvSpPr>
-          <p:cNvPr id="8" name="Text Placeholder 7"/>
-          <p:cNvSpPr>
-            <a:spLocks noGrp="1"/>
-          </p:cNvSpPr>
-          <p:nvPr>
-            <p:ph type="body" idx="1"/>
-          </p:nvPr>
-        </p:nvSpPr>
-        <p:spPr/>
-        <p:txBody>
-          <a:bodyPr/>
-          <a:lstStyle/>
-          <a:p>
+          <p:cNvPr id="6" name="Title 5"/>
+          <p:cNvSpPr>
+            <a:spLocks noGrp="1"/>
+          </p:cNvSpPr>
+          <p:nvPr>
+            <p:ph type="title"/>
+          </p:nvPr>
+        </p:nvSpPr>
+        <p:spPr/>
+        <p:txBody>
+          <a:bodyPr/>
+          <a:lstStyle/>
+          <a:p>
+            <a:r>
+              <a:rPr lang="en-GB" dirty="0" smtClean="0"/>
+              <a:t>Upcoming Features - Toolkit</a:t>
+            </a:r>
+            <a:endParaRPr lang="en-GB" dirty="0"/>
+          </a:p>
+        </p:txBody>
+      </p:sp>
+      <p:sp>
+        <p:nvSpPr>
+          <p:cNvPr id="7" name="Content Placeholder 6"/>
+          <p:cNvSpPr>
+            <a:spLocks noGrp="1"/>
+          </p:cNvSpPr>
+          <p:nvPr>
+            <p:ph idx="1"/>
+          </p:nvPr>
+        </p:nvSpPr>
+        <p:spPr/>
+        <p:txBody>
+          <a:bodyPr>
+            <a:normAutofit fontScale="92500"/>
+          </a:bodyPr>
+          <a:lstStyle/>
+          <a:p>
+            <a:r>
+              <a:rPr lang="en-GB" dirty="0" smtClean="0"/>
+              <a:t>There will likely be minimal changes to the Toolkit for the next release (0.3.0) but the following will see some changes/minor upgrades:</a:t>
+            </a:r>
+          </a:p>
+          <a:p>
+            <a:pPr lvl="1"/>
             <a:r>
               <a:rPr lang="en-GB" dirty="0" err="1" smtClean="0"/>
               <a:t>rdfConvert</a:t>
             </a:r>
-            <a:endParaRPr lang="en-GB" dirty="0"/>
-          </a:p>
-        </p:txBody>
-      </p:sp>
-      <p:sp>
-        <p:nvSpPr>
-          <p:cNvPr id="3" name="Content Placeholder 2"/>
-          <p:cNvSpPr>
-            <a:spLocks noGrp="1"/>
-          </p:cNvSpPr>
-          <p:nvPr>
-            <p:ph sz="half" idx="2"/>
-          </p:nvPr>
-        </p:nvSpPr>
-        <p:spPr/>
-        <p:txBody>
-          <a:bodyPr/>
-          <a:lstStyle/>
-          <a:p>
-            <a:r>
-              <a:rPr lang="en-GB" dirty="0" smtClean="0"/>
-              <a:t>With the addition of new formatters to the core library more formats will be eligible for fast conversion</a:t>
-            </a:r>
-            <a:endParaRPr lang="en-GB" dirty="0"/>
-          </a:p>
-        </p:txBody>
-      </p:sp>
-      <p:sp>
-        <p:nvSpPr>
-          <p:cNvPr id="9" name="Text Placeholder 8"/>
-          <p:cNvSpPr>
-            <a:spLocks noGrp="1"/>
-          </p:cNvSpPr>
-          <p:nvPr>
-            <p:ph type="body" sz="quarter" idx="3"/>
-          </p:nvPr>
-        </p:nvSpPr>
-        <p:spPr/>
-        <p:txBody>
-          <a:bodyPr/>
-          <a:lstStyle/>
-          <a:p>
+            <a:endParaRPr lang="en-GB" dirty="0" smtClean="0"/>
+          </a:p>
+          <a:p>
+            <a:pPr lvl="1"/>
             <a:r>
               <a:rPr lang="en-GB" dirty="0" err="1" smtClean="0"/>
               <a:t>rdfQuery</a:t>
             </a:r>
-            <a:endParaRPr lang="en-GB" dirty="0"/>
-          </a:p>
-        </p:txBody>
-      </p:sp>
-      <p:sp>
-        <p:nvSpPr>
-          <p:cNvPr id="10" name="Content Placeholder 9"/>
-          <p:cNvSpPr>
-            <a:spLocks noGrp="1"/>
-          </p:cNvSpPr>
-          <p:nvPr>
-            <p:ph sz="quarter" idx="4"/>
-          </p:nvPr>
-        </p:nvSpPr>
-        <p:spPr/>
-        <p:txBody>
-          <a:bodyPr/>
-          <a:lstStyle/>
-          <a:p>
-            <a:r>
-              <a:rPr lang="en-GB" dirty="0" smtClean="0"/>
-              <a:t>Changes in the core library now permit for the explanation of query execution so support for this will be added</a:t>
-            </a:r>
-            <a:endParaRPr lang="en-GB" dirty="0"/>
-          </a:p>
-        </p:txBody>
-      </p:sp>
-      <p:sp>
-        <p:nvSpPr>
-          <p:cNvPr id="4" name="Date Placeholder 3"/>
+            <a:endParaRPr lang="en-GB" dirty="0" smtClean="0"/>
+          </a:p>
+          <a:p>
+            <a:pPr lvl="1"/>
+            <a:r>
+              <a:rPr lang="en-GB" dirty="0" err="1" smtClean="0"/>
+              <a:t>rdfEditor</a:t>
+            </a:r>
+            <a:endParaRPr lang="en-GB" dirty="0" smtClean="0"/>
+          </a:p>
+          <a:p>
+            <a:pPr lvl="1"/>
+            <a:r>
+              <a:rPr lang="en-GB" dirty="0" err="1" smtClean="0"/>
+              <a:t>SparqlGUI</a:t>
+            </a:r>
+            <a:endParaRPr lang="en-GB" dirty="0" smtClean="0"/>
+          </a:p>
+          <a:p>
+            <a:pPr lvl="1"/>
+            <a:r>
+              <a:rPr lang="en-GB" dirty="0" err="1" smtClean="0"/>
+              <a:t>StoreManager</a:t>
+            </a:r>
+            <a:endParaRPr lang="en-GB" dirty="0" smtClean="0"/>
+          </a:p>
+        </p:txBody>
+      </p:sp>
+      <p:sp>
+        <p:nvSpPr>
+          <p:cNvPr id="3" name="Date Placeholder 2"/>
           <p:cNvSpPr>
             <a:spLocks noGrp="1"/>
           </p:cNvSpPr>
@@ -6241,10 +6307,10 @@
           <a:bodyPr/>
           <a:lstStyle/>
           <a:p>
-            <a:fld id="{CDAEE9B0-25E7-4C28-AF1D-B3DDCE7EBBDB}" type="datetime1">
+            <a:fld id="{EA5D455B-ECD0-44E3-BA0C-3649A3FCD15C}" type="datetime1">
               <a:rPr lang="en-US" smtClean="0"/>
               <a:pPr/>
-              <a:t>7/5/2011</a:t>
+              <a:t>7/13/2011</a:t>
             </a:fld>
             <a:endParaRPr lang="en-GB"/>
           </a:p>
@@ -6252,7 +6318,7 @@
       </p:sp>
       <p:sp>
         <p:nvSpPr>
-          <p:cNvPr id="5" name="Footer Placeholder 4"/>
+          <p:cNvPr id="4" name="Footer Placeholder 3"/>
           <p:cNvSpPr>
             <a:spLocks noGrp="1"/>
           </p:cNvSpPr>
@@ -6275,7 +6341,7 @@
       </p:sp>
       <p:sp>
         <p:nvSpPr>
-          <p:cNvPr id="6" name="Slide Number Placeholder 5"/>
+          <p:cNvPr id="5" name="Slide Number Placeholder 4"/>
           <p:cNvSpPr>
             <a:spLocks noGrp="1"/>
           </p:cNvSpPr>
@@ -6300,7 +6366,7 @@
     </p:spTree>
     <p:extLst>
       <p:ext uri="{BB962C8B-B14F-4D97-AF65-F5344CB8AC3E}">
-        <p14:creationId xmlns:p14="http://schemas.microsoft.com/office/powerpoint/2010/main" xmlns="" val="299555438"/>
+        <p14:creationId xmlns:p14="http://schemas.microsoft.com/office/powerpoint/2010/main" val="118536430"/>
       </p:ext>
     </p:extLst>
   </p:cSld>
@@ -6329,12 +6395,12 @@
       </p:grpSpPr>
       <p:sp>
         <p:nvSpPr>
-          <p:cNvPr id="2" name="Title 1"/>
-          <p:cNvSpPr>
-            <a:spLocks noGrp="1"/>
-          </p:cNvSpPr>
-          <p:nvPr>
-            <p:ph type="title"/>
+          <p:cNvPr id="8" name="Text Placeholder 7"/>
+          <p:cNvSpPr>
+            <a:spLocks noGrp="1"/>
+          </p:cNvSpPr>
+          <p:nvPr>
+            <p:ph type="body" idx="1"/>
           </p:nvPr>
         </p:nvSpPr>
         <p:spPr/>
@@ -6344,7 +6410,7 @@
           <a:p>
             <a:r>
               <a:rPr lang="en-GB" dirty="0" err="1" smtClean="0"/>
-              <a:t>rdfEditor</a:t>
+              <a:t>rdfConvert</a:t>
             </a:r>
             <a:endParaRPr lang="en-GB" dirty="0"/>
           </a:p>
@@ -6357,23 +6423,63 @@
             <a:spLocks noGrp="1"/>
           </p:cNvSpPr>
           <p:nvPr>
-            <p:ph idx="1"/>
-          </p:nvPr>
-        </p:nvSpPr>
-        <p:spPr/>
-        <p:txBody>
-          <a:bodyPr/>
-          <a:lstStyle/>
-          <a:p>
-            <a:r>
-              <a:rPr lang="en-GB" dirty="0" smtClean="0"/>
-              <a:t>Speed improvements will be made to syntax validation</a:t>
-            </a:r>
-          </a:p>
-          <a:p>
-            <a:r>
-              <a:rPr lang="en-GB" dirty="0" smtClean="0"/>
-              <a:t>Time permitting there will be some internal API refactoring to permit planned changes in future releases</a:t>
+            <p:ph sz="half" idx="2"/>
+          </p:nvPr>
+        </p:nvSpPr>
+        <p:spPr/>
+        <p:txBody>
+          <a:bodyPr/>
+          <a:lstStyle/>
+          <a:p>
+            <a:r>
+              <a:rPr lang="en-GB" dirty="0" smtClean="0"/>
+              <a:t>With the addition of new formatters to the core library more formats will be eligible for fast conversion</a:t>
+            </a:r>
+            <a:endParaRPr lang="en-GB" dirty="0"/>
+          </a:p>
+        </p:txBody>
+      </p:sp>
+      <p:sp>
+        <p:nvSpPr>
+          <p:cNvPr id="9" name="Text Placeholder 8"/>
+          <p:cNvSpPr>
+            <a:spLocks noGrp="1"/>
+          </p:cNvSpPr>
+          <p:nvPr>
+            <p:ph type="body" sz="quarter" idx="3"/>
+          </p:nvPr>
+        </p:nvSpPr>
+        <p:spPr/>
+        <p:txBody>
+          <a:bodyPr/>
+          <a:lstStyle/>
+          <a:p>
+            <a:r>
+              <a:rPr lang="en-GB" dirty="0" err="1" smtClean="0"/>
+              <a:t>rdfQuery</a:t>
+            </a:r>
+            <a:endParaRPr lang="en-GB" dirty="0"/>
+          </a:p>
+        </p:txBody>
+      </p:sp>
+      <p:sp>
+        <p:nvSpPr>
+          <p:cNvPr id="10" name="Content Placeholder 9"/>
+          <p:cNvSpPr>
+            <a:spLocks noGrp="1"/>
+          </p:cNvSpPr>
+          <p:nvPr>
+            <p:ph sz="quarter" idx="4"/>
+          </p:nvPr>
+        </p:nvSpPr>
+        <p:spPr/>
+        <p:txBody>
+          <a:bodyPr/>
+          <a:lstStyle/>
+          <a:p>
+            <a:r>
+              <a:rPr lang="en-GB" dirty="0" smtClean="0"/>
+              <a:t>Changes in the core library now permit for the explanation of query execution so support for this will be added</a:t>
             </a:r>
             <a:endParaRPr lang="en-GB" dirty="0"/>
           </a:p>
@@ -6397,7 +6503,7 @@
             <a:fld id="{CDAEE9B0-25E7-4C28-AF1D-B3DDCE7EBBDB}" type="datetime1">
               <a:rPr lang="en-US" smtClean="0"/>
               <a:pPr/>
-              <a:t>7/5/2011</a:t>
+              <a:t>7/13/2011</a:t>
             </a:fld>
             <a:endParaRPr lang="en-GB"/>
           </a:p>
@@ -6453,7 +6559,7 @@
     </p:spTree>
     <p:extLst>
       <p:ext uri="{BB962C8B-B14F-4D97-AF65-F5344CB8AC3E}">
-        <p14:creationId xmlns:p14="http://schemas.microsoft.com/office/powerpoint/2010/main" xmlns="" val="1002032322"/>
+        <p14:creationId xmlns:p14="http://schemas.microsoft.com/office/powerpoint/2010/main" val="299555438"/>
       </p:ext>
     </p:extLst>
   </p:cSld>
@@ -6497,7 +6603,7 @@
           <a:p>
             <a:r>
               <a:rPr lang="en-GB" dirty="0" err="1" smtClean="0"/>
-              <a:t>SparqlGUI</a:t>
+              <a:t>rdfEditor</a:t>
             </a:r>
             <a:endParaRPr lang="en-GB" dirty="0"/>
           </a:p>
@@ -6520,24 +6626,14 @@
           <a:p>
             <a:r>
               <a:rPr lang="en-GB" dirty="0" smtClean="0"/>
-              <a:t>Support for query explanation will also be added to the tool</a:t>
-            </a:r>
-          </a:p>
-          <a:p>
-            <a:pPr lvl="1"/>
-            <a:r>
-              <a:rPr lang="en-GB" dirty="0" smtClean="0"/>
-              <a:t>An explain button can be used just to show the explanation trace</a:t>
-            </a:r>
-          </a:p>
-          <a:p>
-            <a:pPr lvl="1"/>
-            <a:r>
-              <a:rPr lang="en-GB" dirty="0" smtClean="0"/>
-              <a:t>A Log Explanations option has been added so explanations for all queries are added to the log file</a:t>
-            </a:r>
-          </a:p>
-          <a:p>
+              <a:t>Speed improvements will be made to syntax validation</a:t>
+            </a:r>
+          </a:p>
+          <a:p>
+            <a:r>
+              <a:rPr lang="en-GB" dirty="0" smtClean="0"/>
+              <a:t>Time permitting there will be some internal API refactoring to permit planned changes in future releases</a:t>
+            </a:r>
             <a:endParaRPr lang="en-GB" dirty="0"/>
           </a:p>
         </p:txBody>
@@ -6560,7 +6656,7 @@
             <a:fld id="{CDAEE9B0-25E7-4C28-AF1D-B3DDCE7EBBDB}" type="datetime1">
               <a:rPr lang="en-US" smtClean="0"/>
               <a:pPr/>
-              <a:t>7/5/2011</a:t>
+              <a:t>7/13/2011</a:t>
             </a:fld>
             <a:endParaRPr lang="en-GB"/>
           </a:p>
@@ -6616,7 +6712,7 @@
     </p:spTree>
     <p:extLst>
       <p:ext uri="{BB962C8B-B14F-4D97-AF65-F5344CB8AC3E}">
-        <p14:creationId xmlns:p14="http://schemas.microsoft.com/office/powerpoint/2010/main" xmlns="" val="1473382163"/>
+        <p14:creationId xmlns:p14="http://schemas.microsoft.com/office/powerpoint/2010/main" val="1002032322"/>
       </p:ext>
     </p:extLst>
   </p:cSld>
@@ -6660,7 +6756,7 @@
           <a:p>
             <a:r>
               <a:rPr lang="en-GB" dirty="0" err="1" smtClean="0"/>
-              <a:t>StoreManager</a:t>
+              <a:t>SparqlGUI</a:t>
             </a:r>
             <a:endParaRPr lang="en-GB" dirty="0"/>
           </a:p>
@@ -6678,65 +6774,38 @@
         </p:nvSpPr>
         <p:spPr/>
         <p:txBody>
-          <a:bodyPr>
-            <a:normAutofit lnSpcReduction="10000"/>
-          </a:bodyPr>
-          <a:lstStyle/>
-          <a:p>
-            <a:r>
-              <a:rPr lang="en-GB" dirty="0" smtClean="0"/>
-              <a:t>Support for new stores</a:t>
+          <a:bodyPr/>
+          <a:lstStyle/>
+          <a:p>
+            <a:r>
+              <a:rPr lang="en-GB" dirty="0" smtClean="0"/>
+              <a:t>Support for query explanation will </a:t>
+            </a:r>
+            <a:r>
+              <a:rPr lang="en-GB" dirty="0" smtClean="0"/>
+              <a:t>be </a:t>
+            </a:r>
+            <a:r>
+              <a:rPr lang="en-GB" dirty="0" smtClean="0"/>
+              <a:t>added to the tool</a:t>
             </a:r>
           </a:p>
           <a:p>
             <a:pPr lvl="1"/>
             <a:r>
               <a:rPr lang="en-GB" dirty="0" smtClean="0"/>
-              <a:t>ADO Store and </a:t>
-            </a:r>
-            <a:r>
-              <a:rPr lang="en-GB" dirty="0" err="1" smtClean="0"/>
-              <a:t>Dydra</a:t>
-            </a:r>
-            <a:endParaRPr lang="en-GB" dirty="0" smtClean="0"/>
-          </a:p>
-          <a:p>
-            <a:r>
-              <a:rPr lang="en-GB" dirty="0" smtClean="0"/>
-              <a:t>Improved </a:t>
-            </a:r>
-            <a:r>
-              <a:rPr lang="en-GB" dirty="0" err="1" smtClean="0"/>
-              <a:t>AllegroGraph</a:t>
-            </a:r>
-            <a:r>
-              <a:rPr lang="en-GB" dirty="0" smtClean="0"/>
-              <a:t> 4.x support</a:t>
-            </a:r>
-          </a:p>
-          <a:p>
-            <a:r>
-              <a:rPr lang="en-GB" dirty="0" smtClean="0"/>
-              <a:t>Will use the handler subsystem extensions in the core library to:</a:t>
+              <a:t>An explain button can be used just to show the explanation trace</a:t>
             </a:r>
           </a:p>
           <a:p>
             <a:pPr lvl="1"/>
             <a:r>
-              <a:rPr lang="en-GB" dirty="0"/>
-              <a:t>I</a:t>
-            </a:r>
-            <a:r>
-              <a:rPr lang="en-GB" dirty="0" smtClean="0"/>
-              <a:t>mprove export speed when possible</a:t>
-            </a:r>
-          </a:p>
-          <a:p>
-            <a:pPr lvl="1"/>
-            <a:r>
-              <a:rPr lang="en-GB" dirty="0" smtClean="0"/>
-              <a:t>Provide a preview graph function which returns the first 100 triples of a graph</a:t>
-            </a:r>
+              <a:rPr lang="en-GB" dirty="0" smtClean="0"/>
+              <a:t>A Log Explanations option has been added so explanations for all queries are added to the log file</a:t>
+            </a:r>
+          </a:p>
+          <a:p>
+            <a:endParaRPr lang="en-GB" dirty="0"/>
           </a:p>
         </p:txBody>
       </p:sp>
@@ -6758,7 +6827,7 @@
             <a:fld id="{CDAEE9B0-25E7-4C28-AF1D-B3DDCE7EBBDB}" type="datetime1">
               <a:rPr lang="en-US" smtClean="0"/>
               <a:pPr/>
-              <a:t>7/5/2011</a:t>
+              <a:t>7/13/2011</a:t>
             </a:fld>
             <a:endParaRPr lang="en-GB"/>
           </a:p>
@@ -6814,7 +6883,7 @@
     </p:spTree>
     <p:extLst>
       <p:ext uri="{BB962C8B-B14F-4D97-AF65-F5344CB8AC3E}">
-        <p14:creationId xmlns:p14="http://schemas.microsoft.com/office/powerpoint/2010/main" xmlns="" val="370317736"/>
+        <p14:creationId xmlns:p14="http://schemas.microsoft.com/office/powerpoint/2010/main" val="1473382163"/>
       </p:ext>
     </p:extLst>
   </p:cSld>
@@ -6857,8 +6926,8 @@
           <a:lstStyle/>
           <a:p>
             <a:r>
-              <a:rPr lang="en-GB" dirty="0" smtClean="0"/>
-              <a:t>Architecture Roadmap</a:t>
+              <a:rPr lang="en-GB" dirty="0" err="1" smtClean="0"/>
+              <a:t>StoreManager</a:t>
             </a:r>
             <a:endParaRPr lang="en-GB" dirty="0"/>
           </a:p>
@@ -6866,7 +6935,89 @@
       </p:sp>
       <p:sp>
         <p:nvSpPr>
-          <p:cNvPr id="3" name="Date Placeholder 2"/>
+          <p:cNvPr id="3" name="Content Placeholder 2"/>
+          <p:cNvSpPr>
+            <a:spLocks noGrp="1"/>
+          </p:cNvSpPr>
+          <p:nvPr>
+            <p:ph idx="1"/>
+          </p:nvPr>
+        </p:nvSpPr>
+        <p:spPr/>
+        <p:txBody>
+          <a:bodyPr>
+            <a:normAutofit lnSpcReduction="10000"/>
+          </a:bodyPr>
+          <a:lstStyle/>
+          <a:p>
+            <a:r>
+              <a:rPr lang="en-GB" dirty="0" smtClean="0"/>
+              <a:t>Support for new stores</a:t>
+            </a:r>
+          </a:p>
+          <a:p>
+            <a:pPr lvl="1"/>
+            <a:r>
+              <a:rPr lang="en-GB" dirty="0" smtClean="0"/>
+              <a:t>ADO </a:t>
+            </a:r>
+            <a:r>
+              <a:rPr lang="en-GB" dirty="0" smtClean="0"/>
+              <a:t>Store (MS SQL) </a:t>
+            </a:r>
+            <a:r>
+              <a:rPr lang="en-GB" dirty="0" smtClean="0"/>
+              <a:t>and </a:t>
+            </a:r>
+            <a:r>
+              <a:rPr lang="en-GB" dirty="0" err="1" smtClean="0"/>
+              <a:t>Dydra</a:t>
+            </a:r>
+            <a:endParaRPr lang="en-GB" dirty="0" smtClean="0"/>
+          </a:p>
+          <a:p>
+            <a:r>
+              <a:rPr lang="en-GB" dirty="0" smtClean="0"/>
+              <a:t>Improved </a:t>
+            </a:r>
+            <a:r>
+              <a:rPr lang="en-GB" dirty="0" err="1" smtClean="0"/>
+              <a:t>AllegroGraph</a:t>
+            </a:r>
+            <a:r>
+              <a:rPr lang="en-GB" dirty="0" smtClean="0"/>
+              <a:t> 4.x support</a:t>
+            </a:r>
+          </a:p>
+          <a:p>
+            <a:r>
+              <a:rPr lang="en-GB" dirty="0" smtClean="0"/>
+              <a:t>Will use the handler subsystem extensions in the core library to:</a:t>
+            </a:r>
+          </a:p>
+          <a:p>
+            <a:pPr lvl="1"/>
+            <a:r>
+              <a:rPr lang="en-GB" dirty="0"/>
+              <a:t>I</a:t>
+            </a:r>
+            <a:r>
+              <a:rPr lang="en-GB" dirty="0" smtClean="0"/>
+              <a:t>mprove export speed when possible</a:t>
+            </a:r>
+          </a:p>
+          <a:p>
+            <a:pPr lvl="1"/>
+            <a:r>
+              <a:rPr lang="en-GB" dirty="0" smtClean="0"/>
+              <a:t>Provide a preview graph function which returns the first 100 triples of a graph</a:t>
+            </a:r>
+          </a:p>
+        </p:txBody>
+      </p:sp>
+      <p:sp>
+        <p:nvSpPr>
+          <p:cNvPr id="4" name="Date Placeholder 3"/>
           <p:cNvSpPr>
             <a:spLocks noGrp="1"/>
           </p:cNvSpPr>
@@ -6879,10 +7030,10 @@
           <a:bodyPr/>
           <a:lstStyle/>
           <a:p>
-            <a:fld id="{EA5D455B-ECD0-44E3-BA0C-3649A3FCD15C}" type="datetime1">
+            <a:fld id="{CDAEE9B0-25E7-4C28-AF1D-B3DDCE7EBBDB}" type="datetime1">
               <a:rPr lang="en-US" smtClean="0"/>
               <a:pPr/>
-              <a:t>7/5/2011</a:t>
+              <a:t>7/13/2011</a:t>
             </a:fld>
             <a:endParaRPr lang="en-GB"/>
           </a:p>
@@ -6890,7 +7041,7 @@
       </p:sp>
       <p:sp>
         <p:nvSpPr>
-          <p:cNvPr id="4" name="Footer Placeholder 3"/>
+          <p:cNvPr id="5" name="Footer Placeholder 4"/>
           <p:cNvSpPr>
             <a:spLocks noGrp="1"/>
           </p:cNvSpPr>
@@ -6913,7 +7064,7 @@
       </p:sp>
       <p:sp>
         <p:nvSpPr>
-          <p:cNvPr id="5" name="Slide Number Placeholder 4"/>
+          <p:cNvPr id="6" name="Slide Number Placeholder 5"/>
           <p:cNvSpPr>
             <a:spLocks noGrp="1"/>
           </p:cNvSpPr>
@@ -6938,7 +7089,7 @@
     </p:spTree>
     <p:extLst>
       <p:ext uri="{BB962C8B-B14F-4D97-AF65-F5344CB8AC3E}">
-        <p14:creationId xmlns:p14="http://schemas.microsoft.com/office/powerpoint/2010/main" xmlns="" val="106888204"/>
+        <p14:creationId xmlns:p14="http://schemas.microsoft.com/office/powerpoint/2010/main" val="370317736"/>
       </p:ext>
     </p:extLst>
   </p:cSld>
@@ -7076,7 +7227,7 @@
             <a:fld id="{CDAEE9B0-25E7-4C28-AF1D-B3DDCE7EBBDB}" type="datetime1">
               <a:rPr lang="en-US" smtClean="0"/>
               <a:pPr/>
-              <a:t>7/5/2011</a:t>
+              <a:t>7/13/2011</a:t>
             </a:fld>
             <a:endParaRPr lang="en-GB"/>
           </a:p>
@@ -7132,7 +7283,7 @@
     </p:spTree>
     <p:extLst>
       <p:ext uri="{BB962C8B-B14F-4D97-AF65-F5344CB8AC3E}">
-        <p14:creationId xmlns:p14="http://schemas.microsoft.com/office/powerpoint/2010/main" xmlns="" val="3702788433"/>
+        <p14:creationId xmlns:p14="http://schemas.microsoft.com/office/powerpoint/2010/main" val="3702788433"/>
       </p:ext>
     </p:extLst>
   </p:cSld>
@@ -7161,7 +7312,7 @@
       </p:grpSpPr>
       <p:sp>
         <p:nvSpPr>
-          <p:cNvPr id="6" name="Title 5"/>
+          <p:cNvPr id="2" name="Title 1"/>
           <p:cNvSpPr>
             <a:spLocks noGrp="1"/>
           </p:cNvSpPr>
@@ -7176,45 +7327,9 @@
           <a:p>
             <a:r>
               <a:rPr lang="en-GB" dirty="0" smtClean="0"/>
-              <a:t>Current Architecture</a:t>
+              <a:t>Architecture Roadmap</a:t>
             </a:r>
             <a:endParaRPr lang="en-GB" dirty="0"/>
-          </a:p>
-        </p:txBody>
-      </p:sp>
-      <p:sp>
-        <p:nvSpPr>
-          <p:cNvPr id="7" name="Content Placeholder 6"/>
-          <p:cNvSpPr>
-            <a:spLocks noGrp="1"/>
-          </p:cNvSpPr>
-          <p:nvPr>
-            <p:ph idx="1"/>
-          </p:nvPr>
-        </p:nvSpPr>
-        <p:spPr/>
-        <p:txBody>
-          <a:bodyPr/>
-          <a:lstStyle/>
-          <a:p>
-            <a:r>
-              <a:rPr lang="en-GB" dirty="0" smtClean="0"/>
-              <a:t>Currently the core library is a single library which is not ideal design</a:t>
-            </a:r>
-          </a:p>
-          <a:p>
-            <a:r>
-              <a:rPr lang="en-GB" dirty="0" smtClean="0"/>
-              <a:t>Some features already reside in external libraries e.g. </a:t>
-            </a:r>
-            <a:r>
-              <a:rPr lang="en-GB" dirty="0" err="1" smtClean="0"/>
-              <a:t>dotNetRDF.WinForms</a:t>
-            </a:r>
-            <a:r>
-              <a:rPr lang="en-GB" dirty="0" smtClean="0"/>
-              <a:t> provides common functionality for Windows Forms GUIs</a:t>
-            </a:r>
           </a:p>
         </p:txBody>
       </p:sp>
@@ -7236,7 +7351,7 @@
             <a:fld id="{EA5D455B-ECD0-44E3-BA0C-3649A3FCD15C}" type="datetime1">
               <a:rPr lang="en-US" smtClean="0"/>
               <a:pPr/>
-              <a:t>7/5/2011</a:t>
+              <a:t>7/13/2011</a:t>
             </a:fld>
             <a:endParaRPr lang="en-GB"/>
           </a:p>
@@ -7292,7 +7407,7 @@
     </p:spTree>
     <p:extLst>
       <p:ext uri="{BB962C8B-B14F-4D97-AF65-F5344CB8AC3E}">
-        <p14:creationId xmlns:p14="http://schemas.microsoft.com/office/powerpoint/2010/main" xmlns="" val="1934465878"/>
+        <p14:creationId xmlns:p14="http://schemas.microsoft.com/office/powerpoint/2010/main" val="106888204"/>
       </p:ext>
     </p:extLst>
   </p:cSld>
@@ -7321,7 +7436,7 @@
       </p:grpSpPr>
       <p:sp>
         <p:nvSpPr>
-          <p:cNvPr id="2" name="Title 1"/>
+          <p:cNvPr id="6" name="Title 5"/>
           <p:cNvSpPr>
             <a:spLocks noGrp="1"/>
           </p:cNvSpPr>
@@ -7336,7 +7451,7 @@
           <a:p>
             <a:r>
               <a:rPr lang="en-GB" dirty="0" smtClean="0"/>
-              <a:t>Proposed Architecture</a:t>
+              <a:t>Current Architecture</a:t>
             </a:r>
             <a:endParaRPr lang="en-GB" dirty="0"/>
           </a:p>
@@ -7344,7 +7459,7 @@
       </p:sp>
       <p:sp>
         <p:nvSpPr>
-          <p:cNvPr id="3" name="Content Placeholder 2"/>
+          <p:cNvPr id="7" name="Content Placeholder 6"/>
           <p:cNvSpPr>
             <a:spLocks noGrp="1"/>
           </p:cNvSpPr>
@@ -7359,35 +7474,33 @@
           <a:p>
             <a:r>
               <a:rPr lang="en-GB" dirty="0" smtClean="0"/>
-              <a:t>As new features are added it should be considered carefully whether they are really core features</a:t>
-            </a:r>
-          </a:p>
-          <a:p>
-            <a:pPr lvl="1"/>
-            <a:r>
-              <a:rPr lang="en-GB" dirty="0" smtClean="0"/>
-              <a:t>Core Features should stay in the core library</a:t>
-            </a:r>
-          </a:p>
-          <a:p>
-            <a:pPr lvl="1"/>
-            <a:r>
-              <a:rPr lang="en-GB" dirty="0" smtClean="0"/>
-              <a:t>Non-core features should go into other libraries</a:t>
-            </a:r>
-          </a:p>
-          <a:p>
-            <a:r>
-              <a:rPr lang="en-GB" dirty="0" smtClean="0"/>
-              <a:t>This will help to stop dependency bloat as new features are added</a:t>
-            </a:r>
-            <a:endParaRPr lang="en-GB" dirty="0"/>
-          </a:p>
-        </p:txBody>
-      </p:sp>
-      <p:sp>
-        <p:nvSpPr>
-          <p:cNvPr id="4" name="Date Placeholder 3"/>
+              <a:t>Currently the core library is a single library which is not ideal </a:t>
+            </a:r>
+            <a:r>
+              <a:rPr lang="en-GB" dirty="0" smtClean="0"/>
+              <a:t>design going forward</a:t>
+            </a:r>
+            <a:endParaRPr lang="en-GB" dirty="0" smtClean="0"/>
+          </a:p>
+          <a:p>
+            <a:r>
+              <a:rPr lang="en-GB" dirty="0" smtClean="0"/>
+              <a:t>Some features already reside in external libraries e.g. </a:t>
+            </a:r>
+            <a:r>
+              <a:rPr lang="en-GB" dirty="0" err="1" smtClean="0"/>
+              <a:t>dotNetRDF.WinForms</a:t>
+            </a:r>
+            <a:r>
+              <a:rPr lang="en-GB" dirty="0" smtClean="0"/>
+              <a:t> provides common functionality for Windows Forms GUIs</a:t>
+            </a:r>
+          </a:p>
+        </p:txBody>
+      </p:sp>
+      <p:sp>
+        <p:nvSpPr>
+          <p:cNvPr id="3" name="Date Placeholder 2"/>
           <p:cNvSpPr>
             <a:spLocks noGrp="1"/>
           </p:cNvSpPr>
@@ -7400,10 +7513,10 @@
           <a:bodyPr/>
           <a:lstStyle/>
           <a:p>
-            <a:fld id="{CDAEE9B0-25E7-4C28-AF1D-B3DDCE7EBBDB}" type="datetime1">
+            <a:fld id="{EA5D455B-ECD0-44E3-BA0C-3649A3FCD15C}" type="datetime1">
               <a:rPr lang="en-US" smtClean="0"/>
               <a:pPr/>
-              <a:t>7/5/2011</a:t>
+              <a:t>7/13/2011</a:t>
             </a:fld>
             <a:endParaRPr lang="en-GB"/>
           </a:p>
@@ -7411,7 +7524,7 @@
       </p:sp>
       <p:sp>
         <p:nvSpPr>
-          <p:cNvPr id="5" name="Footer Placeholder 4"/>
+          <p:cNvPr id="4" name="Footer Placeholder 3"/>
           <p:cNvSpPr>
             <a:spLocks noGrp="1"/>
           </p:cNvSpPr>
@@ -7434,7 +7547,7 @@
       </p:sp>
       <p:sp>
         <p:nvSpPr>
-          <p:cNvPr id="6" name="Slide Number Placeholder 5"/>
+          <p:cNvPr id="5" name="Slide Number Placeholder 4"/>
           <p:cNvSpPr>
             <a:spLocks noGrp="1"/>
           </p:cNvSpPr>
@@ -7459,7 +7572,7 @@
     </p:spTree>
     <p:extLst>
       <p:ext uri="{BB962C8B-B14F-4D97-AF65-F5344CB8AC3E}">
-        <p14:creationId xmlns:p14="http://schemas.microsoft.com/office/powerpoint/2010/main" xmlns="" val="3933745380"/>
+        <p14:creationId xmlns:p14="http://schemas.microsoft.com/office/powerpoint/2010/main" val="1934465878"/>
       </p:ext>
     </p:extLst>
   </p:cSld>
@@ -7503,7 +7616,7 @@
           <a:p>
             <a:r>
               <a:rPr lang="en-GB" dirty="0" smtClean="0"/>
-              <a:t>What constitutes a Core Feature?</a:t>
+              <a:t>Proposed Architecture</a:t>
             </a:r>
             <a:endParaRPr lang="en-GB" dirty="0"/>
           </a:p>
@@ -7522,61 +7635,55 @@
         <p:spPr/>
         <p:txBody>
           <a:bodyPr>
-            <a:normAutofit fontScale="85000" lnSpcReduction="20000"/>
+            <a:normAutofit fontScale="92500" lnSpcReduction="20000"/>
           </a:bodyPr>
           <a:lstStyle/>
           <a:p>
             <a:r>
               <a:rPr lang="en-GB" dirty="0" smtClean="0"/>
-              <a:t>Core Features:</a:t>
+              <a:t>As new features are added it should be considered carefully whether they are really core features</a:t>
             </a:r>
           </a:p>
           <a:p>
             <a:pPr lvl="1"/>
             <a:r>
               <a:rPr lang="en-GB" dirty="0" smtClean="0"/>
-              <a:t>Adds to/improve capability of a specific subsystem</a:t>
+              <a:t>Core Features should stay in the core library</a:t>
             </a:r>
           </a:p>
           <a:p>
             <a:pPr lvl="1"/>
             <a:r>
               <a:rPr lang="en-GB" dirty="0" smtClean="0"/>
-              <a:t>Unless providing major new capabilities which are highly desirable to all users they should not constitute an entirely new subsystem</a:t>
-            </a:r>
-          </a:p>
-          <a:p>
-            <a:pPr lvl="1"/>
-            <a:r>
-              <a:rPr lang="en-GB" dirty="0" smtClean="0"/>
-              <a:t>Does not require additional dependencies</a:t>
-            </a:r>
-          </a:p>
-          <a:p>
-            <a:r>
-              <a:rPr lang="en-GB" dirty="0" smtClean="0"/>
-              <a:t>Non Core Features:</a:t>
-            </a:r>
-          </a:p>
-          <a:p>
-            <a:pPr lvl="1"/>
-            <a:r>
-              <a:rPr lang="en-GB" dirty="0" smtClean="0"/>
-              <a:t>Provides an entirely new subsystem</a:t>
-            </a:r>
-          </a:p>
-          <a:p>
-            <a:pPr lvl="1"/>
-            <a:r>
-              <a:rPr lang="en-GB" dirty="0" smtClean="0"/>
-              <a:t>Is only of interest to part of the user base</a:t>
-            </a:r>
-          </a:p>
-          <a:p>
-            <a:pPr lvl="1"/>
-            <a:r>
-              <a:rPr lang="en-GB" dirty="0" smtClean="0"/>
-              <a:t>Introduce new dependencies</a:t>
+              <a:t>Non-core features should go into </a:t>
+            </a:r>
+            <a:r>
+              <a:rPr lang="en-GB" dirty="0" smtClean="0"/>
+              <a:t>dedicated</a:t>
+            </a:r>
+            <a:r>
+              <a:rPr lang="en-GB" dirty="0" smtClean="0"/>
+              <a:t> </a:t>
+            </a:r>
+            <a:r>
+              <a:rPr lang="en-GB" dirty="0" smtClean="0"/>
+              <a:t>libraries</a:t>
+            </a:r>
+          </a:p>
+          <a:p>
+            <a:r>
+              <a:rPr lang="en-GB" dirty="0" smtClean="0"/>
+              <a:t>This will help to stop dependency bloat as new features are </a:t>
+            </a:r>
+            <a:r>
+              <a:rPr lang="en-GB" dirty="0" smtClean="0"/>
+              <a:t>added</a:t>
+            </a:r>
+          </a:p>
+          <a:p>
+            <a:r>
+              <a:rPr lang="en-GB" dirty="0" smtClean="0"/>
+              <a:t>Also improves maintainability of code and features</a:t>
             </a:r>
             <a:endParaRPr lang="en-GB" dirty="0"/>
           </a:p>
@@ -7600,7 +7707,7 @@
             <a:fld id="{CDAEE9B0-25E7-4C28-AF1D-B3DDCE7EBBDB}" type="datetime1">
               <a:rPr lang="en-US" smtClean="0"/>
               <a:pPr/>
-              <a:t>7/5/2011</a:t>
+              <a:t>7/13/2011</a:t>
             </a:fld>
             <a:endParaRPr lang="en-GB"/>
           </a:p>
@@ -7656,7 +7763,7 @@
     </p:spTree>
     <p:extLst>
       <p:ext uri="{BB962C8B-B14F-4D97-AF65-F5344CB8AC3E}">
-        <p14:creationId xmlns:p14="http://schemas.microsoft.com/office/powerpoint/2010/main" xmlns="" val="4089701815"/>
+        <p14:creationId xmlns:p14="http://schemas.microsoft.com/office/powerpoint/2010/main" val="3933745380"/>
       </p:ext>
     </p:extLst>
   </p:cSld>
@@ -7700,7 +7807,7 @@
           <a:p>
             <a:r>
               <a:rPr lang="en-GB" dirty="0" smtClean="0"/>
-              <a:t>Proposed Architecture in practise (1 of 2)</a:t>
+              <a:t>What constitutes a Core Feature?</a:t>
             </a:r>
             <a:endParaRPr lang="en-GB" dirty="0"/>
           </a:p>
@@ -7719,33 +7826,61 @@
         <p:spPr/>
         <p:txBody>
           <a:bodyPr>
-            <a:normAutofit fontScale="92500"/>
+            <a:normAutofit fontScale="85000" lnSpcReduction="20000"/>
           </a:bodyPr>
           <a:lstStyle/>
           <a:p>
             <a:r>
               <a:rPr lang="en-GB" dirty="0" smtClean="0"/>
-              <a:t>It is proposed that the new ADO Store be packaged in a separate library</a:t>
+              <a:t>Core Features:</a:t>
             </a:r>
           </a:p>
           <a:p>
             <a:pPr lvl="1"/>
             <a:r>
               <a:rPr lang="en-GB" dirty="0" smtClean="0"/>
-              <a:t>Will reduce the need for dependencies in the core library</a:t>
+              <a:t>Adds to/improve capability of a specific subsystem</a:t>
             </a:r>
           </a:p>
           <a:p>
             <a:pPr lvl="1"/>
             <a:r>
               <a:rPr lang="en-GB" dirty="0" smtClean="0"/>
-              <a:t>Allows additional implementations other than MSSQL to be added in future with their dependencies</a:t>
-            </a:r>
-          </a:p>
-          <a:p>
-            <a:r>
-              <a:rPr lang="en-GB" dirty="0" smtClean="0"/>
-              <a:t>Make it easier to maintain and those who don’t need the features get a smaller library footprint</a:t>
+              <a:t>Unless providing major new capabilities which are highly desirable to all users they should not constitute an entirely new subsystem</a:t>
+            </a:r>
+          </a:p>
+          <a:p>
+            <a:pPr lvl="1"/>
+            <a:r>
+              <a:rPr lang="en-GB" dirty="0" smtClean="0"/>
+              <a:t>Does not require additional dependencies</a:t>
+            </a:r>
+          </a:p>
+          <a:p>
+            <a:r>
+              <a:rPr lang="en-GB" dirty="0" smtClean="0"/>
+              <a:t>Non Core Features:</a:t>
+            </a:r>
+          </a:p>
+          <a:p>
+            <a:pPr lvl="1"/>
+            <a:r>
+              <a:rPr lang="en-GB" dirty="0" smtClean="0"/>
+              <a:t>Provides an entirely new subsystem</a:t>
+            </a:r>
+          </a:p>
+          <a:p>
+            <a:pPr lvl="1"/>
+            <a:r>
+              <a:rPr lang="en-GB" dirty="0" smtClean="0"/>
+              <a:t>Is only of interest to part of the user base</a:t>
+            </a:r>
+          </a:p>
+          <a:p>
+            <a:pPr lvl="1"/>
+            <a:r>
+              <a:rPr lang="en-GB" dirty="0" smtClean="0"/>
+              <a:t>Introduce new dependencies</a:t>
             </a:r>
             <a:endParaRPr lang="en-GB" dirty="0"/>
           </a:p>
@@ -7769,7 +7904,7 @@
             <a:fld id="{CDAEE9B0-25E7-4C28-AF1D-B3DDCE7EBBDB}" type="datetime1">
               <a:rPr lang="en-US" smtClean="0"/>
               <a:pPr/>
-              <a:t>7/5/2011</a:t>
+              <a:t>7/13/2011</a:t>
             </a:fld>
             <a:endParaRPr lang="en-GB"/>
           </a:p>
@@ -7825,7 +7960,7 @@
     </p:spTree>
     <p:extLst>
       <p:ext uri="{BB962C8B-B14F-4D97-AF65-F5344CB8AC3E}">
-        <p14:creationId xmlns:p14="http://schemas.microsoft.com/office/powerpoint/2010/main" xmlns="" val="1078110969"/>
+        <p14:creationId xmlns:p14="http://schemas.microsoft.com/office/powerpoint/2010/main" val="4089701815"/>
       </p:ext>
     </p:extLst>
   </p:cSld>
@@ -7869,7 +8004,7 @@
           <a:p>
             <a:r>
               <a:rPr lang="en-GB" dirty="0" smtClean="0"/>
-              <a:t>Proposed Architecture in practise (2 of 2)</a:t>
+              <a:t>Proposed Architecture in practise (1 of 2)</a:t>
             </a:r>
             <a:endParaRPr lang="en-GB" dirty="0"/>
           </a:p>
@@ -7887,19 +8022,34 @@
         </p:nvSpPr>
         <p:spPr/>
         <p:txBody>
-          <a:bodyPr/>
-          <a:lstStyle/>
-          <a:p>
-            <a:r>
-              <a:rPr lang="en-GB" dirty="0" smtClean="0"/>
-              <a:t>Virtuoso support will be separated out into it’s own library</a:t>
+          <a:bodyPr>
+            <a:normAutofit fontScale="92500"/>
+          </a:bodyPr>
+          <a:lstStyle/>
+          <a:p>
+            <a:r>
+              <a:rPr lang="en-GB" dirty="0" smtClean="0"/>
+              <a:t>It is proposed that the new ADO Store be packaged in a separate library</a:t>
             </a:r>
           </a:p>
           <a:p>
             <a:pPr lvl="1"/>
             <a:r>
               <a:rPr lang="en-GB" dirty="0" smtClean="0"/>
-              <a:t>Desirable since Virtuoso support represents only a couple of classes in the API but introduces an entire DLL as a dependency</a:t>
+              <a:t>Will reduce the need for dependencies in the core library</a:t>
+            </a:r>
+          </a:p>
+          <a:p>
+            <a:pPr lvl="1"/>
+            <a:r>
+              <a:rPr lang="en-GB" dirty="0" smtClean="0"/>
+              <a:t>Allows additional implementations other than MSSQL to be added in future with their dependencies</a:t>
+            </a:r>
+          </a:p>
+          <a:p>
+            <a:r>
+              <a:rPr lang="en-GB" dirty="0" smtClean="0"/>
+              <a:t>Make it easier to maintain and those who don’t need the features get a smaller library footprint</a:t>
             </a:r>
             <a:endParaRPr lang="en-GB" dirty="0"/>
           </a:p>
@@ -7923,7 +8073,7 @@
             <a:fld id="{CDAEE9B0-25E7-4C28-AF1D-B3DDCE7EBBDB}" type="datetime1">
               <a:rPr lang="en-US" smtClean="0"/>
               <a:pPr/>
-              <a:t>7/5/2011</a:t>
+              <a:t>7/13/2011</a:t>
             </a:fld>
             <a:endParaRPr lang="en-GB"/>
           </a:p>
@@ -7979,7 +8129,7 @@
     </p:spTree>
     <p:extLst>
       <p:ext uri="{BB962C8B-B14F-4D97-AF65-F5344CB8AC3E}">
-        <p14:creationId xmlns:p14="http://schemas.microsoft.com/office/powerpoint/2010/main" xmlns="" val="3038176013"/>
+        <p14:creationId xmlns:p14="http://schemas.microsoft.com/office/powerpoint/2010/main" val="1078110969"/>
       </p:ext>
     </p:extLst>
   </p:cSld>
@@ -8023,7 +8173,7 @@
           <a:p>
             <a:r>
               <a:rPr lang="en-GB" dirty="0" smtClean="0"/>
-              <a:t>Library Naming Conventions</a:t>
+              <a:t>Proposed Architecture in practise (2 of 2)</a:t>
             </a:r>
             <a:endParaRPr lang="en-GB" dirty="0"/>
           </a:p>
@@ -8041,67 +8191,21 @@
         </p:nvSpPr>
         <p:spPr/>
         <p:txBody>
-          <a:bodyPr>
-            <a:normAutofit fontScale="85000" lnSpcReduction="20000"/>
-          </a:bodyPr>
-          <a:lstStyle/>
-          <a:p>
-            <a:r>
-              <a:rPr lang="en-GB" dirty="0" smtClean="0"/>
-              <a:t>Names should all be prefixed with </a:t>
-            </a:r>
-            <a:r>
-              <a:rPr lang="en-GB" dirty="0" err="1" smtClean="0"/>
-              <a:t>dotNetRDF</a:t>
-            </a:r>
-            <a:r>
-              <a:rPr lang="en-GB" dirty="0" smtClean="0"/>
-              <a:t>.</a:t>
-            </a:r>
-          </a:p>
-          <a:p>
-            <a:r>
-              <a:rPr lang="en-GB" dirty="0" smtClean="0"/>
-              <a:t>Name should be descriptive, not necessarily just the root namespace</a:t>
+          <a:bodyPr/>
+          <a:lstStyle/>
+          <a:p>
+            <a:r>
+              <a:rPr lang="en-GB" dirty="0" smtClean="0"/>
+              <a:t>Virtuoso support will be separated out into it’s own library</a:t>
             </a:r>
           </a:p>
           <a:p>
             <a:pPr lvl="1"/>
             <a:r>
-              <a:rPr lang="en-GB" dirty="0" err="1" smtClean="0"/>
-              <a:t>Eg</a:t>
-            </a:r>
-            <a:r>
-              <a:rPr lang="en-GB" dirty="0" smtClean="0"/>
-              <a:t>. dotNetRDF.WinForms.dll and dotNetRDF.Data.Sql.dll</a:t>
-            </a:r>
-          </a:p>
-          <a:p>
-            <a:r>
-              <a:rPr lang="en-GB" dirty="0" smtClean="0"/>
-              <a:t>Names can be </a:t>
-            </a:r>
-            <a:r>
-              <a:rPr lang="en-GB" dirty="0" err="1" smtClean="0"/>
-              <a:t>postfixed</a:t>
-            </a:r>
-            <a:r>
-              <a:rPr lang="en-GB" dirty="0" smtClean="0"/>
-              <a:t> with platform identifier where applicable e.g. dotNetRDF.Silverlight.dll</a:t>
-            </a:r>
-          </a:p>
-          <a:p>
-            <a:r>
-              <a:rPr lang="en-GB" dirty="0" smtClean="0"/>
-              <a:t>Version Numbers need not be aligned with core library, should reflect maturity of code</a:t>
-            </a:r>
-          </a:p>
-          <a:p>
-            <a:pPr lvl="1"/>
-            <a:r>
-              <a:rPr lang="en-GB" dirty="0" smtClean="0"/>
-              <a:t>For simplicity code considered mature/split out of core library will have version numbers aligned with core library</a:t>
-            </a:r>
+              <a:rPr lang="en-GB" dirty="0" smtClean="0"/>
+              <a:t>Desirable since Virtuoso support represents only a couple of classes in the API but introduces an entire DLL as a dependency</a:t>
+            </a:r>
+            <a:endParaRPr lang="en-GB" dirty="0"/>
           </a:p>
         </p:txBody>
       </p:sp>
@@ -8123,7 +8227,7 @@
             <a:fld id="{CDAEE9B0-25E7-4C28-AF1D-B3DDCE7EBBDB}" type="datetime1">
               <a:rPr lang="en-US" smtClean="0"/>
               <a:pPr/>
-              <a:t>7/5/2011</a:t>
+              <a:t>7/13/2011</a:t>
             </a:fld>
             <a:endParaRPr lang="en-GB"/>
           </a:p>
@@ -8179,7 +8283,7 @@
     </p:spTree>
     <p:extLst>
       <p:ext uri="{BB962C8B-B14F-4D97-AF65-F5344CB8AC3E}">
-        <p14:creationId xmlns:p14="http://schemas.microsoft.com/office/powerpoint/2010/main" xmlns="" val="687733986"/>
+        <p14:creationId xmlns:p14="http://schemas.microsoft.com/office/powerpoint/2010/main" val="3038176013"/>
       </p:ext>
     </p:extLst>
   </p:cSld>
@@ -8223,7 +8327,7 @@
           <a:p>
             <a:r>
               <a:rPr lang="en-GB" dirty="0" smtClean="0"/>
-              <a:t>Proposed Libraries for 0.5.0 Release</a:t>
+              <a:t>Library Naming Conventions</a:t>
             </a:r>
             <a:endParaRPr lang="en-GB" dirty="0"/>
           </a:p>
@@ -8241,39 +8345,79 @@
         </p:nvSpPr>
         <p:spPr/>
         <p:txBody>
-          <a:bodyPr/>
-          <a:lstStyle/>
-          <a:p>
-            <a:r>
-              <a:rPr lang="en-GB" dirty="0" smtClean="0"/>
-              <a:t>Core Library – dotNetRDF.dll</a:t>
+          <a:bodyPr>
+            <a:normAutofit fontScale="85000" lnSpcReduction="20000"/>
+          </a:bodyPr>
+          <a:lstStyle/>
+          <a:p>
+            <a:r>
+              <a:rPr lang="en-GB" dirty="0" smtClean="0"/>
+              <a:t>Names should all be prefixed with </a:t>
+            </a:r>
+            <a:r>
+              <a:rPr lang="en-GB" dirty="0" err="1" smtClean="0"/>
+              <a:t>dotNetRDF</a:t>
+            </a:r>
+            <a:r>
+              <a:rPr lang="en-GB" dirty="0" smtClean="0"/>
+              <a:t>.</a:t>
+            </a:r>
+          </a:p>
+          <a:p>
+            <a:r>
+              <a:rPr lang="en-GB" dirty="0" smtClean="0"/>
+              <a:t>Name should be descriptive, not necessarily </a:t>
+            </a:r>
+            <a:r>
+              <a:rPr lang="en-GB" dirty="0" smtClean="0"/>
+              <a:t>aligned with</a:t>
+            </a:r>
+            <a:r>
+              <a:rPr lang="en-GB" dirty="0" smtClean="0"/>
+              <a:t> </a:t>
+            </a:r>
+            <a:r>
+              <a:rPr lang="en-GB" dirty="0" smtClean="0"/>
+              <a:t>the root namespace</a:t>
             </a:r>
           </a:p>
           <a:p>
             <a:pPr lvl="1"/>
             <a:r>
               <a:rPr lang="en-GB" dirty="0" err="1" smtClean="0"/>
-              <a:t>WinForms</a:t>
-            </a:r>
-            <a:r>
-              <a:rPr lang="en-GB" dirty="0" smtClean="0"/>
-              <a:t> GUI – dotNetRDF.WinForms.dll</a:t>
+              <a:t>Eg</a:t>
+            </a:r>
+            <a:r>
+              <a:rPr lang="en-GB" dirty="0" smtClean="0"/>
+              <a:t>. dotNetRDF.WinForms.dll and dotNetRDF.Data.Sql.dll</a:t>
+            </a:r>
+          </a:p>
+          <a:p>
+            <a:r>
+              <a:rPr lang="en-GB" dirty="0" smtClean="0"/>
+              <a:t>Names can be </a:t>
+            </a:r>
+            <a:r>
+              <a:rPr lang="en-GB" dirty="0" err="1" smtClean="0"/>
+              <a:t>postfixed</a:t>
+            </a:r>
+            <a:r>
+              <a:rPr lang="en-GB" dirty="0" smtClean="0"/>
+              <a:t> with platform identifier where applicable e.g. dotNetRDF.Silverlight.dll</a:t>
+            </a:r>
+          </a:p>
+          <a:p>
+            <a:r>
+              <a:rPr lang="en-GB" dirty="0" smtClean="0"/>
+              <a:t>Version Numbers need not be aligned with core library, should reflect maturity of code</a:t>
             </a:r>
           </a:p>
           <a:p>
             <a:pPr lvl="1"/>
             <a:r>
               <a:rPr lang="en-GB" dirty="0" smtClean="0"/>
-              <a:t>ADO Store – dotNetRDF.Data.Sql.dll</a:t>
-            </a:r>
-          </a:p>
-          <a:p>
-            <a:pPr lvl="1"/>
-            <a:r>
-              <a:rPr lang="en-GB" dirty="0" smtClean="0"/>
-              <a:t>Virtuoso support – dotNetRDF.Data.Virtuoso.dll</a:t>
-            </a:r>
-            <a:endParaRPr lang="en-GB" dirty="0"/>
+              <a:t>For simplicity code considered mature/split out of core library will have version numbers aligned with core library</a:t>
+            </a:r>
           </a:p>
         </p:txBody>
       </p:sp>
@@ -8295,7 +8439,7 @@
             <a:fld id="{CDAEE9B0-25E7-4C28-AF1D-B3DDCE7EBBDB}" type="datetime1">
               <a:rPr lang="en-US" smtClean="0"/>
               <a:pPr/>
-              <a:t>7/5/2011</a:t>
+              <a:t>7/13/2011</a:t>
             </a:fld>
             <a:endParaRPr lang="en-GB"/>
           </a:p>
@@ -8351,7 +8495,7 @@
     </p:spTree>
     <p:extLst>
       <p:ext uri="{BB962C8B-B14F-4D97-AF65-F5344CB8AC3E}">
-        <p14:creationId xmlns:p14="http://schemas.microsoft.com/office/powerpoint/2010/main" xmlns="" val="3219753914"/>
+        <p14:creationId xmlns:p14="http://schemas.microsoft.com/office/powerpoint/2010/main" val="687733986"/>
       </p:ext>
     </p:extLst>
   </p:cSld>
@@ -8395,7 +8539,7 @@
           <a:p>
             <a:r>
               <a:rPr lang="en-GB" dirty="0" smtClean="0"/>
-              <a:t>Proposed Libraries for Future Releases</a:t>
+              <a:t>Proposed Libraries for 0.5.0 Release</a:t>
             </a:r>
             <a:endParaRPr lang="en-GB" dirty="0"/>
           </a:p>
@@ -8418,40 +8562,32 @@
           <a:p>
             <a:r>
               <a:rPr lang="en-GB" dirty="0" smtClean="0"/>
-              <a:t>LINQ Provider – dotNetRDF.Linq.dll</a:t>
+              <a:t>Core Library – dotNetRDF.dll</a:t>
             </a:r>
           </a:p>
           <a:p>
             <a:pPr lvl="1"/>
             <a:r>
-              <a:rPr lang="en-GB" dirty="0" smtClean="0"/>
-              <a:t>Based on a port of </a:t>
-            </a:r>
-            <a:r>
               <a:rPr lang="en-GB" dirty="0" err="1" smtClean="0"/>
-              <a:t>Andew</a:t>
-            </a:r>
-            <a:r>
-              <a:rPr lang="en-GB" dirty="0" smtClean="0"/>
-              <a:t> Matthew’s </a:t>
-            </a:r>
-            <a:r>
-              <a:rPr lang="en-GB" dirty="0" err="1" smtClean="0"/>
-              <a:t>LinqToRdf</a:t>
-            </a:r>
-            <a:endParaRPr lang="en-GB" dirty="0" smtClean="0"/>
+              <a:t>WinForms</a:t>
+            </a:r>
+            <a:r>
+              <a:rPr lang="en-GB" dirty="0" smtClean="0"/>
+              <a:t> GUI – dotNetRDF.WinForms.dll</a:t>
+            </a:r>
           </a:p>
           <a:p>
             <a:pPr lvl="1"/>
             <a:r>
               <a:rPr lang="en-GB" dirty="0" smtClean="0"/>
-              <a:t>Persistence capability added by use of SPARQL Update</a:t>
-            </a:r>
-          </a:p>
-          <a:p>
-            <a:r>
-              <a:rPr lang="en-GB" dirty="0" smtClean="0"/>
-              <a:t>WPF GUI – dotNetRDF.Wpf.dll</a:t>
+              <a:t>ADO Store – dotNetRDF.Data.Sql.dll</a:t>
+            </a:r>
+          </a:p>
+          <a:p>
+            <a:pPr lvl="1"/>
+            <a:r>
+              <a:rPr lang="en-GB" dirty="0" smtClean="0"/>
+              <a:t>Virtuoso support – dotNetRDF.Data.Virtuoso.dll</a:t>
             </a:r>
             <a:endParaRPr lang="en-GB" dirty="0"/>
           </a:p>
@@ -8475,7 +8611,7 @@
             <a:fld id="{CDAEE9B0-25E7-4C28-AF1D-B3DDCE7EBBDB}" type="datetime1">
               <a:rPr lang="en-US" smtClean="0"/>
               <a:pPr/>
-              <a:t>7/5/2011</a:t>
+              <a:t>7/13/2011</a:t>
             </a:fld>
             <a:endParaRPr lang="en-GB"/>
           </a:p>
@@ -8531,7 +8667,7 @@
     </p:spTree>
     <p:extLst>
       <p:ext uri="{BB962C8B-B14F-4D97-AF65-F5344CB8AC3E}">
-        <p14:creationId xmlns:p14="http://schemas.microsoft.com/office/powerpoint/2010/main" xmlns="" val="3035919924"/>
+        <p14:creationId xmlns:p14="http://schemas.microsoft.com/office/powerpoint/2010/main" val="3219753914"/>
       </p:ext>
     </p:extLst>
   </p:cSld>
@@ -8570,14 +8706,12 @@
         </p:nvSpPr>
         <p:spPr/>
         <p:txBody>
-          <a:bodyPr>
-            <a:normAutofit/>
-          </a:bodyPr>
-          <a:lstStyle/>
-          <a:p>
-            <a:r>
-              <a:rPr lang="en-GB" dirty="0" smtClean="0"/>
-              <a:t>General Roadmap</a:t>
+          <a:bodyPr/>
+          <a:lstStyle/>
+          <a:p>
+            <a:r>
+              <a:rPr lang="en-GB" dirty="0" smtClean="0"/>
+              <a:t>Proposed Libraries for Future Releases</a:t>
             </a:r>
             <a:endParaRPr lang="en-GB" dirty="0"/>
           </a:p>
@@ -8585,7 +8719,74 @@
       </p:sp>
       <p:sp>
         <p:nvSpPr>
-          <p:cNvPr id="3" name="Date Placeholder 2"/>
+          <p:cNvPr id="3" name="Content Placeholder 2"/>
+          <p:cNvSpPr>
+            <a:spLocks noGrp="1"/>
+          </p:cNvSpPr>
+          <p:nvPr>
+            <p:ph idx="1"/>
+          </p:nvPr>
+        </p:nvSpPr>
+        <p:spPr/>
+        <p:txBody>
+          <a:bodyPr/>
+          <a:lstStyle/>
+          <a:p>
+            <a:r>
+              <a:rPr lang="en-GB" dirty="0" smtClean="0"/>
+              <a:t>LINQ Provider – dotNetRDF.Linq.dll</a:t>
+            </a:r>
+          </a:p>
+          <a:p>
+            <a:pPr lvl="1"/>
+            <a:r>
+              <a:rPr lang="en-GB" dirty="0" smtClean="0"/>
+              <a:t>Based on a port of </a:t>
+            </a:r>
+            <a:r>
+              <a:rPr lang="en-GB" dirty="0" err="1" smtClean="0"/>
+              <a:t>Andew</a:t>
+            </a:r>
+            <a:r>
+              <a:rPr lang="en-GB" dirty="0" smtClean="0"/>
+              <a:t> Matthew’s </a:t>
+            </a:r>
+            <a:r>
+              <a:rPr lang="en-GB" dirty="0" err="1" smtClean="0"/>
+              <a:t>LinqToRdf</a:t>
+            </a:r>
+            <a:endParaRPr lang="en-GB" dirty="0" smtClean="0"/>
+          </a:p>
+          <a:p>
+            <a:pPr lvl="1"/>
+            <a:r>
+              <a:rPr lang="en-GB" dirty="0" smtClean="0"/>
+              <a:t>Persistence capability added by use of SPARQL </a:t>
+            </a:r>
+            <a:r>
+              <a:rPr lang="en-GB" dirty="0" smtClean="0"/>
+              <a:t>Update</a:t>
+            </a:r>
+          </a:p>
+          <a:p>
+            <a:r>
+              <a:rPr lang="en-GB" dirty="0" smtClean="0"/>
+              <a:t>SPIN Implementation – dotNetRDF.Spin.dll</a:t>
+            </a:r>
+            <a:endParaRPr lang="en-GB" dirty="0" smtClean="0"/>
+          </a:p>
+          <a:p>
+            <a:r>
+              <a:rPr lang="en-GB" dirty="0" smtClean="0"/>
+              <a:t>WPF GUI – dotNetRDF.Wpf.dll</a:t>
+            </a:r>
+            <a:endParaRPr lang="en-GB" dirty="0"/>
+          </a:p>
+        </p:txBody>
+      </p:sp>
+      <p:sp>
+        <p:nvSpPr>
+          <p:cNvPr id="4" name="Date Placeholder 3"/>
           <p:cNvSpPr>
             <a:spLocks noGrp="1"/>
           </p:cNvSpPr>
@@ -8598,10 +8799,10 @@
           <a:bodyPr/>
           <a:lstStyle/>
           <a:p>
-            <a:fld id="{EA5D455B-ECD0-44E3-BA0C-3649A3FCD15C}" type="datetime1">
+            <a:fld id="{CDAEE9B0-25E7-4C28-AF1D-B3DDCE7EBBDB}" type="datetime1">
               <a:rPr lang="en-US" smtClean="0"/>
               <a:pPr/>
-              <a:t>7/5/2011</a:t>
+              <a:t>7/13/2011</a:t>
             </a:fld>
             <a:endParaRPr lang="en-GB"/>
           </a:p>
@@ -8609,7 +8810,7 @@
       </p:sp>
       <p:sp>
         <p:nvSpPr>
-          <p:cNvPr id="4" name="Footer Placeholder 3"/>
+          <p:cNvPr id="5" name="Footer Placeholder 4"/>
           <p:cNvSpPr>
             <a:spLocks noGrp="1"/>
           </p:cNvSpPr>
@@ -8632,7 +8833,7 @@
       </p:sp>
       <p:sp>
         <p:nvSpPr>
-          <p:cNvPr id="5" name="Slide Number Placeholder 4"/>
+          <p:cNvPr id="6" name="Slide Number Placeholder 5"/>
           <p:cNvSpPr>
             <a:spLocks noGrp="1"/>
           </p:cNvSpPr>
@@ -8657,7 +8858,7 @@
     </p:spTree>
     <p:extLst>
       <p:ext uri="{BB962C8B-B14F-4D97-AF65-F5344CB8AC3E}">
-        <p14:creationId xmlns:p14="http://schemas.microsoft.com/office/powerpoint/2010/main" xmlns="" val="2482877072"/>
+        <p14:creationId xmlns:p14="http://schemas.microsoft.com/office/powerpoint/2010/main" val="3035919924"/>
       </p:ext>
     </p:extLst>
   </p:cSld>
@@ -8686,7 +8887,7 @@
       </p:grpSpPr>
       <p:sp>
         <p:nvSpPr>
-          <p:cNvPr id="6" name="Title 5"/>
+          <p:cNvPr id="2" name="Title 1"/>
           <p:cNvSpPr>
             <a:spLocks noGrp="1"/>
           </p:cNvSpPr>
@@ -8696,53 +8897,15 @@
         </p:nvSpPr>
         <p:spPr/>
         <p:txBody>
-          <a:bodyPr/>
-          <a:lstStyle/>
-          <a:p>
-            <a:r>
-              <a:rPr lang="en-GB" dirty="0" smtClean="0"/>
-              <a:t>Plans</a:t>
-            </a:r>
-            <a:endParaRPr lang="en-GB" dirty="0"/>
-          </a:p>
-        </p:txBody>
-      </p:sp>
-      <p:sp>
-        <p:nvSpPr>
-          <p:cNvPr id="7" name="Content Placeholder 6"/>
-          <p:cNvSpPr>
-            <a:spLocks noGrp="1"/>
-          </p:cNvSpPr>
-          <p:nvPr>
-            <p:ph idx="1"/>
-          </p:nvPr>
-        </p:nvSpPr>
-        <p:spPr/>
-        <p:txBody>
-          <a:bodyPr/>
-          <a:lstStyle/>
-          <a:p>
-            <a:r>
-              <a:rPr lang="en-GB" dirty="0" smtClean="0"/>
-              <a:t>Currently the roadmap is very loose beyond the immediate next releases (the 0.5.x series)</a:t>
-            </a:r>
-          </a:p>
-          <a:p>
-            <a:r>
-              <a:rPr lang="en-GB" dirty="0" smtClean="0"/>
-              <a:t>There are no specific plans for any release beyond 0.5.x at the moment</a:t>
-            </a:r>
-          </a:p>
-          <a:p>
-            <a:r>
-              <a:rPr lang="en-GB" dirty="0" smtClean="0"/>
-              <a:t>Ideally the roadmap from subsequent releases (0.6.x) to the 1.0 release should be driven by the community</a:t>
-            </a:r>
-          </a:p>
-          <a:p>
-            <a:pPr marL="0" indent="0">
-              <a:buNone/>
-            </a:pPr>
+          <a:bodyPr>
+            <a:normAutofit/>
+          </a:bodyPr>
+          <a:lstStyle/>
+          <a:p>
+            <a:r>
+              <a:rPr lang="en-GB" dirty="0" smtClean="0"/>
+              <a:t>General Roadmap</a:t>
+            </a:r>
             <a:endParaRPr lang="en-GB" dirty="0"/>
           </a:p>
         </p:txBody>
@@ -8765,7 +8928,7 @@
             <a:fld id="{EA5D455B-ECD0-44E3-BA0C-3649A3FCD15C}" type="datetime1">
               <a:rPr lang="en-US" smtClean="0"/>
               <a:pPr/>
-              <a:t>7/5/2011</a:t>
+              <a:t>7/13/2011</a:t>
             </a:fld>
             <a:endParaRPr lang="en-GB"/>
           </a:p>
@@ -8821,7 +8984,7 @@
     </p:spTree>
     <p:extLst>
       <p:ext uri="{BB962C8B-B14F-4D97-AF65-F5344CB8AC3E}">
-        <p14:creationId xmlns:p14="http://schemas.microsoft.com/office/powerpoint/2010/main" xmlns="" val="381284594"/>
+        <p14:creationId xmlns:p14="http://schemas.microsoft.com/office/powerpoint/2010/main" val="2482877072"/>
       </p:ext>
     </p:extLst>
   </p:cSld>
@@ -8889,7 +9052,7 @@
             <a:fld id="{EA5D455B-ECD0-44E3-BA0C-3649A3FCD15C}" type="datetime1">
               <a:rPr lang="en-US" smtClean="0"/>
               <a:pPr/>
-              <a:t>7/5/2011</a:t>
+              <a:t>7/13/2011</a:t>
             </a:fld>
             <a:endParaRPr lang="en-GB"/>
           </a:p>
@@ -8945,7 +9108,7 @@
     </p:spTree>
     <p:extLst>
       <p:ext uri="{BB962C8B-B14F-4D97-AF65-F5344CB8AC3E}">
-        <p14:creationId xmlns:p14="http://schemas.microsoft.com/office/powerpoint/2010/main" xmlns="" val="4095227198"/>
+        <p14:creationId xmlns:p14="http://schemas.microsoft.com/office/powerpoint/2010/main" val="4095227198"/>
       </p:ext>
     </p:extLst>
   </p:cSld>
@@ -8974,7 +9137,7 @@
       </p:grpSpPr>
       <p:sp>
         <p:nvSpPr>
-          <p:cNvPr id="2" name="Title 1"/>
+          <p:cNvPr id="6" name="Title 5"/>
           <p:cNvSpPr>
             <a:spLocks noGrp="1"/>
           </p:cNvSpPr>
@@ -8989,7 +9152,7 @@
           <a:p>
             <a:r>
               <a:rPr lang="en-GB" dirty="0" smtClean="0"/>
-              <a:t>Community Driven Planning</a:t>
+              <a:t>Plans</a:t>
             </a:r>
             <a:endParaRPr lang="en-GB" dirty="0"/>
           </a:p>
@@ -8997,7 +9160,7 @@
       </p:sp>
       <p:sp>
         <p:nvSpPr>
-          <p:cNvPr id="3" name="Content Placeholder 2"/>
+          <p:cNvPr id="7" name="Content Placeholder 6"/>
           <p:cNvSpPr>
             <a:spLocks noGrp="1"/>
           </p:cNvSpPr>
@@ -9007,35 +9170,37 @@
         </p:nvSpPr>
         <p:spPr/>
         <p:txBody>
-          <a:bodyPr>
-            <a:normAutofit lnSpcReduction="10000"/>
-          </a:bodyPr>
-          <a:lstStyle/>
-          <a:p>
-            <a:r>
-              <a:rPr lang="en-GB" dirty="0" smtClean="0"/>
-              <a:t>For 0.6.x releases new features/improvements should be primarily driven by community request</a:t>
-            </a:r>
-          </a:p>
-          <a:p>
-            <a:pPr lvl="1"/>
-            <a:r>
-              <a:rPr lang="en-GB" dirty="0" smtClean="0"/>
-              <a:t>i.e. features will be prioritised based on community request/need/feedback</a:t>
-            </a:r>
-          </a:p>
-          <a:p>
-            <a:r>
-              <a:rPr lang="en-GB" dirty="0" smtClean="0"/>
-              <a:t>We have some possible features lined up which we will prioritise unless community suggests other features</a:t>
-            </a:r>
+          <a:bodyPr/>
+          <a:lstStyle/>
+          <a:p>
+            <a:r>
+              <a:rPr lang="en-GB" dirty="0" smtClean="0"/>
+              <a:t>Currently the roadmap is very loose beyond the immediate next releases (the 0.5.x series)</a:t>
+            </a:r>
+          </a:p>
+          <a:p>
+            <a:r>
+              <a:rPr lang="en-GB" dirty="0" smtClean="0"/>
+              <a:t>There are no specific plans for any release beyond 0.5.x at the moment</a:t>
+            </a:r>
+          </a:p>
+          <a:p>
+            <a:r>
+              <a:rPr lang="en-GB" dirty="0" smtClean="0"/>
+              <a:t>Ideally the roadmap from subsequent releases (0.6.x) to the 1.0 release should be driven by the community</a:t>
+            </a:r>
+          </a:p>
+          <a:p>
+            <a:pPr marL="0" indent="0">
+              <a:buNone/>
+            </a:pPr>
             <a:endParaRPr lang="en-GB" dirty="0"/>
           </a:p>
         </p:txBody>
       </p:sp>
       <p:sp>
         <p:nvSpPr>
-          <p:cNvPr id="4" name="Date Placeholder 3"/>
+          <p:cNvPr id="3" name="Date Placeholder 2"/>
           <p:cNvSpPr>
             <a:spLocks noGrp="1"/>
           </p:cNvSpPr>
@@ -9048,10 +9213,10 @@
           <a:bodyPr/>
           <a:lstStyle/>
           <a:p>
-            <a:fld id="{CDAEE9B0-25E7-4C28-AF1D-B3DDCE7EBBDB}" type="datetime1">
+            <a:fld id="{EA5D455B-ECD0-44E3-BA0C-3649A3FCD15C}" type="datetime1">
               <a:rPr lang="en-US" smtClean="0"/>
               <a:pPr/>
-              <a:t>7/5/2011</a:t>
+              <a:t>7/13/2011</a:t>
             </a:fld>
             <a:endParaRPr lang="en-GB"/>
           </a:p>
@@ -9059,7 +9224,7 @@
       </p:sp>
       <p:sp>
         <p:nvSpPr>
-          <p:cNvPr id="5" name="Footer Placeholder 4"/>
+          <p:cNvPr id="4" name="Footer Placeholder 3"/>
           <p:cNvSpPr>
             <a:spLocks noGrp="1"/>
           </p:cNvSpPr>
@@ -9082,7 +9247,7 @@
       </p:sp>
       <p:sp>
         <p:nvSpPr>
-          <p:cNvPr id="6" name="Slide Number Placeholder 5"/>
+          <p:cNvPr id="5" name="Slide Number Placeholder 4"/>
           <p:cNvSpPr>
             <a:spLocks noGrp="1"/>
           </p:cNvSpPr>
@@ -9107,7 +9272,7 @@
     </p:spTree>
     <p:extLst>
       <p:ext uri="{BB962C8B-B14F-4D97-AF65-F5344CB8AC3E}">
-        <p14:creationId xmlns:p14="http://schemas.microsoft.com/office/powerpoint/2010/main" xmlns="" val="3357694366"/>
+        <p14:creationId xmlns:p14="http://schemas.microsoft.com/office/powerpoint/2010/main" val="381284594"/>
       </p:ext>
     </p:extLst>
   </p:cSld>
@@ -9151,7 +9316,7 @@
           <a:p>
             <a:r>
               <a:rPr lang="en-GB" dirty="0" smtClean="0"/>
-              <a:t>Our Suggestions (1 of 2)</a:t>
+              <a:t>Community Driven Planning</a:t>
             </a:r>
             <a:endParaRPr lang="en-GB" dirty="0"/>
           </a:p>
@@ -9170,42 +9335,26 @@
         <p:spPr/>
         <p:txBody>
           <a:bodyPr>
-            <a:normAutofit fontScale="92500"/>
+            <a:normAutofit lnSpcReduction="10000"/>
           </a:bodyPr>
           <a:lstStyle/>
           <a:p>
             <a:r>
               <a:rPr lang="en-GB" dirty="0" smtClean="0"/>
-              <a:t>Full text SPARQL Support – dotNetRDF.Sparql.FullText.dll</a:t>
+              <a:t>For 0.6.x releases new features/improvements should be primarily driven by community request</a:t>
             </a:r>
           </a:p>
           <a:p>
             <a:pPr lvl="1"/>
             <a:r>
               <a:rPr lang="en-GB" dirty="0" smtClean="0"/>
-              <a:t>Use </a:t>
-            </a:r>
-            <a:r>
-              <a:rPr lang="en-GB" dirty="0" err="1" smtClean="0"/>
-              <a:t>Lucene.Net</a:t>
-            </a:r>
-            <a:r>
-              <a:rPr lang="en-GB" dirty="0" smtClean="0"/>
-              <a:t> to provide full text search capabilities</a:t>
-            </a:r>
-          </a:p>
-          <a:p>
-            <a:pPr lvl="1"/>
-            <a:r>
-              <a:rPr lang="en-GB" dirty="0" smtClean="0"/>
-              <a:t>Syntax compatible with other implementations as far as possible</a:t>
-            </a:r>
-          </a:p>
-          <a:p>
-            <a:pPr lvl="1"/>
-            <a:r>
-              <a:rPr lang="en-GB" dirty="0" smtClean="0"/>
-              <a:t>Will be implemented as a new library since as per the architecture proposal it is a non core feature and requires additional dependencies</a:t>
+              <a:t>i.e. features will be prioritised based on community request/need/feedback</a:t>
+            </a:r>
+          </a:p>
+          <a:p>
+            <a:r>
+              <a:rPr lang="en-GB" dirty="0" smtClean="0"/>
+              <a:t>We have some possible features lined up which we will prioritise unless community suggests other features</a:t>
             </a:r>
             <a:endParaRPr lang="en-GB" dirty="0"/>
           </a:p>
@@ -9229,7 +9378,7 @@
             <a:fld id="{CDAEE9B0-25E7-4C28-AF1D-B3DDCE7EBBDB}" type="datetime1">
               <a:rPr lang="en-US" smtClean="0"/>
               <a:pPr/>
-              <a:t>7/5/2011</a:t>
+              <a:t>7/13/2011</a:t>
             </a:fld>
             <a:endParaRPr lang="en-GB"/>
           </a:p>
@@ -9285,7 +9434,7 @@
     </p:spTree>
     <p:extLst>
       <p:ext uri="{BB962C8B-B14F-4D97-AF65-F5344CB8AC3E}">
-        <p14:creationId xmlns:p14="http://schemas.microsoft.com/office/powerpoint/2010/main" xmlns="" val="912609684"/>
+        <p14:creationId xmlns:p14="http://schemas.microsoft.com/office/powerpoint/2010/main" val="3357694366"/>
       </p:ext>
     </p:extLst>
   </p:cSld>
@@ -9329,7 +9478,7 @@
           <a:p>
             <a:r>
               <a:rPr lang="en-GB" dirty="0" smtClean="0"/>
-              <a:t>Our Suggestions (2 of 2)</a:t>
+              <a:t>Our Suggestions (1 of 2)</a:t>
             </a:r>
             <a:endParaRPr lang="en-GB" dirty="0"/>
           </a:p>
@@ -9347,38 +9496,43 @@
         </p:nvSpPr>
         <p:spPr/>
         <p:txBody>
-          <a:bodyPr/>
-          <a:lstStyle/>
-          <a:p>
+          <a:bodyPr>
+            <a:normAutofit fontScale="92500"/>
+          </a:bodyPr>
+          <a:lstStyle/>
+          <a:p>
+            <a:r>
+              <a:rPr lang="en-GB" dirty="0" smtClean="0"/>
+              <a:t>Full text SPARQL Support – dotNetRDF.Sparql.FullText.dll</a:t>
+            </a:r>
+          </a:p>
+          <a:p>
+            <a:pPr lvl="1"/>
+            <a:r>
+              <a:rPr lang="en-GB" dirty="0" smtClean="0"/>
+              <a:t>Use </a:t>
+            </a:r>
             <a:r>
               <a:rPr lang="en-GB" dirty="0" err="1" smtClean="0"/>
-              <a:t>GeoSPARQL</a:t>
-            </a:r>
-            <a:r>
-              <a:rPr lang="en-GB" dirty="0" smtClean="0"/>
-              <a:t> Support – dotNetRDF.Sparql.Geo.dll</a:t>
+              <a:t>Lucene.Net</a:t>
+            </a:r>
+            <a:r>
+              <a:rPr lang="en-GB" dirty="0" smtClean="0"/>
+              <a:t> to provide full text search capabilities</a:t>
             </a:r>
           </a:p>
           <a:p>
             <a:pPr lvl="1"/>
             <a:r>
               <a:rPr lang="en-GB" dirty="0" smtClean="0"/>
-              <a:t>Provide an implementation of the OGC </a:t>
-            </a:r>
-            <a:r>
-              <a:rPr lang="en-GB" dirty="0" err="1" smtClean="0"/>
-              <a:t>GeoSPARQL</a:t>
-            </a:r>
-            <a:r>
-              <a:rPr lang="en-GB" dirty="0" smtClean="0"/>
-              <a:t> standard</a:t>
+              <a:t>Syntax compatible with other implementations as far as possible</a:t>
             </a:r>
           </a:p>
           <a:p>
             <a:pPr lvl="1"/>
             <a:r>
               <a:rPr lang="en-GB" dirty="0" smtClean="0"/>
-              <a:t>As with full text SPARQL will be implemented as a new library as is as non-core feature</a:t>
+              <a:t>Will be implemented as a new library since as per the architecture proposal it is a non core feature and requires additional dependencies</a:t>
             </a:r>
             <a:endParaRPr lang="en-GB" dirty="0"/>
           </a:p>
@@ -9402,7 +9556,7 @@
             <a:fld id="{CDAEE9B0-25E7-4C28-AF1D-B3DDCE7EBBDB}" type="datetime1">
               <a:rPr lang="en-US" smtClean="0"/>
               <a:pPr/>
-              <a:t>7/5/2011</a:t>
+              <a:t>7/13/2011</a:t>
             </a:fld>
             <a:endParaRPr lang="en-GB"/>
           </a:p>
@@ -9458,7 +9612,7 @@
     </p:spTree>
     <p:extLst>
       <p:ext uri="{BB962C8B-B14F-4D97-AF65-F5344CB8AC3E}">
-        <p14:creationId xmlns:p14="http://schemas.microsoft.com/office/powerpoint/2010/main" xmlns="" val="585871984"/>
+        <p14:creationId xmlns:p14="http://schemas.microsoft.com/office/powerpoint/2010/main" val="912609684"/>
       </p:ext>
     </p:extLst>
   </p:cSld>
@@ -9502,7 +9656,7 @@
           <a:p>
             <a:r>
               <a:rPr lang="en-GB" dirty="0" smtClean="0"/>
-              <a:t>Existing Community Suggestions</a:t>
+              <a:t>Our Suggestions (2 of 2)</a:t>
             </a:r>
             <a:endParaRPr lang="en-GB" dirty="0"/>
           </a:p>
@@ -9524,69 +9678,34 @@
           <a:lstStyle/>
           <a:p>
             <a:r>
-              <a:rPr lang="en-GB" dirty="0" smtClean="0"/>
-              <a:t>Currently the following features have been suggested/requested by the community</a:t>
-            </a:r>
-            <a:r>
-              <a:rPr lang="en-GB" dirty="0" smtClean="0"/>
-              <a:t>:</a:t>
+              <a:rPr lang="en-GB" dirty="0" err="1" smtClean="0"/>
+              <a:t>GeoSPARQL</a:t>
+            </a:r>
+            <a:r>
+              <a:rPr lang="en-GB" dirty="0" smtClean="0"/>
+              <a:t> Support – dotNetRDF.Sparql.Geo.dll</a:t>
             </a:r>
           </a:p>
           <a:p>
             <a:pPr lvl="1"/>
             <a:r>
+              <a:rPr lang="en-GB" dirty="0" smtClean="0"/>
+              <a:t>Provide an implementation of the OGC </a:t>
+            </a:r>
+            <a:r>
               <a:rPr lang="en-GB" dirty="0" err="1" smtClean="0"/>
-              <a:t>.Net</a:t>
-            </a:r>
-            <a:r>
-              <a:rPr lang="en-GB" dirty="0" smtClean="0"/>
-              <a:t> Serialization support</a:t>
-            </a:r>
-            <a:endParaRPr lang="en-GB" dirty="0" smtClean="0"/>
+              <a:t>GeoSPARQL</a:t>
+            </a:r>
+            <a:r>
+              <a:rPr lang="en-GB" dirty="0" smtClean="0"/>
+              <a:t> standard</a:t>
+            </a:r>
           </a:p>
           <a:p>
             <a:pPr lvl="1"/>
             <a:r>
               <a:rPr lang="en-GB" dirty="0" smtClean="0"/>
-              <a:t>SPIN (SPARQL Inferencing Notation) Support</a:t>
-            </a:r>
-          </a:p>
-          <a:p>
-            <a:pPr lvl="1"/>
-            <a:r>
-              <a:rPr lang="en-GB" dirty="0" err="1" smtClean="0"/>
-              <a:t>rdfEditor</a:t>
-            </a:r>
-            <a:r>
-              <a:rPr lang="en-GB" dirty="0" smtClean="0"/>
-              <a:t> for non-Windows </a:t>
-            </a:r>
-            <a:r>
-              <a:rPr lang="en-GB" dirty="0" smtClean="0"/>
-              <a:t>systems</a:t>
-            </a:r>
-          </a:p>
-          <a:p>
-            <a:pPr lvl="2"/>
-            <a:r>
-              <a:rPr lang="en-GB" dirty="0" smtClean="0"/>
-              <a:t>As </a:t>
-            </a:r>
-            <a:r>
-              <a:rPr lang="en-GB" dirty="0" smtClean="0"/>
-              <a:t>it is WPF based it does not run under Mono which limits it to Windows </a:t>
-            </a:r>
-            <a:r>
-              <a:rPr lang="en-GB" dirty="0" smtClean="0"/>
-              <a:t>only currently</a:t>
-            </a:r>
-            <a:endParaRPr lang="en-GB" dirty="0" smtClean="0"/>
-          </a:p>
-          <a:p>
-            <a:pPr lvl="1"/>
-            <a:r>
-              <a:rPr lang="en-GB" dirty="0" smtClean="0"/>
-              <a:t>Additional JSON format support</a:t>
+              <a:t>As with full text SPARQL will be implemented as a new library as is as non-core feature</a:t>
             </a:r>
             <a:endParaRPr lang="en-GB" dirty="0"/>
           </a:p>
@@ -9610,7 +9729,7 @@
             <a:fld id="{CDAEE9B0-25E7-4C28-AF1D-B3DDCE7EBBDB}" type="datetime1">
               <a:rPr lang="en-US" smtClean="0"/>
               <a:pPr/>
-              <a:t>7/5/2011</a:t>
+              <a:t>7/13/2011</a:t>
             </a:fld>
             <a:endParaRPr lang="en-GB"/>
           </a:p>
@@ -9666,7 +9785,7 @@
     </p:spTree>
     <p:extLst>
       <p:ext uri="{BB962C8B-B14F-4D97-AF65-F5344CB8AC3E}">
-        <p14:creationId xmlns:p14="http://schemas.microsoft.com/office/powerpoint/2010/main" xmlns="" val="2152085500"/>
+        <p14:creationId xmlns:p14="http://schemas.microsoft.com/office/powerpoint/2010/main" val="585871984"/>
       </p:ext>
     </p:extLst>
   </p:cSld>
@@ -9695,7 +9814,7 @@
       </p:grpSpPr>
       <p:sp>
         <p:nvSpPr>
-          <p:cNvPr id="7" name="Title 6"/>
+          <p:cNvPr id="2" name="Title 1"/>
           <p:cNvSpPr>
             <a:spLocks noGrp="1"/>
           </p:cNvSpPr>
@@ -9710,7 +9829,73 @@
           <a:p>
             <a:r>
               <a:rPr lang="en-GB" dirty="0" smtClean="0"/>
-              <a:t>Get Involved</a:t>
+              <a:t>Existing Community Suggestions</a:t>
+            </a:r>
+            <a:endParaRPr lang="en-GB" dirty="0"/>
+          </a:p>
+        </p:txBody>
+      </p:sp>
+      <p:sp>
+        <p:nvSpPr>
+          <p:cNvPr id="3" name="Content Placeholder 2"/>
+          <p:cNvSpPr>
+            <a:spLocks noGrp="1"/>
+          </p:cNvSpPr>
+          <p:nvPr>
+            <p:ph idx="1"/>
+          </p:nvPr>
+        </p:nvSpPr>
+        <p:spPr/>
+        <p:txBody>
+          <a:bodyPr/>
+          <a:lstStyle/>
+          <a:p>
+            <a:r>
+              <a:rPr lang="en-GB" dirty="0" smtClean="0"/>
+              <a:t>Currently the following features have been suggested/requested by the community:</a:t>
+            </a:r>
+          </a:p>
+          <a:p>
+            <a:pPr lvl="1"/>
+            <a:r>
+              <a:rPr lang="en-GB" dirty="0" err="1" smtClean="0"/>
+              <a:t>.Net</a:t>
+            </a:r>
+            <a:r>
+              <a:rPr lang="en-GB" dirty="0" smtClean="0"/>
+              <a:t> Serialization support</a:t>
+            </a:r>
+          </a:p>
+          <a:p>
+            <a:pPr lvl="1"/>
+            <a:r>
+              <a:rPr lang="en-GB" dirty="0" smtClean="0"/>
+              <a:t>SPIN (SPARQL Inferencing Notation) Support</a:t>
+            </a:r>
+          </a:p>
+          <a:p>
+            <a:pPr lvl="1"/>
+            <a:r>
+              <a:rPr lang="en-GB" dirty="0" err="1" smtClean="0"/>
+              <a:t>rdfEditor</a:t>
+            </a:r>
+            <a:r>
+              <a:rPr lang="en-GB" dirty="0" smtClean="0"/>
+              <a:t> for non-Windows systems</a:t>
+            </a:r>
+          </a:p>
+          <a:p>
+            <a:pPr lvl="2"/>
+            <a:r>
+              <a:rPr lang="en-GB" dirty="0" smtClean="0"/>
+              <a:t>As it is WPF based it does not run under Mono which limits it to Windows only currently</a:t>
+            </a:r>
+          </a:p>
+          <a:p>
+            <a:pPr lvl="1"/>
+            <a:r>
+              <a:rPr lang="en-GB" dirty="0" smtClean="0"/>
+              <a:t>Additional JSON format support</a:t>
             </a:r>
             <a:endParaRPr lang="en-GB" dirty="0"/>
           </a:p>
@@ -9734,7 +9919,7 @@
             <a:fld id="{CDAEE9B0-25E7-4C28-AF1D-B3DDCE7EBBDB}" type="datetime1">
               <a:rPr lang="en-US" smtClean="0"/>
               <a:pPr/>
-              <a:t>7/5/2011</a:t>
+              <a:t>7/13/2011</a:t>
             </a:fld>
             <a:endParaRPr lang="en-GB"/>
           </a:p>
@@ -9790,7 +9975,7 @@
     </p:spTree>
     <p:extLst>
       <p:ext uri="{BB962C8B-B14F-4D97-AF65-F5344CB8AC3E}">
-        <p14:creationId xmlns:p14="http://schemas.microsoft.com/office/powerpoint/2010/main" xmlns="" val="3258641840"/>
+        <p14:creationId xmlns:p14="http://schemas.microsoft.com/office/powerpoint/2010/main" val="2152085500"/>
       </p:ext>
     </p:extLst>
   </p:cSld>
@@ -9819,7 +10004,7 @@
       </p:grpSpPr>
       <p:sp>
         <p:nvSpPr>
-          <p:cNvPr id="2" name="Title 1"/>
+          <p:cNvPr id="7" name="Title 6"/>
           <p:cNvSpPr>
             <a:spLocks noGrp="1"/>
           </p:cNvSpPr>
@@ -9837,78 +10022,6 @@
               <a:t>Get Involved</a:t>
             </a:r>
             <a:endParaRPr lang="en-GB" dirty="0"/>
-          </a:p>
-        </p:txBody>
-      </p:sp>
-      <p:sp>
-        <p:nvSpPr>
-          <p:cNvPr id="3" name="Content Placeholder 2"/>
-          <p:cNvSpPr>
-            <a:spLocks noGrp="1"/>
-          </p:cNvSpPr>
-          <p:nvPr>
-            <p:ph idx="1"/>
-          </p:nvPr>
-        </p:nvSpPr>
-        <p:spPr/>
-        <p:txBody>
-          <a:bodyPr>
-            <a:normAutofit/>
-          </a:bodyPr>
-          <a:lstStyle/>
-          <a:p>
-            <a:r>
-              <a:rPr lang="en-GB" dirty="0" smtClean="0"/>
-              <a:t>Suggestions and feedback on this roadmap are solicited and welcomed</a:t>
-            </a:r>
-          </a:p>
-          <a:p>
-            <a:r>
-              <a:rPr lang="en-GB" dirty="0" smtClean="0"/>
-              <a:t>Via email:</a:t>
-            </a:r>
-          </a:p>
-          <a:p>
-            <a:pPr lvl="1"/>
-            <a:r>
-              <a:rPr lang="en-GB" dirty="0" smtClean="0"/>
-              <a:t>Mailing List – </a:t>
-            </a:r>
-            <a:r>
-              <a:rPr lang="en-GB" dirty="0" smtClean="0">
-                <a:hlinkClick r:id="rId2"/>
-              </a:rPr>
-              <a:t>dotnetrdf-develop@lists.sf.net</a:t>
-            </a:r>
-            <a:endParaRPr lang="en-GB" dirty="0" smtClean="0"/>
-          </a:p>
-          <a:p>
-            <a:pPr lvl="1"/>
-            <a:r>
-              <a:rPr lang="en-GB" dirty="0" smtClean="0"/>
-              <a:t>Direct Email – </a:t>
-            </a:r>
-            <a:r>
-              <a:rPr lang="en-GB" dirty="0" smtClean="0">
-                <a:hlinkClick r:id="rId3"/>
-              </a:rPr>
-              <a:t>rvesse@dotnetrdf.org</a:t>
-            </a:r>
-            <a:endParaRPr lang="en-GB" dirty="0" smtClean="0"/>
-          </a:p>
-          <a:p>
-            <a:r>
-              <a:rPr lang="en-GB" dirty="0" smtClean="0"/>
-              <a:t>Via Skype (</a:t>
-            </a:r>
-            <a:r>
-              <a:rPr lang="en-GB" dirty="0" err="1" smtClean="0"/>
-              <a:t>rvesse</a:t>
-            </a:r>
-            <a:r>
-              <a:rPr lang="en-GB" dirty="0" smtClean="0"/>
-              <a:t>) – please email first to arrange a meeting</a:t>
-            </a:r>
           </a:p>
         </p:txBody>
       </p:sp>
@@ -9930,7 +10043,7 @@
             <a:fld id="{CDAEE9B0-25E7-4C28-AF1D-B3DDCE7EBBDB}" type="datetime1">
               <a:rPr lang="en-US" smtClean="0"/>
               <a:pPr/>
-              <a:t>7/5/2011</a:t>
+              <a:t>7/13/2011</a:t>
             </a:fld>
             <a:endParaRPr lang="en-GB"/>
           </a:p>
@@ -9986,7 +10099,7 @@
     </p:spTree>
     <p:extLst>
       <p:ext uri="{BB962C8B-B14F-4D97-AF65-F5344CB8AC3E}">
-        <p14:creationId xmlns:p14="http://schemas.microsoft.com/office/powerpoint/2010/main" xmlns="" val="1264147251"/>
+        <p14:creationId xmlns:p14="http://schemas.microsoft.com/office/powerpoint/2010/main" val="3258641840"/>
       </p:ext>
     </p:extLst>
   </p:cSld>
@@ -10048,67 +10161,63 @@
         </p:nvSpPr>
         <p:spPr/>
         <p:txBody>
-          <a:bodyPr/>
-          <a:lstStyle/>
-          <a:p>
-            <a:r>
-              <a:rPr lang="en-GB" dirty="0"/>
-              <a:t>Face to Face </a:t>
+          <a:bodyPr>
+            <a:normAutofit/>
+          </a:bodyPr>
+          <a:lstStyle/>
+          <a:p>
+            <a:r>
+              <a:rPr lang="en-GB" dirty="0" smtClean="0"/>
+              <a:t>Suggestions and feedback on this roadmap are solicited and welcomed</a:t>
+            </a:r>
+          </a:p>
+          <a:p>
+            <a:r>
+              <a:rPr lang="en-GB" dirty="0" smtClean="0"/>
+              <a:t>Via email:</a:t>
             </a:r>
           </a:p>
           <a:p>
             <a:pPr lvl="1"/>
             <a:r>
-              <a:rPr lang="en-GB" dirty="0"/>
-              <a:t>Conferences – contact me via email to see what conferences I plain on attending later this year</a:t>
-            </a:r>
+              <a:rPr lang="en-GB" dirty="0" smtClean="0"/>
+              <a:t>Mailing List – </a:t>
+            </a:r>
+            <a:r>
+              <a:rPr lang="en-GB" dirty="0" smtClean="0">
+                <a:hlinkClick r:id="rId2"/>
+              </a:rPr>
+              <a:t>dotnetrdf-develop@lists.sf.net</a:t>
+            </a:r>
+            <a:endParaRPr lang="en-GB" dirty="0" smtClean="0"/>
           </a:p>
           <a:p>
             <a:pPr lvl="1"/>
             <a:r>
-              <a:rPr lang="en-GB" dirty="0" err="1"/>
-              <a:t>Meetup</a:t>
-            </a:r>
-            <a:r>
-              <a:rPr lang="en-GB" dirty="0"/>
-              <a:t> – I attend the London </a:t>
-            </a:r>
-            <a:r>
-              <a:rPr lang="en-GB" dirty="0" err="1"/>
-              <a:t>SemWeb</a:t>
-            </a:r>
-            <a:r>
-              <a:rPr lang="en-GB" dirty="0"/>
-              <a:t> </a:t>
+              <a:rPr lang="en-GB" dirty="0" smtClean="0"/>
+              <a:t>Direct Email – </a:t>
+            </a:r>
+            <a:r>
+              <a:rPr lang="en-GB" dirty="0" smtClean="0">
+                <a:hlinkClick r:id="rId3"/>
+              </a:rPr>
+              <a:t>rvesse@dotnetrdf.org</a:t>
+            </a:r>
+            <a:endParaRPr lang="en-GB" dirty="0" smtClean="0"/>
+          </a:p>
+          <a:p>
+            <a:r>
+              <a:rPr lang="en-GB" dirty="0" smtClean="0"/>
+              <a:t>Via Skype (</a:t>
             </a:r>
             <a:r>
               <a:rPr lang="en-GB" dirty="0" err="1" smtClean="0"/>
-              <a:t>Meetup</a:t>
-            </a:r>
-            <a:r>
-              <a:rPr lang="en-GB" dirty="0" smtClean="0"/>
-              <a:t>, please check with me via email whether I will be at a specific </a:t>
-            </a:r>
-            <a:r>
-              <a:rPr lang="en-GB" dirty="0" err="1" smtClean="0"/>
-              <a:t>meetup</a:t>
-            </a:r>
-            <a:endParaRPr lang="en-GB" dirty="0"/>
-          </a:p>
-          <a:p>
-            <a:pPr lvl="1"/>
-            <a:r>
-              <a:rPr lang="en-GB" dirty="0"/>
-              <a:t>Meetings – If you are based in the </a:t>
-            </a:r>
-            <a:r>
-              <a:rPr lang="en-GB" dirty="0" smtClean="0"/>
-              <a:t>south of the UK I am happy to arrange meetings via email</a:t>
-            </a:r>
-            <a:endParaRPr lang="en-GB" dirty="0"/>
-          </a:p>
-          <a:p>
-            <a:endParaRPr lang="en-GB" dirty="0"/>
+              <a:t>rvesse</a:t>
+            </a:r>
+            <a:r>
+              <a:rPr lang="en-GB" dirty="0" smtClean="0"/>
+              <a:t>) – please email first to arrange a meeting</a:t>
+            </a:r>
           </a:p>
         </p:txBody>
       </p:sp>
@@ -10130,7 +10239,7 @@
             <a:fld id="{CDAEE9B0-25E7-4C28-AF1D-B3DDCE7EBBDB}" type="datetime1">
               <a:rPr lang="en-US" smtClean="0"/>
               <a:pPr/>
-              <a:t>7/5/2011</a:t>
+              <a:t>7/13/2011</a:t>
             </a:fld>
             <a:endParaRPr lang="en-GB"/>
           </a:p>
@@ -10186,7 +10295,207 @@
     </p:spTree>
     <p:extLst>
       <p:ext uri="{BB962C8B-B14F-4D97-AF65-F5344CB8AC3E}">
-        <p14:creationId xmlns:p14="http://schemas.microsoft.com/office/powerpoint/2010/main" xmlns="" val="798761902"/>
+        <p14:creationId xmlns:p14="http://schemas.microsoft.com/office/powerpoint/2010/main" val="1264147251"/>
+      </p:ext>
+    </p:extLst>
+  </p:cSld>
+  <p:clrMapOvr>
+    <a:masterClrMapping/>
+  </p:clrMapOvr>
+</p:sld>
+</file>
+
+<file path=ppt/slides/slide47.xml><?xml version="1.0" encoding="utf-8"?>
+<p:sld xmlns:a="http://schemas.openxmlformats.org/drawingml/2006/main" xmlns:r="http://schemas.openxmlformats.org/officeDocument/2006/relationships" xmlns:p="http://schemas.openxmlformats.org/presentationml/2006/main">
+  <p:cSld>
+    <p:spTree>
+      <p:nvGrpSpPr>
+        <p:cNvPr id="1" name=""/>
+        <p:cNvGrpSpPr/>
+        <p:nvPr/>
+      </p:nvGrpSpPr>
+      <p:grpSpPr>
+        <a:xfrm>
+          <a:off x="0" y="0"/>
+          <a:ext cx="0" cy="0"/>
+          <a:chOff x="0" y="0"/>
+          <a:chExt cx="0" cy="0"/>
+        </a:xfrm>
+      </p:grpSpPr>
+      <p:sp>
+        <p:nvSpPr>
+          <p:cNvPr id="2" name="Title 1"/>
+          <p:cNvSpPr>
+            <a:spLocks noGrp="1"/>
+          </p:cNvSpPr>
+          <p:nvPr>
+            <p:ph type="title"/>
+          </p:nvPr>
+        </p:nvSpPr>
+        <p:spPr/>
+        <p:txBody>
+          <a:bodyPr/>
+          <a:lstStyle/>
+          <a:p>
+            <a:r>
+              <a:rPr lang="en-GB" dirty="0" smtClean="0"/>
+              <a:t>Get Involved</a:t>
+            </a:r>
+            <a:endParaRPr lang="en-GB" dirty="0"/>
+          </a:p>
+        </p:txBody>
+      </p:sp>
+      <p:sp>
+        <p:nvSpPr>
+          <p:cNvPr id="3" name="Content Placeholder 2"/>
+          <p:cNvSpPr>
+            <a:spLocks noGrp="1"/>
+          </p:cNvSpPr>
+          <p:nvPr>
+            <p:ph idx="1"/>
+          </p:nvPr>
+        </p:nvSpPr>
+        <p:spPr/>
+        <p:txBody>
+          <a:bodyPr/>
+          <a:lstStyle/>
+          <a:p>
+            <a:r>
+              <a:rPr lang="en-GB" dirty="0"/>
+              <a:t>Face to Face </a:t>
+            </a:r>
+          </a:p>
+          <a:p>
+            <a:pPr lvl="1"/>
+            <a:r>
+              <a:rPr lang="en-GB" dirty="0"/>
+              <a:t>Conferences – contact me via email to see what conferences I plain on attending later this year</a:t>
+            </a:r>
+          </a:p>
+          <a:p>
+            <a:pPr lvl="1"/>
+            <a:r>
+              <a:rPr lang="en-GB" dirty="0" err="1"/>
+              <a:t>Meetup</a:t>
+            </a:r>
+            <a:r>
+              <a:rPr lang="en-GB" dirty="0"/>
+              <a:t> – I attend the London </a:t>
+            </a:r>
+            <a:r>
+              <a:rPr lang="en-GB" dirty="0" err="1"/>
+              <a:t>SemWeb</a:t>
+            </a:r>
+            <a:r>
+              <a:rPr lang="en-GB" dirty="0"/>
+              <a:t> </a:t>
+            </a:r>
+            <a:r>
+              <a:rPr lang="en-GB" dirty="0" err="1" smtClean="0"/>
+              <a:t>Meetup</a:t>
+            </a:r>
+            <a:r>
+              <a:rPr lang="en-GB" dirty="0" smtClean="0"/>
+              <a:t>, please check with me via email whether I will be at a specific </a:t>
+            </a:r>
+            <a:r>
+              <a:rPr lang="en-GB" dirty="0" err="1" smtClean="0"/>
+              <a:t>meetup</a:t>
+            </a:r>
+            <a:endParaRPr lang="en-GB" dirty="0"/>
+          </a:p>
+          <a:p>
+            <a:pPr lvl="1"/>
+            <a:r>
+              <a:rPr lang="en-GB" dirty="0"/>
+              <a:t>Meetings – If you are based in the </a:t>
+            </a:r>
+            <a:r>
+              <a:rPr lang="en-GB" dirty="0" smtClean="0"/>
+              <a:t>south of the UK I am happy to arrange meetings via email</a:t>
+            </a:r>
+            <a:endParaRPr lang="en-GB" dirty="0"/>
+          </a:p>
+          <a:p>
+            <a:endParaRPr lang="en-GB" dirty="0"/>
+          </a:p>
+        </p:txBody>
+      </p:sp>
+      <p:sp>
+        <p:nvSpPr>
+          <p:cNvPr id="4" name="Date Placeholder 3"/>
+          <p:cNvSpPr>
+            <a:spLocks noGrp="1"/>
+          </p:cNvSpPr>
+          <p:nvPr>
+            <p:ph type="dt" sz="half" idx="10"/>
+          </p:nvPr>
+        </p:nvSpPr>
+        <p:spPr/>
+        <p:txBody>
+          <a:bodyPr/>
+          <a:lstStyle/>
+          <a:p>
+            <a:fld id="{CDAEE9B0-25E7-4C28-AF1D-B3DDCE7EBBDB}" type="datetime1">
+              <a:rPr lang="en-US" smtClean="0"/>
+              <a:pPr/>
+              <a:t>7/13/2011</a:t>
+            </a:fld>
+            <a:endParaRPr lang="en-GB"/>
+          </a:p>
+        </p:txBody>
+      </p:sp>
+      <p:sp>
+        <p:nvSpPr>
+          <p:cNvPr id="5" name="Footer Placeholder 4"/>
+          <p:cNvSpPr>
+            <a:spLocks noGrp="1"/>
+          </p:cNvSpPr>
+          <p:nvPr>
+            <p:ph type="ftr" sz="quarter" idx="11"/>
+          </p:nvPr>
+        </p:nvSpPr>
+        <p:spPr/>
+        <p:txBody>
+          <a:bodyPr/>
+          <a:lstStyle/>
+          <a:p>
+            <a:r>
+              <a:rPr lang="en-GB" smtClean="0"/>
+              <a:t>http://www.dotnetrdf.org</a:t>
+            </a:r>
+            <a:endParaRPr lang="en-GB"/>
+          </a:p>
+        </p:txBody>
+      </p:sp>
+      <p:sp>
+        <p:nvSpPr>
+          <p:cNvPr id="6" name="Slide Number Placeholder 5"/>
+          <p:cNvSpPr>
+            <a:spLocks noGrp="1"/>
+          </p:cNvSpPr>
+          <p:nvPr>
+            <p:ph type="sldNum" sz="quarter" idx="12"/>
+          </p:nvPr>
+        </p:nvSpPr>
+        <p:spPr/>
+        <p:txBody>
+          <a:bodyPr/>
+          <a:lstStyle/>
+          <a:p>
+            <a:fld id="{35128F56-7434-487A-8B29-0C024560A5F4}" type="slidenum">
+              <a:rPr lang="en-GB" smtClean="0"/>
+              <a:pPr/>
+              <a:t>47</a:t>
+            </a:fld>
+            <a:endParaRPr lang="en-GB"/>
+          </a:p>
+        </p:txBody>
+      </p:sp>
+    </p:spTree>
+    <p:extLst>
+      <p:ext uri="{BB962C8B-B14F-4D97-AF65-F5344CB8AC3E}">
+        <p14:creationId xmlns:p14="http://schemas.microsoft.com/office/powerpoint/2010/main" val="798761902"/>
       </p:ext>
     </p:extLst>
   </p:cSld>
@@ -10311,7 +10620,7 @@
             <a:fld id="{CDAEE9B0-25E7-4C28-AF1D-B3DDCE7EBBDB}" type="datetime1">
               <a:rPr lang="en-US" smtClean="0"/>
               <a:pPr/>
-              <a:t>7/5/2011</a:t>
+              <a:t>7/13/2011</a:t>
             </a:fld>
             <a:endParaRPr lang="en-GB"/>
           </a:p>
@@ -10367,7 +10676,7 @@
     </p:spTree>
     <p:extLst>
       <p:ext uri="{BB962C8B-B14F-4D97-AF65-F5344CB8AC3E}">
-        <p14:creationId xmlns:p14="http://schemas.microsoft.com/office/powerpoint/2010/main" xmlns="" val="685525953"/>
+        <p14:creationId xmlns:p14="http://schemas.microsoft.com/office/powerpoint/2010/main" val="685525953"/>
       </p:ext>
     </p:extLst>
   </p:cSld>
@@ -10435,7 +10744,7 @@
             <a:fld id="{EA5D455B-ECD0-44E3-BA0C-3649A3FCD15C}" type="datetime1">
               <a:rPr lang="en-US" smtClean="0"/>
               <a:pPr/>
-              <a:t>7/5/2011</a:t>
+              <a:t>7/13/2011</a:t>
             </a:fld>
             <a:endParaRPr lang="en-GB"/>
           </a:p>
@@ -10491,7 +10800,7 @@
     </p:spTree>
     <p:extLst>
       <p:ext uri="{BB962C8B-B14F-4D97-AF65-F5344CB8AC3E}">
-        <p14:creationId xmlns:p14="http://schemas.microsoft.com/office/powerpoint/2010/main" xmlns="" val="2062332550"/>
+        <p14:creationId xmlns:p14="http://schemas.microsoft.com/office/powerpoint/2010/main" val="2062332550"/>
       </p:ext>
     </p:extLst>
   </p:cSld>
@@ -10597,7 +10906,7 @@
             <a:fld id="{CDAEE9B0-25E7-4C28-AF1D-B3DDCE7EBBDB}" type="datetime1">
               <a:rPr lang="en-US" smtClean="0"/>
               <a:pPr/>
-              <a:t>7/5/2011</a:t>
+              <a:t>7/13/2011</a:t>
             </a:fld>
             <a:endParaRPr lang="en-GB"/>
           </a:p>
@@ -10653,7 +10962,7 @@
     </p:spTree>
     <p:extLst>
       <p:ext uri="{BB962C8B-B14F-4D97-AF65-F5344CB8AC3E}">
-        <p14:creationId xmlns:p14="http://schemas.microsoft.com/office/powerpoint/2010/main" xmlns="" val="2752513629"/>
+        <p14:creationId xmlns:p14="http://schemas.microsoft.com/office/powerpoint/2010/main" val="2752513629"/>
       </p:ext>
     </p:extLst>
   </p:cSld>
@@ -10777,7 +11086,7 @@
             <a:fld id="{CDAEE9B0-25E7-4C28-AF1D-B3DDCE7EBBDB}" type="datetime1">
               <a:rPr lang="en-US" smtClean="0"/>
               <a:pPr/>
-              <a:t>7/5/2011</a:t>
+              <a:t>7/13/2011</a:t>
             </a:fld>
             <a:endParaRPr lang="en-GB"/>
           </a:p>
@@ -10833,7 +11142,7 @@
     </p:spTree>
     <p:extLst>
       <p:ext uri="{BB962C8B-B14F-4D97-AF65-F5344CB8AC3E}">
-        <p14:creationId xmlns:p14="http://schemas.microsoft.com/office/powerpoint/2010/main" xmlns="" val="1884836899"/>
+        <p14:creationId xmlns:p14="http://schemas.microsoft.com/office/powerpoint/2010/main" val="1884836899"/>
       </p:ext>
     </p:extLst>
   </p:cSld>
@@ -10930,7 +11239,7 @@
             <a:fld id="{CDAEE9B0-25E7-4C28-AF1D-B3DDCE7EBBDB}" type="datetime1">
               <a:rPr lang="en-US" smtClean="0"/>
               <a:pPr/>
-              <a:t>7/5/2011</a:t>
+              <a:t>7/13/2011</a:t>
             </a:fld>
             <a:endParaRPr lang="en-GB"/>
           </a:p>
@@ -10986,7 +11295,7 @@
     </p:spTree>
     <p:extLst>
       <p:ext uri="{BB962C8B-B14F-4D97-AF65-F5344CB8AC3E}">
-        <p14:creationId xmlns:p14="http://schemas.microsoft.com/office/powerpoint/2010/main" xmlns="" val="1547614895"/>
+        <p14:creationId xmlns:p14="http://schemas.microsoft.com/office/powerpoint/2010/main" val="1547614895"/>
       </p:ext>
     </p:extLst>
   </p:cSld>

</xml_diff>

<commit_message>
Removed rdfEditor.Core from the trunk solutions in preparation for moving it to the experimental branch
</commit_message>
<xml_diff>
--- a/Slides/Roadmap.pptx
+++ b/Slides/Roadmap.pptx
@@ -5,7 +5,7 @@
     <p:sldMasterId id="2147483648" r:id="rId1"/>
   </p:sldMasterIdLst>
   <p:notesMasterIdLst>
-    <p:notesMasterId r:id="rId50"/>
+    <p:notesMasterId r:id="rId51"/>
   </p:notesMasterIdLst>
   <p:sldIdLst>
     <p:sldId id="256" r:id="rId2"/>
@@ -35,27 +35,28 @@
     <p:sldId id="279" r:id="rId26"/>
     <p:sldId id="280" r:id="rId27"/>
     <p:sldId id="281" r:id="rId28"/>
-    <p:sldId id="308" r:id="rId29"/>
-    <p:sldId id="282" r:id="rId30"/>
-    <p:sldId id="283" r:id="rId31"/>
-    <p:sldId id="287" r:id="rId32"/>
-    <p:sldId id="288" r:id="rId33"/>
-    <p:sldId id="289" r:id="rId34"/>
-    <p:sldId id="299" r:id="rId35"/>
-    <p:sldId id="290" r:id="rId36"/>
-    <p:sldId id="291" r:id="rId37"/>
-    <p:sldId id="292" r:id="rId38"/>
-    <p:sldId id="293" r:id="rId39"/>
-    <p:sldId id="294" r:id="rId40"/>
-    <p:sldId id="295" r:id="rId41"/>
-    <p:sldId id="296" r:id="rId42"/>
-    <p:sldId id="297" r:id="rId43"/>
-    <p:sldId id="298" r:id="rId44"/>
-    <p:sldId id="300" r:id="rId45"/>
-    <p:sldId id="301" r:id="rId46"/>
-    <p:sldId id="303" r:id="rId47"/>
-    <p:sldId id="302" r:id="rId48"/>
-    <p:sldId id="304" r:id="rId49"/>
+    <p:sldId id="282" r:id="rId29"/>
+    <p:sldId id="283" r:id="rId30"/>
+    <p:sldId id="287" r:id="rId31"/>
+    <p:sldId id="288" r:id="rId32"/>
+    <p:sldId id="289" r:id="rId33"/>
+    <p:sldId id="299" r:id="rId34"/>
+    <p:sldId id="290" r:id="rId35"/>
+    <p:sldId id="291" r:id="rId36"/>
+    <p:sldId id="292" r:id="rId37"/>
+    <p:sldId id="293" r:id="rId38"/>
+    <p:sldId id="294" r:id="rId39"/>
+    <p:sldId id="295" r:id="rId40"/>
+    <p:sldId id="296" r:id="rId41"/>
+    <p:sldId id="297" r:id="rId42"/>
+    <p:sldId id="298" r:id="rId43"/>
+    <p:sldId id="300" r:id="rId44"/>
+    <p:sldId id="308" r:id="rId45"/>
+    <p:sldId id="309" r:id="rId46"/>
+    <p:sldId id="301" r:id="rId47"/>
+    <p:sldId id="303" r:id="rId48"/>
+    <p:sldId id="302" r:id="rId49"/>
+    <p:sldId id="304" r:id="rId50"/>
   </p:sldIdLst>
   <p:sldSz cx="9144000" cy="6858000" type="screen4x3"/>
   <p:notesSz cx="7099300" cy="10223500"/>
@@ -240,7 +241,7 @@
             <a:fld id="{A4EFCF4D-B222-4BDE-9F21-361A6D2DD5DC}" type="datetimeFigureOut">
               <a:rPr lang="en-GB" smtClean="0"/>
               <a:pPr/>
-              <a:t>15/07/2011</a:t>
+              <a:t>20/07/2011</a:t>
             </a:fld>
             <a:endParaRPr lang="en-GB"/>
           </a:p>
@@ -409,7 +410,7 @@
     </p:spTree>
     <p:extLst>
       <p:ext uri="{BB962C8B-B14F-4D97-AF65-F5344CB8AC3E}">
-        <p14:creationId xmlns:p14="http://schemas.microsoft.com/office/powerpoint/2010/main" val="3764111685"/>
+        <p14:creationId xmlns:p14="http://schemas.microsoft.com/office/powerpoint/2010/main" xmlns="" val="3764111685"/>
       </p:ext>
     </p:extLst>
   </p:cSld>
@@ -697,7 +698,7 @@
             <a:fld id="{7DDF2E66-A8D8-4938-9770-803246E1F4D9}" type="datetime1">
               <a:rPr lang="en-US" smtClean="0"/>
               <a:pPr/>
-              <a:t>7/15/2011</a:t>
+              <a:t>7/20/2011</a:t>
             </a:fld>
             <a:endParaRPr lang="en-GB"/>
           </a:p>
@@ -888,7 +889,7 @@
             <a:fld id="{CDAEE9B0-25E7-4C28-AF1D-B3DDCE7EBBDB}" type="datetime1">
               <a:rPr lang="en-US" smtClean="0"/>
               <a:pPr/>
-              <a:t>7/15/2011</a:t>
+              <a:t>7/20/2011</a:t>
             </a:fld>
             <a:endParaRPr lang="en-GB"/>
           </a:p>
@@ -1135,7 +1136,7 @@
             <a:fld id="{B4D3D433-0AB0-44F2-9244-5C7078B0628D}" type="datetime1">
               <a:rPr lang="en-US" smtClean="0"/>
               <a:pPr/>
-              <a:t>7/15/2011</a:t>
+              <a:t>7/20/2011</a:t>
             </a:fld>
             <a:endParaRPr lang="en-GB"/>
           </a:p>
@@ -1439,7 +1440,7 @@
             <a:fld id="{603E95A3-71BD-4303-BDB5-8A36882C7B2B}" type="datetime1">
               <a:rPr lang="en-US" smtClean="0"/>
               <a:pPr/>
-              <a:t>7/15/2011</a:t>
+              <a:t>7/20/2011</a:t>
             </a:fld>
             <a:endParaRPr lang="en-GB"/>
           </a:p>
@@ -1847,7 +1848,7 @@
             <a:fld id="{DA3AB10B-EC00-4A9D-ADD6-A8B68613B4D2}" type="datetime1">
               <a:rPr lang="en-US" smtClean="0"/>
               <a:pPr/>
-              <a:t>7/15/2011</a:t>
+              <a:t>7/20/2011</a:t>
             </a:fld>
             <a:endParaRPr lang="en-GB"/>
           </a:p>
@@ -1979,7 +1980,7 @@
             <a:fld id="{EA5D455B-ECD0-44E3-BA0C-3649A3FCD15C}" type="datetime1">
               <a:rPr lang="en-US" smtClean="0"/>
               <a:pPr/>
-              <a:t>7/15/2011</a:t>
+              <a:t>7/20/2011</a:t>
             </a:fld>
             <a:endParaRPr lang="en-GB"/>
           </a:p>
@@ -2075,7 +2076,7 @@
             <a:fld id="{F83BA156-88F6-4A85-BCB0-63F0774EAEDC}" type="datetime1">
               <a:rPr lang="en-US" smtClean="0"/>
               <a:pPr/>
-              <a:t>7/15/2011</a:t>
+              <a:t>7/20/2011</a:t>
             </a:fld>
             <a:endParaRPr lang="en-GB"/>
           </a:p>
@@ -2359,7 +2360,7 @@
             <a:fld id="{044DBA34-05AD-44A3-A0F1-C917A9CE0E42}" type="datetime1">
               <a:rPr lang="en-US" smtClean="0"/>
               <a:pPr/>
-              <a:t>7/15/2011</a:t>
+              <a:t>7/20/2011</a:t>
             </a:fld>
             <a:endParaRPr lang="en-GB"/>
           </a:p>
@@ -2623,7 +2624,7 @@
             <a:fld id="{3FDD57B1-846D-42C4-9FE3-5B43FAB1C846}" type="datetime1">
               <a:rPr lang="en-US" smtClean="0"/>
               <a:pPr/>
-              <a:t>7/15/2011</a:t>
+              <a:t>7/20/2011</a:t>
             </a:fld>
             <a:endParaRPr lang="en-GB"/>
           </a:p>
@@ -2775,7 +2776,7 @@
             <a:fld id="{8EDAB77D-6898-4F92-AE07-90DBD2DF1995}" type="datetime1">
               <a:rPr lang="en-US" smtClean="0"/>
               <a:pPr/>
-              <a:t>7/15/2011</a:t>
+              <a:t>7/20/2011</a:t>
             </a:fld>
             <a:endParaRPr lang="en-GB" dirty="0"/>
           </a:p>
@@ -3336,7 +3337,7 @@
             <a:fld id="{ADB3C27C-C00A-40F0-A166-0452DE5EF4FD}" type="datetime1">
               <a:rPr lang="en-US" smtClean="0"/>
               <a:pPr/>
-              <a:t>7/15/2011</a:t>
+              <a:t>7/20/2011</a:t>
             </a:fld>
             <a:endParaRPr lang="en-GB"/>
           </a:p>
@@ -3510,7 +3511,7 @@
             <a:fld id="{EA5D455B-ECD0-44E3-BA0C-3649A3FCD15C}" type="datetime1">
               <a:rPr lang="en-US" smtClean="0"/>
               <a:pPr/>
-              <a:t>7/15/2011</a:t>
+              <a:t>7/20/2011</a:t>
             </a:fld>
             <a:endParaRPr lang="en-GB"/>
           </a:p>
@@ -3566,7 +3567,7 @@
     </p:spTree>
     <p:extLst>
       <p:ext uri="{BB962C8B-B14F-4D97-AF65-F5344CB8AC3E}">
-        <p14:creationId xmlns:p14="http://schemas.microsoft.com/office/powerpoint/2010/main" val="3728461749"/>
+        <p14:creationId xmlns:p14="http://schemas.microsoft.com/office/powerpoint/2010/main" xmlns="" val="3728461749"/>
       </p:ext>
     </p:extLst>
   </p:cSld>
@@ -3688,7 +3689,7 @@
             <a:fld id="{CDAEE9B0-25E7-4C28-AF1D-B3DDCE7EBBDB}" type="datetime1">
               <a:rPr lang="en-US" smtClean="0"/>
               <a:pPr/>
-              <a:t>7/15/2011</a:t>
+              <a:t>7/20/2011</a:t>
             </a:fld>
             <a:endParaRPr lang="en-GB"/>
           </a:p>
@@ -3744,7 +3745,7 @@
     </p:spTree>
     <p:extLst>
       <p:ext uri="{BB962C8B-B14F-4D97-AF65-F5344CB8AC3E}">
-        <p14:creationId xmlns:p14="http://schemas.microsoft.com/office/powerpoint/2010/main" val="3573922916"/>
+        <p14:creationId xmlns:p14="http://schemas.microsoft.com/office/powerpoint/2010/main" xmlns="" val="3573922916"/>
       </p:ext>
     </p:extLst>
   </p:cSld>
@@ -3852,7 +3853,7 @@
             <a:fld id="{CDAEE9B0-25E7-4C28-AF1D-B3DDCE7EBBDB}" type="datetime1">
               <a:rPr lang="en-US" smtClean="0"/>
               <a:pPr/>
-              <a:t>7/15/2011</a:t>
+              <a:t>7/20/2011</a:t>
             </a:fld>
             <a:endParaRPr lang="en-GB"/>
           </a:p>
@@ -3908,7 +3909,7 @@
     </p:spTree>
     <p:extLst>
       <p:ext uri="{BB962C8B-B14F-4D97-AF65-F5344CB8AC3E}">
-        <p14:creationId xmlns:p14="http://schemas.microsoft.com/office/powerpoint/2010/main" val="2108512158"/>
+        <p14:creationId xmlns:p14="http://schemas.microsoft.com/office/powerpoint/2010/main" xmlns="" val="2108512158"/>
       </p:ext>
     </p:extLst>
   </p:cSld>
@@ -4011,7 +4012,7 @@
             <a:fld id="{CDAEE9B0-25E7-4C28-AF1D-B3DDCE7EBBDB}" type="datetime1">
               <a:rPr lang="en-US" smtClean="0"/>
               <a:pPr/>
-              <a:t>7/15/2011</a:t>
+              <a:t>7/20/2011</a:t>
             </a:fld>
             <a:endParaRPr lang="en-GB" dirty="0"/>
           </a:p>
@@ -4067,7 +4068,7 @@
     </p:spTree>
     <p:extLst>
       <p:ext uri="{BB962C8B-B14F-4D97-AF65-F5344CB8AC3E}">
-        <p14:creationId xmlns:p14="http://schemas.microsoft.com/office/powerpoint/2010/main" val="3738179165"/>
+        <p14:creationId xmlns:p14="http://schemas.microsoft.com/office/powerpoint/2010/main" xmlns="" val="3738179165"/>
       </p:ext>
     </p:extLst>
   </p:cSld>
@@ -4196,7 +4197,7 @@
             <a:fld id="{CDAEE9B0-25E7-4C28-AF1D-B3DDCE7EBBDB}" type="datetime1">
               <a:rPr lang="en-US" smtClean="0"/>
               <a:pPr/>
-              <a:t>7/15/2011</a:t>
+              <a:t>7/20/2011</a:t>
             </a:fld>
             <a:endParaRPr lang="en-GB"/>
           </a:p>
@@ -4252,7 +4253,7 @@
     </p:spTree>
     <p:extLst>
       <p:ext uri="{BB962C8B-B14F-4D97-AF65-F5344CB8AC3E}">
-        <p14:creationId xmlns:p14="http://schemas.microsoft.com/office/powerpoint/2010/main" val="1957182481"/>
+        <p14:creationId xmlns:p14="http://schemas.microsoft.com/office/powerpoint/2010/main" xmlns="" val="1957182481"/>
       </p:ext>
     </p:extLst>
   </p:cSld>
@@ -4383,7 +4384,7 @@
             <a:fld id="{CDAEE9B0-25E7-4C28-AF1D-B3DDCE7EBBDB}" type="datetime1">
               <a:rPr lang="en-US" smtClean="0"/>
               <a:pPr/>
-              <a:t>7/15/2011</a:t>
+              <a:t>7/20/2011</a:t>
             </a:fld>
             <a:endParaRPr lang="en-GB"/>
           </a:p>
@@ -4439,7 +4440,7 @@
     </p:spTree>
     <p:extLst>
       <p:ext uri="{BB962C8B-B14F-4D97-AF65-F5344CB8AC3E}">
-        <p14:creationId xmlns:p14="http://schemas.microsoft.com/office/powerpoint/2010/main" val="2909703350"/>
+        <p14:creationId xmlns:p14="http://schemas.microsoft.com/office/powerpoint/2010/main" xmlns="" val="2909703350"/>
       </p:ext>
     </p:extLst>
   </p:cSld>
@@ -4546,7 +4547,7 @@
             <a:fld id="{CDAEE9B0-25E7-4C28-AF1D-B3DDCE7EBBDB}" type="datetime1">
               <a:rPr lang="en-US" smtClean="0"/>
               <a:pPr/>
-              <a:t>7/15/2011</a:t>
+              <a:t>7/20/2011</a:t>
             </a:fld>
             <a:endParaRPr lang="en-GB"/>
           </a:p>
@@ -4602,7 +4603,7 @@
     </p:spTree>
     <p:extLst>
       <p:ext uri="{BB962C8B-B14F-4D97-AF65-F5344CB8AC3E}">
-        <p14:creationId xmlns:p14="http://schemas.microsoft.com/office/powerpoint/2010/main" val="3472818035"/>
+        <p14:creationId xmlns:p14="http://schemas.microsoft.com/office/powerpoint/2010/main" xmlns="" val="3472818035"/>
       </p:ext>
     </p:extLst>
   </p:cSld>
@@ -4715,7 +4716,7 @@
             <a:fld id="{CDAEE9B0-25E7-4C28-AF1D-B3DDCE7EBBDB}" type="datetime1">
               <a:rPr lang="en-US" smtClean="0"/>
               <a:pPr/>
-              <a:t>7/15/2011</a:t>
+              <a:t>7/20/2011</a:t>
             </a:fld>
             <a:endParaRPr lang="en-GB"/>
           </a:p>
@@ -4771,7 +4772,7 @@
     </p:spTree>
     <p:extLst>
       <p:ext uri="{BB962C8B-B14F-4D97-AF65-F5344CB8AC3E}">
-        <p14:creationId xmlns:p14="http://schemas.microsoft.com/office/powerpoint/2010/main" val="1034858646"/>
+        <p14:creationId xmlns:p14="http://schemas.microsoft.com/office/powerpoint/2010/main" xmlns="" val="1034858646"/>
       </p:ext>
     </p:extLst>
   </p:cSld>
@@ -4893,7 +4894,7 @@
             <a:fld id="{CDAEE9B0-25E7-4C28-AF1D-B3DDCE7EBBDB}" type="datetime1">
               <a:rPr lang="en-US" smtClean="0"/>
               <a:pPr/>
-              <a:t>7/15/2011</a:t>
+              <a:t>7/20/2011</a:t>
             </a:fld>
             <a:endParaRPr lang="en-GB"/>
           </a:p>
@@ -4949,7 +4950,7 @@
     </p:spTree>
     <p:extLst>
       <p:ext uri="{BB962C8B-B14F-4D97-AF65-F5344CB8AC3E}">
-        <p14:creationId xmlns:p14="http://schemas.microsoft.com/office/powerpoint/2010/main" val="3849529298"/>
+        <p14:creationId xmlns:p14="http://schemas.microsoft.com/office/powerpoint/2010/main" xmlns="" val="3849529298"/>
       </p:ext>
     </p:extLst>
   </p:cSld>
@@ -5108,7 +5109,7 @@
             <a:fld id="{CDAEE9B0-25E7-4C28-AF1D-B3DDCE7EBBDB}" type="datetime1">
               <a:rPr lang="en-US" smtClean="0"/>
               <a:pPr/>
-              <a:t>7/15/2011</a:t>
+              <a:t>7/20/2011</a:t>
             </a:fld>
             <a:endParaRPr lang="en-GB"/>
           </a:p>
@@ -5164,7 +5165,7 @@
     </p:spTree>
     <p:extLst>
       <p:ext uri="{BB962C8B-B14F-4D97-AF65-F5344CB8AC3E}">
-        <p14:creationId xmlns:p14="http://schemas.microsoft.com/office/powerpoint/2010/main" val="4093170207"/>
+        <p14:creationId xmlns:p14="http://schemas.microsoft.com/office/powerpoint/2010/main" xmlns="" val="4093170207"/>
       </p:ext>
     </p:extLst>
   </p:cSld>
@@ -5300,7 +5301,7 @@
             <a:fld id="{CDAEE9B0-25E7-4C28-AF1D-B3DDCE7EBBDB}" type="datetime1">
               <a:rPr lang="en-US" smtClean="0"/>
               <a:pPr/>
-              <a:t>7/15/2011</a:t>
+              <a:t>7/20/2011</a:t>
             </a:fld>
             <a:endParaRPr lang="en-GB"/>
           </a:p>
@@ -5356,7 +5357,7 @@
     </p:spTree>
     <p:extLst>
       <p:ext uri="{BB962C8B-B14F-4D97-AF65-F5344CB8AC3E}">
-        <p14:creationId xmlns:p14="http://schemas.microsoft.com/office/powerpoint/2010/main" val="2357537943"/>
+        <p14:creationId xmlns:p14="http://schemas.microsoft.com/office/powerpoint/2010/main" xmlns="" val="2357537943"/>
       </p:ext>
     </p:extLst>
   </p:cSld>
@@ -5478,7 +5479,7 @@
             <a:fld id="{CDAEE9B0-25E7-4C28-AF1D-B3DDCE7EBBDB}" type="datetime1">
               <a:rPr lang="en-US" smtClean="0"/>
               <a:pPr/>
-              <a:t>7/15/2011</a:t>
+              <a:t>7/20/2011</a:t>
             </a:fld>
             <a:endParaRPr lang="en-GB"/>
           </a:p>
@@ -5534,7 +5535,7 @@
     </p:spTree>
     <p:extLst>
       <p:ext uri="{BB962C8B-B14F-4D97-AF65-F5344CB8AC3E}">
-        <p14:creationId xmlns:p14="http://schemas.microsoft.com/office/powerpoint/2010/main" val="509411177"/>
+        <p14:creationId xmlns:p14="http://schemas.microsoft.com/office/powerpoint/2010/main" xmlns="" val="509411177"/>
       </p:ext>
     </p:extLst>
   </p:cSld>
@@ -5658,7 +5659,7 @@
             <a:fld id="{CDAEE9B0-25E7-4C28-AF1D-B3DDCE7EBBDB}" type="datetime1">
               <a:rPr lang="en-US" smtClean="0"/>
               <a:pPr/>
-              <a:t>7/15/2011</a:t>
+              <a:t>7/20/2011</a:t>
             </a:fld>
             <a:endParaRPr lang="en-GB"/>
           </a:p>
@@ -5714,7 +5715,7 @@
     </p:spTree>
     <p:extLst>
       <p:ext uri="{BB962C8B-B14F-4D97-AF65-F5344CB8AC3E}">
-        <p14:creationId xmlns:p14="http://schemas.microsoft.com/office/powerpoint/2010/main" val="673125997"/>
+        <p14:creationId xmlns:p14="http://schemas.microsoft.com/office/powerpoint/2010/main" xmlns="" val="673125997"/>
       </p:ext>
     </p:extLst>
   </p:cSld>
@@ -5812,7 +5813,7 @@
             <a:fld id="{CDAEE9B0-25E7-4C28-AF1D-B3DDCE7EBBDB}" type="datetime1">
               <a:rPr lang="en-US" smtClean="0"/>
               <a:pPr/>
-              <a:t>7/15/2011</a:t>
+              <a:t>7/20/2011</a:t>
             </a:fld>
             <a:endParaRPr lang="en-GB"/>
           </a:p>
@@ -5868,7 +5869,7 @@
     </p:spTree>
     <p:extLst>
       <p:ext uri="{BB962C8B-B14F-4D97-AF65-F5344CB8AC3E}">
-        <p14:creationId xmlns:p14="http://schemas.microsoft.com/office/powerpoint/2010/main" val="2964860377"/>
+        <p14:creationId xmlns:p14="http://schemas.microsoft.com/office/powerpoint/2010/main" xmlns="" val="2964860377"/>
       </p:ext>
     </p:extLst>
   </p:cSld>
@@ -6038,7 +6039,7 @@
             <a:fld id="{CDAEE9B0-25E7-4C28-AF1D-B3DDCE7EBBDB}" type="datetime1">
               <a:rPr lang="en-US" smtClean="0"/>
               <a:pPr/>
-              <a:t>7/15/2011</a:t>
+              <a:t>7/20/2011</a:t>
             </a:fld>
             <a:endParaRPr lang="en-GB"/>
           </a:p>
@@ -6094,7 +6095,7 @@
     </p:spTree>
     <p:extLst>
       <p:ext uri="{BB962C8B-B14F-4D97-AF65-F5344CB8AC3E}">
-        <p14:creationId xmlns:p14="http://schemas.microsoft.com/office/powerpoint/2010/main" val="322844269"/>
+        <p14:creationId xmlns:p14="http://schemas.microsoft.com/office/powerpoint/2010/main" xmlns="" val="322844269"/>
       </p:ext>
     </p:extLst>
   </p:cSld>
@@ -6147,7 +6148,7 @@
     </p:spTree>
     <p:extLst>
       <p:ext uri="{BB962C8B-B14F-4D97-AF65-F5344CB8AC3E}">
-        <p14:creationId xmlns:p14="http://schemas.microsoft.com/office/powerpoint/2010/main" val="798346359"/>
+        <p14:creationId xmlns:p14="http://schemas.microsoft.com/office/powerpoint/2010/main" xmlns="" val="798346359"/>
       </p:ext>
     </p:extLst>
   </p:cSld>
@@ -6279,7 +6280,7 @@
             <a:fld id="{EA5D455B-ECD0-44E3-BA0C-3649A3FCD15C}" type="datetime1">
               <a:rPr lang="en-US" smtClean="0"/>
               <a:pPr/>
-              <a:t>7/15/2011</a:t>
+              <a:t>7/20/2011</a:t>
             </a:fld>
             <a:endParaRPr lang="en-GB"/>
           </a:p>
@@ -6335,7 +6336,7 @@
     </p:spTree>
     <p:extLst>
       <p:ext uri="{BB962C8B-B14F-4D97-AF65-F5344CB8AC3E}">
-        <p14:creationId xmlns:p14="http://schemas.microsoft.com/office/powerpoint/2010/main" val="118536430"/>
+        <p14:creationId xmlns:p14="http://schemas.microsoft.com/office/powerpoint/2010/main" xmlns="" val="118536430"/>
       </p:ext>
     </p:extLst>
   </p:cSld>
@@ -6472,7 +6473,7 @@
             <a:fld id="{CDAEE9B0-25E7-4C28-AF1D-B3DDCE7EBBDB}" type="datetime1">
               <a:rPr lang="en-US" smtClean="0"/>
               <a:pPr/>
-              <a:t>7/15/2011</a:t>
+              <a:t>7/20/2011</a:t>
             </a:fld>
             <a:endParaRPr lang="en-GB"/>
           </a:p>
@@ -6528,7 +6529,7 @@
     </p:spTree>
     <p:extLst>
       <p:ext uri="{BB962C8B-B14F-4D97-AF65-F5344CB8AC3E}">
-        <p14:creationId xmlns:p14="http://schemas.microsoft.com/office/powerpoint/2010/main" val="299555438"/>
+        <p14:creationId xmlns:p14="http://schemas.microsoft.com/office/powerpoint/2010/main" xmlns="" val="299555438"/>
       </p:ext>
     </p:extLst>
   </p:cSld>
@@ -6574,10 +6575,6 @@
               <a:rPr lang="en-GB" dirty="0" err="1" smtClean="0"/>
               <a:t>rdfEditor</a:t>
             </a:r>
-            <a:r>
-              <a:rPr lang="en-GB" dirty="0" smtClean="0"/>
-              <a:t> (1 of 2)</a:t>
-            </a:r>
             <a:endParaRPr lang="en-GB" dirty="0"/>
           </a:p>
         </p:txBody>
@@ -6601,53 +6598,13 @@
           <a:p>
             <a:r>
               <a:rPr lang="en-GB" dirty="0" smtClean="0"/>
-              <a:t>Speed improvements will be made to syntax validation</a:t>
-            </a:r>
-          </a:p>
-          <a:p>
-            <a:r>
-              <a:rPr lang="en-GB" dirty="0" smtClean="0"/>
-              <a:t>Abstraction of much of the core functionality into a separate library </a:t>
-            </a:r>
-            <a:r>
-              <a:rPr lang="en-GB" dirty="0" err="1" smtClean="0"/>
-              <a:t>rdfEditor.Core</a:t>
+              <a:t>Speed improvements will be made to syntax </a:t>
+            </a:r>
+            <a:r>
+              <a:rPr lang="en-GB" dirty="0" smtClean="0"/>
+              <a:t>validation</a:t>
             </a:r>
             <a:endParaRPr lang="en-GB" dirty="0" smtClean="0"/>
-          </a:p>
-          <a:p>
-            <a:r>
-              <a:rPr lang="en-GB" dirty="0" err="1" smtClean="0"/>
-              <a:t>WinForms</a:t>
-            </a:r>
-            <a:r>
-              <a:rPr lang="en-GB" dirty="0" smtClean="0"/>
-              <a:t> based version of </a:t>
-            </a:r>
-            <a:r>
-              <a:rPr lang="en-GB" dirty="0" err="1" smtClean="0"/>
-              <a:t>rdfEditor</a:t>
-            </a:r>
-            <a:r>
-              <a:rPr lang="en-GB" dirty="0" smtClean="0"/>
-              <a:t> using this new library</a:t>
-            </a:r>
-          </a:p>
-          <a:p>
-            <a:pPr lvl="1"/>
-            <a:r>
-              <a:rPr lang="en-GB" dirty="0" smtClean="0"/>
-              <a:t>Means </a:t>
-            </a:r>
-            <a:r>
-              <a:rPr lang="en-GB" dirty="0" err="1" smtClean="0"/>
-              <a:t>rdfEditor</a:t>
-            </a:r>
-            <a:r>
-              <a:rPr lang="en-GB" dirty="0" smtClean="0"/>
-              <a:t> is runnable on non-Windows systems</a:t>
-            </a:r>
-            <a:endParaRPr lang="en-GB" dirty="0"/>
           </a:p>
         </p:txBody>
       </p:sp>
@@ -6669,7 +6626,7 @@
             <a:fld id="{CDAEE9B0-25E7-4C28-AF1D-B3DDCE7EBBDB}" type="datetime1">
               <a:rPr lang="en-US" smtClean="0"/>
               <a:pPr/>
-              <a:t>7/15/2011</a:t>
+              <a:t>7/20/2011</a:t>
             </a:fld>
             <a:endParaRPr lang="en-GB"/>
           </a:p>
@@ -6725,7 +6682,7 @@
     </p:spTree>
     <p:extLst>
       <p:ext uri="{BB962C8B-B14F-4D97-AF65-F5344CB8AC3E}">
-        <p14:creationId xmlns:p14="http://schemas.microsoft.com/office/powerpoint/2010/main" val="1002032322"/>
+        <p14:creationId xmlns:p14="http://schemas.microsoft.com/office/powerpoint/2010/main" xmlns="" val="1002032322"/>
       </p:ext>
     </p:extLst>
   </p:cSld>
@@ -6769,11 +6726,7 @@
           <a:p>
             <a:r>
               <a:rPr lang="en-GB" dirty="0" err="1" smtClean="0"/>
-              <a:t>rdfEditor</a:t>
-            </a:r>
-            <a:r>
-              <a:rPr lang="en-GB" dirty="0" smtClean="0"/>
-              <a:t> (2 of 2)</a:t>
+              <a:t>SparqlGUI</a:t>
             </a:r>
             <a:endParaRPr lang="en-GB" dirty="0"/>
           </a:p>
@@ -6791,74 +6744,29 @@
         </p:nvSpPr>
         <p:spPr/>
         <p:txBody>
-          <a:bodyPr>
-            <a:normAutofit lnSpcReduction="10000"/>
-          </a:bodyPr>
-          <a:lstStyle/>
-          <a:p>
-            <a:r>
-              <a:rPr lang="en-GB" dirty="0" smtClean="0"/>
-              <a:t>Existing WPF version of </a:t>
-            </a:r>
-            <a:r>
-              <a:rPr lang="en-GB" dirty="0" err="1" smtClean="0"/>
-              <a:t>rdfEditor</a:t>
-            </a:r>
-            <a:r>
-              <a:rPr lang="en-GB" dirty="0" smtClean="0"/>
-              <a:t> will be refactored to use new </a:t>
-            </a:r>
-            <a:r>
-              <a:rPr lang="en-GB" dirty="0" err="1" smtClean="0"/>
-              <a:t>rdfEditor.Core</a:t>
-            </a:r>
-            <a:r>
-              <a:rPr lang="en-GB" dirty="0" smtClean="0"/>
-              <a:t> library</a:t>
-            </a:r>
-          </a:p>
-          <a:p>
-            <a:r>
-              <a:rPr lang="en-GB" dirty="0" err="1" smtClean="0"/>
-              <a:t>rdfEditor.Core</a:t>
-            </a:r>
-            <a:r>
-              <a:rPr lang="en-GB" dirty="0" smtClean="0"/>
-              <a:t> provides the following:</a:t>
+          <a:bodyPr/>
+          <a:lstStyle/>
+          <a:p>
+            <a:r>
+              <a:rPr lang="en-GB" dirty="0" smtClean="0"/>
+              <a:t>Support for query explanation will be added to the tool</a:t>
             </a:r>
           </a:p>
           <a:p>
             <a:pPr lvl="1"/>
             <a:r>
               <a:rPr lang="en-GB" dirty="0" smtClean="0"/>
-              <a:t>Cleaner and reusable shared code based between different GUI frontends</a:t>
+              <a:t>An explain button can be used just to show the explanation trace</a:t>
             </a:r>
           </a:p>
           <a:p>
             <a:pPr lvl="1"/>
             <a:r>
               <a:rPr lang="en-GB" dirty="0" smtClean="0"/>
-              <a:t>Support for multiple document editing</a:t>
-            </a:r>
-          </a:p>
-          <a:p>
-            <a:pPr lvl="1"/>
-            <a:r>
-              <a:rPr lang="en-GB" dirty="0" smtClean="0"/>
-              <a:t>Improved support for conversion between formats</a:t>
-            </a:r>
-          </a:p>
-          <a:p>
-            <a:pPr lvl="1"/>
-            <a:r>
-              <a:rPr lang="en-GB" dirty="0" smtClean="0"/>
-              <a:t>Extensible plugin system</a:t>
-            </a:r>
-          </a:p>
-          <a:p>
-            <a:pPr marL="457200" lvl="1" indent="0">
-              <a:buNone/>
-            </a:pPr>
+              <a:t>A Log Explanations option has been added so explanations for all queries are added to the log file</a:t>
+            </a:r>
+          </a:p>
+          <a:p>
             <a:endParaRPr lang="en-GB" dirty="0"/>
           </a:p>
         </p:txBody>
@@ -6881,7 +6789,7 @@
             <a:fld id="{CDAEE9B0-25E7-4C28-AF1D-B3DDCE7EBBDB}" type="datetime1">
               <a:rPr lang="en-US" smtClean="0"/>
               <a:pPr/>
-              <a:t>7/15/2011</a:t>
+              <a:t>7/20/2011</a:t>
             </a:fld>
             <a:endParaRPr lang="en-GB"/>
           </a:p>
@@ -6937,7 +6845,7 @@
     </p:spTree>
     <p:extLst>
       <p:ext uri="{BB962C8B-B14F-4D97-AF65-F5344CB8AC3E}">
-        <p14:creationId xmlns:p14="http://schemas.microsoft.com/office/powerpoint/2010/main" val="1906835178"/>
+        <p14:creationId xmlns:p14="http://schemas.microsoft.com/office/powerpoint/2010/main" xmlns="" val="1473382163"/>
       </p:ext>
     </p:extLst>
   </p:cSld>
@@ -6981,7 +6889,7 @@
           <a:p>
             <a:r>
               <a:rPr lang="en-GB" dirty="0" err="1" smtClean="0"/>
-              <a:t>SparqlGUI</a:t>
+              <a:t>StoreManager</a:t>
             </a:r>
             <a:endParaRPr lang="en-GB" dirty="0"/>
           </a:p>
@@ -6999,30 +6907,65 @@
         </p:nvSpPr>
         <p:spPr/>
         <p:txBody>
-          <a:bodyPr/>
-          <a:lstStyle/>
-          <a:p>
-            <a:r>
-              <a:rPr lang="en-GB" dirty="0" smtClean="0"/>
-              <a:t>Support for query explanation will be added to the tool</a:t>
+          <a:bodyPr>
+            <a:normAutofit lnSpcReduction="10000"/>
+          </a:bodyPr>
+          <a:lstStyle/>
+          <a:p>
+            <a:r>
+              <a:rPr lang="en-GB" dirty="0" smtClean="0"/>
+              <a:t>Support for new stores</a:t>
             </a:r>
           </a:p>
           <a:p>
             <a:pPr lvl="1"/>
             <a:r>
               <a:rPr lang="en-GB" dirty="0" smtClean="0"/>
-              <a:t>An explain button can be used just to show the explanation trace</a:t>
+              <a:t>ADO Store (MS SQL) and </a:t>
+            </a:r>
+            <a:r>
+              <a:rPr lang="en-GB" dirty="0" err="1" smtClean="0"/>
+              <a:t>Dydra</a:t>
+            </a:r>
+            <a:endParaRPr lang="en-GB" dirty="0" smtClean="0"/>
+          </a:p>
+          <a:p>
+            <a:r>
+              <a:rPr lang="en-GB" dirty="0" smtClean="0"/>
+              <a:t>Improved </a:t>
+            </a:r>
+            <a:r>
+              <a:rPr lang="en-GB" dirty="0" err="1" smtClean="0"/>
+              <a:t>AllegroGraph</a:t>
+            </a:r>
+            <a:r>
+              <a:rPr lang="en-GB" dirty="0" smtClean="0"/>
+              <a:t> 4.x support</a:t>
+            </a:r>
+          </a:p>
+          <a:p>
+            <a:r>
+              <a:rPr lang="en-GB" dirty="0" smtClean="0"/>
+              <a:t>Will use the handler subsystem extensions in the core library to:</a:t>
             </a:r>
           </a:p>
           <a:p>
             <a:pPr lvl="1"/>
             <a:r>
-              <a:rPr lang="en-GB" dirty="0" smtClean="0"/>
-              <a:t>A Log Explanations option has been added so explanations for all queries are added to the log file</a:t>
-            </a:r>
-          </a:p>
-          <a:p>
-            <a:endParaRPr lang="en-GB" dirty="0"/>
+              <a:rPr lang="en-GB" dirty="0"/>
+              <a:t>I</a:t>
+            </a:r>
+            <a:r>
+              <a:rPr lang="en-GB" dirty="0" smtClean="0"/>
+              <a:t>mprove export speed when possible</a:t>
+            </a:r>
+          </a:p>
+          <a:p>
+            <a:pPr lvl="1"/>
+            <a:r>
+              <a:rPr lang="en-GB" dirty="0" smtClean="0"/>
+              <a:t>Provide a preview graph function which returns the first 100 triples of a graph</a:t>
+            </a:r>
           </a:p>
         </p:txBody>
       </p:sp>
@@ -7044,7 +6987,7 @@
             <a:fld id="{CDAEE9B0-25E7-4C28-AF1D-B3DDCE7EBBDB}" type="datetime1">
               <a:rPr lang="en-US" smtClean="0"/>
               <a:pPr/>
-              <a:t>7/15/2011</a:t>
+              <a:t>7/20/2011</a:t>
             </a:fld>
             <a:endParaRPr lang="en-GB"/>
           </a:p>
@@ -7100,7 +7043,7 @@
     </p:spTree>
     <p:extLst>
       <p:ext uri="{BB962C8B-B14F-4D97-AF65-F5344CB8AC3E}">
-        <p14:creationId xmlns:p14="http://schemas.microsoft.com/office/powerpoint/2010/main" val="1473382163"/>
+        <p14:creationId xmlns:p14="http://schemas.microsoft.com/office/powerpoint/2010/main" xmlns="" val="370317736"/>
       </p:ext>
     </p:extLst>
   </p:cSld>
@@ -7238,7 +7181,7 @@
             <a:fld id="{CDAEE9B0-25E7-4C28-AF1D-B3DDCE7EBBDB}" type="datetime1">
               <a:rPr lang="en-US" smtClean="0"/>
               <a:pPr/>
-              <a:t>7/15/2011</a:t>
+              <a:t>7/20/2011</a:t>
             </a:fld>
             <a:endParaRPr lang="en-GB"/>
           </a:p>
@@ -7294,7 +7237,7 @@
     </p:spTree>
     <p:extLst>
       <p:ext uri="{BB962C8B-B14F-4D97-AF65-F5344CB8AC3E}">
-        <p14:creationId xmlns:p14="http://schemas.microsoft.com/office/powerpoint/2010/main" val="3702788433"/>
+        <p14:creationId xmlns:p14="http://schemas.microsoft.com/office/powerpoint/2010/main" xmlns="" val="3702788433"/>
       </p:ext>
     </p:extLst>
   </p:cSld>
@@ -7337,8 +7280,8 @@
           <a:lstStyle/>
           <a:p>
             <a:r>
-              <a:rPr lang="en-GB" dirty="0" err="1" smtClean="0"/>
-              <a:t>StoreManager</a:t>
+              <a:rPr lang="en-GB" dirty="0" smtClean="0"/>
+              <a:t>Architecture Roadmap</a:t>
             </a:r>
             <a:endParaRPr lang="en-GB" dirty="0"/>
           </a:p>
@@ -7346,81 +7289,7 @@
       </p:sp>
       <p:sp>
         <p:nvSpPr>
-          <p:cNvPr id="3" name="Content Placeholder 2"/>
-          <p:cNvSpPr>
-            <a:spLocks noGrp="1"/>
-          </p:cNvSpPr>
-          <p:nvPr>
-            <p:ph idx="1"/>
-          </p:nvPr>
-        </p:nvSpPr>
-        <p:spPr/>
-        <p:txBody>
-          <a:bodyPr>
-            <a:normAutofit lnSpcReduction="10000"/>
-          </a:bodyPr>
-          <a:lstStyle/>
-          <a:p>
-            <a:r>
-              <a:rPr lang="en-GB" dirty="0" smtClean="0"/>
-              <a:t>Support for new stores</a:t>
-            </a:r>
-          </a:p>
-          <a:p>
-            <a:pPr lvl="1"/>
-            <a:r>
-              <a:rPr lang="en-GB" dirty="0" smtClean="0"/>
-              <a:t>ADO Store (MS SQL) and </a:t>
-            </a:r>
-            <a:r>
-              <a:rPr lang="en-GB" dirty="0" err="1" smtClean="0"/>
-              <a:t>Dydra</a:t>
-            </a:r>
-            <a:endParaRPr lang="en-GB" dirty="0" smtClean="0"/>
-          </a:p>
-          <a:p>
-            <a:r>
-              <a:rPr lang="en-GB" dirty="0" smtClean="0"/>
-              <a:t>Improved </a:t>
-            </a:r>
-            <a:r>
-              <a:rPr lang="en-GB" dirty="0" err="1" smtClean="0"/>
-              <a:t>AllegroGraph</a:t>
-            </a:r>
-            <a:r>
-              <a:rPr lang="en-GB" dirty="0" smtClean="0"/>
-              <a:t> 4.x support</a:t>
-            </a:r>
-          </a:p>
-          <a:p>
-            <a:r>
-              <a:rPr lang="en-GB" dirty="0" smtClean="0"/>
-              <a:t>Will use the handler subsystem extensions in the core library to:</a:t>
-            </a:r>
-          </a:p>
-          <a:p>
-            <a:pPr lvl="1"/>
-            <a:r>
-              <a:rPr lang="en-GB" dirty="0"/>
-              <a:t>I</a:t>
-            </a:r>
-            <a:r>
-              <a:rPr lang="en-GB" dirty="0" smtClean="0"/>
-              <a:t>mprove export speed when possible</a:t>
-            </a:r>
-          </a:p>
-          <a:p>
-            <a:pPr lvl="1"/>
-            <a:r>
-              <a:rPr lang="en-GB" dirty="0" smtClean="0"/>
-              <a:t>Provide a preview graph function which returns the first 100 triples of a graph</a:t>
-            </a:r>
-          </a:p>
-        </p:txBody>
-      </p:sp>
-      <p:sp>
-        <p:nvSpPr>
-          <p:cNvPr id="4" name="Date Placeholder 3"/>
+          <p:cNvPr id="3" name="Date Placeholder 2"/>
           <p:cNvSpPr>
             <a:spLocks noGrp="1"/>
           </p:cNvSpPr>
@@ -7433,10 +7302,10 @@
           <a:bodyPr/>
           <a:lstStyle/>
           <a:p>
-            <a:fld id="{CDAEE9B0-25E7-4C28-AF1D-B3DDCE7EBBDB}" type="datetime1">
+            <a:fld id="{EA5D455B-ECD0-44E3-BA0C-3649A3FCD15C}" type="datetime1">
               <a:rPr lang="en-US" smtClean="0"/>
               <a:pPr/>
-              <a:t>7/15/2011</a:t>
+              <a:t>7/20/2011</a:t>
             </a:fld>
             <a:endParaRPr lang="en-GB"/>
           </a:p>
@@ -7444,7 +7313,7 @@
       </p:sp>
       <p:sp>
         <p:nvSpPr>
-          <p:cNvPr id="5" name="Footer Placeholder 4"/>
+          <p:cNvPr id="4" name="Footer Placeholder 3"/>
           <p:cNvSpPr>
             <a:spLocks noGrp="1"/>
           </p:cNvSpPr>
@@ -7467,7 +7336,7 @@
       </p:sp>
       <p:sp>
         <p:nvSpPr>
-          <p:cNvPr id="6" name="Slide Number Placeholder 5"/>
+          <p:cNvPr id="5" name="Slide Number Placeholder 4"/>
           <p:cNvSpPr>
             <a:spLocks noGrp="1"/>
           </p:cNvSpPr>
@@ -7492,7 +7361,7 @@
     </p:spTree>
     <p:extLst>
       <p:ext uri="{BB962C8B-B14F-4D97-AF65-F5344CB8AC3E}">
-        <p14:creationId xmlns:p14="http://schemas.microsoft.com/office/powerpoint/2010/main" val="370317736"/>
+        <p14:creationId xmlns:p14="http://schemas.microsoft.com/office/powerpoint/2010/main" xmlns="" val="106888204"/>
       </p:ext>
     </p:extLst>
   </p:cSld>
@@ -7521,7 +7390,7 @@
       </p:grpSpPr>
       <p:sp>
         <p:nvSpPr>
-          <p:cNvPr id="2" name="Title 1"/>
+          <p:cNvPr id="6" name="Title 5"/>
           <p:cNvSpPr>
             <a:spLocks noGrp="1"/>
           </p:cNvSpPr>
@@ -7536,9 +7405,45 @@
           <a:p>
             <a:r>
               <a:rPr lang="en-GB" dirty="0" smtClean="0"/>
-              <a:t>Architecture Roadmap</a:t>
+              <a:t>Current Architecture</a:t>
             </a:r>
             <a:endParaRPr lang="en-GB" dirty="0"/>
+          </a:p>
+        </p:txBody>
+      </p:sp>
+      <p:sp>
+        <p:nvSpPr>
+          <p:cNvPr id="7" name="Content Placeholder 6"/>
+          <p:cNvSpPr>
+            <a:spLocks noGrp="1"/>
+          </p:cNvSpPr>
+          <p:nvPr>
+            <p:ph idx="1"/>
+          </p:nvPr>
+        </p:nvSpPr>
+        <p:spPr/>
+        <p:txBody>
+          <a:bodyPr/>
+          <a:lstStyle/>
+          <a:p>
+            <a:r>
+              <a:rPr lang="en-GB" dirty="0" smtClean="0"/>
+              <a:t>Currently the core library is a single library which is not ideal design going forward</a:t>
+            </a:r>
+          </a:p>
+          <a:p>
+            <a:r>
+              <a:rPr lang="en-GB" dirty="0" smtClean="0"/>
+              <a:t>Some features already reside in external libraries e.g. </a:t>
+            </a:r>
+            <a:r>
+              <a:rPr lang="en-GB" dirty="0" err="1" smtClean="0"/>
+              <a:t>dotNetRDF.WinForms</a:t>
+            </a:r>
+            <a:r>
+              <a:rPr lang="en-GB" dirty="0" smtClean="0"/>
+              <a:t> provides common functionality for Windows Forms GUIs</a:t>
+            </a:r>
           </a:p>
         </p:txBody>
       </p:sp>
@@ -7560,7 +7465,7 @@
             <a:fld id="{EA5D455B-ECD0-44E3-BA0C-3649A3FCD15C}" type="datetime1">
               <a:rPr lang="en-US" smtClean="0"/>
               <a:pPr/>
-              <a:t>7/15/2011</a:t>
+              <a:t>7/20/2011</a:t>
             </a:fld>
             <a:endParaRPr lang="en-GB"/>
           </a:p>
@@ -7616,7 +7521,7 @@
     </p:spTree>
     <p:extLst>
       <p:ext uri="{BB962C8B-B14F-4D97-AF65-F5344CB8AC3E}">
-        <p14:creationId xmlns:p14="http://schemas.microsoft.com/office/powerpoint/2010/main" val="106888204"/>
+        <p14:creationId xmlns:p14="http://schemas.microsoft.com/office/powerpoint/2010/main" xmlns="" val="1934465878"/>
       </p:ext>
     </p:extLst>
   </p:cSld>
@@ -7645,7 +7550,7 @@
       </p:grpSpPr>
       <p:sp>
         <p:nvSpPr>
-          <p:cNvPr id="6" name="Title 5"/>
+          <p:cNvPr id="2" name="Title 1"/>
           <p:cNvSpPr>
             <a:spLocks noGrp="1"/>
           </p:cNvSpPr>
@@ -7660,7 +7565,7 @@
           <a:p>
             <a:r>
               <a:rPr lang="en-GB" dirty="0" smtClean="0"/>
-              <a:t>Current Architecture</a:t>
+              <a:t>Proposed Architecture</a:t>
             </a:r>
             <a:endParaRPr lang="en-GB" dirty="0"/>
           </a:p>
@@ -7668,7 +7573,7 @@
       </p:sp>
       <p:sp>
         <p:nvSpPr>
-          <p:cNvPr id="7" name="Content Placeholder 6"/>
+          <p:cNvPr id="3" name="Content Placeholder 2"/>
           <p:cNvSpPr>
             <a:spLocks noGrp="1"/>
           </p:cNvSpPr>
@@ -7678,33 +7583,48 @@
         </p:nvSpPr>
         <p:spPr/>
         <p:txBody>
-          <a:bodyPr/>
-          <a:lstStyle/>
-          <a:p>
-            <a:r>
-              <a:rPr lang="en-GB" dirty="0" smtClean="0"/>
-              <a:t>Currently the core library is a single library which is not ideal design going forward</a:t>
-            </a:r>
-          </a:p>
-          <a:p>
-            <a:r>
-              <a:rPr lang="en-GB" dirty="0" smtClean="0"/>
-              <a:t>Some features already reside in external libraries e.g. </a:t>
-            </a:r>
-            <a:r>
-              <a:rPr lang="en-GB" dirty="0" err="1" smtClean="0"/>
-              <a:t>dotNetRDF.WinForms</a:t>
-            </a:r>
-            <a:r>
-              <a:rPr lang="en-GB" dirty="0" smtClean="0"/>
-              <a:t> provides common functionality for Windows Forms GUIs</a:t>
-            </a:r>
-          </a:p>
-        </p:txBody>
-      </p:sp>
-      <p:sp>
-        <p:nvSpPr>
-          <p:cNvPr id="3" name="Date Placeholder 2"/>
+          <a:bodyPr>
+            <a:normAutofit fontScale="92500" lnSpcReduction="20000"/>
+          </a:bodyPr>
+          <a:lstStyle/>
+          <a:p>
+            <a:r>
+              <a:rPr lang="en-GB" dirty="0" smtClean="0"/>
+              <a:t>As new features are added it should be considered carefully whether they are really core features</a:t>
+            </a:r>
+          </a:p>
+          <a:p>
+            <a:pPr lvl="1"/>
+            <a:r>
+              <a:rPr lang="en-GB" dirty="0" smtClean="0"/>
+              <a:t>Core Features should stay in the core library</a:t>
+            </a:r>
+          </a:p>
+          <a:p>
+            <a:pPr lvl="1"/>
+            <a:r>
+              <a:rPr lang="en-GB" dirty="0" smtClean="0"/>
+              <a:t>Non-core features should go into dedicated libraries</a:t>
+            </a:r>
+          </a:p>
+          <a:p>
+            <a:r>
+              <a:rPr lang="en-GB" dirty="0" smtClean="0"/>
+              <a:t>This will help to stop dependency bloat as new features are added</a:t>
+            </a:r>
+          </a:p>
+          <a:p>
+            <a:r>
+              <a:rPr lang="en-GB" dirty="0" smtClean="0"/>
+              <a:t>Also improves maintainability of code and features</a:t>
+            </a:r>
+            <a:endParaRPr lang="en-GB" dirty="0"/>
+          </a:p>
+        </p:txBody>
+      </p:sp>
+      <p:sp>
+        <p:nvSpPr>
+          <p:cNvPr id="4" name="Date Placeholder 3"/>
           <p:cNvSpPr>
             <a:spLocks noGrp="1"/>
           </p:cNvSpPr>
@@ -7717,10 +7637,10 @@
           <a:bodyPr/>
           <a:lstStyle/>
           <a:p>
-            <a:fld id="{EA5D455B-ECD0-44E3-BA0C-3649A3FCD15C}" type="datetime1">
+            <a:fld id="{CDAEE9B0-25E7-4C28-AF1D-B3DDCE7EBBDB}" type="datetime1">
               <a:rPr lang="en-US" smtClean="0"/>
               <a:pPr/>
-              <a:t>7/15/2011</a:t>
+              <a:t>7/20/2011</a:t>
             </a:fld>
             <a:endParaRPr lang="en-GB"/>
           </a:p>
@@ -7728,7 +7648,7 @@
       </p:sp>
       <p:sp>
         <p:nvSpPr>
-          <p:cNvPr id="4" name="Footer Placeholder 3"/>
+          <p:cNvPr id="5" name="Footer Placeholder 4"/>
           <p:cNvSpPr>
             <a:spLocks noGrp="1"/>
           </p:cNvSpPr>
@@ -7751,7 +7671,7 @@
       </p:sp>
       <p:sp>
         <p:nvSpPr>
-          <p:cNvPr id="5" name="Slide Number Placeholder 4"/>
+          <p:cNvPr id="6" name="Slide Number Placeholder 5"/>
           <p:cNvSpPr>
             <a:spLocks noGrp="1"/>
           </p:cNvSpPr>
@@ -7776,7 +7696,7 @@
     </p:spTree>
     <p:extLst>
       <p:ext uri="{BB962C8B-B14F-4D97-AF65-F5344CB8AC3E}">
-        <p14:creationId xmlns:p14="http://schemas.microsoft.com/office/powerpoint/2010/main" val="1934465878"/>
+        <p14:creationId xmlns:p14="http://schemas.microsoft.com/office/powerpoint/2010/main" xmlns="" val="3933745380"/>
       </p:ext>
     </p:extLst>
   </p:cSld>
@@ -7820,7 +7740,7 @@
           <a:p>
             <a:r>
               <a:rPr lang="en-GB" dirty="0" smtClean="0"/>
-              <a:t>Proposed Architecture</a:t>
+              <a:t>What constitutes a Core Feature?</a:t>
             </a:r>
             <a:endParaRPr lang="en-GB" dirty="0"/>
           </a:p>
@@ -7839,39 +7759,61 @@
         <p:spPr/>
         <p:txBody>
           <a:bodyPr>
-            <a:normAutofit fontScale="92500" lnSpcReduction="20000"/>
+            <a:normAutofit fontScale="85000" lnSpcReduction="20000"/>
           </a:bodyPr>
           <a:lstStyle/>
           <a:p>
             <a:r>
               <a:rPr lang="en-GB" dirty="0" smtClean="0"/>
-              <a:t>As new features are added it should be considered carefully whether they are really core features</a:t>
+              <a:t>Core Features:</a:t>
             </a:r>
           </a:p>
           <a:p>
             <a:pPr lvl="1"/>
             <a:r>
               <a:rPr lang="en-GB" dirty="0" smtClean="0"/>
-              <a:t>Core Features should stay in the core library</a:t>
+              <a:t>Adds to/improve capability of a specific subsystem</a:t>
             </a:r>
           </a:p>
           <a:p>
             <a:pPr lvl="1"/>
             <a:r>
               <a:rPr lang="en-GB" dirty="0" smtClean="0"/>
-              <a:t>Non-core features should go into dedicated libraries</a:t>
-            </a:r>
-          </a:p>
-          <a:p>
-            <a:r>
-              <a:rPr lang="en-GB" dirty="0" smtClean="0"/>
-              <a:t>This will help to stop dependency bloat as new features are added</a:t>
-            </a:r>
-          </a:p>
-          <a:p>
-            <a:r>
-              <a:rPr lang="en-GB" dirty="0" smtClean="0"/>
-              <a:t>Also improves maintainability of code and features</a:t>
+              <a:t>Unless providing major new capabilities which are highly desirable to all users they should not constitute an entirely new subsystem</a:t>
+            </a:r>
+          </a:p>
+          <a:p>
+            <a:pPr lvl="1"/>
+            <a:r>
+              <a:rPr lang="en-GB" dirty="0" smtClean="0"/>
+              <a:t>Does not require additional dependencies</a:t>
+            </a:r>
+          </a:p>
+          <a:p>
+            <a:r>
+              <a:rPr lang="en-GB" dirty="0" smtClean="0"/>
+              <a:t>Non Core Features:</a:t>
+            </a:r>
+          </a:p>
+          <a:p>
+            <a:pPr lvl="1"/>
+            <a:r>
+              <a:rPr lang="en-GB" dirty="0" smtClean="0"/>
+              <a:t>Provides an entirely new subsystem</a:t>
+            </a:r>
+          </a:p>
+          <a:p>
+            <a:pPr lvl="1"/>
+            <a:r>
+              <a:rPr lang="en-GB" dirty="0" smtClean="0"/>
+              <a:t>Is only of interest to part of the user base</a:t>
+            </a:r>
+          </a:p>
+          <a:p>
+            <a:pPr lvl="1"/>
+            <a:r>
+              <a:rPr lang="en-GB" dirty="0" smtClean="0"/>
+              <a:t>Introduce new dependencies</a:t>
             </a:r>
             <a:endParaRPr lang="en-GB" dirty="0"/>
           </a:p>
@@ -7895,7 +7837,7 @@
             <a:fld id="{CDAEE9B0-25E7-4C28-AF1D-B3DDCE7EBBDB}" type="datetime1">
               <a:rPr lang="en-US" smtClean="0"/>
               <a:pPr/>
-              <a:t>7/15/2011</a:t>
+              <a:t>7/20/2011</a:t>
             </a:fld>
             <a:endParaRPr lang="en-GB"/>
           </a:p>
@@ -7951,7 +7893,7 @@
     </p:spTree>
     <p:extLst>
       <p:ext uri="{BB962C8B-B14F-4D97-AF65-F5344CB8AC3E}">
-        <p14:creationId xmlns:p14="http://schemas.microsoft.com/office/powerpoint/2010/main" val="3933745380"/>
+        <p14:creationId xmlns:p14="http://schemas.microsoft.com/office/powerpoint/2010/main" xmlns="" val="4089701815"/>
       </p:ext>
     </p:extLst>
   </p:cSld>
@@ -7995,7 +7937,7 @@
           <a:p>
             <a:r>
               <a:rPr lang="en-GB" dirty="0" smtClean="0"/>
-              <a:t>What constitutes a Core Feature?</a:t>
+              <a:t>Proposed Architecture in practise (1 of 2)</a:t>
             </a:r>
             <a:endParaRPr lang="en-GB" dirty="0"/>
           </a:p>
@@ -8014,61 +7956,33 @@
         <p:spPr/>
         <p:txBody>
           <a:bodyPr>
-            <a:normAutofit fontScale="85000" lnSpcReduction="20000"/>
+            <a:normAutofit fontScale="92500"/>
           </a:bodyPr>
           <a:lstStyle/>
           <a:p>
             <a:r>
               <a:rPr lang="en-GB" dirty="0" smtClean="0"/>
-              <a:t>Core Features:</a:t>
+              <a:t>It is proposed that the new ADO Store be packaged in a separate library</a:t>
             </a:r>
           </a:p>
           <a:p>
             <a:pPr lvl="1"/>
             <a:r>
               <a:rPr lang="en-GB" dirty="0" smtClean="0"/>
-              <a:t>Adds to/improve capability of a specific subsystem</a:t>
+              <a:t>Will reduce the need for dependencies in the core library</a:t>
             </a:r>
           </a:p>
           <a:p>
             <a:pPr lvl="1"/>
             <a:r>
               <a:rPr lang="en-GB" dirty="0" smtClean="0"/>
-              <a:t>Unless providing major new capabilities which are highly desirable to all users they should not constitute an entirely new subsystem</a:t>
-            </a:r>
-          </a:p>
-          <a:p>
-            <a:pPr lvl="1"/>
-            <a:r>
-              <a:rPr lang="en-GB" dirty="0" smtClean="0"/>
-              <a:t>Does not require additional dependencies</a:t>
-            </a:r>
-          </a:p>
-          <a:p>
-            <a:r>
-              <a:rPr lang="en-GB" dirty="0" smtClean="0"/>
-              <a:t>Non Core Features:</a:t>
-            </a:r>
-          </a:p>
-          <a:p>
-            <a:pPr lvl="1"/>
-            <a:r>
-              <a:rPr lang="en-GB" dirty="0" smtClean="0"/>
-              <a:t>Provides an entirely new subsystem</a:t>
-            </a:r>
-          </a:p>
-          <a:p>
-            <a:pPr lvl="1"/>
-            <a:r>
-              <a:rPr lang="en-GB" dirty="0" smtClean="0"/>
-              <a:t>Is only of interest to part of the user base</a:t>
-            </a:r>
-          </a:p>
-          <a:p>
-            <a:pPr lvl="1"/>
-            <a:r>
-              <a:rPr lang="en-GB" dirty="0" smtClean="0"/>
-              <a:t>Introduce new dependencies</a:t>
+              <a:t>Allows additional implementations other than MSSQL to be added in future with their dependencies</a:t>
+            </a:r>
+          </a:p>
+          <a:p>
+            <a:r>
+              <a:rPr lang="en-GB" dirty="0" smtClean="0"/>
+              <a:t>Make it easier to maintain and those who don’t need the features get a smaller library footprint</a:t>
             </a:r>
             <a:endParaRPr lang="en-GB" dirty="0"/>
           </a:p>
@@ -8092,7 +8006,7 @@
             <a:fld id="{CDAEE9B0-25E7-4C28-AF1D-B3DDCE7EBBDB}" type="datetime1">
               <a:rPr lang="en-US" smtClean="0"/>
               <a:pPr/>
-              <a:t>7/15/2011</a:t>
+              <a:t>7/20/2011</a:t>
             </a:fld>
             <a:endParaRPr lang="en-GB"/>
           </a:p>
@@ -8148,7 +8062,7 @@
     </p:spTree>
     <p:extLst>
       <p:ext uri="{BB962C8B-B14F-4D97-AF65-F5344CB8AC3E}">
-        <p14:creationId xmlns:p14="http://schemas.microsoft.com/office/powerpoint/2010/main" val="4089701815"/>
+        <p14:creationId xmlns:p14="http://schemas.microsoft.com/office/powerpoint/2010/main" xmlns="" val="1078110969"/>
       </p:ext>
     </p:extLst>
   </p:cSld>
@@ -8192,7 +8106,7 @@
           <a:p>
             <a:r>
               <a:rPr lang="en-GB" dirty="0" smtClean="0"/>
-              <a:t>Proposed Architecture in practise (1 of 2)</a:t>
+              <a:t>Proposed Architecture in practise (2 of 2)</a:t>
             </a:r>
             <a:endParaRPr lang="en-GB" dirty="0"/>
           </a:p>
@@ -8210,34 +8124,19 @@
         </p:nvSpPr>
         <p:spPr/>
         <p:txBody>
-          <a:bodyPr>
-            <a:normAutofit fontScale="92500"/>
-          </a:bodyPr>
-          <a:lstStyle/>
-          <a:p>
-            <a:r>
-              <a:rPr lang="en-GB" dirty="0" smtClean="0"/>
-              <a:t>It is proposed that the new ADO Store be packaged in a separate library</a:t>
+          <a:bodyPr/>
+          <a:lstStyle/>
+          <a:p>
+            <a:r>
+              <a:rPr lang="en-GB" dirty="0" smtClean="0"/>
+              <a:t>Virtuoso support will be separated out into it’s own library</a:t>
             </a:r>
           </a:p>
           <a:p>
             <a:pPr lvl="1"/>
             <a:r>
               <a:rPr lang="en-GB" dirty="0" smtClean="0"/>
-              <a:t>Will reduce the need for dependencies in the core library</a:t>
-            </a:r>
-          </a:p>
-          <a:p>
-            <a:pPr lvl="1"/>
-            <a:r>
-              <a:rPr lang="en-GB" dirty="0" smtClean="0"/>
-              <a:t>Allows additional implementations other than MSSQL to be added in future with their dependencies</a:t>
-            </a:r>
-          </a:p>
-          <a:p>
-            <a:r>
-              <a:rPr lang="en-GB" dirty="0" smtClean="0"/>
-              <a:t>Make it easier to maintain and those who don’t need the features get a smaller library footprint</a:t>
+              <a:t>Desirable since Virtuoso support represents only a couple of classes in the API but introduces an entire DLL as a dependency</a:t>
             </a:r>
             <a:endParaRPr lang="en-GB" dirty="0"/>
           </a:p>
@@ -8261,7 +8160,7 @@
             <a:fld id="{CDAEE9B0-25E7-4C28-AF1D-B3DDCE7EBBDB}" type="datetime1">
               <a:rPr lang="en-US" smtClean="0"/>
               <a:pPr/>
-              <a:t>7/15/2011</a:t>
+              <a:t>7/20/2011</a:t>
             </a:fld>
             <a:endParaRPr lang="en-GB"/>
           </a:p>
@@ -8317,7 +8216,7 @@
     </p:spTree>
     <p:extLst>
       <p:ext uri="{BB962C8B-B14F-4D97-AF65-F5344CB8AC3E}">
-        <p14:creationId xmlns:p14="http://schemas.microsoft.com/office/powerpoint/2010/main" val="1078110969"/>
+        <p14:creationId xmlns:p14="http://schemas.microsoft.com/office/powerpoint/2010/main" xmlns="" val="3038176013"/>
       </p:ext>
     </p:extLst>
   </p:cSld>
@@ -8361,7 +8260,7 @@
           <a:p>
             <a:r>
               <a:rPr lang="en-GB" dirty="0" smtClean="0"/>
-              <a:t>Proposed Architecture in practise (2 of 2)</a:t>
+              <a:t>Library Naming Conventions</a:t>
             </a:r>
             <a:endParaRPr lang="en-GB" dirty="0"/>
           </a:p>
@@ -8379,21 +8278,67 @@
         </p:nvSpPr>
         <p:spPr/>
         <p:txBody>
-          <a:bodyPr/>
-          <a:lstStyle/>
-          <a:p>
-            <a:r>
-              <a:rPr lang="en-GB" dirty="0" smtClean="0"/>
-              <a:t>Virtuoso support will be separated out into it’s own library</a:t>
+          <a:bodyPr>
+            <a:normAutofit fontScale="85000" lnSpcReduction="20000"/>
+          </a:bodyPr>
+          <a:lstStyle/>
+          <a:p>
+            <a:r>
+              <a:rPr lang="en-GB" dirty="0" smtClean="0"/>
+              <a:t>Names should all be prefixed with </a:t>
+            </a:r>
+            <a:r>
+              <a:rPr lang="en-GB" dirty="0" err="1" smtClean="0"/>
+              <a:t>dotNetRDF</a:t>
+            </a:r>
+            <a:r>
+              <a:rPr lang="en-GB" dirty="0" smtClean="0"/>
+              <a:t>.</a:t>
+            </a:r>
+          </a:p>
+          <a:p>
+            <a:r>
+              <a:rPr lang="en-GB" dirty="0" smtClean="0"/>
+              <a:t>Name should be descriptive, not necessarily aligned with the root namespace</a:t>
             </a:r>
           </a:p>
           <a:p>
             <a:pPr lvl="1"/>
             <a:r>
-              <a:rPr lang="en-GB" dirty="0" smtClean="0"/>
-              <a:t>Desirable since Virtuoso support represents only a couple of classes in the API but introduces an entire DLL as a dependency</a:t>
-            </a:r>
-            <a:endParaRPr lang="en-GB" dirty="0"/>
+              <a:rPr lang="en-GB" dirty="0" err="1" smtClean="0"/>
+              <a:t>Eg</a:t>
+            </a:r>
+            <a:r>
+              <a:rPr lang="en-GB" dirty="0" smtClean="0"/>
+              <a:t>. dotNetRDF.WinForms.dll and dotNetRDF.Data.Sql.dll</a:t>
+            </a:r>
+          </a:p>
+          <a:p>
+            <a:r>
+              <a:rPr lang="en-GB" dirty="0" smtClean="0"/>
+              <a:t>Names can be </a:t>
+            </a:r>
+            <a:r>
+              <a:rPr lang="en-GB" dirty="0" err="1" smtClean="0"/>
+              <a:t>postfixed</a:t>
+            </a:r>
+            <a:r>
+              <a:rPr lang="en-GB" dirty="0" smtClean="0"/>
+              <a:t> with platform identifier where applicable e.g. dotNetRDF.Silverlight.dll</a:t>
+            </a:r>
+          </a:p>
+          <a:p>
+            <a:r>
+              <a:rPr lang="en-GB" dirty="0" smtClean="0"/>
+              <a:t>Version Numbers need not be aligned with core library, should reflect maturity of code</a:t>
+            </a:r>
+          </a:p>
+          <a:p>
+            <a:pPr lvl="1"/>
+            <a:r>
+              <a:rPr lang="en-GB" dirty="0" smtClean="0"/>
+              <a:t>For simplicity code considered mature/split out of core library will have version numbers aligned with core library</a:t>
+            </a:r>
           </a:p>
         </p:txBody>
       </p:sp>
@@ -8415,7 +8360,7 @@
             <a:fld id="{CDAEE9B0-25E7-4C28-AF1D-B3DDCE7EBBDB}" type="datetime1">
               <a:rPr lang="en-US" smtClean="0"/>
               <a:pPr/>
-              <a:t>7/15/2011</a:t>
+              <a:t>7/20/2011</a:t>
             </a:fld>
             <a:endParaRPr lang="en-GB"/>
           </a:p>
@@ -8471,7 +8416,7 @@
     </p:spTree>
     <p:extLst>
       <p:ext uri="{BB962C8B-B14F-4D97-AF65-F5344CB8AC3E}">
-        <p14:creationId xmlns:p14="http://schemas.microsoft.com/office/powerpoint/2010/main" val="3038176013"/>
+        <p14:creationId xmlns:p14="http://schemas.microsoft.com/office/powerpoint/2010/main" xmlns="" val="687733986"/>
       </p:ext>
     </p:extLst>
   </p:cSld>
@@ -8515,7 +8460,7 @@
           <a:p>
             <a:r>
               <a:rPr lang="en-GB" dirty="0" smtClean="0"/>
-              <a:t>Library Naming Conventions</a:t>
+              <a:t>Proposed Libraries for 0.5.0 Release</a:t>
             </a:r>
             <a:endParaRPr lang="en-GB" dirty="0"/>
           </a:p>
@@ -8533,67 +8478,39 @@
         </p:nvSpPr>
         <p:spPr/>
         <p:txBody>
-          <a:bodyPr>
-            <a:normAutofit fontScale="85000" lnSpcReduction="20000"/>
-          </a:bodyPr>
-          <a:lstStyle/>
-          <a:p>
-            <a:r>
-              <a:rPr lang="en-GB" dirty="0" smtClean="0"/>
-              <a:t>Names should all be prefixed with </a:t>
-            </a:r>
+          <a:bodyPr/>
+          <a:lstStyle/>
+          <a:p>
+            <a:r>
+              <a:rPr lang="en-GB" dirty="0" smtClean="0"/>
+              <a:t>Core Library – dotNetRDF.dll</a:t>
+            </a:r>
+          </a:p>
+          <a:p>
+            <a:pPr lvl="1"/>
             <a:r>
               <a:rPr lang="en-GB" dirty="0" err="1" smtClean="0"/>
-              <a:t>dotNetRDF</a:t>
-            </a:r>
-            <a:r>
-              <a:rPr lang="en-GB" dirty="0" smtClean="0"/>
-              <a:t>.</a:t>
-            </a:r>
-          </a:p>
-          <a:p>
-            <a:r>
-              <a:rPr lang="en-GB" dirty="0" smtClean="0"/>
-              <a:t>Name should be descriptive, not necessarily aligned with the root namespace</a:t>
+              <a:t>WinForms</a:t>
+            </a:r>
+            <a:r>
+              <a:rPr lang="en-GB" dirty="0" smtClean="0"/>
+              <a:t> GUI – dotNetRDF.WinForms.dll</a:t>
             </a:r>
           </a:p>
           <a:p>
             <a:pPr lvl="1"/>
             <a:r>
-              <a:rPr lang="en-GB" dirty="0" err="1" smtClean="0"/>
-              <a:t>Eg</a:t>
-            </a:r>
-            <a:r>
-              <a:rPr lang="en-GB" dirty="0" smtClean="0"/>
-              <a:t>. dotNetRDF.WinForms.dll and dotNetRDF.Data.Sql.dll</a:t>
-            </a:r>
-          </a:p>
-          <a:p>
-            <a:r>
-              <a:rPr lang="en-GB" dirty="0" smtClean="0"/>
-              <a:t>Names can be </a:t>
-            </a:r>
-            <a:r>
-              <a:rPr lang="en-GB" dirty="0" err="1" smtClean="0"/>
-              <a:t>postfixed</a:t>
-            </a:r>
-            <a:r>
-              <a:rPr lang="en-GB" dirty="0" smtClean="0"/>
-              <a:t> with platform identifier where applicable e.g. dotNetRDF.Silverlight.dll</a:t>
-            </a:r>
-          </a:p>
-          <a:p>
-            <a:r>
-              <a:rPr lang="en-GB" dirty="0" smtClean="0"/>
-              <a:t>Version Numbers need not be aligned with core library, should reflect maturity of code</a:t>
+              <a:rPr lang="en-GB" dirty="0" smtClean="0"/>
+              <a:t>ADO Store – dotNetRDF.Data.Sql.dll</a:t>
             </a:r>
           </a:p>
           <a:p>
             <a:pPr lvl="1"/>
             <a:r>
               <a:rPr lang="en-GB" dirty="0" smtClean="0"/>
-              <a:t>For simplicity code considered mature/split out of core library will have version numbers aligned with core library</a:t>
-            </a:r>
+              <a:t>Virtuoso support – dotNetRDF.Data.Virtuoso.dll</a:t>
+            </a:r>
+            <a:endParaRPr lang="en-GB" dirty="0"/>
           </a:p>
         </p:txBody>
       </p:sp>
@@ -8615,7 +8532,7 @@
             <a:fld id="{CDAEE9B0-25E7-4C28-AF1D-B3DDCE7EBBDB}" type="datetime1">
               <a:rPr lang="en-US" smtClean="0"/>
               <a:pPr/>
-              <a:t>7/15/2011</a:t>
+              <a:t>7/20/2011</a:t>
             </a:fld>
             <a:endParaRPr lang="en-GB"/>
           </a:p>
@@ -8671,7 +8588,7 @@
     </p:spTree>
     <p:extLst>
       <p:ext uri="{BB962C8B-B14F-4D97-AF65-F5344CB8AC3E}">
-        <p14:creationId xmlns:p14="http://schemas.microsoft.com/office/powerpoint/2010/main" val="687733986"/>
+        <p14:creationId xmlns:p14="http://schemas.microsoft.com/office/powerpoint/2010/main" xmlns="" val="3219753914"/>
       </p:ext>
     </p:extLst>
   </p:cSld>
@@ -8710,12 +8627,18 @@
         </p:nvSpPr>
         <p:spPr/>
         <p:txBody>
-          <a:bodyPr/>
-          <a:lstStyle/>
-          <a:p>
-            <a:r>
-              <a:rPr lang="en-GB" dirty="0" smtClean="0"/>
-              <a:t>Proposed Libraries for 0.5.0 Release</a:t>
+          <a:bodyPr>
+            <a:normAutofit fontScale="90000"/>
+          </a:bodyPr>
+          <a:lstStyle/>
+          <a:p>
+            <a:r>
+              <a:rPr lang="en-GB" dirty="0" smtClean="0"/>
+              <a:t>Proposed Libraries for Future </a:t>
+            </a:r>
+            <a:r>
+              <a:rPr lang="en-GB" dirty="0" smtClean="0"/>
+              <a:t>Releases (1 of 2)</a:t>
             </a:r>
             <a:endParaRPr lang="en-GB" dirty="0"/>
           </a:p>
@@ -8738,32 +8661,46 @@
           <a:p>
             <a:r>
               <a:rPr lang="en-GB" dirty="0" smtClean="0"/>
-              <a:t>Core Library – dotNetRDF.dll</a:t>
+              <a:t>LINQ Provider – dotNetRDF.Linq.dll</a:t>
             </a:r>
           </a:p>
           <a:p>
             <a:pPr lvl="1"/>
             <a:r>
+              <a:rPr lang="en-GB" dirty="0" smtClean="0"/>
+              <a:t>Based on a port of </a:t>
+            </a:r>
+            <a:r>
               <a:rPr lang="en-GB" dirty="0" err="1" smtClean="0"/>
-              <a:t>WinForms</a:t>
-            </a:r>
-            <a:r>
-              <a:rPr lang="en-GB" dirty="0" smtClean="0"/>
-              <a:t> GUI – dotNetRDF.WinForms.dll</a:t>
-            </a:r>
+              <a:t>Andew</a:t>
+            </a:r>
+            <a:r>
+              <a:rPr lang="en-GB" dirty="0" smtClean="0"/>
+              <a:t> Matthew’s </a:t>
+            </a:r>
+            <a:r>
+              <a:rPr lang="en-GB" dirty="0" err="1" smtClean="0"/>
+              <a:t>LinqToRdf</a:t>
+            </a:r>
+            <a:endParaRPr lang="en-GB" dirty="0" smtClean="0"/>
           </a:p>
           <a:p>
             <a:pPr lvl="1"/>
             <a:r>
               <a:rPr lang="en-GB" dirty="0" smtClean="0"/>
-              <a:t>ADO Store – dotNetRDF.Data.Sql.dll</a:t>
-            </a:r>
-          </a:p>
-          <a:p>
-            <a:pPr lvl="1"/>
-            <a:r>
-              <a:rPr lang="en-GB" dirty="0" smtClean="0"/>
-              <a:t>Virtuoso support – dotNetRDF.Data.Virtuoso.dll</a:t>
+              <a:t>Persistence capability added by use of SPARQL Update</a:t>
+            </a:r>
+          </a:p>
+          <a:p>
+            <a:r>
+              <a:rPr lang="en-GB" dirty="0" smtClean="0"/>
+              <a:t>SPIN Implementation – dotNetRDF.Spin.dll</a:t>
+            </a:r>
+          </a:p>
+          <a:p>
+            <a:r>
+              <a:rPr lang="en-GB" dirty="0" smtClean="0"/>
+              <a:t>WPF GUI – dotNetRDF.Wpf.dll</a:t>
             </a:r>
             <a:endParaRPr lang="en-GB" dirty="0"/>
           </a:p>
@@ -8787,7 +8724,7 @@
             <a:fld id="{CDAEE9B0-25E7-4C28-AF1D-B3DDCE7EBBDB}" type="datetime1">
               <a:rPr lang="en-US" smtClean="0"/>
               <a:pPr/>
-              <a:t>7/15/2011</a:t>
+              <a:t>7/20/2011</a:t>
             </a:fld>
             <a:endParaRPr lang="en-GB"/>
           </a:p>
@@ -8843,7 +8780,7 @@
     </p:spTree>
     <p:extLst>
       <p:ext uri="{BB962C8B-B14F-4D97-AF65-F5344CB8AC3E}">
-        <p14:creationId xmlns:p14="http://schemas.microsoft.com/office/powerpoint/2010/main" val="3219753914"/>
+        <p14:creationId xmlns:p14="http://schemas.microsoft.com/office/powerpoint/2010/main" xmlns="" val="3035919924"/>
       </p:ext>
     </p:extLst>
   </p:cSld>
@@ -8882,12 +8819,14 @@
         </p:nvSpPr>
         <p:spPr/>
         <p:txBody>
-          <a:bodyPr/>
-          <a:lstStyle/>
-          <a:p>
-            <a:r>
-              <a:rPr lang="en-GB" dirty="0" smtClean="0"/>
-              <a:t>Proposed Libraries for Future Releases</a:t>
+          <a:bodyPr>
+            <a:normAutofit/>
+          </a:bodyPr>
+          <a:lstStyle/>
+          <a:p>
+            <a:r>
+              <a:rPr lang="en-GB" dirty="0" smtClean="0"/>
+              <a:t>General Roadmap</a:t>
             </a:r>
             <a:endParaRPr lang="en-GB" dirty="0"/>
           </a:p>
@@ -8895,69 +8834,7 @@
       </p:sp>
       <p:sp>
         <p:nvSpPr>
-          <p:cNvPr id="3" name="Content Placeholder 2"/>
-          <p:cNvSpPr>
-            <a:spLocks noGrp="1"/>
-          </p:cNvSpPr>
-          <p:nvPr>
-            <p:ph idx="1"/>
-          </p:nvPr>
-        </p:nvSpPr>
-        <p:spPr/>
-        <p:txBody>
-          <a:bodyPr/>
-          <a:lstStyle/>
-          <a:p>
-            <a:r>
-              <a:rPr lang="en-GB" dirty="0" smtClean="0"/>
-              <a:t>LINQ Provider – dotNetRDF.Linq.dll</a:t>
-            </a:r>
-          </a:p>
-          <a:p>
-            <a:pPr lvl="1"/>
-            <a:r>
-              <a:rPr lang="en-GB" dirty="0" smtClean="0"/>
-              <a:t>Based on a port of </a:t>
-            </a:r>
-            <a:r>
-              <a:rPr lang="en-GB" dirty="0" err="1" smtClean="0"/>
-              <a:t>Andew</a:t>
-            </a:r>
-            <a:r>
-              <a:rPr lang="en-GB" dirty="0" smtClean="0"/>
-              <a:t> Matthew’s </a:t>
-            </a:r>
-            <a:r>
-              <a:rPr lang="en-GB" dirty="0" err="1" smtClean="0"/>
-              <a:t>LinqToRdf</a:t>
-            </a:r>
-            <a:endParaRPr lang="en-GB" dirty="0" smtClean="0"/>
-          </a:p>
-          <a:p>
-            <a:pPr lvl="1"/>
-            <a:r>
-              <a:rPr lang="en-GB" dirty="0" smtClean="0"/>
-              <a:t>Persistence capability added by use of SPARQL Update</a:t>
-            </a:r>
-          </a:p>
-          <a:p>
-            <a:r>
-              <a:rPr lang="en-GB" dirty="0" smtClean="0"/>
-              <a:t>SPIN Implementation – dotNetRDF.Spin.dll</a:t>
-            </a:r>
-          </a:p>
-          <a:p>
-            <a:r>
-              <a:rPr lang="en-GB" dirty="0" smtClean="0"/>
-              <a:t>WPF GUI – dotNetRDF.Wpf.dll</a:t>
-            </a:r>
-            <a:endParaRPr lang="en-GB" dirty="0"/>
-          </a:p>
-        </p:txBody>
-      </p:sp>
-      <p:sp>
-        <p:nvSpPr>
-          <p:cNvPr id="4" name="Date Placeholder 3"/>
+          <p:cNvPr id="3" name="Date Placeholder 2"/>
           <p:cNvSpPr>
             <a:spLocks noGrp="1"/>
           </p:cNvSpPr>
@@ -8970,10 +8847,10 @@
           <a:bodyPr/>
           <a:lstStyle/>
           <a:p>
-            <a:fld id="{CDAEE9B0-25E7-4C28-AF1D-B3DDCE7EBBDB}" type="datetime1">
+            <a:fld id="{EA5D455B-ECD0-44E3-BA0C-3649A3FCD15C}" type="datetime1">
               <a:rPr lang="en-US" smtClean="0"/>
               <a:pPr/>
-              <a:t>7/15/2011</a:t>
+              <a:t>7/20/2011</a:t>
             </a:fld>
             <a:endParaRPr lang="en-GB"/>
           </a:p>
@@ -8981,7 +8858,7 @@
       </p:sp>
       <p:sp>
         <p:nvSpPr>
-          <p:cNvPr id="5" name="Footer Placeholder 4"/>
+          <p:cNvPr id="4" name="Footer Placeholder 3"/>
           <p:cNvSpPr>
             <a:spLocks noGrp="1"/>
           </p:cNvSpPr>
@@ -9004,7 +8881,7 @@
       </p:sp>
       <p:sp>
         <p:nvSpPr>
-          <p:cNvPr id="6" name="Slide Number Placeholder 5"/>
+          <p:cNvPr id="5" name="Slide Number Placeholder 4"/>
           <p:cNvSpPr>
             <a:spLocks noGrp="1"/>
           </p:cNvSpPr>
@@ -9029,7 +8906,7 @@
     </p:spTree>
     <p:extLst>
       <p:ext uri="{BB962C8B-B14F-4D97-AF65-F5344CB8AC3E}">
-        <p14:creationId xmlns:p14="http://schemas.microsoft.com/office/powerpoint/2010/main" val="3035919924"/>
+        <p14:creationId xmlns:p14="http://schemas.microsoft.com/office/powerpoint/2010/main" xmlns="" val="2482877072"/>
       </p:ext>
     </p:extLst>
   </p:cSld>
@@ -9097,7 +8974,7 @@
             <a:fld id="{EA5D455B-ECD0-44E3-BA0C-3649A3FCD15C}" type="datetime1">
               <a:rPr lang="en-US" smtClean="0"/>
               <a:pPr/>
-              <a:t>7/15/2011</a:t>
+              <a:t>7/20/2011</a:t>
             </a:fld>
             <a:endParaRPr lang="en-GB"/>
           </a:p>
@@ -9153,7 +9030,7 @@
     </p:spTree>
     <p:extLst>
       <p:ext uri="{BB962C8B-B14F-4D97-AF65-F5344CB8AC3E}">
-        <p14:creationId xmlns:p14="http://schemas.microsoft.com/office/powerpoint/2010/main" val="4095227198"/>
+        <p14:creationId xmlns:p14="http://schemas.microsoft.com/office/powerpoint/2010/main" xmlns="" val="4095227198"/>
       </p:ext>
     </p:extLst>
   </p:cSld>
@@ -9182,7 +9059,7 @@
       </p:grpSpPr>
       <p:sp>
         <p:nvSpPr>
-          <p:cNvPr id="2" name="Title 1"/>
+          <p:cNvPr id="6" name="Title 5"/>
           <p:cNvSpPr>
             <a:spLocks noGrp="1"/>
           </p:cNvSpPr>
@@ -9192,15 +9069,53 @@
         </p:nvSpPr>
         <p:spPr/>
         <p:txBody>
-          <a:bodyPr>
-            <a:normAutofit/>
-          </a:bodyPr>
-          <a:lstStyle/>
-          <a:p>
-            <a:r>
-              <a:rPr lang="en-GB" dirty="0" smtClean="0"/>
-              <a:t>General Roadmap</a:t>
-            </a:r>
+          <a:bodyPr/>
+          <a:lstStyle/>
+          <a:p>
+            <a:r>
+              <a:rPr lang="en-GB" dirty="0" smtClean="0"/>
+              <a:t>Plans</a:t>
+            </a:r>
+            <a:endParaRPr lang="en-GB" dirty="0"/>
+          </a:p>
+        </p:txBody>
+      </p:sp>
+      <p:sp>
+        <p:nvSpPr>
+          <p:cNvPr id="7" name="Content Placeholder 6"/>
+          <p:cNvSpPr>
+            <a:spLocks noGrp="1"/>
+          </p:cNvSpPr>
+          <p:nvPr>
+            <p:ph idx="1"/>
+          </p:nvPr>
+        </p:nvSpPr>
+        <p:spPr/>
+        <p:txBody>
+          <a:bodyPr/>
+          <a:lstStyle/>
+          <a:p>
+            <a:r>
+              <a:rPr lang="en-GB" dirty="0" smtClean="0"/>
+              <a:t>Currently the roadmap is very loose beyond the immediate next releases (the 0.5.x series)</a:t>
+            </a:r>
+          </a:p>
+          <a:p>
+            <a:r>
+              <a:rPr lang="en-GB" dirty="0" smtClean="0"/>
+              <a:t>There are no specific plans for any release beyond 0.5.x at the moment</a:t>
+            </a:r>
+          </a:p>
+          <a:p>
+            <a:r>
+              <a:rPr lang="en-GB" dirty="0" smtClean="0"/>
+              <a:t>Ideally the roadmap from subsequent releases (0.6.x) to the 1.0 release should be driven by the community</a:t>
+            </a:r>
+          </a:p>
+          <a:p>
+            <a:pPr marL="0" indent="0">
+              <a:buNone/>
+            </a:pPr>
             <a:endParaRPr lang="en-GB" dirty="0"/>
           </a:p>
         </p:txBody>
@@ -9223,7 +9138,7 @@
             <a:fld id="{EA5D455B-ECD0-44E3-BA0C-3649A3FCD15C}" type="datetime1">
               <a:rPr lang="en-US" smtClean="0"/>
               <a:pPr/>
-              <a:t>7/15/2011</a:t>
+              <a:t>7/20/2011</a:t>
             </a:fld>
             <a:endParaRPr lang="en-GB"/>
           </a:p>
@@ -9279,7 +9194,7 @@
     </p:spTree>
     <p:extLst>
       <p:ext uri="{BB962C8B-B14F-4D97-AF65-F5344CB8AC3E}">
-        <p14:creationId xmlns:p14="http://schemas.microsoft.com/office/powerpoint/2010/main" val="2482877072"/>
+        <p14:creationId xmlns:p14="http://schemas.microsoft.com/office/powerpoint/2010/main" xmlns="" val="381284594"/>
       </p:ext>
     </p:extLst>
   </p:cSld>
@@ -9308,7 +9223,7 @@
       </p:grpSpPr>
       <p:sp>
         <p:nvSpPr>
-          <p:cNvPr id="6" name="Title 5"/>
+          <p:cNvPr id="2" name="Title 1"/>
           <p:cNvSpPr>
             <a:spLocks noGrp="1"/>
           </p:cNvSpPr>
@@ -9323,7 +9238,7 @@
           <a:p>
             <a:r>
               <a:rPr lang="en-GB" dirty="0" smtClean="0"/>
-              <a:t>Plans</a:t>
+              <a:t>Community Driven Planning</a:t>
             </a:r>
             <a:endParaRPr lang="en-GB" dirty="0"/>
           </a:p>
@@ -9331,7 +9246,7 @@
       </p:sp>
       <p:sp>
         <p:nvSpPr>
-          <p:cNvPr id="7" name="Content Placeholder 6"/>
+          <p:cNvPr id="3" name="Content Placeholder 2"/>
           <p:cNvSpPr>
             <a:spLocks noGrp="1"/>
           </p:cNvSpPr>
@@ -9341,37 +9256,35 @@
         </p:nvSpPr>
         <p:spPr/>
         <p:txBody>
-          <a:bodyPr/>
-          <a:lstStyle/>
-          <a:p>
-            <a:r>
-              <a:rPr lang="en-GB" dirty="0" smtClean="0"/>
-              <a:t>Currently the roadmap is very loose beyond the immediate next releases (the 0.5.x series)</a:t>
-            </a:r>
-          </a:p>
-          <a:p>
-            <a:r>
-              <a:rPr lang="en-GB" dirty="0" smtClean="0"/>
-              <a:t>There are no specific plans for any release beyond 0.5.x at the moment</a:t>
-            </a:r>
-          </a:p>
-          <a:p>
-            <a:r>
-              <a:rPr lang="en-GB" dirty="0" smtClean="0"/>
-              <a:t>Ideally the roadmap from subsequent releases (0.6.x) to the 1.0 release should be driven by the community</a:t>
-            </a:r>
-          </a:p>
-          <a:p>
-            <a:pPr marL="0" indent="0">
-              <a:buNone/>
-            </a:pPr>
+          <a:bodyPr>
+            <a:normAutofit lnSpcReduction="10000"/>
+          </a:bodyPr>
+          <a:lstStyle/>
+          <a:p>
+            <a:r>
+              <a:rPr lang="en-GB" dirty="0" smtClean="0"/>
+              <a:t>For 0.6.x releases new features/improvements should be primarily driven by community request</a:t>
+            </a:r>
+          </a:p>
+          <a:p>
+            <a:pPr lvl="1"/>
+            <a:r>
+              <a:rPr lang="en-GB" dirty="0" smtClean="0"/>
+              <a:t>i.e. features will be prioritised based on community request/need/feedback</a:t>
+            </a:r>
+          </a:p>
+          <a:p>
+            <a:r>
+              <a:rPr lang="en-GB" dirty="0" smtClean="0"/>
+              <a:t>We have some possible features lined up which we will prioritise unless community suggests other features</a:t>
+            </a:r>
             <a:endParaRPr lang="en-GB" dirty="0"/>
           </a:p>
         </p:txBody>
       </p:sp>
       <p:sp>
         <p:nvSpPr>
-          <p:cNvPr id="3" name="Date Placeholder 2"/>
+          <p:cNvPr id="4" name="Date Placeholder 3"/>
           <p:cNvSpPr>
             <a:spLocks noGrp="1"/>
           </p:cNvSpPr>
@@ -9384,10 +9297,10 @@
           <a:bodyPr/>
           <a:lstStyle/>
           <a:p>
-            <a:fld id="{EA5D455B-ECD0-44E3-BA0C-3649A3FCD15C}" type="datetime1">
+            <a:fld id="{CDAEE9B0-25E7-4C28-AF1D-B3DDCE7EBBDB}" type="datetime1">
               <a:rPr lang="en-US" smtClean="0"/>
               <a:pPr/>
-              <a:t>7/15/2011</a:t>
+              <a:t>7/20/2011</a:t>
             </a:fld>
             <a:endParaRPr lang="en-GB"/>
           </a:p>
@@ -9395,7 +9308,7 @@
       </p:sp>
       <p:sp>
         <p:nvSpPr>
-          <p:cNvPr id="4" name="Footer Placeholder 3"/>
+          <p:cNvPr id="5" name="Footer Placeholder 4"/>
           <p:cNvSpPr>
             <a:spLocks noGrp="1"/>
           </p:cNvSpPr>
@@ -9418,7 +9331,7 @@
       </p:sp>
       <p:sp>
         <p:nvSpPr>
-          <p:cNvPr id="5" name="Slide Number Placeholder 4"/>
+          <p:cNvPr id="6" name="Slide Number Placeholder 5"/>
           <p:cNvSpPr>
             <a:spLocks noGrp="1"/>
           </p:cNvSpPr>
@@ -9443,7 +9356,7 @@
     </p:spTree>
     <p:extLst>
       <p:ext uri="{BB962C8B-B14F-4D97-AF65-F5344CB8AC3E}">
-        <p14:creationId xmlns:p14="http://schemas.microsoft.com/office/powerpoint/2010/main" val="381284594"/>
+        <p14:creationId xmlns:p14="http://schemas.microsoft.com/office/powerpoint/2010/main" xmlns="" val="3357694366"/>
       </p:ext>
     </p:extLst>
   </p:cSld>
@@ -9487,7 +9400,11 @@
           <a:p>
             <a:r>
               <a:rPr lang="en-GB" dirty="0" smtClean="0"/>
-              <a:t>Community Driven Planning</a:t>
+              <a:t>Our Suggestions (1 of </a:t>
+            </a:r>
+            <a:r>
+              <a:rPr lang="en-GB" dirty="0" smtClean="0"/>
+              <a:t>4)</a:t>
             </a:r>
             <a:endParaRPr lang="en-GB" dirty="0"/>
           </a:p>
@@ -9506,26 +9423,42 @@
         <p:spPr/>
         <p:txBody>
           <a:bodyPr>
-            <a:normAutofit lnSpcReduction="10000"/>
+            <a:normAutofit fontScale="92500"/>
           </a:bodyPr>
           <a:lstStyle/>
           <a:p>
             <a:r>
               <a:rPr lang="en-GB" dirty="0" smtClean="0"/>
-              <a:t>For 0.6.x releases new features/improvements should be primarily driven by community request</a:t>
+              <a:t>Full text SPARQL Support – dotNetRDF.Sparql.FullText.dll</a:t>
             </a:r>
           </a:p>
           <a:p>
             <a:pPr lvl="1"/>
             <a:r>
               <a:rPr lang="en-GB" dirty="0" smtClean="0"/>
-              <a:t>i.e. features will be prioritised based on community request/need/feedback</a:t>
-            </a:r>
-          </a:p>
-          <a:p>
-            <a:r>
-              <a:rPr lang="en-GB" dirty="0" smtClean="0"/>
-              <a:t>We have some possible features lined up which we will prioritise unless community suggests other features</a:t>
+              <a:t>Use </a:t>
+            </a:r>
+            <a:r>
+              <a:rPr lang="en-GB" dirty="0" err="1" smtClean="0"/>
+              <a:t>Lucene.Net</a:t>
+            </a:r>
+            <a:r>
+              <a:rPr lang="en-GB" dirty="0" smtClean="0"/>
+              <a:t> to provide full text search capabilities</a:t>
+            </a:r>
+          </a:p>
+          <a:p>
+            <a:pPr lvl="1"/>
+            <a:r>
+              <a:rPr lang="en-GB" dirty="0" smtClean="0"/>
+              <a:t>Syntax compatible with other implementations as far as possible</a:t>
+            </a:r>
+          </a:p>
+          <a:p>
+            <a:pPr lvl="1"/>
+            <a:r>
+              <a:rPr lang="en-GB" dirty="0" smtClean="0"/>
+              <a:t>Will be implemented as a new library since as per the architecture proposal it is a non core feature and requires additional dependencies</a:t>
             </a:r>
             <a:endParaRPr lang="en-GB" dirty="0"/>
           </a:p>
@@ -9549,7 +9482,7 @@
             <a:fld id="{CDAEE9B0-25E7-4C28-AF1D-B3DDCE7EBBDB}" type="datetime1">
               <a:rPr lang="en-US" smtClean="0"/>
               <a:pPr/>
-              <a:t>7/15/2011</a:t>
+              <a:t>7/20/2011</a:t>
             </a:fld>
             <a:endParaRPr lang="en-GB"/>
           </a:p>
@@ -9605,7 +9538,7 @@
     </p:spTree>
     <p:extLst>
       <p:ext uri="{BB962C8B-B14F-4D97-AF65-F5344CB8AC3E}">
-        <p14:creationId xmlns:p14="http://schemas.microsoft.com/office/powerpoint/2010/main" val="3357694366"/>
+        <p14:creationId xmlns:p14="http://schemas.microsoft.com/office/powerpoint/2010/main" xmlns="" val="912609684"/>
       </p:ext>
     </p:extLst>
   </p:cSld>
@@ -9649,7 +9582,11 @@
           <a:p>
             <a:r>
               <a:rPr lang="en-GB" dirty="0" smtClean="0"/>
-              <a:t>Our Suggestions (1 of 2)</a:t>
+              <a:t>Our Suggestions (2 of </a:t>
+            </a:r>
+            <a:r>
+              <a:rPr lang="en-GB" dirty="0" smtClean="0"/>
+              <a:t>4)</a:t>
             </a:r>
             <a:endParaRPr lang="en-GB" dirty="0"/>
           </a:p>
@@ -9667,43 +9604,38 @@
         </p:nvSpPr>
         <p:spPr/>
         <p:txBody>
-          <a:bodyPr>
-            <a:normAutofit fontScale="92500"/>
-          </a:bodyPr>
-          <a:lstStyle/>
-          <a:p>
-            <a:r>
-              <a:rPr lang="en-GB" dirty="0" smtClean="0"/>
-              <a:t>Full text SPARQL Support – dotNetRDF.Sparql.FullText.dll</a:t>
+          <a:bodyPr/>
+          <a:lstStyle/>
+          <a:p>
+            <a:r>
+              <a:rPr lang="en-GB" dirty="0" err="1" smtClean="0"/>
+              <a:t>GeoSPARQL</a:t>
+            </a:r>
+            <a:r>
+              <a:rPr lang="en-GB" dirty="0" smtClean="0"/>
+              <a:t> Support – dotNetRDF.Sparql.Geo.dll</a:t>
             </a:r>
           </a:p>
           <a:p>
             <a:pPr lvl="1"/>
             <a:r>
               <a:rPr lang="en-GB" dirty="0" smtClean="0"/>
-              <a:t>Use </a:t>
+              <a:t>Provide an implementation of the OGC </a:t>
             </a:r>
             <a:r>
               <a:rPr lang="en-GB" dirty="0" err="1" smtClean="0"/>
-              <a:t>Lucene.Net</a:t>
-            </a:r>
-            <a:r>
-              <a:rPr lang="en-GB" dirty="0" smtClean="0"/>
-              <a:t> to provide full text search capabilities</a:t>
+              <a:t>GeoSPARQL</a:t>
+            </a:r>
+            <a:r>
+              <a:rPr lang="en-GB" dirty="0" smtClean="0"/>
+              <a:t> standard</a:t>
             </a:r>
           </a:p>
           <a:p>
             <a:pPr lvl="1"/>
             <a:r>
               <a:rPr lang="en-GB" dirty="0" smtClean="0"/>
-              <a:t>Syntax compatible with other implementations as far as possible</a:t>
-            </a:r>
-          </a:p>
-          <a:p>
-            <a:pPr lvl="1"/>
-            <a:r>
-              <a:rPr lang="en-GB" dirty="0" smtClean="0"/>
-              <a:t>Will be implemented as a new library since as per the architecture proposal it is a non core feature and requires additional dependencies</a:t>
+              <a:t>As with full text SPARQL will be implemented as a new library as is as non-core feature</a:t>
             </a:r>
             <a:endParaRPr lang="en-GB" dirty="0"/>
           </a:p>
@@ -9727,7 +9659,7 @@
             <a:fld id="{CDAEE9B0-25E7-4C28-AF1D-B3DDCE7EBBDB}" type="datetime1">
               <a:rPr lang="en-US" smtClean="0"/>
               <a:pPr/>
-              <a:t>7/15/2011</a:t>
+              <a:t>7/20/2011</a:t>
             </a:fld>
             <a:endParaRPr lang="en-GB"/>
           </a:p>
@@ -9783,7 +9715,7 @@
     </p:spTree>
     <p:extLst>
       <p:ext uri="{BB962C8B-B14F-4D97-AF65-F5344CB8AC3E}">
-        <p14:creationId xmlns:p14="http://schemas.microsoft.com/office/powerpoint/2010/main" val="912609684"/>
+        <p14:creationId xmlns:p14="http://schemas.microsoft.com/office/powerpoint/2010/main" xmlns="" val="585871984"/>
       </p:ext>
     </p:extLst>
   </p:cSld>
@@ -9822,12 +9754,14 @@
         </p:nvSpPr>
         <p:spPr/>
         <p:txBody>
-          <a:bodyPr/>
-          <a:lstStyle/>
-          <a:p>
-            <a:r>
-              <a:rPr lang="en-GB" dirty="0" smtClean="0"/>
-              <a:t>Our Suggestions (2 of 2)</a:t>
+          <a:bodyPr>
+            <a:normAutofit/>
+          </a:bodyPr>
+          <a:lstStyle/>
+          <a:p>
+            <a:r>
+              <a:rPr lang="en-GB" dirty="0" smtClean="0"/>
+              <a:t>Our Suggestions (3 of 4)</a:t>
             </a:r>
             <a:endParaRPr lang="en-GB" dirty="0"/>
           </a:p>
@@ -9850,33 +9784,101 @@
           <a:p>
             <a:r>
               <a:rPr lang="en-GB" dirty="0" err="1" smtClean="0"/>
-              <a:t>GeoSPARQL</a:t>
-            </a:r>
-            <a:r>
-              <a:rPr lang="en-GB" dirty="0" smtClean="0"/>
-              <a:t> Support – dotNetRDF.Sparql.Geo.dll</a:t>
-            </a:r>
+              <a:t>rdfEditor</a:t>
+            </a:r>
+            <a:r>
+              <a:rPr lang="en-GB" dirty="0" smtClean="0"/>
+              <a:t> Core – </a:t>
+            </a:r>
+            <a:r>
+              <a:rPr lang="en-GB" dirty="0" err="1" smtClean="0"/>
+              <a:t>rdfEditor.Core.dll</a:t>
+            </a:r>
+            <a:endParaRPr lang="en-GB" dirty="0" smtClean="0"/>
           </a:p>
           <a:p>
             <a:pPr lvl="1"/>
             <a:r>
               <a:rPr lang="en-GB" dirty="0" smtClean="0"/>
-              <a:t>Provide an implementation of the OGC </a:t>
+              <a:t>Abstraction </a:t>
+            </a:r>
+            <a:r>
+              <a:rPr lang="en-GB" dirty="0" smtClean="0"/>
+              <a:t>of much of the core functionality into a separate library </a:t>
             </a:r>
             <a:r>
               <a:rPr lang="en-GB" dirty="0" err="1" smtClean="0"/>
-              <a:t>GeoSPARQL</a:t>
-            </a:r>
-            <a:r>
-              <a:rPr lang="en-GB" dirty="0" smtClean="0"/>
-              <a:t> standard</a:t>
-            </a:r>
+              <a:t>rdfEditor.Core</a:t>
+            </a:r>
+            <a:endParaRPr lang="en-GB" dirty="0" smtClean="0"/>
           </a:p>
           <a:p>
             <a:pPr lvl="1"/>
             <a:r>
               <a:rPr lang="en-GB" dirty="0" smtClean="0"/>
-              <a:t>As with full text SPARQL will be implemented as a new library as is as non-core feature</a:t>
+              <a:t>Alternative GUI implementation </a:t>
+            </a:r>
+            <a:r>
+              <a:rPr lang="en-GB" dirty="0" smtClean="0"/>
+              <a:t>of </a:t>
+            </a:r>
+            <a:r>
+              <a:rPr lang="en-GB" dirty="0" err="1" smtClean="0"/>
+              <a:t>rdfEditor</a:t>
+            </a:r>
+            <a:r>
+              <a:rPr lang="en-GB" dirty="0" smtClean="0"/>
+              <a:t> using this new library</a:t>
+            </a:r>
+          </a:p>
+          <a:p>
+            <a:pPr lvl="2"/>
+            <a:r>
+              <a:rPr lang="en-GB" dirty="0" smtClean="0"/>
+              <a:t>Will use a GUI that is works on Mono and non-Windows systems </a:t>
+            </a:r>
+            <a:r>
+              <a:rPr lang="en-GB" dirty="0" err="1" smtClean="0"/>
+              <a:t>e.g</a:t>
+            </a:r>
+            <a:r>
+              <a:rPr lang="en-GB" dirty="0" smtClean="0"/>
+              <a:t> </a:t>
+            </a:r>
+            <a:r>
+              <a:rPr lang="en-GB" dirty="0" err="1" smtClean="0"/>
+              <a:t>MonoDevelop’s</a:t>
+            </a:r>
+            <a:r>
+              <a:rPr lang="en-GB" dirty="0" smtClean="0"/>
+              <a:t> GTK# based editor</a:t>
+            </a:r>
+          </a:p>
+          <a:p>
+            <a:pPr lvl="1"/>
+            <a:r>
+              <a:rPr lang="en-GB" dirty="0" smtClean="0"/>
+              <a:t>Existing WPF version of </a:t>
+            </a:r>
+            <a:r>
+              <a:rPr lang="en-GB" dirty="0" err="1" smtClean="0"/>
+              <a:t>rdfEditor</a:t>
+            </a:r>
+            <a:r>
+              <a:rPr lang="en-GB" dirty="0" smtClean="0"/>
+              <a:t> will be </a:t>
+            </a:r>
+            <a:r>
+              <a:rPr lang="en-GB" dirty="0" err="1" smtClean="0"/>
+              <a:t>refactored</a:t>
+            </a:r>
+            <a:r>
+              <a:rPr lang="en-GB" dirty="0" smtClean="0"/>
+              <a:t> to use </a:t>
+            </a:r>
+            <a:r>
+              <a:rPr lang="en-GB" dirty="0" smtClean="0"/>
+              <a:t>this</a:t>
             </a:r>
             <a:endParaRPr lang="en-GB" dirty="0"/>
           </a:p>
@@ -9900,9 +9902,9 @@
             <a:fld id="{CDAEE9B0-25E7-4C28-AF1D-B3DDCE7EBBDB}" type="datetime1">
               <a:rPr lang="en-US" smtClean="0"/>
               <a:pPr/>
-              <a:t>7/15/2011</a:t>
+              <a:t>7/20/2011</a:t>
             </a:fld>
-            <a:endParaRPr lang="en-GB"/>
+            <a:endParaRPr lang="en-GB" dirty="0"/>
           </a:p>
         </p:txBody>
       </p:sp>
@@ -9922,10 +9924,10 @@
           <a:lstStyle/>
           <a:p>
             <a:r>
-              <a:rPr lang="en-GB" smtClean="0"/>
+              <a:rPr lang="en-GB" dirty="0" smtClean="0"/>
               <a:t>http://www.dotnetrdf.org</a:t>
             </a:r>
-            <a:endParaRPr lang="en-GB"/>
+            <a:endParaRPr lang="en-GB" dirty="0"/>
           </a:p>
         </p:txBody>
       </p:sp>
@@ -9954,11 +9956,6 @@
         </p:txBody>
       </p:sp>
     </p:spTree>
-    <p:extLst>
-      <p:ext uri="{BB962C8B-B14F-4D97-AF65-F5344CB8AC3E}">
-        <p14:creationId xmlns:p14="http://schemas.microsoft.com/office/powerpoint/2010/main" val="585871984"/>
-      </p:ext>
-    </p:extLst>
   </p:cSld>
   <p:clrMapOvr>
     <a:masterClrMapping/>
@@ -10000,7 +9997,7 @@
           <a:p>
             <a:r>
               <a:rPr lang="en-GB" dirty="0" smtClean="0"/>
-              <a:t>Existing Community Suggestions</a:t>
+              <a:t>Our Suggestions (4 of 4)</a:t>
             </a:r>
             <a:endParaRPr lang="en-GB" dirty="0"/>
           </a:p>
@@ -10022,52 +10019,59 @@
           <a:lstStyle/>
           <a:p>
             <a:r>
-              <a:rPr lang="en-GB" dirty="0" smtClean="0"/>
-              <a:t>Currently the following features have been suggested/requested by the community:</a:t>
+              <a:rPr lang="en-GB" dirty="0" err="1" smtClean="0"/>
+              <a:t>rdfEditor.Core</a:t>
+            </a:r>
+            <a:r>
+              <a:rPr lang="en-GB" smtClean="0"/>
+              <a:t> will provide </a:t>
+            </a:r>
+            <a:r>
+              <a:rPr lang="en-GB" dirty="0" smtClean="0"/>
+              <a:t>the following:</a:t>
             </a:r>
           </a:p>
           <a:p>
             <a:pPr lvl="1"/>
             <a:r>
+              <a:rPr lang="en-GB" dirty="0" smtClean="0"/>
+              <a:t>Cleaner and reusable shared code based between different GUI frontends</a:t>
+            </a:r>
+          </a:p>
+          <a:p>
+            <a:pPr lvl="1"/>
+            <a:r>
+              <a:rPr lang="en-GB" dirty="0" smtClean="0"/>
+              <a:t>Support for multiple document editing</a:t>
+            </a:r>
+          </a:p>
+          <a:p>
+            <a:pPr lvl="1"/>
+            <a:r>
+              <a:rPr lang="en-GB" dirty="0" smtClean="0"/>
+              <a:t>Improved support for conversion between formats</a:t>
+            </a:r>
+          </a:p>
+          <a:p>
+            <a:pPr lvl="1"/>
+            <a:r>
+              <a:rPr lang="en-GB" dirty="0" smtClean="0"/>
+              <a:t>Extensible </a:t>
+            </a:r>
+            <a:r>
               <a:rPr lang="en-GB" dirty="0" err="1" smtClean="0"/>
-              <a:t>.Net</a:t>
-            </a:r>
-            <a:r>
-              <a:rPr lang="en-GB" dirty="0" smtClean="0"/>
-              <a:t> Serialization support</a:t>
+              <a:t>plugin</a:t>
+            </a:r>
+            <a:r>
+              <a:rPr lang="en-GB" dirty="0" smtClean="0"/>
+              <a:t> system</a:t>
             </a:r>
           </a:p>
           <a:p>
             <a:pPr lvl="1"/>
-            <a:r>
-              <a:rPr lang="en-GB" dirty="0" smtClean="0"/>
-              <a:t>SPIN (SPARQL Inferencing Notation) Support</a:t>
-            </a:r>
-          </a:p>
-          <a:p>
-            <a:pPr lvl="1"/>
-            <a:r>
-              <a:rPr lang="en-GB" dirty="0" err="1" smtClean="0"/>
-              <a:t>rdfEditor</a:t>
-            </a:r>
-            <a:r>
-              <a:rPr lang="en-GB" dirty="0" smtClean="0"/>
-              <a:t> for non-Windows systems</a:t>
-            </a:r>
-          </a:p>
-          <a:p>
-            <a:pPr lvl="2"/>
-            <a:r>
-              <a:rPr lang="en-GB" dirty="0" smtClean="0"/>
-              <a:t>As it is WPF based it does not run under Mono which limits it to Windows only currently</a:t>
-            </a:r>
-          </a:p>
-          <a:p>
-            <a:pPr lvl="1"/>
-            <a:r>
-              <a:rPr lang="en-GB" dirty="0" smtClean="0"/>
-              <a:t>Additional JSON format support</a:t>
-            </a:r>
+            <a:endParaRPr lang="en-GB" dirty="0" smtClean="0"/>
+          </a:p>
+          <a:p>
             <a:endParaRPr lang="en-GB" dirty="0"/>
           </a:p>
         </p:txBody>
@@ -10090,7 +10094,7 @@
             <a:fld id="{CDAEE9B0-25E7-4C28-AF1D-B3DDCE7EBBDB}" type="datetime1">
               <a:rPr lang="en-US" smtClean="0"/>
               <a:pPr/>
-              <a:t>7/15/2011</a:t>
+              <a:t>7/20/2011</a:t>
             </a:fld>
             <a:endParaRPr lang="en-GB"/>
           </a:p>
@@ -10144,11 +10148,6 @@
         </p:txBody>
       </p:sp>
     </p:spTree>
-    <p:extLst>
-      <p:ext uri="{BB962C8B-B14F-4D97-AF65-F5344CB8AC3E}">
-        <p14:creationId xmlns:p14="http://schemas.microsoft.com/office/powerpoint/2010/main" val="2152085500"/>
-      </p:ext>
-    </p:extLst>
   </p:cSld>
   <p:clrMapOvr>
     <a:masterClrMapping/>
@@ -10175,7 +10174,7 @@
       </p:grpSpPr>
       <p:sp>
         <p:nvSpPr>
-          <p:cNvPr id="7" name="Title 6"/>
+          <p:cNvPr id="2" name="Title 1"/>
           <p:cNvSpPr>
             <a:spLocks noGrp="1"/>
           </p:cNvSpPr>
@@ -10190,7 +10189,73 @@
           <a:p>
             <a:r>
               <a:rPr lang="en-GB" dirty="0" smtClean="0"/>
-              <a:t>Get Involved</a:t>
+              <a:t>Existing Community Suggestions</a:t>
+            </a:r>
+            <a:endParaRPr lang="en-GB" dirty="0"/>
+          </a:p>
+        </p:txBody>
+      </p:sp>
+      <p:sp>
+        <p:nvSpPr>
+          <p:cNvPr id="3" name="Content Placeholder 2"/>
+          <p:cNvSpPr>
+            <a:spLocks noGrp="1"/>
+          </p:cNvSpPr>
+          <p:nvPr>
+            <p:ph idx="1"/>
+          </p:nvPr>
+        </p:nvSpPr>
+        <p:spPr/>
+        <p:txBody>
+          <a:bodyPr/>
+          <a:lstStyle/>
+          <a:p>
+            <a:r>
+              <a:rPr lang="en-GB" dirty="0" smtClean="0"/>
+              <a:t>Currently the following features have been suggested/requested by the community:</a:t>
+            </a:r>
+          </a:p>
+          <a:p>
+            <a:pPr lvl="1"/>
+            <a:r>
+              <a:rPr lang="en-GB" dirty="0" err="1" smtClean="0"/>
+              <a:t>.Net</a:t>
+            </a:r>
+            <a:r>
+              <a:rPr lang="en-GB" dirty="0" smtClean="0"/>
+              <a:t> Serialization support</a:t>
+            </a:r>
+          </a:p>
+          <a:p>
+            <a:pPr lvl="1"/>
+            <a:r>
+              <a:rPr lang="en-GB" dirty="0" smtClean="0"/>
+              <a:t>SPIN (SPARQL Inferencing Notation) Support</a:t>
+            </a:r>
+          </a:p>
+          <a:p>
+            <a:pPr lvl="1"/>
+            <a:r>
+              <a:rPr lang="en-GB" dirty="0" err="1" smtClean="0"/>
+              <a:t>rdfEditor</a:t>
+            </a:r>
+            <a:r>
+              <a:rPr lang="en-GB" dirty="0" smtClean="0"/>
+              <a:t> for non-Windows systems</a:t>
+            </a:r>
+          </a:p>
+          <a:p>
+            <a:pPr lvl="2"/>
+            <a:r>
+              <a:rPr lang="en-GB" dirty="0" smtClean="0"/>
+              <a:t>As it is WPF based it does not run under Mono which limits it to Windows only currently</a:t>
+            </a:r>
+          </a:p>
+          <a:p>
+            <a:pPr lvl="1"/>
+            <a:r>
+              <a:rPr lang="en-GB" dirty="0" smtClean="0"/>
+              <a:t>Additional JSON format support</a:t>
             </a:r>
             <a:endParaRPr lang="en-GB" dirty="0"/>
           </a:p>
@@ -10214,7 +10279,7 @@
             <a:fld id="{CDAEE9B0-25E7-4C28-AF1D-B3DDCE7EBBDB}" type="datetime1">
               <a:rPr lang="en-US" smtClean="0"/>
               <a:pPr/>
-              <a:t>7/15/2011</a:t>
+              <a:t>7/20/2011</a:t>
             </a:fld>
             <a:endParaRPr lang="en-GB"/>
           </a:p>
@@ -10270,7 +10335,7 @@
     </p:spTree>
     <p:extLst>
       <p:ext uri="{BB962C8B-B14F-4D97-AF65-F5344CB8AC3E}">
-        <p14:creationId xmlns:p14="http://schemas.microsoft.com/office/powerpoint/2010/main" val="3258641840"/>
+        <p14:creationId xmlns:p14="http://schemas.microsoft.com/office/powerpoint/2010/main" xmlns="" val="2152085500"/>
       </p:ext>
     </p:extLst>
   </p:cSld>
@@ -10299,7 +10364,7 @@
       </p:grpSpPr>
       <p:sp>
         <p:nvSpPr>
-          <p:cNvPr id="2" name="Title 1"/>
+          <p:cNvPr id="7" name="Title 6"/>
           <p:cNvSpPr>
             <a:spLocks noGrp="1"/>
           </p:cNvSpPr>
@@ -10317,78 +10382,6 @@
               <a:t>Get Involved</a:t>
             </a:r>
             <a:endParaRPr lang="en-GB" dirty="0"/>
-          </a:p>
-        </p:txBody>
-      </p:sp>
-      <p:sp>
-        <p:nvSpPr>
-          <p:cNvPr id="3" name="Content Placeholder 2"/>
-          <p:cNvSpPr>
-            <a:spLocks noGrp="1"/>
-          </p:cNvSpPr>
-          <p:nvPr>
-            <p:ph idx="1"/>
-          </p:nvPr>
-        </p:nvSpPr>
-        <p:spPr/>
-        <p:txBody>
-          <a:bodyPr>
-            <a:normAutofit/>
-          </a:bodyPr>
-          <a:lstStyle/>
-          <a:p>
-            <a:r>
-              <a:rPr lang="en-GB" dirty="0" smtClean="0"/>
-              <a:t>Suggestions and feedback on this roadmap are solicited and welcomed</a:t>
-            </a:r>
-          </a:p>
-          <a:p>
-            <a:r>
-              <a:rPr lang="en-GB" dirty="0" smtClean="0"/>
-              <a:t>Via email:</a:t>
-            </a:r>
-          </a:p>
-          <a:p>
-            <a:pPr lvl="1"/>
-            <a:r>
-              <a:rPr lang="en-GB" dirty="0" smtClean="0"/>
-              <a:t>Mailing List – </a:t>
-            </a:r>
-            <a:r>
-              <a:rPr lang="en-GB" dirty="0" smtClean="0">
-                <a:hlinkClick r:id="rId2"/>
-              </a:rPr>
-              <a:t>dotnetrdf-develop@lists.sf.net</a:t>
-            </a:r>
-            <a:endParaRPr lang="en-GB" dirty="0" smtClean="0"/>
-          </a:p>
-          <a:p>
-            <a:pPr lvl="1"/>
-            <a:r>
-              <a:rPr lang="en-GB" dirty="0" smtClean="0"/>
-              <a:t>Direct Email – </a:t>
-            </a:r>
-            <a:r>
-              <a:rPr lang="en-GB" dirty="0" smtClean="0">
-                <a:hlinkClick r:id="rId3"/>
-              </a:rPr>
-              <a:t>rvesse@dotnetrdf.org</a:t>
-            </a:r>
-            <a:endParaRPr lang="en-GB" dirty="0" smtClean="0"/>
-          </a:p>
-          <a:p>
-            <a:r>
-              <a:rPr lang="en-GB" dirty="0" smtClean="0"/>
-              <a:t>Via Skype (</a:t>
-            </a:r>
-            <a:r>
-              <a:rPr lang="en-GB" dirty="0" err="1" smtClean="0"/>
-              <a:t>rvesse</a:t>
-            </a:r>
-            <a:r>
-              <a:rPr lang="en-GB" dirty="0" smtClean="0"/>
-              <a:t>) – please email first to arrange a meeting</a:t>
-            </a:r>
           </a:p>
         </p:txBody>
       </p:sp>
@@ -10410,7 +10403,7 @@
             <a:fld id="{CDAEE9B0-25E7-4C28-AF1D-B3DDCE7EBBDB}" type="datetime1">
               <a:rPr lang="en-US" smtClean="0"/>
               <a:pPr/>
-              <a:t>7/15/2011</a:t>
+              <a:t>7/20/2011</a:t>
             </a:fld>
             <a:endParaRPr lang="en-GB"/>
           </a:p>
@@ -10466,7 +10459,7 @@
     </p:spTree>
     <p:extLst>
       <p:ext uri="{BB962C8B-B14F-4D97-AF65-F5344CB8AC3E}">
-        <p14:creationId xmlns:p14="http://schemas.microsoft.com/office/powerpoint/2010/main" val="1264147251"/>
+        <p14:creationId xmlns:p14="http://schemas.microsoft.com/office/powerpoint/2010/main" xmlns="" val="3258641840"/>
       </p:ext>
     </p:extLst>
   </p:cSld>
@@ -10528,67 +10521,63 @@
         </p:nvSpPr>
         <p:spPr/>
         <p:txBody>
-          <a:bodyPr/>
-          <a:lstStyle/>
-          <a:p>
-            <a:r>
-              <a:rPr lang="en-GB" dirty="0"/>
-              <a:t>Face to Face </a:t>
+          <a:bodyPr>
+            <a:normAutofit/>
+          </a:bodyPr>
+          <a:lstStyle/>
+          <a:p>
+            <a:r>
+              <a:rPr lang="en-GB" dirty="0" smtClean="0"/>
+              <a:t>Suggestions and feedback on this roadmap are solicited and welcomed</a:t>
+            </a:r>
+          </a:p>
+          <a:p>
+            <a:r>
+              <a:rPr lang="en-GB" dirty="0" smtClean="0"/>
+              <a:t>Via email:</a:t>
             </a:r>
           </a:p>
           <a:p>
             <a:pPr lvl="1"/>
             <a:r>
-              <a:rPr lang="en-GB" dirty="0"/>
-              <a:t>Conferences – contact me via email to see what conferences I plain on attending later this year</a:t>
-            </a:r>
+              <a:rPr lang="en-GB" dirty="0" smtClean="0"/>
+              <a:t>Mailing List – </a:t>
+            </a:r>
+            <a:r>
+              <a:rPr lang="en-GB" dirty="0" smtClean="0">
+                <a:hlinkClick r:id="rId2"/>
+              </a:rPr>
+              <a:t>dotnetrdf-develop@lists.sf.net</a:t>
+            </a:r>
+            <a:endParaRPr lang="en-GB" dirty="0" smtClean="0"/>
           </a:p>
           <a:p>
             <a:pPr lvl="1"/>
             <a:r>
-              <a:rPr lang="en-GB" dirty="0" err="1"/>
-              <a:t>Meetup</a:t>
-            </a:r>
-            <a:r>
-              <a:rPr lang="en-GB" dirty="0"/>
-              <a:t> – I attend the London </a:t>
-            </a:r>
-            <a:r>
-              <a:rPr lang="en-GB" dirty="0" err="1"/>
-              <a:t>SemWeb</a:t>
-            </a:r>
-            <a:r>
-              <a:rPr lang="en-GB" dirty="0"/>
-              <a:t> </a:t>
+              <a:rPr lang="en-GB" dirty="0" smtClean="0"/>
+              <a:t>Direct Email – </a:t>
+            </a:r>
+            <a:r>
+              <a:rPr lang="en-GB" dirty="0" smtClean="0">
+                <a:hlinkClick r:id="rId3"/>
+              </a:rPr>
+              <a:t>rvesse@dotnetrdf.org</a:t>
+            </a:r>
+            <a:endParaRPr lang="en-GB" dirty="0" smtClean="0"/>
+          </a:p>
+          <a:p>
+            <a:r>
+              <a:rPr lang="en-GB" dirty="0" smtClean="0"/>
+              <a:t>Via Skype (</a:t>
             </a:r>
             <a:r>
               <a:rPr lang="en-GB" dirty="0" err="1" smtClean="0"/>
-              <a:t>Meetup</a:t>
-            </a:r>
-            <a:r>
-              <a:rPr lang="en-GB" dirty="0" smtClean="0"/>
-              <a:t>, please check with me via email whether I will be at a specific </a:t>
-            </a:r>
-            <a:r>
-              <a:rPr lang="en-GB" dirty="0" err="1" smtClean="0"/>
-              <a:t>meetup</a:t>
-            </a:r>
-            <a:endParaRPr lang="en-GB" dirty="0"/>
-          </a:p>
-          <a:p>
-            <a:pPr lvl="1"/>
-            <a:r>
-              <a:rPr lang="en-GB" dirty="0"/>
-              <a:t>Meetings – If you are based in the </a:t>
-            </a:r>
-            <a:r>
-              <a:rPr lang="en-GB" dirty="0" smtClean="0"/>
-              <a:t>south of the UK I am happy to arrange meetings via email</a:t>
-            </a:r>
-            <a:endParaRPr lang="en-GB" dirty="0"/>
-          </a:p>
-          <a:p>
-            <a:endParaRPr lang="en-GB" dirty="0"/>
+              <a:t>rvesse</a:t>
+            </a:r>
+            <a:r>
+              <a:rPr lang="en-GB" dirty="0" smtClean="0"/>
+              <a:t>) – please email first to arrange a meeting</a:t>
+            </a:r>
           </a:p>
         </p:txBody>
       </p:sp>
@@ -10610,7 +10599,7 @@
             <a:fld id="{CDAEE9B0-25E7-4C28-AF1D-B3DDCE7EBBDB}" type="datetime1">
               <a:rPr lang="en-US" smtClean="0"/>
               <a:pPr/>
-              <a:t>7/15/2011</a:t>
+              <a:t>7/20/2011</a:t>
             </a:fld>
             <a:endParaRPr lang="en-GB"/>
           </a:p>
@@ -10666,7 +10655,207 @@
     </p:spTree>
     <p:extLst>
       <p:ext uri="{BB962C8B-B14F-4D97-AF65-F5344CB8AC3E}">
-        <p14:creationId xmlns:p14="http://schemas.microsoft.com/office/powerpoint/2010/main" val="798761902"/>
+        <p14:creationId xmlns:p14="http://schemas.microsoft.com/office/powerpoint/2010/main" xmlns="" val="1264147251"/>
+      </p:ext>
+    </p:extLst>
+  </p:cSld>
+  <p:clrMapOvr>
+    <a:masterClrMapping/>
+  </p:clrMapOvr>
+</p:sld>
+</file>
+
+<file path=ppt/slides/slide49.xml><?xml version="1.0" encoding="utf-8"?>
+<p:sld xmlns:a="http://schemas.openxmlformats.org/drawingml/2006/main" xmlns:r="http://schemas.openxmlformats.org/officeDocument/2006/relationships" xmlns:p="http://schemas.openxmlformats.org/presentationml/2006/main">
+  <p:cSld>
+    <p:spTree>
+      <p:nvGrpSpPr>
+        <p:cNvPr id="1" name=""/>
+        <p:cNvGrpSpPr/>
+        <p:nvPr/>
+      </p:nvGrpSpPr>
+      <p:grpSpPr>
+        <a:xfrm>
+          <a:off x="0" y="0"/>
+          <a:ext cx="0" cy="0"/>
+          <a:chOff x="0" y="0"/>
+          <a:chExt cx="0" cy="0"/>
+        </a:xfrm>
+      </p:grpSpPr>
+      <p:sp>
+        <p:nvSpPr>
+          <p:cNvPr id="2" name="Title 1"/>
+          <p:cNvSpPr>
+            <a:spLocks noGrp="1"/>
+          </p:cNvSpPr>
+          <p:nvPr>
+            <p:ph type="title"/>
+          </p:nvPr>
+        </p:nvSpPr>
+        <p:spPr/>
+        <p:txBody>
+          <a:bodyPr/>
+          <a:lstStyle/>
+          <a:p>
+            <a:r>
+              <a:rPr lang="en-GB" dirty="0" smtClean="0"/>
+              <a:t>Get Involved</a:t>
+            </a:r>
+            <a:endParaRPr lang="en-GB" dirty="0"/>
+          </a:p>
+        </p:txBody>
+      </p:sp>
+      <p:sp>
+        <p:nvSpPr>
+          <p:cNvPr id="3" name="Content Placeholder 2"/>
+          <p:cNvSpPr>
+            <a:spLocks noGrp="1"/>
+          </p:cNvSpPr>
+          <p:nvPr>
+            <p:ph idx="1"/>
+          </p:nvPr>
+        </p:nvSpPr>
+        <p:spPr/>
+        <p:txBody>
+          <a:bodyPr/>
+          <a:lstStyle/>
+          <a:p>
+            <a:r>
+              <a:rPr lang="en-GB" dirty="0"/>
+              <a:t>Face to Face </a:t>
+            </a:r>
+          </a:p>
+          <a:p>
+            <a:pPr lvl="1"/>
+            <a:r>
+              <a:rPr lang="en-GB" dirty="0"/>
+              <a:t>Conferences – contact me via email to see what conferences I plain on attending later this year</a:t>
+            </a:r>
+          </a:p>
+          <a:p>
+            <a:pPr lvl="1"/>
+            <a:r>
+              <a:rPr lang="en-GB" dirty="0" err="1"/>
+              <a:t>Meetup</a:t>
+            </a:r>
+            <a:r>
+              <a:rPr lang="en-GB" dirty="0"/>
+              <a:t> – I attend the London </a:t>
+            </a:r>
+            <a:r>
+              <a:rPr lang="en-GB" dirty="0" err="1"/>
+              <a:t>SemWeb</a:t>
+            </a:r>
+            <a:r>
+              <a:rPr lang="en-GB" dirty="0"/>
+              <a:t> </a:t>
+            </a:r>
+            <a:r>
+              <a:rPr lang="en-GB" dirty="0" err="1" smtClean="0"/>
+              <a:t>Meetup</a:t>
+            </a:r>
+            <a:r>
+              <a:rPr lang="en-GB" dirty="0" smtClean="0"/>
+              <a:t>, please check with me via email whether I will be at a specific </a:t>
+            </a:r>
+            <a:r>
+              <a:rPr lang="en-GB" dirty="0" err="1" smtClean="0"/>
+              <a:t>meetup</a:t>
+            </a:r>
+            <a:endParaRPr lang="en-GB" dirty="0"/>
+          </a:p>
+          <a:p>
+            <a:pPr lvl="1"/>
+            <a:r>
+              <a:rPr lang="en-GB" dirty="0"/>
+              <a:t>Meetings – If you are based in the </a:t>
+            </a:r>
+            <a:r>
+              <a:rPr lang="en-GB" dirty="0" smtClean="0"/>
+              <a:t>south of the UK I am happy to arrange meetings via email</a:t>
+            </a:r>
+            <a:endParaRPr lang="en-GB" dirty="0"/>
+          </a:p>
+          <a:p>
+            <a:endParaRPr lang="en-GB" dirty="0"/>
+          </a:p>
+        </p:txBody>
+      </p:sp>
+      <p:sp>
+        <p:nvSpPr>
+          <p:cNvPr id="4" name="Date Placeholder 3"/>
+          <p:cNvSpPr>
+            <a:spLocks noGrp="1"/>
+          </p:cNvSpPr>
+          <p:nvPr>
+            <p:ph type="dt" sz="half" idx="10"/>
+          </p:nvPr>
+        </p:nvSpPr>
+        <p:spPr/>
+        <p:txBody>
+          <a:bodyPr/>
+          <a:lstStyle/>
+          <a:p>
+            <a:fld id="{CDAEE9B0-25E7-4C28-AF1D-B3DDCE7EBBDB}" type="datetime1">
+              <a:rPr lang="en-US" smtClean="0"/>
+              <a:pPr/>
+              <a:t>7/20/2011</a:t>
+            </a:fld>
+            <a:endParaRPr lang="en-GB"/>
+          </a:p>
+        </p:txBody>
+      </p:sp>
+      <p:sp>
+        <p:nvSpPr>
+          <p:cNvPr id="5" name="Footer Placeholder 4"/>
+          <p:cNvSpPr>
+            <a:spLocks noGrp="1"/>
+          </p:cNvSpPr>
+          <p:nvPr>
+            <p:ph type="ftr" sz="quarter" idx="11"/>
+          </p:nvPr>
+        </p:nvSpPr>
+        <p:spPr/>
+        <p:txBody>
+          <a:bodyPr/>
+          <a:lstStyle/>
+          <a:p>
+            <a:r>
+              <a:rPr lang="en-GB" smtClean="0"/>
+              <a:t>http://www.dotnetrdf.org</a:t>
+            </a:r>
+            <a:endParaRPr lang="en-GB"/>
+          </a:p>
+        </p:txBody>
+      </p:sp>
+      <p:sp>
+        <p:nvSpPr>
+          <p:cNvPr id="6" name="Slide Number Placeholder 5"/>
+          <p:cNvSpPr>
+            <a:spLocks noGrp="1"/>
+          </p:cNvSpPr>
+          <p:nvPr>
+            <p:ph type="sldNum" sz="quarter" idx="12"/>
+          </p:nvPr>
+        </p:nvSpPr>
+        <p:spPr/>
+        <p:txBody>
+          <a:bodyPr/>
+          <a:lstStyle/>
+          <a:p>
+            <a:fld id="{35128F56-7434-487A-8B29-0C024560A5F4}" type="slidenum">
+              <a:rPr lang="en-GB" smtClean="0"/>
+              <a:pPr/>
+              <a:t>49</a:t>
+            </a:fld>
+            <a:endParaRPr lang="en-GB"/>
+          </a:p>
+        </p:txBody>
+      </p:sp>
+    </p:spTree>
+    <p:extLst>
+      <p:ext uri="{BB962C8B-B14F-4D97-AF65-F5344CB8AC3E}">
+        <p14:creationId xmlns:p14="http://schemas.microsoft.com/office/powerpoint/2010/main" xmlns="" val="798761902"/>
       </p:ext>
     </p:extLst>
   </p:cSld>
@@ -10791,7 +10980,7 @@
             <a:fld id="{CDAEE9B0-25E7-4C28-AF1D-B3DDCE7EBBDB}" type="datetime1">
               <a:rPr lang="en-US" smtClean="0"/>
               <a:pPr/>
-              <a:t>7/15/2011</a:t>
+              <a:t>7/20/2011</a:t>
             </a:fld>
             <a:endParaRPr lang="en-GB"/>
           </a:p>
@@ -10847,7 +11036,7 @@
     </p:spTree>
     <p:extLst>
       <p:ext uri="{BB962C8B-B14F-4D97-AF65-F5344CB8AC3E}">
-        <p14:creationId xmlns:p14="http://schemas.microsoft.com/office/powerpoint/2010/main" val="685525953"/>
+        <p14:creationId xmlns:p14="http://schemas.microsoft.com/office/powerpoint/2010/main" xmlns="" val="685525953"/>
       </p:ext>
     </p:extLst>
   </p:cSld>
@@ -10915,7 +11104,7 @@
             <a:fld id="{EA5D455B-ECD0-44E3-BA0C-3649A3FCD15C}" type="datetime1">
               <a:rPr lang="en-US" smtClean="0"/>
               <a:pPr/>
-              <a:t>7/15/2011</a:t>
+              <a:t>7/20/2011</a:t>
             </a:fld>
             <a:endParaRPr lang="en-GB"/>
           </a:p>
@@ -10971,7 +11160,7 @@
     </p:spTree>
     <p:extLst>
       <p:ext uri="{BB962C8B-B14F-4D97-AF65-F5344CB8AC3E}">
-        <p14:creationId xmlns:p14="http://schemas.microsoft.com/office/powerpoint/2010/main" val="2062332550"/>
+        <p14:creationId xmlns:p14="http://schemas.microsoft.com/office/powerpoint/2010/main" xmlns="" val="2062332550"/>
       </p:ext>
     </p:extLst>
   </p:cSld>
@@ -11077,7 +11266,7 @@
             <a:fld id="{CDAEE9B0-25E7-4C28-AF1D-B3DDCE7EBBDB}" type="datetime1">
               <a:rPr lang="en-US" smtClean="0"/>
               <a:pPr/>
-              <a:t>7/15/2011</a:t>
+              <a:t>7/20/2011</a:t>
             </a:fld>
             <a:endParaRPr lang="en-GB"/>
           </a:p>
@@ -11133,7 +11322,7 @@
     </p:spTree>
     <p:extLst>
       <p:ext uri="{BB962C8B-B14F-4D97-AF65-F5344CB8AC3E}">
-        <p14:creationId xmlns:p14="http://schemas.microsoft.com/office/powerpoint/2010/main" val="2752513629"/>
+        <p14:creationId xmlns:p14="http://schemas.microsoft.com/office/powerpoint/2010/main" xmlns="" val="2752513629"/>
       </p:ext>
     </p:extLst>
   </p:cSld>
@@ -11257,7 +11446,7 @@
             <a:fld id="{CDAEE9B0-25E7-4C28-AF1D-B3DDCE7EBBDB}" type="datetime1">
               <a:rPr lang="en-US" smtClean="0"/>
               <a:pPr/>
-              <a:t>7/15/2011</a:t>
+              <a:t>7/20/2011</a:t>
             </a:fld>
             <a:endParaRPr lang="en-GB"/>
           </a:p>
@@ -11313,7 +11502,7 @@
     </p:spTree>
     <p:extLst>
       <p:ext uri="{BB962C8B-B14F-4D97-AF65-F5344CB8AC3E}">
-        <p14:creationId xmlns:p14="http://schemas.microsoft.com/office/powerpoint/2010/main" val="1884836899"/>
+        <p14:creationId xmlns:p14="http://schemas.microsoft.com/office/powerpoint/2010/main" xmlns="" val="1884836899"/>
       </p:ext>
     </p:extLst>
   </p:cSld>
@@ -11410,7 +11599,7 @@
             <a:fld id="{CDAEE9B0-25E7-4C28-AF1D-B3DDCE7EBBDB}" type="datetime1">
               <a:rPr lang="en-US" smtClean="0"/>
               <a:pPr/>
-              <a:t>7/15/2011</a:t>
+              <a:t>7/20/2011</a:t>
             </a:fld>
             <a:endParaRPr lang="en-GB"/>
           </a:p>
@@ -11466,7 +11655,7 @@
     </p:spTree>
     <p:extLst>
       <p:ext uri="{BB962C8B-B14F-4D97-AF65-F5344CB8AC3E}">
-        <p14:creationId xmlns:p14="http://schemas.microsoft.com/office/powerpoint/2010/main" val="1547614895"/>
+        <p14:creationId xmlns:p14="http://schemas.microsoft.com/office/powerpoint/2010/main" xmlns="" val="1547614895"/>
       </p:ext>
     </p:extLst>
   </p:cSld>

</xml_diff>

<commit_message>
Updated Roadmap slides and Release Notes acknowledgements list
</commit_message>
<xml_diff>
--- a/Slides/Roadmap.pptx
+++ b/Slides/Roadmap.pptx
@@ -5,7 +5,7 @@
     <p:sldMasterId id="2147483648" r:id="rId1"/>
   </p:sldMasterIdLst>
   <p:notesMasterIdLst>
-    <p:notesMasterId r:id="rId51"/>
+    <p:notesMasterId r:id="rId56"/>
   </p:notesMasterIdLst>
   <p:sldIdLst>
     <p:sldId id="256" r:id="rId2"/>
@@ -37,26 +37,31 @@
     <p:sldId id="281" r:id="rId28"/>
     <p:sldId id="282" r:id="rId29"/>
     <p:sldId id="283" r:id="rId30"/>
-    <p:sldId id="287" r:id="rId31"/>
-    <p:sldId id="288" r:id="rId32"/>
-    <p:sldId id="289" r:id="rId33"/>
-    <p:sldId id="299" r:id="rId34"/>
-    <p:sldId id="290" r:id="rId35"/>
-    <p:sldId id="291" r:id="rId36"/>
-    <p:sldId id="292" r:id="rId37"/>
-    <p:sldId id="293" r:id="rId38"/>
-    <p:sldId id="294" r:id="rId39"/>
-    <p:sldId id="295" r:id="rId40"/>
-    <p:sldId id="296" r:id="rId41"/>
-    <p:sldId id="297" r:id="rId42"/>
-    <p:sldId id="298" r:id="rId43"/>
-    <p:sldId id="300" r:id="rId44"/>
-    <p:sldId id="308" r:id="rId45"/>
-    <p:sldId id="309" r:id="rId46"/>
-    <p:sldId id="301" r:id="rId47"/>
-    <p:sldId id="303" r:id="rId48"/>
-    <p:sldId id="302" r:id="rId49"/>
-    <p:sldId id="304" r:id="rId50"/>
+    <p:sldId id="315" r:id="rId31"/>
+    <p:sldId id="287" r:id="rId32"/>
+    <p:sldId id="288" r:id="rId33"/>
+    <p:sldId id="310" r:id="rId34"/>
+    <p:sldId id="289" r:id="rId35"/>
+    <p:sldId id="299" r:id="rId36"/>
+    <p:sldId id="290" r:id="rId37"/>
+    <p:sldId id="291" r:id="rId38"/>
+    <p:sldId id="292" r:id="rId39"/>
+    <p:sldId id="293" r:id="rId40"/>
+    <p:sldId id="311" r:id="rId41"/>
+    <p:sldId id="295" r:id="rId42"/>
+    <p:sldId id="296" r:id="rId43"/>
+    <p:sldId id="297" r:id="rId44"/>
+    <p:sldId id="298" r:id="rId45"/>
+    <p:sldId id="300" r:id="rId46"/>
+    <p:sldId id="308" r:id="rId47"/>
+    <p:sldId id="309" r:id="rId48"/>
+    <p:sldId id="301" r:id="rId49"/>
+    <p:sldId id="303" r:id="rId50"/>
+    <p:sldId id="302" r:id="rId51"/>
+    <p:sldId id="312" r:id="rId52"/>
+    <p:sldId id="304" r:id="rId53"/>
+    <p:sldId id="313" r:id="rId54"/>
+    <p:sldId id="314" r:id="rId55"/>
   </p:sldIdLst>
   <p:sldSz cx="9144000" cy="6858000" type="screen4x3"/>
   <p:notesSz cx="7099300" cy="10223500"/>
@@ -241,7 +246,7 @@
             <a:fld id="{A4EFCF4D-B222-4BDE-9F21-361A6D2DD5DC}" type="datetimeFigureOut">
               <a:rPr lang="en-GB" smtClean="0"/>
               <a:pPr/>
-              <a:t>20/07/2011</a:t>
+              <a:t>26/07/2011</a:t>
             </a:fld>
             <a:endParaRPr lang="en-GB"/>
           </a:p>
@@ -410,7 +415,7 @@
     </p:spTree>
     <p:extLst>
       <p:ext uri="{BB962C8B-B14F-4D97-AF65-F5344CB8AC3E}">
-        <p14:creationId xmlns:p14="http://schemas.microsoft.com/office/powerpoint/2010/main" xmlns="" val="3764111685"/>
+        <p14:creationId xmlns="" xmlns:p14="http://schemas.microsoft.com/office/powerpoint/2010/main" val="3764111685"/>
       </p:ext>
     </p:extLst>
   </p:cSld>
@@ -698,7 +703,7 @@
             <a:fld id="{7DDF2E66-A8D8-4938-9770-803246E1F4D9}" type="datetime1">
               <a:rPr lang="en-US" smtClean="0"/>
               <a:pPr/>
-              <a:t>7/20/2011</a:t>
+              <a:t>7/26/2011</a:t>
             </a:fld>
             <a:endParaRPr lang="en-GB"/>
           </a:p>
@@ -889,7 +894,7 @@
             <a:fld id="{CDAEE9B0-25E7-4C28-AF1D-B3DDCE7EBBDB}" type="datetime1">
               <a:rPr lang="en-US" smtClean="0"/>
               <a:pPr/>
-              <a:t>7/20/2011</a:t>
+              <a:t>7/26/2011</a:t>
             </a:fld>
             <a:endParaRPr lang="en-GB"/>
           </a:p>
@@ -1136,7 +1141,7 @@
             <a:fld id="{B4D3D433-0AB0-44F2-9244-5C7078B0628D}" type="datetime1">
               <a:rPr lang="en-US" smtClean="0"/>
               <a:pPr/>
-              <a:t>7/20/2011</a:t>
+              <a:t>7/26/2011</a:t>
             </a:fld>
             <a:endParaRPr lang="en-GB"/>
           </a:p>
@@ -1440,7 +1445,7 @@
             <a:fld id="{603E95A3-71BD-4303-BDB5-8A36882C7B2B}" type="datetime1">
               <a:rPr lang="en-US" smtClean="0"/>
               <a:pPr/>
-              <a:t>7/20/2011</a:t>
+              <a:t>7/26/2011</a:t>
             </a:fld>
             <a:endParaRPr lang="en-GB"/>
           </a:p>
@@ -1848,7 +1853,7 @@
             <a:fld id="{DA3AB10B-EC00-4A9D-ADD6-A8B68613B4D2}" type="datetime1">
               <a:rPr lang="en-US" smtClean="0"/>
               <a:pPr/>
-              <a:t>7/20/2011</a:t>
+              <a:t>7/26/2011</a:t>
             </a:fld>
             <a:endParaRPr lang="en-GB"/>
           </a:p>
@@ -1980,7 +1985,7 @@
             <a:fld id="{EA5D455B-ECD0-44E3-BA0C-3649A3FCD15C}" type="datetime1">
               <a:rPr lang="en-US" smtClean="0"/>
               <a:pPr/>
-              <a:t>7/20/2011</a:t>
+              <a:t>7/26/2011</a:t>
             </a:fld>
             <a:endParaRPr lang="en-GB"/>
           </a:p>
@@ -2076,7 +2081,7 @@
             <a:fld id="{F83BA156-88F6-4A85-BCB0-63F0774EAEDC}" type="datetime1">
               <a:rPr lang="en-US" smtClean="0"/>
               <a:pPr/>
-              <a:t>7/20/2011</a:t>
+              <a:t>7/26/2011</a:t>
             </a:fld>
             <a:endParaRPr lang="en-GB"/>
           </a:p>
@@ -2360,7 +2365,7 @@
             <a:fld id="{044DBA34-05AD-44A3-A0F1-C917A9CE0E42}" type="datetime1">
               <a:rPr lang="en-US" smtClean="0"/>
               <a:pPr/>
-              <a:t>7/20/2011</a:t>
+              <a:t>7/26/2011</a:t>
             </a:fld>
             <a:endParaRPr lang="en-GB"/>
           </a:p>
@@ -2624,7 +2629,7 @@
             <a:fld id="{3FDD57B1-846D-42C4-9FE3-5B43FAB1C846}" type="datetime1">
               <a:rPr lang="en-US" smtClean="0"/>
               <a:pPr/>
-              <a:t>7/20/2011</a:t>
+              <a:t>7/26/2011</a:t>
             </a:fld>
             <a:endParaRPr lang="en-GB"/>
           </a:p>
@@ -2776,7 +2781,7 @@
             <a:fld id="{8EDAB77D-6898-4F92-AE07-90DBD2DF1995}" type="datetime1">
               <a:rPr lang="en-US" smtClean="0"/>
               <a:pPr/>
-              <a:t>7/20/2011</a:t>
+              <a:t>7/26/2011</a:t>
             </a:fld>
             <a:endParaRPr lang="en-GB" dirty="0"/>
           </a:p>
@@ -3337,7 +3342,7 @@
             <a:fld id="{ADB3C27C-C00A-40F0-A166-0452DE5EF4FD}" type="datetime1">
               <a:rPr lang="en-US" smtClean="0"/>
               <a:pPr/>
-              <a:t>7/20/2011</a:t>
+              <a:t>7/26/2011</a:t>
             </a:fld>
             <a:endParaRPr lang="en-GB"/>
           </a:p>
@@ -3511,7 +3516,7 @@
             <a:fld id="{EA5D455B-ECD0-44E3-BA0C-3649A3FCD15C}" type="datetime1">
               <a:rPr lang="en-US" smtClean="0"/>
               <a:pPr/>
-              <a:t>7/20/2011</a:t>
+              <a:t>7/26/2011</a:t>
             </a:fld>
             <a:endParaRPr lang="en-GB"/>
           </a:p>
@@ -3567,7 +3572,7 @@
     </p:spTree>
     <p:extLst>
       <p:ext uri="{BB962C8B-B14F-4D97-AF65-F5344CB8AC3E}">
-        <p14:creationId xmlns:p14="http://schemas.microsoft.com/office/powerpoint/2010/main" xmlns="" val="3728461749"/>
+        <p14:creationId xmlns="" xmlns:p14="http://schemas.microsoft.com/office/powerpoint/2010/main" val="3728461749"/>
       </p:ext>
     </p:extLst>
   </p:cSld>
@@ -3689,7 +3694,7 @@
             <a:fld id="{CDAEE9B0-25E7-4C28-AF1D-B3DDCE7EBBDB}" type="datetime1">
               <a:rPr lang="en-US" smtClean="0"/>
               <a:pPr/>
-              <a:t>7/20/2011</a:t>
+              <a:t>7/26/2011</a:t>
             </a:fld>
             <a:endParaRPr lang="en-GB"/>
           </a:p>
@@ -3745,7 +3750,7 @@
     </p:spTree>
     <p:extLst>
       <p:ext uri="{BB962C8B-B14F-4D97-AF65-F5344CB8AC3E}">
-        <p14:creationId xmlns:p14="http://schemas.microsoft.com/office/powerpoint/2010/main" xmlns="" val="3573922916"/>
+        <p14:creationId xmlns="" xmlns:p14="http://schemas.microsoft.com/office/powerpoint/2010/main" val="3573922916"/>
       </p:ext>
     </p:extLst>
   </p:cSld>
@@ -3853,7 +3858,7 @@
             <a:fld id="{CDAEE9B0-25E7-4C28-AF1D-B3DDCE7EBBDB}" type="datetime1">
               <a:rPr lang="en-US" smtClean="0"/>
               <a:pPr/>
-              <a:t>7/20/2011</a:t>
+              <a:t>7/26/2011</a:t>
             </a:fld>
             <a:endParaRPr lang="en-GB"/>
           </a:p>
@@ -3909,7 +3914,7 @@
     </p:spTree>
     <p:extLst>
       <p:ext uri="{BB962C8B-B14F-4D97-AF65-F5344CB8AC3E}">
-        <p14:creationId xmlns:p14="http://schemas.microsoft.com/office/powerpoint/2010/main" xmlns="" val="2108512158"/>
+        <p14:creationId xmlns="" xmlns:p14="http://schemas.microsoft.com/office/powerpoint/2010/main" val="2108512158"/>
       </p:ext>
     </p:extLst>
   </p:cSld>
@@ -4012,7 +4017,7 @@
             <a:fld id="{CDAEE9B0-25E7-4C28-AF1D-B3DDCE7EBBDB}" type="datetime1">
               <a:rPr lang="en-US" smtClean="0"/>
               <a:pPr/>
-              <a:t>7/20/2011</a:t>
+              <a:t>7/26/2011</a:t>
             </a:fld>
             <a:endParaRPr lang="en-GB" dirty="0"/>
           </a:p>
@@ -4068,7 +4073,7 @@
     </p:spTree>
     <p:extLst>
       <p:ext uri="{BB962C8B-B14F-4D97-AF65-F5344CB8AC3E}">
-        <p14:creationId xmlns:p14="http://schemas.microsoft.com/office/powerpoint/2010/main" xmlns="" val="3738179165"/>
+        <p14:creationId xmlns="" xmlns:p14="http://schemas.microsoft.com/office/powerpoint/2010/main" val="3738179165"/>
       </p:ext>
     </p:extLst>
   </p:cSld>
@@ -4197,7 +4202,7 @@
             <a:fld id="{CDAEE9B0-25E7-4C28-AF1D-B3DDCE7EBBDB}" type="datetime1">
               <a:rPr lang="en-US" smtClean="0"/>
               <a:pPr/>
-              <a:t>7/20/2011</a:t>
+              <a:t>7/26/2011</a:t>
             </a:fld>
             <a:endParaRPr lang="en-GB"/>
           </a:p>
@@ -4253,7 +4258,7 @@
     </p:spTree>
     <p:extLst>
       <p:ext uri="{BB962C8B-B14F-4D97-AF65-F5344CB8AC3E}">
-        <p14:creationId xmlns:p14="http://schemas.microsoft.com/office/powerpoint/2010/main" xmlns="" val="1957182481"/>
+        <p14:creationId xmlns="" xmlns:p14="http://schemas.microsoft.com/office/powerpoint/2010/main" val="1957182481"/>
       </p:ext>
     </p:extLst>
   </p:cSld>
@@ -4384,7 +4389,7 @@
             <a:fld id="{CDAEE9B0-25E7-4C28-AF1D-B3DDCE7EBBDB}" type="datetime1">
               <a:rPr lang="en-US" smtClean="0"/>
               <a:pPr/>
-              <a:t>7/20/2011</a:t>
+              <a:t>7/26/2011</a:t>
             </a:fld>
             <a:endParaRPr lang="en-GB"/>
           </a:p>
@@ -4440,7 +4445,7 @@
     </p:spTree>
     <p:extLst>
       <p:ext uri="{BB962C8B-B14F-4D97-AF65-F5344CB8AC3E}">
-        <p14:creationId xmlns:p14="http://schemas.microsoft.com/office/powerpoint/2010/main" xmlns="" val="2909703350"/>
+        <p14:creationId xmlns="" xmlns:p14="http://schemas.microsoft.com/office/powerpoint/2010/main" val="2909703350"/>
       </p:ext>
     </p:extLst>
   </p:cSld>
@@ -4547,7 +4552,7 @@
             <a:fld id="{CDAEE9B0-25E7-4C28-AF1D-B3DDCE7EBBDB}" type="datetime1">
               <a:rPr lang="en-US" smtClean="0"/>
               <a:pPr/>
-              <a:t>7/20/2011</a:t>
+              <a:t>7/26/2011</a:t>
             </a:fld>
             <a:endParaRPr lang="en-GB"/>
           </a:p>
@@ -4603,7 +4608,7 @@
     </p:spTree>
     <p:extLst>
       <p:ext uri="{BB962C8B-B14F-4D97-AF65-F5344CB8AC3E}">
-        <p14:creationId xmlns:p14="http://schemas.microsoft.com/office/powerpoint/2010/main" xmlns="" val="3472818035"/>
+        <p14:creationId xmlns="" xmlns:p14="http://schemas.microsoft.com/office/powerpoint/2010/main" val="3472818035"/>
       </p:ext>
     </p:extLst>
   </p:cSld>
@@ -4716,7 +4721,7 @@
             <a:fld id="{CDAEE9B0-25E7-4C28-AF1D-B3DDCE7EBBDB}" type="datetime1">
               <a:rPr lang="en-US" smtClean="0"/>
               <a:pPr/>
-              <a:t>7/20/2011</a:t>
+              <a:t>7/26/2011</a:t>
             </a:fld>
             <a:endParaRPr lang="en-GB"/>
           </a:p>
@@ -4772,7 +4777,7 @@
     </p:spTree>
     <p:extLst>
       <p:ext uri="{BB962C8B-B14F-4D97-AF65-F5344CB8AC3E}">
-        <p14:creationId xmlns:p14="http://schemas.microsoft.com/office/powerpoint/2010/main" xmlns="" val="1034858646"/>
+        <p14:creationId xmlns="" xmlns:p14="http://schemas.microsoft.com/office/powerpoint/2010/main" val="1034858646"/>
       </p:ext>
     </p:extLst>
   </p:cSld>
@@ -4894,7 +4899,7 @@
             <a:fld id="{CDAEE9B0-25E7-4C28-AF1D-B3DDCE7EBBDB}" type="datetime1">
               <a:rPr lang="en-US" smtClean="0"/>
               <a:pPr/>
-              <a:t>7/20/2011</a:t>
+              <a:t>7/26/2011</a:t>
             </a:fld>
             <a:endParaRPr lang="en-GB"/>
           </a:p>
@@ -4950,7 +4955,7 @@
     </p:spTree>
     <p:extLst>
       <p:ext uri="{BB962C8B-B14F-4D97-AF65-F5344CB8AC3E}">
-        <p14:creationId xmlns:p14="http://schemas.microsoft.com/office/powerpoint/2010/main" xmlns="" val="3849529298"/>
+        <p14:creationId xmlns="" xmlns:p14="http://schemas.microsoft.com/office/powerpoint/2010/main" val="3849529298"/>
       </p:ext>
     </p:extLst>
   </p:cSld>
@@ -5080,12 +5085,8 @@
           <a:p>
             <a:pPr lvl="1"/>
             <a:r>
-              <a:rPr lang="en-GB" dirty="0"/>
-              <a:t>I</a:t>
-            </a:r>
-            <a:r>
-              <a:rPr lang="en-GB" dirty="0" smtClean="0"/>
-              <a:t>f the parser is not ready in time it will be pushed back to the 0.5.1 minor release</a:t>
+              <a:rPr lang="en-GB" dirty="0" smtClean="0"/>
+              <a:t>Likely to be pushed back to 0.5.1 release due to time and work constraints</a:t>
             </a:r>
             <a:endParaRPr lang="en-GB" i="1" dirty="0"/>
           </a:p>
@@ -5109,7 +5110,7 @@
             <a:fld id="{CDAEE9B0-25E7-4C28-AF1D-B3DDCE7EBBDB}" type="datetime1">
               <a:rPr lang="en-US" smtClean="0"/>
               <a:pPr/>
-              <a:t>7/20/2011</a:t>
+              <a:t>7/26/2011</a:t>
             </a:fld>
             <a:endParaRPr lang="en-GB"/>
           </a:p>
@@ -5165,7 +5166,7 @@
     </p:spTree>
     <p:extLst>
       <p:ext uri="{BB962C8B-B14F-4D97-AF65-F5344CB8AC3E}">
-        <p14:creationId xmlns:p14="http://schemas.microsoft.com/office/powerpoint/2010/main" xmlns="" val="4093170207"/>
+        <p14:creationId xmlns="" xmlns:p14="http://schemas.microsoft.com/office/powerpoint/2010/main" val="4093170207"/>
       </p:ext>
     </p:extLst>
   </p:cSld>
@@ -5301,7 +5302,7 @@
             <a:fld id="{CDAEE9B0-25E7-4C28-AF1D-B3DDCE7EBBDB}" type="datetime1">
               <a:rPr lang="en-US" smtClean="0"/>
               <a:pPr/>
-              <a:t>7/20/2011</a:t>
+              <a:t>7/26/2011</a:t>
             </a:fld>
             <a:endParaRPr lang="en-GB"/>
           </a:p>
@@ -5357,7 +5358,7 @@
     </p:spTree>
     <p:extLst>
       <p:ext uri="{BB962C8B-B14F-4D97-AF65-F5344CB8AC3E}">
-        <p14:creationId xmlns:p14="http://schemas.microsoft.com/office/powerpoint/2010/main" xmlns="" val="2357537943"/>
+        <p14:creationId xmlns="" xmlns:p14="http://schemas.microsoft.com/office/powerpoint/2010/main" val="2357537943"/>
       </p:ext>
     </p:extLst>
   </p:cSld>
@@ -5479,7 +5480,7 @@
             <a:fld id="{CDAEE9B0-25E7-4C28-AF1D-B3DDCE7EBBDB}" type="datetime1">
               <a:rPr lang="en-US" smtClean="0"/>
               <a:pPr/>
-              <a:t>7/20/2011</a:t>
+              <a:t>7/26/2011</a:t>
             </a:fld>
             <a:endParaRPr lang="en-GB"/>
           </a:p>
@@ -5535,7 +5536,7 @@
     </p:spTree>
     <p:extLst>
       <p:ext uri="{BB962C8B-B14F-4D97-AF65-F5344CB8AC3E}">
-        <p14:creationId xmlns:p14="http://schemas.microsoft.com/office/powerpoint/2010/main" xmlns="" val="509411177"/>
+        <p14:creationId xmlns="" xmlns:p14="http://schemas.microsoft.com/office/powerpoint/2010/main" val="509411177"/>
       </p:ext>
     </p:extLst>
   </p:cSld>
@@ -5659,7 +5660,7 @@
             <a:fld id="{CDAEE9B0-25E7-4C28-AF1D-B3DDCE7EBBDB}" type="datetime1">
               <a:rPr lang="en-US" smtClean="0"/>
               <a:pPr/>
-              <a:t>7/20/2011</a:t>
+              <a:t>7/26/2011</a:t>
             </a:fld>
             <a:endParaRPr lang="en-GB"/>
           </a:p>
@@ -5715,7 +5716,7 @@
     </p:spTree>
     <p:extLst>
       <p:ext uri="{BB962C8B-B14F-4D97-AF65-F5344CB8AC3E}">
-        <p14:creationId xmlns:p14="http://schemas.microsoft.com/office/powerpoint/2010/main" xmlns="" val="673125997"/>
+        <p14:creationId xmlns="" xmlns:p14="http://schemas.microsoft.com/office/powerpoint/2010/main" val="673125997"/>
       </p:ext>
     </p:extLst>
   </p:cSld>
@@ -5813,7 +5814,7 @@
             <a:fld id="{CDAEE9B0-25E7-4C28-AF1D-B3DDCE7EBBDB}" type="datetime1">
               <a:rPr lang="en-US" smtClean="0"/>
               <a:pPr/>
-              <a:t>7/20/2011</a:t>
+              <a:t>7/26/2011</a:t>
             </a:fld>
             <a:endParaRPr lang="en-GB"/>
           </a:p>
@@ -5869,7 +5870,7 @@
     </p:spTree>
     <p:extLst>
       <p:ext uri="{BB962C8B-B14F-4D97-AF65-F5344CB8AC3E}">
-        <p14:creationId xmlns:p14="http://schemas.microsoft.com/office/powerpoint/2010/main" xmlns="" val="2964860377"/>
+        <p14:creationId xmlns="" xmlns:p14="http://schemas.microsoft.com/office/powerpoint/2010/main" val="2964860377"/>
       </p:ext>
     </p:extLst>
   </p:cSld>
@@ -6039,7 +6040,7 @@
             <a:fld id="{CDAEE9B0-25E7-4C28-AF1D-B3DDCE7EBBDB}" type="datetime1">
               <a:rPr lang="en-US" smtClean="0"/>
               <a:pPr/>
-              <a:t>7/20/2011</a:t>
+              <a:t>7/26/2011</a:t>
             </a:fld>
             <a:endParaRPr lang="en-GB"/>
           </a:p>
@@ -6095,7 +6096,7 @@
     </p:spTree>
     <p:extLst>
       <p:ext uri="{BB962C8B-B14F-4D97-AF65-F5344CB8AC3E}">
-        <p14:creationId xmlns:p14="http://schemas.microsoft.com/office/powerpoint/2010/main" xmlns="" val="322844269"/>
+        <p14:creationId xmlns="" xmlns:p14="http://schemas.microsoft.com/office/powerpoint/2010/main" val="322844269"/>
       </p:ext>
     </p:extLst>
   </p:cSld>
@@ -6148,7 +6149,7 @@
     </p:spTree>
     <p:extLst>
       <p:ext uri="{BB962C8B-B14F-4D97-AF65-F5344CB8AC3E}">
-        <p14:creationId xmlns:p14="http://schemas.microsoft.com/office/powerpoint/2010/main" xmlns="" val="798346359"/>
+        <p14:creationId xmlns="" xmlns:p14="http://schemas.microsoft.com/office/powerpoint/2010/main" val="798346359"/>
       </p:ext>
     </p:extLst>
   </p:cSld>
@@ -6280,7 +6281,7 @@
             <a:fld id="{EA5D455B-ECD0-44E3-BA0C-3649A3FCD15C}" type="datetime1">
               <a:rPr lang="en-US" smtClean="0"/>
               <a:pPr/>
-              <a:t>7/20/2011</a:t>
+              <a:t>7/26/2011</a:t>
             </a:fld>
             <a:endParaRPr lang="en-GB"/>
           </a:p>
@@ -6336,7 +6337,7 @@
     </p:spTree>
     <p:extLst>
       <p:ext uri="{BB962C8B-B14F-4D97-AF65-F5344CB8AC3E}">
-        <p14:creationId xmlns:p14="http://schemas.microsoft.com/office/powerpoint/2010/main" xmlns="" val="118536430"/>
+        <p14:creationId xmlns="" xmlns:p14="http://schemas.microsoft.com/office/powerpoint/2010/main" val="118536430"/>
       </p:ext>
     </p:extLst>
   </p:cSld>
@@ -6473,7 +6474,7 @@
             <a:fld id="{CDAEE9B0-25E7-4C28-AF1D-B3DDCE7EBBDB}" type="datetime1">
               <a:rPr lang="en-US" smtClean="0"/>
               <a:pPr/>
-              <a:t>7/20/2011</a:t>
+              <a:t>7/26/2011</a:t>
             </a:fld>
             <a:endParaRPr lang="en-GB"/>
           </a:p>
@@ -6529,7 +6530,7 @@
     </p:spTree>
     <p:extLst>
       <p:ext uri="{BB962C8B-B14F-4D97-AF65-F5344CB8AC3E}">
-        <p14:creationId xmlns:p14="http://schemas.microsoft.com/office/powerpoint/2010/main" xmlns="" val="299555438"/>
+        <p14:creationId xmlns="" xmlns:p14="http://schemas.microsoft.com/office/powerpoint/2010/main" val="299555438"/>
       </p:ext>
     </p:extLst>
   </p:cSld>
@@ -6604,6 +6605,31 @@
               <a:rPr lang="en-GB" dirty="0" smtClean="0"/>
               <a:t>validation</a:t>
             </a:r>
+          </a:p>
+          <a:p>
+            <a:r>
+              <a:rPr lang="en-GB" i="1" dirty="0" smtClean="0"/>
+              <a:t>Time Permitting Feature</a:t>
+            </a:r>
+            <a:r>
+              <a:rPr lang="en-GB" dirty="0" smtClean="0"/>
+              <a:t> – May be altered to start using the new </a:t>
+            </a:r>
+            <a:r>
+              <a:rPr lang="en-GB" dirty="0" err="1" smtClean="0"/>
+              <a:t>rdfEditor.Core.dll</a:t>
+            </a:r>
+            <a:r>
+              <a:rPr lang="en-GB" dirty="0" smtClean="0"/>
+              <a:t> backend</a:t>
+            </a:r>
+          </a:p>
+          <a:p>
+            <a:pPr lvl="1"/>
+            <a:r>
+              <a:rPr lang="en-GB" dirty="0" smtClean="0"/>
+              <a:t>Unlikely to be in immediate next release given current time and work constraints</a:t>
+            </a:r>
             <a:endParaRPr lang="en-GB" dirty="0" smtClean="0"/>
           </a:p>
         </p:txBody>
@@ -6626,7 +6652,7 @@
             <a:fld id="{CDAEE9B0-25E7-4C28-AF1D-B3DDCE7EBBDB}" type="datetime1">
               <a:rPr lang="en-US" smtClean="0"/>
               <a:pPr/>
-              <a:t>7/20/2011</a:t>
+              <a:t>7/26/2011</a:t>
             </a:fld>
             <a:endParaRPr lang="en-GB"/>
           </a:p>
@@ -6682,7 +6708,7 @@
     </p:spTree>
     <p:extLst>
       <p:ext uri="{BB962C8B-B14F-4D97-AF65-F5344CB8AC3E}">
-        <p14:creationId xmlns:p14="http://schemas.microsoft.com/office/powerpoint/2010/main" xmlns="" val="1002032322"/>
+        <p14:creationId xmlns="" xmlns:p14="http://schemas.microsoft.com/office/powerpoint/2010/main" val="1002032322"/>
       </p:ext>
     </p:extLst>
   </p:cSld>
@@ -6789,7 +6815,7 @@
             <a:fld id="{CDAEE9B0-25E7-4C28-AF1D-B3DDCE7EBBDB}" type="datetime1">
               <a:rPr lang="en-US" smtClean="0"/>
               <a:pPr/>
-              <a:t>7/20/2011</a:t>
+              <a:t>7/26/2011</a:t>
             </a:fld>
             <a:endParaRPr lang="en-GB"/>
           </a:p>
@@ -6845,7 +6871,7 @@
     </p:spTree>
     <p:extLst>
       <p:ext uri="{BB962C8B-B14F-4D97-AF65-F5344CB8AC3E}">
-        <p14:creationId xmlns:p14="http://schemas.microsoft.com/office/powerpoint/2010/main" xmlns="" val="1473382163"/>
+        <p14:creationId xmlns="" xmlns:p14="http://schemas.microsoft.com/office/powerpoint/2010/main" val="1473382163"/>
       </p:ext>
     </p:extLst>
   </p:cSld>
@@ -6891,6 +6917,10 @@
               <a:rPr lang="en-GB" dirty="0" err="1" smtClean="0"/>
               <a:t>StoreManager</a:t>
             </a:r>
+            <a:r>
+              <a:rPr lang="en-GB" dirty="0" smtClean="0"/>
+              <a:t> (1 of 2)</a:t>
+            </a:r>
             <a:endParaRPr lang="en-GB" dirty="0"/>
           </a:p>
         </p:txBody>
@@ -6914,8 +6944,17 @@
           <a:p>
             <a:r>
               <a:rPr lang="en-GB" dirty="0" smtClean="0"/>
-              <a:t>Support for new stores</a:t>
-            </a:r>
+              <a:t>Support for new </a:t>
+            </a:r>
+            <a:r>
+              <a:rPr lang="en-GB" dirty="0" smtClean="0"/>
+              <a:t>stores and </a:t>
+            </a:r>
+            <a:r>
+              <a:rPr lang="en-GB" dirty="0" smtClean="0"/>
+              <a:t>improvements for some existing stores</a:t>
+            </a:r>
+            <a:endParaRPr lang="en-GB" dirty="0" smtClean="0"/>
           </a:p>
           <a:p>
             <a:pPr lvl="1"/>
@@ -6930,42 +6969,31 @@
             <a:endParaRPr lang="en-GB" dirty="0" smtClean="0"/>
           </a:p>
           <a:p>
-            <a:r>
-              <a:rPr lang="en-GB" dirty="0" smtClean="0"/>
-              <a:t>Improved </a:t>
-            </a:r>
+            <a:pPr lvl="1"/>
             <a:r>
               <a:rPr lang="en-GB" dirty="0" err="1" smtClean="0"/>
               <a:t>AllegroGraph</a:t>
             </a:r>
             <a:r>
               <a:rPr lang="en-GB" dirty="0" smtClean="0"/>
-              <a:t> 4.x support</a:t>
-            </a:r>
-          </a:p>
-          <a:p>
-            <a:r>
-              <a:rPr lang="en-GB" dirty="0" smtClean="0"/>
-              <a:t>Will use the handler subsystem extensions in the core library to:</a:t>
+              <a:t> 4.x root </a:t>
+            </a:r>
+            <a:r>
+              <a:rPr lang="en-GB" dirty="0" err="1" smtClean="0"/>
+              <a:t>catalog</a:t>
+            </a:r>
+            <a:r>
+              <a:rPr lang="en-GB" dirty="0" smtClean="0"/>
+              <a:t> support</a:t>
             </a:r>
           </a:p>
           <a:p>
             <a:pPr lvl="1"/>
             <a:r>
-              <a:rPr lang="en-GB" dirty="0"/>
-              <a:t>I</a:t>
-            </a:r>
-            <a:r>
-              <a:rPr lang="en-GB" dirty="0" smtClean="0"/>
-              <a:t>mprove export speed when possible</a:t>
-            </a:r>
-          </a:p>
-          <a:p>
-            <a:pPr lvl="1"/>
-            <a:r>
-              <a:rPr lang="en-GB" dirty="0" smtClean="0"/>
-              <a:t>Provide a preview graph function which returns the first 100 triples of a graph</a:t>
-            </a:r>
+              <a:rPr lang="en-GB" dirty="0" smtClean="0"/>
+              <a:t>Support for configuring Stardog reasoning</a:t>
+            </a:r>
+            <a:endParaRPr lang="en-GB" dirty="0" smtClean="0"/>
           </a:p>
         </p:txBody>
       </p:sp>
@@ -6987,7 +7015,7 @@
             <a:fld id="{CDAEE9B0-25E7-4C28-AF1D-B3DDCE7EBBDB}" type="datetime1">
               <a:rPr lang="en-US" smtClean="0"/>
               <a:pPr/>
-              <a:t>7/20/2011</a:t>
+              <a:t>7/26/2011</a:t>
             </a:fld>
             <a:endParaRPr lang="en-GB"/>
           </a:p>
@@ -7043,7 +7071,7 @@
     </p:spTree>
     <p:extLst>
       <p:ext uri="{BB962C8B-B14F-4D97-AF65-F5344CB8AC3E}">
-        <p14:creationId xmlns:p14="http://schemas.microsoft.com/office/powerpoint/2010/main" xmlns="" val="370317736"/>
+        <p14:creationId xmlns="" xmlns:p14="http://schemas.microsoft.com/office/powerpoint/2010/main" val="370317736"/>
       </p:ext>
     </p:extLst>
   </p:cSld>
@@ -7150,7 +7178,11 @@
             </a:pPr>
             <a:r>
               <a:rPr lang="en-GB" dirty="0" smtClean="0"/>
-              <a:t>Get Involved</a:t>
+              <a:t>Getting </a:t>
+            </a:r>
+            <a:r>
+              <a:rPr lang="en-GB" dirty="0" smtClean="0"/>
+              <a:t>Involved</a:t>
             </a:r>
           </a:p>
           <a:p>
@@ -7181,7 +7213,7 @@
             <a:fld id="{CDAEE9B0-25E7-4C28-AF1D-B3DDCE7EBBDB}" type="datetime1">
               <a:rPr lang="en-US" smtClean="0"/>
               <a:pPr/>
-              <a:t>7/20/2011</a:t>
+              <a:t>7/26/2011</a:t>
             </a:fld>
             <a:endParaRPr lang="en-GB"/>
           </a:p>
@@ -7237,7 +7269,7 @@
     </p:spTree>
     <p:extLst>
       <p:ext uri="{BB962C8B-B14F-4D97-AF65-F5344CB8AC3E}">
-        <p14:creationId xmlns:p14="http://schemas.microsoft.com/office/powerpoint/2010/main" xmlns="" val="3702788433"/>
+        <p14:creationId xmlns="" xmlns:p14="http://schemas.microsoft.com/office/powerpoint/2010/main" val="3702788433"/>
       </p:ext>
     </p:extLst>
   </p:cSld>
@@ -7266,7 +7298,7 @@
       </p:grpSpPr>
       <p:sp>
         <p:nvSpPr>
-          <p:cNvPr id="2" name="Title 1"/>
+          <p:cNvPr id="6" name="Title 5"/>
           <p:cNvSpPr>
             <a:spLocks noGrp="1"/>
           </p:cNvSpPr>
@@ -7281,8 +7313,47 @@
           <a:p>
             <a:r>
               <a:rPr lang="en-GB" dirty="0" smtClean="0"/>
-              <a:t>Architecture Roadmap</a:t>
-            </a:r>
+              <a:t>Store Manager (2 of 2)</a:t>
+            </a:r>
+            <a:endParaRPr lang="en-GB" dirty="0"/>
+          </a:p>
+        </p:txBody>
+      </p:sp>
+      <p:sp>
+        <p:nvSpPr>
+          <p:cNvPr id="7" name="Content Placeholder 6"/>
+          <p:cNvSpPr>
+            <a:spLocks noGrp="1"/>
+          </p:cNvSpPr>
+          <p:nvPr>
+            <p:ph idx="1"/>
+          </p:nvPr>
+        </p:nvSpPr>
+        <p:spPr/>
+        <p:txBody>
+          <a:bodyPr/>
+          <a:lstStyle/>
+          <a:p>
+            <a:r>
+              <a:rPr lang="en-GB" dirty="0" smtClean="0"/>
+              <a:t>Will use the handler subsystem extensions in the core library to:</a:t>
+            </a:r>
+          </a:p>
+          <a:p>
+            <a:pPr lvl="1"/>
+            <a:r>
+              <a:rPr lang="en-GB" dirty="0" smtClean="0"/>
+              <a:t>Improve export speed when possible</a:t>
+            </a:r>
+          </a:p>
+          <a:p>
+            <a:pPr lvl="1"/>
+            <a:r>
+              <a:rPr lang="en-GB" dirty="0" smtClean="0"/>
+              <a:t>Provide a preview graph function which returns the first 100 triples of a graph</a:t>
+            </a:r>
+          </a:p>
+          <a:p>
             <a:endParaRPr lang="en-GB" dirty="0"/>
           </a:p>
         </p:txBody>
@@ -7305,7 +7376,7 @@
             <a:fld id="{EA5D455B-ECD0-44E3-BA0C-3649A3FCD15C}" type="datetime1">
               <a:rPr lang="en-US" smtClean="0"/>
               <a:pPr/>
-              <a:t>7/20/2011</a:t>
+              <a:t>7/26/2011</a:t>
             </a:fld>
             <a:endParaRPr lang="en-GB"/>
           </a:p>
@@ -7359,11 +7430,6 @@
         </p:txBody>
       </p:sp>
     </p:spTree>
-    <p:extLst>
-      <p:ext uri="{BB962C8B-B14F-4D97-AF65-F5344CB8AC3E}">
-        <p14:creationId xmlns:p14="http://schemas.microsoft.com/office/powerpoint/2010/main" xmlns="" val="106888204"/>
-      </p:ext>
-    </p:extLst>
   </p:cSld>
   <p:clrMapOvr>
     <a:masterClrMapping/>
@@ -7390,7 +7456,7 @@
       </p:grpSpPr>
       <p:sp>
         <p:nvSpPr>
-          <p:cNvPr id="6" name="Title 5"/>
+          <p:cNvPr id="2" name="Title 1"/>
           <p:cNvSpPr>
             <a:spLocks noGrp="1"/>
           </p:cNvSpPr>
@@ -7405,45 +7471,9 @@
           <a:p>
             <a:r>
               <a:rPr lang="en-GB" dirty="0" smtClean="0"/>
-              <a:t>Current Architecture</a:t>
+              <a:t>Architecture Roadmap</a:t>
             </a:r>
             <a:endParaRPr lang="en-GB" dirty="0"/>
-          </a:p>
-        </p:txBody>
-      </p:sp>
-      <p:sp>
-        <p:nvSpPr>
-          <p:cNvPr id="7" name="Content Placeholder 6"/>
-          <p:cNvSpPr>
-            <a:spLocks noGrp="1"/>
-          </p:cNvSpPr>
-          <p:nvPr>
-            <p:ph idx="1"/>
-          </p:nvPr>
-        </p:nvSpPr>
-        <p:spPr/>
-        <p:txBody>
-          <a:bodyPr/>
-          <a:lstStyle/>
-          <a:p>
-            <a:r>
-              <a:rPr lang="en-GB" dirty="0" smtClean="0"/>
-              <a:t>Currently the core library is a single library which is not ideal design going forward</a:t>
-            </a:r>
-          </a:p>
-          <a:p>
-            <a:r>
-              <a:rPr lang="en-GB" dirty="0" smtClean="0"/>
-              <a:t>Some features already reside in external libraries e.g. </a:t>
-            </a:r>
-            <a:r>
-              <a:rPr lang="en-GB" dirty="0" err="1" smtClean="0"/>
-              <a:t>dotNetRDF.WinForms</a:t>
-            </a:r>
-            <a:r>
-              <a:rPr lang="en-GB" dirty="0" smtClean="0"/>
-              <a:t> provides common functionality for Windows Forms GUIs</a:t>
-            </a:r>
           </a:p>
         </p:txBody>
       </p:sp>
@@ -7465,7 +7495,7 @@
             <a:fld id="{EA5D455B-ECD0-44E3-BA0C-3649A3FCD15C}" type="datetime1">
               <a:rPr lang="en-US" smtClean="0"/>
               <a:pPr/>
-              <a:t>7/20/2011</a:t>
+              <a:t>7/26/2011</a:t>
             </a:fld>
             <a:endParaRPr lang="en-GB"/>
           </a:p>
@@ -7521,7 +7551,7 @@
     </p:spTree>
     <p:extLst>
       <p:ext uri="{BB962C8B-B14F-4D97-AF65-F5344CB8AC3E}">
-        <p14:creationId xmlns:p14="http://schemas.microsoft.com/office/powerpoint/2010/main" xmlns="" val="1934465878"/>
+        <p14:creationId xmlns="" xmlns:p14="http://schemas.microsoft.com/office/powerpoint/2010/main" val="106888204"/>
       </p:ext>
     </p:extLst>
   </p:cSld>
@@ -7550,7 +7580,7 @@
       </p:grpSpPr>
       <p:sp>
         <p:nvSpPr>
-          <p:cNvPr id="2" name="Title 1"/>
+          <p:cNvPr id="6" name="Title 5"/>
           <p:cNvSpPr>
             <a:spLocks noGrp="1"/>
           </p:cNvSpPr>
@@ -7565,7 +7595,7 @@
           <a:p>
             <a:r>
               <a:rPr lang="en-GB" dirty="0" smtClean="0"/>
-              <a:t>Proposed Architecture</a:t>
+              <a:t>Current Architecture</a:t>
             </a:r>
             <a:endParaRPr lang="en-GB" dirty="0"/>
           </a:p>
@@ -7573,7 +7603,7 @@
       </p:sp>
       <p:sp>
         <p:nvSpPr>
-          <p:cNvPr id="3" name="Content Placeholder 2"/>
+          <p:cNvPr id="7" name="Content Placeholder 6"/>
           <p:cNvSpPr>
             <a:spLocks noGrp="1"/>
           </p:cNvSpPr>
@@ -7583,48 +7613,33 @@
         </p:nvSpPr>
         <p:spPr/>
         <p:txBody>
-          <a:bodyPr>
-            <a:normAutofit fontScale="92500" lnSpcReduction="20000"/>
-          </a:bodyPr>
-          <a:lstStyle/>
-          <a:p>
-            <a:r>
-              <a:rPr lang="en-GB" dirty="0" smtClean="0"/>
-              <a:t>As new features are added it should be considered carefully whether they are really core features</a:t>
-            </a:r>
-          </a:p>
-          <a:p>
-            <a:pPr lvl="1"/>
-            <a:r>
-              <a:rPr lang="en-GB" dirty="0" smtClean="0"/>
-              <a:t>Core Features should stay in the core library</a:t>
-            </a:r>
-          </a:p>
-          <a:p>
-            <a:pPr lvl="1"/>
-            <a:r>
-              <a:rPr lang="en-GB" dirty="0" smtClean="0"/>
-              <a:t>Non-core features should go into dedicated libraries</a:t>
-            </a:r>
-          </a:p>
-          <a:p>
-            <a:r>
-              <a:rPr lang="en-GB" dirty="0" smtClean="0"/>
-              <a:t>This will help to stop dependency bloat as new features are added</a:t>
-            </a:r>
-          </a:p>
-          <a:p>
-            <a:r>
-              <a:rPr lang="en-GB" dirty="0" smtClean="0"/>
-              <a:t>Also improves maintainability of code and features</a:t>
-            </a:r>
-            <a:endParaRPr lang="en-GB" dirty="0"/>
-          </a:p>
-        </p:txBody>
-      </p:sp>
-      <p:sp>
-        <p:nvSpPr>
-          <p:cNvPr id="4" name="Date Placeholder 3"/>
+          <a:bodyPr/>
+          <a:lstStyle/>
+          <a:p>
+            <a:r>
+              <a:rPr lang="en-GB" dirty="0" smtClean="0"/>
+              <a:t>Currently the core library is a single library which is not ideal design going forward</a:t>
+            </a:r>
+          </a:p>
+          <a:p>
+            <a:r>
+              <a:rPr lang="en-GB" dirty="0" smtClean="0"/>
+              <a:t>Some features already reside in external libraries e.g. </a:t>
+            </a:r>
+            <a:r>
+              <a:rPr lang="en-GB" dirty="0" err="1" smtClean="0"/>
+              <a:t>dotNetRDF.WinForms</a:t>
+            </a:r>
+            <a:r>
+              <a:rPr lang="en-GB" dirty="0" smtClean="0"/>
+              <a:t> provides common functionality for Windows Forms GUIs</a:t>
+            </a:r>
+          </a:p>
+        </p:txBody>
+      </p:sp>
+      <p:sp>
+        <p:nvSpPr>
+          <p:cNvPr id="3" name="Date Placeholder 2"/>
           <p:cNvSpPr>
             <a:spLocks noGrp="1"/>
           </p:cNvSpPr>
@@ -7637,10 +7652,10 @@
           <a:bodyPr/>
           <a:lstStyle/>
           <a:p>
-            <a:fld id="{CDAEE9B0-25E7-4C28-AF1D-B3DDCE7EBBDB}" type="datetime1">
+            <a:fld id="{EA5D455B-ECD0-44E3-BA0C-3649A3FCD15C}" type="datetime1">
               <a:rPr lang="en-US" smtClean="0"/>
               <a:pPr/>
-              <a:t>7/20/2011</a:t>
+              <a:t>7/26/2011</a:t>
             </a:fld>
             <a:endParaRPr lang="en-GB"/>
           </a:p>
@@ -7648,7 +7663,7 @@
       </p:sp>
       <p:sp>
         <p:nvSpPr>
-          <p:cNvPr id="5" name="Footer Placeholder 4"/>
+          <p:cNvPr id="4" name="Footer Placeholder 3"/>
           <p:cNvSpPr>
             <a:spLocks noGrp="1"/>
           </p:cNvSpPr>
@@ -7671,7 +7686,7 @@
       </p:sp>
       <p:sp>
         <p:nvSpPr>
-          <p:cNvPr id="6" name="Slide Number Placeholder 5"/>
+          <p:cNvPr id="5" name="Slide Number Placeholder 4"/>
           <p:cNvSpPr>
             <a:spLocks noGrp="1"/>
           </p:cNvSpPr>
@@ -7696,7 +7711,7 @@
     </p:spTree>
     <p:extLst>
       <p:ext uri="{BB962C8B-B14F-4D97-AF65-F5344CB8AC3E}">
-        <p14:creationId xmlns:p14="http://schemas.microsoft.com/office/powerpoint/2010/main" xmlns="" val="3933745380"/>
+        <p14:creationId xmlns="" xmlns:p14="http://schemas.microsoft.com/office/powerpoint/2010/main" val="1934465878"/>
       </p:ext>
     </p:extLst>
   </p:cSld>
@@ -7740,7 +7755,7 @@
           <a:p>
             <a:r>
               <a:rPr lang="en-GB" dirty="0" smtClean="0"/>
-              <a:t>What constitutes a Core Feature?</a:t>
+              <a:t>Architectural Goals</a:t>
             </a:r>
             <a:endParaRPr lang="en-GB" dirty="0"/>
           </a:p>
@@ -7758,62 +7773,33 @@
         </p:nvSpPr>
         <p:spPr/>
         <p:txBody>
-          <a:bodyPr>
-            <a:normAutofit fontScale="85000" lnSpcReduction="20000"/>
-          </a:bodyPr>
-          <a:lstStyle/>
-          <a:p>
-            <a:r>
-              <a:rPr lang="en-GB" dirty="0" smtClean="0"/>
-              <a:t>Core Features:</a:t>
+          <a:bodyPr/>
+          <a:lstStyle/>
+          <a:p>
+            <a:r>
+              <a:rPr lang="en-GB" dirty="0" smtClean="0"/>
+              <a:t>The architecture should continue ensure the following:</a:t>
             </a:r>
           </a:p>
           <a:p>
             <a:pPr lvl="1"/>
             <a:r>
               <a:rPr lang="en-GB" dirty="0" smtClean="0"/>
-              <a:t>Adds to/improve capability of a specific subsystem</a:t>
+              <a:t>Plenty of extension points</a:t>
             </a:r>
           </a:p>
           <a:p>
             <a:pPr lvl="1"/>
             <a:r>
               <a:rPr lang="en-GB" dirty="0" smtClean="0"/>
-              <a:t>Unless providing major new capabilities which are highly desirable to all users they should not constitute an entirely new subsystem</a:t>
+              <a:t>Ability to drop in replacements for most components</a:t>
             </a:r>
           </a:p>
           <a:p>
             <a:pPr lvl="1"/>
             <a:r>
               <a:rPr lang="en-GB" dirty="0" smtClean="0"/>
-              <a:t>Does not require additional dependencies</a:t>
-            </a:r>
-          </a:p>
-          <a:p>
-            <a:r>
-              <a:rPr lang="en-GB" dirty="0" smtClean="0"/>
-              <a:t>Non Core Features:</a:t>
-            </a:r>
-          </a:p>
-          <a:p>
-            <a:pPr lvl="1"/>
-            <a:r>
-              <a:rPr lang="en-GB" dirty="0" smtClean="0"/>
-              <a:t>Provides an entirely new subsystem</a:t>
-            </a:r>
-          </a:p>
-          <a:p>
-            <a:pPr lvl="1"/>
-            <a:r>
-              <a:rPr lang="en-GB" dirty="0" smtClean="0"/>
-              <a:t>Is only of interest to part of the user base</a:t>
-            </a:r>
-          </a:p>
-          <a:p>
-            <a:pPr lvl="1"/>
-            <a:r>
-              <a:rPr lang="en-GB" dirty="0" smtClean="0"/>
-              <a:t>Introduce new dependencies</a:t>
+              <a:t>Not burden the user with large quantities of dependencies</a:t>
             </a:r>
             <a:endParaRPr lang="en-GB" dirty="0"/>
           </a:p>
@@ -7837,7 +7823,7 @@
             <a:fld id="{CDAEE9B0-25E7-4C28-AF1D-B3DDCE7EBBDB}" type="datetime1">
               <a:rPr lang="en-US" smtClean="0"/>
               <a:pPr/>
-              <a:t>7/20/2011</a:t>
+              <a:t>7/26/2011</a:t>
             </a:fld>
             <a:endParaRPr lang="en-GB"/>
           </a:p>
@@ -7891,11 +7877,6 @@
         </p:txBody>
       </p:sp>
     </p:spTree>
-    <p:extLst>
-      <p:ext uri="{BB962C8B-B14F-4D97-AF65-F5344CB8AC3E}">
-        <p14:creationId xmlns:p14="http://schemas.microsoft.com/office/powerpoint/2010/main" xmlns="" val="4089701815"/>
-      </p:ext>
-    </p:extLst>
   </p:cSld>
   <p:clrMapOvr>
     <a:masterClrMapping/>
@@ -7937,7 +7918,7 @@
           <a:p>
             <a:r>
               <a:rPr lang="en-GB" dirty="0" smtClean="0"/>
-              <a:t>Proposed Architecture in practise (1 of 2)</a:t>
+              <a:t>Proposed Architecture</a:t>
             </a:r>
             <a:endParaRPr lang="en-GB" dirty="0"/>
           </a:p>
@@ -7956,33 +7937,39 @@
         <p:spPr/>
         <p:txBody>
           <a:bodyPr>
-            <a:normAutofit fontScale="92500"/>
+            <a:normAutofit fontScale="92500" lnSpcReduction="20000"/>
           </a:bodyPr>
           <a:lstStyle/>
           <a:p>
             <a:r>
               <a:rPr lang="en-GB" dirty="0" smtClean="0"/>
-              <a:t>It is proposed that the new ADO Store be packaged in a separate library</a:t>
+              <a:t>As new features are added it should be considered carefully whether they are really core features</a:t>
             </a:r>
           </a:p>
           <a:p>
             <a:pPr lvl="1"/>
             <a:r>
               <a:rPr lang="en-GB" dirty="0" smtClean="0"/>
-              <a:t>Will reduce the need for dependencies in the core library</a:t>
+              <a:t>Core Features should stay in the core library</a:t>
             </a:r>
           </a:p>
           <a:p>
             <a:pPr lvl="1"/>
             <a:r>
               <a:rPr lang="en-GB" dirty="0" smtClean="0"/>
-              <a:t>Allows additional implementations other than MSSQL to be added in future with their dependencies</a:t>
-            </a:r>
-          </a:p>
-          <a:p>
-            <a:r>
-              <a:rPr lang="en-GB" dirty="0" smtClean="0"/>
-              <a:t>Make it easier to maintain and those who don’t need the features get a smaller library footprint</a:t>
+              <a:t>Non-core features should go into dedicated libraries</a:t>
+            </a:r>
+          </a:p>
+          <a:p>
+            <a:r>
+              <a:rPr lang="en-GB" dirty="0" smtClean="0"/>
+              <a:t>This will help to stop dependency bloat as new features are added</a:t>
+            </a:r>
+          </a:p>
+          <a:p>
+            <a:r>
+              <a:rPr lang="en-GB" dirty="0" smtClean="0"/>
+              <a:t>Also improves maintainability of code and features</a:t>
             </a:r>
             <a:endParaRPr lang="en-GB" dirty="0"/>
           </a:p>
@@ -8006,7 +7993,7 @@
             <a:fld id="{CDAEE9B0-25E7-4C28-AF1D-B3DDCE7EBBDB}" type="datetime1">
               <a:rPr lang="en-US" smtClean="0"/>
               <a:pPr/>
-              <a:t>7/20/2011</a:t>
+              <a:t>7/26/2011</a:t>
             </a:fld>
             <a:endParaRPr lang="en-GB"/>
           </a:p>
@@ -8062,7 +8049,7 @@
     </p:spTree>
     <p:extLst>
       <p:ext uri="{BB962C8B-B14F-4D97-AF65-F5344CB8AC3E}">
-        <p14:creationId xmlns:p14="http://schemas.microsoft.com/office/powerpoint/2010/main" xmlns="" val="1078110969"/>
+        <p14:creationId xmlns="" xmlns:p14="http://schemas.microsoft.com/office/powerpoint/2010/main" val="3933745380"/>
       </p:ext>
     </p:extLst>
   </p:cSld>
@@ -8106,7 +8093,7 @@
           <a:p>
             <a:r>
               <a:rPr lang="en-GB" dirty="0" smtClean="0"/>
-              <a:t>Proposed Architecture in practise (2 of 2)</a:t>
+              <a:t>What constitutes a Core Feature?</a:t>
             </a:r>
             <a:endParaRPr lang="en-GB" dirty="0"/>
           </a:p>
@@ -8124,19 +8111,62 @@
         </p:nvSpPr>
         <p:spPr/>
         <p:txBody>
-          <a:bodyPr/>
-          <a:lstStyle/>
-          <a:p>
-            <a:r>
-              <a:rPr lang="en-GB" dirty="0" smtClean="0"/>
-              <a:t>Virtuoso support will be separated out into it’s own library</a:t>
+          <a:bodyPr>
+            <a:normAutofit fontScale="85000" lnSpcReduction="20000"/>
+          </a:bodyPr>
+          <a:lstStyle/>
+          <a:p>
+            <a:r>
+              <a:rPr lang="en-GB" dirty="0" smtClean="0"/>
+              <a:t>Core Features:</a:t>
             </a:r>
           </a:p>
           <a:p>
             <a:pPr lvl="1"/>
             <a:r>
               <a:rPr lang="en-GB" dirty="0" smtClean="0"/>
-              <a:t>Desirable since Virtuoso support represents only a couple of classes in the API but introduces an entire DLL as a dependency</a:t>
+              <a:t>Adds to/improve capability of a specific subsystem</a:t>
+            </a:r>
+          </a:p>
+          <a:p>
+            <a:pPr lvl="1"/>
+            <a:r>
+              <a:rPr lang="en-GB" dirty="0" smtClean="0"/>
+              <a:t>Unless providing major new capabilities which are highly desirable to all users they should not constitute an entirely new subsystem</a:t>
+            </a:r>
+          </a:p>
+          <a:p>
+            <a:pPr lvl="1"/>
+            <a:r>
+              <a:rPr lang="en-GB" dirty="0" smtClean="0"/>
+              <a:t>Does not require additional dependencies</a:t>
+            </a:r>
+          </a:p>
+          <a:p>
+            <a:r>
+              <a:rPr lang="en-GB" dirty="0" smtClean="0"/>
+              <a:t>Non Core Features:</a:t>
+            </a:r>
+          </a:p>
+          <a:p>
+            <a:pPr lvl="1"/>
+            <a:r>
+              <a:rPr lang="en-GB" dirty="0" smtClean="0"/>
+              <a:t>Provides an entirely new subsystem</a:t>
+            </a:r>
+          </a:p>
+          <a:p>
+            <a:pPr lvl="1"/>
+            <a:r>
+              <a:rPr lang="en-GB" dirty="0" smtClean="0"/>
+              <a:t>Is only of interest to part of the user base</a:t>
+            </a:r>
+          </a:p>
+          <a:p>
+            <a:pPr lvl="1"/>
+            <a:r>
+              <a:rPr lang="en-GB" dirty="0" smtClean="0"/>
+              <a:t>Introduce new dependencies</a:t>
             </a:r>
             <a:endParaRPr lang="en-GB" dirty="0"/>
           </a:p>
@@ -8160,7 +8190,7 @@
             <a:fld id="{CDAEE9B0-25E7-4C28-AF1D-B3DDCE7EBBDB}" type="datetime1">
               <a:rPr lang="en-US" smtClean="0"/>
               <a:pPr/>
-              <a:t>7/20/2011</a:t>
+              <a:t>7/26/2011</a:t>
             </a:fld>
             <a:endParaRPr lang="en-GB"/>
           </a:p>
@@ -8216,7 +8246,7 @@
     </p:spTree>
     <p:extLst>
       <p:ext uri="{BB962C8B-B14F-4D97-AF65-F5344CB8AC3E}">
-        <p14:creationId xmlns:p14="http://schemas.microsoft.com/office/powerpoint/2010/main" xmlns="" val="3038176013"/>
+        <p14:creationId xmlns="" xmlns:p14="http://schemas.microsoft.com/office/powerpoint/2010/main" val="4089701815"/>
       </p:ext>
     </p:extLst>
   </p:cSld>
@@ -8260,7 +8290,7 @@
           <a:p>
             <a:r>
               <a:rPr lang="en-GB" dirty="0" smtClean="0"/>
-              <a:t>Library Naming Conventions</a:t>
+              <a:t>Proposed Architecture in practise (1 of 2)</a:t>
             </a:r>
             <a:endParaRPr lang="en-GB" dirty="0"/>
           </a:p>
@@ -8279,66 +8309,35 @@
         <p:spPr/>
         <p:txBody>
           <a:bodyPr>
-            <a:normAutofit fontScale="85000" lnSpcReduction="20000"/>
+            <a:normAutofit fontScale="92500"/>
           </a:bodyPr>
           <a:lstStyle/>
           <a:p>
             <a:r>
               <a:rPr lang="en-GB" dirty="0" smtClean="0"/>
-              <a:t>Names should all be prefixed with </a:t>
-            </a:r>
-            <a:r>
-              <a:rPr lang="en-GB" dirty="0" err="1" smtClean="0"/>
-              <a:t>dotNetRDF</a:t>
-            </a:r>
-            <a:r>
-              <a:rPr lang="en-GB" dirty="0" smtClean="0"/>
-              <a:t>.</a:t>
-            </a:r>
-          </a:p>
-          <a:p>
-            <a:r>
-              <a:rPr lang="en-GB" dirty="0" smtClean="0"/>
-              <a:t>Name should be descriptive, not necessarily aligned with the root namespace</a:t>
+              <a:t>It is proposed that the new ADO Store be packaged in a separate library</a:t>
             </a:r>
           </a:p>
           <a:p>
             <a:pPr lvl="1"/>
             <a:r>
-              <a:rPr lang="en-GB" dirty="0" err="1" smtClean="0"/>
-              <a:t>Eg</a:t>
-            </a:r>
-            <a:r>
-              <a:rPr lang="en-GB" dirty="0" smtClean="0"/>
-              <a:t>. dotNetRDF.WinForms.dll and dotNetRDF.Data.Sql.dll</a:t>
-            </a:r>
-          </a:p>
-          <a:p>
-            <a:r>
-              <a:rPr lang="en-GB" dirty="0" smtClean="0"/>
-              <a:t>Names can be </a:t>
-            </a:r>
-            <a:r>
-              <a:rPr lang="en-GB" dirty="0" err="1" smtClean="0"/>
-              <a:t>postfixed</a:t>
-            </a:r>
-            <a:r>
-              <a:rPr lang="en-GB" dirty="0" smtClean="0"/>
-              <a:t> with platform identifier where applicable e.g. dotNetRDF.Silverlight.dll</a:t>
-            </a:r>
-          </a:p>
-          <a:p>
-            <a:r>
-              <a:rPr lang="en-GB" dirty="0" smtClean="0"/>
-              <a:t>Version Numbers need not be aligned with core library, should reflect maturity of code</a:t>
+              <a:rPr lang="en-GB" dirty="0" smtClean="0"/>
+              <a:t>Will reduce the need for dependencies in the core library</a:t>
             </a:r>
           </a:p>
           <a:p>
             <a:pPr lvl="1"/>
             <a:r>
               <a:rPr lang="en-GB" dirty="0" smtClean="0"/>
-              <a:t>For simplicity code considered mature/split out of core library will have version numbers aligned with core library</a:t>
-            </a:r>
+              <a:t>Allows additional implementations other than MSSQL to be added in future with their dependencies</a:t>
+            </a:r>
+          </a:p>
+          <a:p>
+            <a:r>
+              <a:rPr lang="en-GB" dirty="0" smtClean="0"/>
+              <a:t>Make it easier to maintain and those who don’t need the features get a smaller library footprint</a:t>
+            </a:r>
+            <a:endParaRPr lang="en-GB" dirty="0"/>
           </a:p>
         </p:txBody>
       </p:sp>
@@ -8360,7 +8359,7 @@
             <a:fld id="{CDAEE9B0-25E7-4C28-AF1D-B3DDCE7EBBDB}" type="datetime1">
               <a:rPr lang="en-US" smtClean="0"/>
               <a:pPr/>
-              <a:t>7/20/2011</a:t>
+              <a:t>7/26/2011</a:t>
             </a:fld>
             <a:endParaRPr lang="en-GB"/>
           </a:p>
@@ -8416,7 +8415,7 @@
     </p:spTree>
     <p:extLst>
       <p:ext uri="{BB962C8B-B14F-4D97-AF65-F5344CB8AC3E}">
-        <p14:creationId xmlns:p14="http://schemas.microsoft.com/office/powerpoint/2010/main" xmlns="" val="687733986"/>
+        <p14:creationId xmlns="" xmlns:p14="http://schemas.microsoft.com/office/powerpoint/2010/main" val="1078110969"/>
       </p:ext>
     </p:extLst>
   </p:cSld>
@@ -8460,7 +8459,7 @@
           <a:p>
             <a:r>
               <a:rPr lang="en-GB" dirty="0" smtClean="0"/>
-              <a:t>Proposed Libraries for 0.5.0 Release</a:t>
+              <a:t>Proposed Architecture in practise (2 of 2)</a:t>
             </a:r>
             <a:endParaRPr lang="en-GB" dirty="0"/>
           </a:p>
@@ -8483,32 +8482,14 @@
           <a:p>
             <a:r>
               <a:rPr lang="en-GB" dirty="0" smtClean="0"/>
-              <a:t>Core Library – dotNetRDF.dll</a:t>
+              <a:t>Virtuoso support will be separated out into it’s own library</a:t>
             </a:r>
           </a:p>
           <a:p>
             <a:pPr lvl="1"/>
             <a:r>
-              <a:rPr lang="en-GB" dirty="0" err="1" smtClean="0"/>
-              <a:t>WinForms</a:t>
-            </a:r>
-            <a:r>
-              <a:rPr lang="en-GB" dirty="0" smtClean="0"/>
-              <a:t> GUI – dotNetRDF.WinForms.dll</a:t>
-            </a:r>
-          </a:p>
-          <a:p>
-            <a:pPr lvl="1"/>
-            <a:r>
-              <a:rPr lang="en-GB" dirty="0" smtClean="0"/>
-              <a:t>ADO Store – dotNetRDF.Data.Sql.dll</a:t>
-            </a:r>
-          </a:p>
-          <a:p>
-            <a:pPr lvl="1"/>
-            <a:r>
-              <a:rPr lang="en-GB" dirty="0" smtClean="0"/>
-              <a:t>Virtuoso support – dotNetRDF.Data.Virtuoso.dll</a:t>
+              <a:rPr lang="en-GB" dirty="0" smtClean="0"/>
+              <a:t>Desirable since Virtuoso support represents only a couple of classes in the API but introduces an entire DLL as a dependency</a:t>
             </a:r>
             <a:endParaRPr lang="en-GB" dirty="0"/>
           </a:p>
@@ -8532,7 +8513,7 @@
             <a:fld id="{CDAEE9B0-25E7-4C28-AF1D-B3DDCE7EBBDB}" type="datetime1">
               <a:rPr lang="en-US" smtClean="0"/>
               <a:pPr/>
-              <a:t>7/20/2011</a:t>
+              <a:t>7/26/2011</a:t>
             </a:fld>
             <a:endParaRPr lang="en-GB"/>
           </a:p>
@@ -8588,7 +8569,7 @@
     </p:spTree>
     <p:extLst>
       <p:ext uri="{BB962C8B-B14F-4D97-AF65-F5344CB8AC3E}">
-        <p14:creationId xmlns:p14="http://schemas.microsoft.com/office/powerpoint/2010/main" xmlns="" val="3219753914"/>
+        <p14:creationId xmlns="" xmlns:p14="http://schemas.microsoft.com/office/powerpoint/2010/main" val="3038176013"/>
       </p:ext>
     </p:extLst>
   </p:cSld>
@@ -8627,82 +8608,90 @@
         </p:nvSpPr>
         <p:spPr/>
         <p:txBody>
+          <a:bodyPr/>
+          <a:lstStyle/>
+          <a:p>
+            <a:r>
+              <a:rPr lang="en-GB" dirty="0" smtClean="0"/>
+              <a:t>Library Naming Conventions</a:t>
+            </a:r>
+            <a:endParaRPr lang="en-GB" dirty="0"/>
+          </a:p>
+        </p:txBody>
+      </p:sp>
+      <p:sp>
+        <p:nvSpPr>
+          <p:cNvPr id="3" name="Content Placeholder 2"/>
+          <p:cNvSpPr>
+            <a:spLocks noGrp="1"/>
+          </p:cNvSpPr>
+          <p:nvPr>
+            <p:ph idx="1"/>
+          </p:nvPr>
+        </p:nvSpPr>
+        <p:spPr/>
+        <p:txBody>
           <a:bodyPr>
-            <a:normAutofit fontScale="90000"/>
+            <a:normAutofit fontScale="85000" lnSpcReduction="20000"/>
           </a:bodyPr>
           <a:lstStyle/>
           <a:p>
             <a:r>
               <a:rPr lang="en-GB" dirty="0" smtClean="0"/>
-              <a:t>Proposed Libraries for Future </a:t>
-            </a:r>
-            <a:r>
-              <a:rPr lang="en-GB" dirty="0" smtClean="0"/>
-              <a:t>Releases (1 of 2)</a:t>
-            </a:r>
-            <a:endParaRPr lang="en-GB" dirty="0"/>
-          </a:p>
-        </p:txBody>
-      </p:sp>
-      <p:sp>
-        <p:nvSpPr>
-          <p:cNvPr id="3" name="Content Placeholder 2"/>
-          <p:cNvSpPr>
-            <a:spLocks noGrp="1"/>
-          </p:cNvSpPr>
-          <p:nvPr>
-            <p:ph idx="1"/>
-          </p:nvPr>
-        </p:nvSpPr>
-        <p:spPr/>
-        <p:txBody>
-          <a:bodyPr/>
-          <a:lstStyle/>
-          <a:p>
-            <a:r>
-              <a:rPr lang="en-GB" dirty="0" smtClean="0"/>
-              <a:t>LINQ Provider – dotNetRDF.Linq.dll</a:t>
+              <a:t>Names should all be prefixed with </a:t>
+            </a:r>
+            <a:r>
+              <a:rPr lang="en-GB" dirty="0" err="1" smtClean="0"/>
+              <a:t>dotNetRDF</a:t>
+            </a:r>
+            <a:r>
+              <a:rPr lang="en-GB" dirty="0" smtClean="0"/>
+              <a:t>.</a:t>
+            </a:r>
+          </a:p>
+          <a:p>
+            <a:r>
+              <a:rPr lang="en-GB" dirty="0" smtClean="0"/>
+              <a:t>Name should be descriptive, not necessarily aligned with the root namespace</a:t>
             </a:r>
           </a:p>
           <a:p>
             <a:pPr lvl="1"/>
             <a:r>
-              <a:rPr lang="en-GB" dirty="0" smtClean="0"/>
-              <a:t>Based on a port of </a:t>
-            </a:r>
-            <a:r>
               <a:rPr lang="en-GB" dirty="0" err="1" smtClean="0"/>
-              <a:t>Andew</a:t>
-            </a:r>
-            <a:r>
-              <a:rPr lang="en-GB" dirty="0" smtClean="0"/>
-              <a:t> Matthew’s </a:t>
+              <a:t>Eg</a:t>
+            </a:r>
+            <a:r>
+              <a:rPr lang="en-GB" dirty="0" smtClean="0"/>
+              <a:t>. dotNetRDF.WinForms.dll and dotNetRDF.Data.Sql.dll</a:t>
+            </a:r>
+          </a:p>
+          <a:p>
+            <a:r>
+              <a:rPr lang="en-GB" dirty="0" smtClean="0"/>
+              <a:t>Names can be </a:t>
             </a:r>
             <a:r>
               <a:rPr lang="en-GB" dirty="0" err="1" smtClean="0"/>
-              <a:t>LinqToRdf</a:t>
-            </a:r>
-            <a:endParaRPr lang="en-GB" dirty="0" smtClean="0"/>
+              <a:t>postfixed</a:t>
+            </a:r>
+            <a:r>
+              <a:rPr lang="en-GB" dirty="0" smtClean="0"/>
+              <a:t> with platform identifier where applicable e.g. dotNetRDF.Silverlight.dll</a:t>
+            </a:r>
+          </a:p>
+          <a:p>
+            <a:r>
+              <a:rPr lang="en-GB" dirty="0" smtClean="0"/>
+              <a:t>Version Numbers need not be aligned with core library, should reflect maturity of code</a:t>
+            </a:r>
           </a:p>
           <a:p>
             <a:pPr lvl="1"/>
             <a:r>
               <a:rPr lang="en-GB" dirty="0" smtClean="0"/>
-              <a:t>Persistence capability added by use of SPARQL Update</a:t>
-            </a:r>
-          </a:p>
-          <a:p>
-            <a:r>
-              <a:rPr lang="en-GB" dirty="0" smtClean="0"/>
-              <a:t>SPIN Implementation – dotNetRDF.Spin.dll</a:t>
-            </a:r>
-          </a:p>
-          <a:p>
-            <a:r>
-              <a:rPr lang="en-GB" dirty="0" smtClean="0"/>
-              <a:t>WPF GUI – dotNetRDF.Wpf.dll</a:t>
-            </a:r>
-            <a:endParaRPr lang="en-GB" dirty="0"/>
+              <a:t>For simplicity code considered mature/split out of core library will have version numbers aligned with core library</a:t>
+            </a:r>
           </a:p>
         </p:txBody>
       </p:sp>
@@ -8724,7 +8713,7 @@
             <a:fld id="{CDAEE9B0-25E7-4C28-AF1D-B3DDCE7EBBDB}" type="datetime1">
               <a:rPr lang="en-US" smtClean="0"/>
               <a:pPr/>
-              <a:t>7/20/2011</a:t>
+              <a:t>7/26/2011</a:t>
             </a:fld>
             <a:endParaRPr lang="en-GB"/>
           </a:p>
@@ -8780,7 +8769,7 @@
     </p:spTree>
     <p:extLst>
       <p:ext uri="{BB962C8B-B14F-4D97-AF65-F5344CB8AC3E}">
-        <p14:creationId xmlns:p14="http://schemas.microsoft.com/office/powerpoint/2010/main" xmlns="" val="3035919924"/>
+        <p14:creationId xmlns="" xmlns:p14="http://schemas.microsoft.com/office/powerpoint/2010/main" val="687733986"/>
       </p:ext>
     </p:extLst>
   </p:cSld>
@@ -8819,14 +8808,12 @@
         </p:nvSpPr>
         <p:spPr/>
         <p:txBody>
-          <a:bodyPr>
-            <a:normAutofit/>
-          </a:bodyPr>
-          <a:lstStyle/>
-          <a:p>
-            <a:r>
-              <a:rPr lang="en-GB" dirty="0" smtClean="0"/>
-              <a:t>General Roadmap</a:t>
+          <a:bodyPr/>
+          <a:lstStyle/>
+          <a:p>
+            <a:r>
+              <a:rPr lang="en-GB" dirty="0" smtClean="0"/>
+              <a:t>Proposed Libraries for 0.5.0 Release</a:t>
             </a:r>
             <a:endParaRPr lang="en-GB" dirty="0"/>
           </a:p>
@@ -8834,7 +8821,55 @@
       </p:sp>
       <p:sp>
         <p:nvSpPr>
-          <p:cNvPr id="3" name="Date Placeholder 2"/>
+          <p:cNvPr id="3" name="Content Placeholder 2"/>
+          <p:cNvSpPr>
+            <a:spLocks noGrp="1"/>
+          </p:cNvSpPr>
+          <p:nvPr>
+            <p:ph idx="1"/>
+          </p:nvPr>
+        </p:nvSpPr>
+        <p:spPr/>
+        <p:txBody>
+          <a:bodyPr/>
+          <a:lstStyle/>
+          <a:p>
+            <a:r>
+              <a:rPr lang="en-GB" dirty="0" smtClean="0"/>
+              <a:t>Core Library – dotNetRDF.dll</a:t>
+            </a:r>
+          </a:p>
+          <a:p>
+            <a:pPr lvl="1"/>
+            <a:r>
+              <a:rPr lang="en-GB" dirty="0" err="1" smtClean="0"/>
+              <a:t>WinForms</a:t>
+            </a:r>
+            <a:r>
+              <a:rPr lang="en-GB" dirty="0" smtClean="0"/>
+              <a:t> GUI – dotNetRDF.WinForms.dll</a:t>
+            </a:r>
+          </a:p>
+          <a:p>
+            <a:pPr lvl="1"/>
+            <a:r>
+              <a:rPr lang="en-GB" dirty="0" smtClean="0"/>
+              <a:t>ADO Store – dotNetRDF.Data.Sql.dll</a:t>
+            </a:r>
+          </a:p>
+          <a:p>
+            <a:pPr lvl="1"/>
+            <a:r>
+              <a:rPr lang="en-GB" dirty="0" smtClean="0"/>
+              <a:t>Virtuoso support – dotNetRDF.Data.Virtuoso.dll</a:t>
+            </a:r>
+            <a:endParaRPr lang="en-GB" dirty="0"/>
+          </a:p>
+        </p:txBody>
+      </p:sp>
+      <p:sp>
+        <p:nvSpPr>
+          <p:cNvPr id="4" name="Date Placeholder 3"/>
           <p:cNvSpPr>
             <a:spLocks noGrp="1"/>
           </p:cNvSpPr>
@@ -8847,10 +8882,10 @@
           <a:bodyPr/>
           <a:lstStyle/>
           <a:p>
-            <a:fld id="{EA5D455B-ECD0-44E3-BA0C-3649A3FCD15C}" type="datetime1">
+            <a:fld id="{CDAEE9B0-25E7-4C28-AF1D-B3DDCE7EBBDB}" type="datetime1">
               <a:rPr lang="en-US" smtClean="0"/>
               <a:pPr/>
-              <a:t>7/20/2011</a:t>
+              <a:t>7/26/2011</a:t>
             </a:fld>
             <a:endParaRPr lang="en-GB"/>
           </a:p>
@@ -8858,7 +8893,7 @@
       </p:sp>
       <p:sp>
         <p:nvSpPr>
-          <p:cNvPr id="4" name="Footer Placeholder 3"/>
+          <p:cNvPr id="5" name="Footer Placeholder 4"/>
           <p:cNvSpPr>
             <a:spLocks noGrp="1"/>
           </p:cNvSpPr>
@@ -8881,7 +8916,7 @@
       </p:sp>
       <p:sp>
         <p:nvSpPr>
-          <p:cNvPr id="5" name="Slide Number Placeholder 4"/>
+          <p:cNvPr id="6" name="Slide Number Placeholder 5"/>
           <p:cNvSpPr>
             <a:spLocks noGrp="1"/>
           </p:cNvSpPr>
@@ -8906,7 +8941,7 @@
     </p:spTree>
     <p:extLst>
       <p:ext uri="{BB962C8B-B14F-4D97-AF65-F5344CB8AC3E}">
-        <p14:creationId xmlns:p14="http://schemas.microsoft.com/office/powerpoint/2010/main" xmlns="" val="2482877072"/>
+        <p14:creationId xmlns="" xmlns:p14="http://schemas.microsoft.com/office/powerpoint/2010/main" val="3219753914"/>
       </p:ext>
     </p:extLst>
   </p:cSld>
@@ -8974,7 +9009,7 @@
             <a:fld id="{EA5D455B-ECD0-44E3-BA0C-3649A3FCD15C}" type="datetime1">
               <a:rPr lang="en-US" smtClean="0"/>
               <a:pPr/>
-              <a:t>7/20/2011</a:t>
+              <a:t>7/26/2011</a:t>
             </a:fld>
             <a:endParaRPr lang="en-GB"/>
           </a:p>
@@ -9030,7 +9065,7 @@
     </p:spTree>
     <p:extLst>
       <p:ext uri="{BB962C8B-B14F-4D97-AF65-F5344CB8AC3E}">
-        <p14:creationId xmlns:p14="http://schemas.microsoft.com/office/powerpoint/2010/main" xmlns="" val="4095227198"/>
+        <p14:creationId xmlns="" xmlns:p14="http://schemas.microsoft.com/office/powerpoint/2010/main" val="4095227198"/>
       </p:ext>
     </p:extLst>
   </p:cSld>
@@ -9059,7 +9094,7 @@
       </p:grpSpPr>
       <p:sp>
         <p:nvSpPr>
-          <p:cNvPr id="6" name="Title 5"/>
+          <p:cNvPr id="2" name="Title 1"/>
           <p:cNvSpPr>
             <a:spLocks noGrp="1"/>
           </p:cNvSpPr>
@@ -9069,12 +9104,14 @@
         </p:nvSpPr>
         <p:spPr/>
         <p:txBody>
-          <a:bodyPr/>
-          <a:lstStyle/>
-          <a:p>
-            <a:r>
-              <a:rPr lang="en-GB" dirty="0" smtClean="0"/>
-              <a:t>Plans</a:t>
+          <a:bodyPr>
+            <a:normAutofit/>
+          </a:bodyPr>
+          <a:lstStyle/>
+          <a:p>
+            <a:r>
+              <a:rPr lang="en-GB" dirty="0" smtClean="0"/>
+              <a:t>In Progress for possible future release</a:t>
             </a:r>
             <a:endParaRPr lang="en-GB" dirty="0"/>
           </a:p>
@@ -9082,7 +9119,7 @@
       </p:sp>
       <p:sp>
         <p:nvSpPr>
-          <p:cNvPr id="7" name="Content Placeholder 6"/>
+          <p:cNvPr id="3" name="Content Placeholder 2"/>
           <p:cNvSpPr>
             <a:spLocks noGrp="1"/>
           </p:cNvSpPr>
@@ -9097,32 +9134,58 @@
           <a:p>
             <a:r>
               <a:rPr lang="en-GB" dirty="0" smtClean="0"/>
-              <a:t>Currently the roadmap is very loose beyond the immediate next releases (the 0.5.x series)</a:t>
-            </a:r>
-          </a:p>
-          <a:p>
-            <a:r>
-              <a:rPr lang="en-GB" dirty="0" smtClean="0"/>
-              <a:t>There are no specific plans for any release beyond 0.5.x at the moment</a:t>
-            </a:r>
-          </a:p>
-          <a:p>
-            <a:r>
-              <a:rPr lang="en-GB" dirty="0" smtClean="0"/>
-              <a:t>Ideally the roadmap from subsequent releases (0.6.x) to the 1.0 release should be driven by the community</a:t>
-            </a:r>
-          </a:p>
-          <a:p>
-            <a:pPr marL="0" indent="0">
-              <a:buNone/>
-            </a:pPr>
+              <a:t>LINQ </a:t>
+            </a:r>
+            <a:r>
+              <a:rPr lang="en-GB" dirty="0" smtClean="0"/>
+              <a:t>Provider – dotNetRDF.Linq.dll</a:t>
+            </a:r>
+          </a:p>
+          <a:p>
+            <a:pPr lvl="1"/>
+            <a:r>
+              <a:rPr lang="en-GB" dirty="0" smtClean="0"/>
+              <a:t>Based on a port of </a:t>
+            </a:r>
+            <a:r>
+              <a:rPr lang="en-GB" dirty="0" err="1" smtClean="0"/>
+              <a:t>Andew</a:t>
+            </a:r>
+            <a:r>
+              <a:rPr lang="en-GB" dirty="0" smtClean="0"/>
+              <a:t> Matthew’s </a:t>
+            </a:r>
+            <a:r>
+              <a:rPr lang="en-GB" dirty="0" err="1" smtClean="0"/>
+              <a:t>LinqToRdf</a:t>
+            </a:r>
+            <a:endParaRPr lang="en-GB" dirty="0" smtClean="0"/>
+          </a:p>
+          <a:p>
+            <a:pPr lvl="1"/>
+            <a:r>
+              <a:rPr lang="en-GB" dirty="0" smtClean="0"/>
+              <a:t>Persistence capability added by use of SPARQL Update</a:t>
+            </a:r>
+          </a:p>
+          <a:p>
+            <a:r>
+              <a:rPr lang="en-GB" dirty="0" smtClean="0"/>
+              <a:t>SPIN Implementation – dotNetRDF.Spin.dll</a:t>
+            </a:r>
+          </a:p>
+          <a:p>
+            <a:r>
+              <a:rPr lang="en-GB" dirty="0" smtClean="0"/>
+              <a:t>WPF GUI – dotNetRDF.Wpf.dll</a:t>
+            </a:r>
             <a:endParaRPr lang="en-GB" dirty="0"/>
           </a:p>
         </p:txBody>
       </p:sp>
       <p:sp>
         <p:nvSpPr>
-          <p:cNvPr id="3" name="Date Placeholder 2"/>
+          <p:cNvPr id="4" name="Date Placeholder 3"/>
           <p:cNvSpPr>
             <a:spLocks noGrp="1"/>
           </p:cNvSpPr>
@@ -9135,10 +9198,10 @@
           <a:bodyPr/>
           <a:lstStyle/>
           <a:p>
-            <a:fld id="{EA5D455B-ECD0-44E3-BA0C-3649A3FCD15C}" type="datetime1">
+            <a:fld id="{CDAEE9B0-25E7-4C28-AF1D-B3DDCE7EBBDB}" type="datetime1">
               <a:rPr lang="en-US" smtClean="0"/>
               <a:pPr/>
-              <a:t>7/20/2011</a:t>
+              <a:t>7/26/2011</a:t>
             </a:fld>
             <a:endParaRPr lang="en-GB"/>
           </a:p>
@@ -9146,7 +9209,7 @@
       </p:sp>
       <p:sp>
         <p:nvSpPr>
-          <p:cNvPr id="4" name="Footer Placeholder 3"/>
+          <p:cNvPr id="5" name="Footer Placeholder 4"/>
           <p:cNvSpPr>
             <a:spLocks noGrp="1"/>
           </p:cNvSpPr>
@@ -9169,7 +9232,7 @@
       </p:sp>
       <p:sp>
         <p:nvSpPr>
-          <p:cNvPr id="5" name="Slide Number Placeholder 4"/>
+          <p:cNvPr id="6" name="Slide Number Placeholder 5"/>
           <p:cNvSpPr>
             <a:spLocks noGrp="1"/>
           </p:cNvSpPr>
@@ -9194,7 +9257,7 @@
     </p:spTree>
     <p:extLst>
       <p:ext uri="{BB962C8B-B14F-4D97-AF65-F5344CB8AC3E}">
-        <p14:creationId xmlns:p14="http://schemas.microsoft.com/office/powerpoint/2010/main" xmlns="" val="381284594"/>
+        <p14:creationId xmlns="" xmlns:p14="http://schemas.microsoft.com/office/powerpoint/2010/main" val="3035919924"/>
       </p:ext>
     </p:extLst>
   </p:cSld>
@@ -9233,12 +9296,14 @@
         </p:nvSpPr>
         <p:spPr/>
         <p:txBody>
-          <a:bodyPr/>
-          <a:lstStyle/>
-          <a:p>
-            <a:r>
-              <a:rPr lang="en-GB" dirty="0" smtClean="0"/>
-              <a:t>Community Driven Planning</a:t>
+          <a:bodyPr>
+            <a:normAutofit/>
+          </a:bodyPr>
+          <a:lstStyle/>
+          <a:p>
+            <a:r>
+              <a:rPr lang="en-GB" dirty="0" smtClean="0"/>
+              <a:t>General Roadmap</a:t>
             </a:r>
             <a:endParaRPr lang="en-GB" dirty="0"/>
           </a:p>
@@ -9246,45 +9311,7 @@
       </p:sp>
       <p:sp>
         <p:nvSpPr>
-          <p:cNvPr id="3" name="Content Placeholder 2"/>
-          <p:cNvSpPr>
-            <a:spLocks noGrp="1"/>
-          </p:cNvSpPr>
-          <p:nvPr>
-            <p:ph idx="1"/>
-          </p:nvPr>
-        </p:nvSpPr>
-        <p:spPr/>
-        <p:txBody>
-          <a:bodyPr>
-            <a:normAutofit lnSpcReduction="10000"/>
-          </a:bodyPr>
-          <a:lstStyle/>
-          <a:p>
-            <a:r>
-              <a:rPr lang="en-GB" dirty="0" smtClean="0"/>
-              <a:t>For 0.6.x releases new features/improvements should be primarily driven by community request</a:t>
-            </a:r>
-          </a:p>
-          <a:p>
-            <a:pPr lvl="1"/>
-            <a:r>
-              <a:rPr lang="en-GB" dirty="0" smtClean="0"/>
-              <a:t>i.e. features will be prioritised based on community request/need/feedback</a:t>
-            </a:r>
-          </a:p>
-          <a:p>
-            <a:r>
-              <a:rPr lang="en-GB" dirty="0" smtClean="0"/>
-              <a:t>We have some possible features lined up which we will prioritise unless community suggests other features</a:t>
-            </a:r>
-            <a:endParaRPr lang="en-GB" dirty="0"/>
-          </a:p>
-        </p:txBody>
-      </p:sp>
-      <p:sp>
-        <p:nvSpPr>
-          <p:cNvPr id="4" name="Date Placeholder 3"/>
+          <p:cNvPr id="3" name="Date Placeholder 2"/>
           <p:cNvSpPr>
             <a:spLocks noGrp="1"/>
           </p:cNvSpPr>
@@ -9297,10 +9324,10 @@
           <a:bodyPr/>
           <a:lstStyle/>
           <a:p>
-            <a:fld id="{CDAEE9B0-25E7-4C28-AF1D-B3DDCE7EBBDB}" type="datetime1">
+            <a:fld id="{EA5D455B-ECD0-44E3-BA0C-3649A3FCD15C}" type="datetime1">
               <a:rPr lang="en-US" smtClean="0"/>
               <a:pPr/>
-              <a:t>7/20/2011</a:t>
+              <a:t>7/26/2011</a:t>
             </a:fld>
             <a:endParaRPr lang="en-GB"/>
           </a:p>
@@ -9308,7 +9335,7 @@
       </p:sp>
       <p:sp>
         <p:nvSpPr>
-          <p:cNvPr id="5" name="Footer Placeholder 4"/>
+          <p:cNvPr id="4" name="Footer Placeholder 3"/>
           <p:cNvSpPr>
             <a:spLocks noGrp="1"/>
           </p:cNvSpPr>
@@ -9331,7 +9358,7 @@
       </p:sp>
       <p:sp>
         <p:nvSpPr>
-          <p:cNvPr id="6" name="Slide Number Placeholder 5"/>
+          <p:cNvPr id="5" name="Slide Number Placeholder 4"/>
           <p:cNvSpPr>
             <a:spLocks noGrp="1"/>
           </p:cNvSpPr>
@@ -9356,7 +9383,7 @@
     </p:spTree>
     <p:extLst>
       <p:ext uri="{BB962C8B-B14F-4D97-AF65-F5344CB8AC3E}">
-        <p14:creationId xmlns:p14="http://schemas.microsoft.com/office/powerpoint/2010/main" xmlns="" val="3357694366"/>
+        <p14:creationId xmlns="" xmlns:p14="http://schemas.microsoft.com/office/powerpoint/2010/main" val="2482877072"/>
       </p:ext>
     </p:extLst>
   </p:cSld>
@@ -9385,7 +9412,7 @@
       </p:grpSpPr>
       <p:sp>
         <p:nvSpPr>
-          <p:cNvPr id="2" name="Title 1"/>
+          <p:cNvPr id="6" name="Title 5"/>
           <p:cNvSpPr>
             <a:spLocks noGrp="1"/>
           </p:cNvSpPr>
@@ -9400,11 +9427,7 @@
           <a:p>
             <a:r>
               <a:rPr lang="en-GB" dirty="0" smtClean="0"/>
-              <a:t>Our Suggestions (1 of </a:t>
-            </a:r>
-            <a:r>
-              <a:rPr lang="en-GB" dirty="0" smtClean="0"/>
-              <a:t>4)</a:t>
+              <a:t>Plans</a:t>
             </a:r>
             <a:endParaRPr lang="en-GB" dirty="0"/>
           </a:p>
@@ -9412,7 +9435,7 @@
       </p:sp>
       <p:sp>
         <p:nvSpPr>
-          <p:cNvPr id="3" name="Content Placeholder 2"/>
+          <p:cNvPr id="7" name="Content Placeholder 6"/>
           <p:cNvSpPr>
             <a:spLocks noGrp="1"/>
           </p:cNvSpPr>
@@ -9422,51 +9445,37 @@
         </p:nvSpPr>
         <p:spPr/>
         <p:txBody>
-          <a:bodyPr>
-            <a:normAutofit fontScale="92500"/>
-          </a:bodyPr>
-          <a:lstStyle/>
-          <a:p>
-            <a:r>
-              <a:rPr lang="en-GB" dirty="0" smtClean="0"/>
-              <a:t>Full text SPARQL Support – dotNetRDF.Sparql.FullText.dll</a:t>
-            </a:r>
-          </a:p>
-          <a:p>
-            <a:pPr lvl="1"/>
-            <a:r>
-              <a:rPr lang="en-GB" dirty="0" smtClean="0"/>
-              <a:t>Use </a:t>
-            </a:r>
-            <a:r>
-              <a:rPr lang="en-GB" dirty="0" err="1" smtClean="0"/>
-              <a:t>Lucene.Net</a:t>
-            </a:r>
-            <a:r>
-              <a:rPr lang="en-GB" dirty="0" smtClean="0"/>
-              <a:t> to provide full text search capabilities</a:t>
-            </a:r>
-          </a:p>
-          <a:p>
-            <a:pPr lvl="1"/>
-            <a:r>
-              <a:rPr lang="en-GB" dirty="0" smtClean="0"/>
-              <a:t>Syntax compatible with other implementations as far as possible</a:t>
-            </a:r>
-          </a:p>
-          <a:p>
-            <a:pPr lvl="1"/>
-            <a:r>
-              <a:rPr lang="en-GB" dirty="0" smtClean="0"/>
-              <a:t>Will be implemented as a new library since as per the architecture proposal it is a non core feature and requires additional dependencies</a:t>
-            </a:r>
+          <a:bodyPr/>
+          <a:lstStyle/>
+          <a:p>
+            <a:r>
+              <a:rPr lang="en-GB" dirty="0" smtClean="0"/>
+              <a:t>Currently the roadmap is very loose beyond the immediate next releases (the 0.5.x series)</a:t>
+            </a:r>
+          </a:p>
+          <a:p>
+            <a:r>
+              <a:rPr lang="en-GB" dirty="0" smtClean="0"/>
+              <a:t>There are no specific plans for any release beyond 0.5.x at the moment</a:t>
+            </a:r>
+          </a:p>
+          <a:p>
+            <a:r>
+              <a:rPr lang="en-GB" dirty="0" smtClean="0"/>
+              <a:t>Ideally the roadmap from subsequent releases (0.6.x) to the 1.0 release should be driven by the community</a:t>
+            </a:r>
+          </a:p>
+          <a:p>
+            <a:pPr marL="0" indent="0">
+              <a:buNone/>
+            </a:pPr>
             <a:endParaRPr lang="en-GB" dirty="0"/>
           </a:p>
         </p:txBody>
       </p:sp>
       <p:sp>
         <p:nvSpPr>
-          <p:cNvPr id="4" name="Date Placeholder 3"/>
+          <p:cNvPr id="3" name="Date Placeholder 2"/>
           <p:cNvSpPr>
             <a:spLocks noGrp="1"/>
           </p:cNvSpPr>
@@ -9479,10 +9488,10 @@
           <a:bodyPr/>
           <a:lstStyle/>
           <a:p>
-            <a:fld id="{CDAEE9B0-25E7-4C28-AF1D-B3DDCE7EBBDB}" type="datetime1">
+            <a:fld id="{EA5D455B-ECD0-44E3-BA0C-3649A3FCD15C}" type="datetime1">
               <a:rPr lang="en-US" smtClean="0"/>
               <a:pPr/>
-              <a:t>7/20/2011</a:t>
+              <a:t>7/26/2011</a:t>
             </a:fld>
             <a:endParaRPr lang="en-GB"/>
           </a:p>
@@ -9490,7 +9499,7 @@
       </p:sp>
       <p:sp>
         <p:nvSpPr>
-          <p:cNvPr id="5" name="Footer Placeholder 4"/>
+          <p:cNvPr id="4" name="Footer Placeholder 3"/>
           <p:cNvSpPr>
             <a:spLocks noGrp="1"/>
           </p:cNvSpPr>
@@ -9513,7 +9522,7 @@
       </p:sp>
       <p:sp>
         <p:nvSpPr>
-          <p:cNvPr id="6" name="Slide Number Placeholder 5"/>
+          <p:cNvPr id="5" name="Slide Number Placeholder 4"/>
           <p:cNvSpPr>
             <a:spLocks noGrp="1"/>
           </p:cNvSpPr>
@@ -9538,7 +9547,7 @@
     </p:spTree>
     <p:extLst>
       <p:ext uri="{BB962C8B-B14F-4D97-AF65-F5344CB8AC3E}">
-        <p14:creationId xmlns:p14="http://schemas.microsoft.com/office/powerpoint/2010/main" xmlns="" val="912609684"/>
+        <p14:creationId xmlns="" xmlns:p14="http://schemas.microsoft.com/office/powerpoint/2010/main" val="381284594"/>
       </p:ext>
     </p:extLst>
   </p:cSld>
@@ -9582,11 +9591,7 @@
           <a:p>
             <a:r>
               <a:rPr lang="en-GB" dirty="0" smtClean="0"/>
-              <a:t>Our Suggestions (2 of </a:t>
-            </a:r>
-            <a:r>
-              <a:rPr lang="en-GB" dirty="0" smtClean="0"/>
-              <a:t>4)</a:t>
+              <a:t>Community Driven Planning</a:t>
             </a:r>
             <a:endParaRPr lang="en-GB" dirty="0"/>
           </a:p>
@@ -9604,38 +9609,27 @@
         </p:nvSpPr>
         <p:spPr/>
         <p:txBody>
-          <a:bodyPr/>
-          <a:lstStyle/>
-          <a:p>
-            <a:r>
-              <a:rPr lang="en-GB" dirty="0" err="1" smtClean="0"/>
-              <a:t>GeoSPARQL</a:t>
-            </a:r>
-            <a:r>
-              <a:rPr lang="en-GB" dirty="0" smtClean="0"/>
-              <a:t> Support – dotNetRDF.Sparql.Geo.dll</a:t>
+          <a:bodyPr>
+            <a:normAutofit lnSpcReduction="10000"/>
+          </a:bodyPr>
+          <a:lstStyle/>
+          <a:p>
+            <a:r>
+              <a:rPr lang="en-GB" dirty="0" smtClean="0"/>
+              <a:t>For 0.6.x releases new features/improvements should be primarily driven by community request</a:t>
             </a:r>
           </a:p>
           <a:p>
             <a:pPr lvl="1"/>
             <a:r>
               <a:rPr lang="en-GB" dirty="0" smtClean="0"/>
-              <a:t>Provide an implementation of the OGC </a:t>
-            </a:r>
-            <a:r>
-              <a:rPr lang="en-GB" dirty="0" err="1" smtClean="0"/>
-              <a:t>GeoSPARQL</a:t>
-            </a:r>
-            <a:r>
-              <a:rPr lang="en-GB" dirty="0" smtClean="0"/>
-              <a:t> standard</a:t>
-            </a:r>
-          </a:p>
-          <a:p>
-            <a:pPr lvl="1"/>
-            <a:r>
-              <a:rPr lang="en-GB" dirty="0" smtClean="0"/>
-              <a:t>As with full text SPARQL will be implemented as a new library as is as non-core feature</a:t>
+              <a:t>i.e. features will be prioritised based on community request/need/feedback</a:t>
+            </a:r>
+          </a:p>
+          <a:p>
+            <a:r>
+              <a:rPr lang="en-GB" dirty="0" smtClean="0"/>
+              <a:t>We have some possible features lined up which we will prioritise unless community suggests other features</a:t>
             </a:r>
             <a:endParaRPr lang="en-GB" dirty="0"/>
           </a:p>
@@ -9659,7 +9653,7 @@
             <a:fld id="{CDAEE9B0-25E7-4C28-AF1D-B3DDCE7EBBDB}" type="datetime1">
               <a:rPr lang="en-US" smtClean="0"/>
               <a:pPr/>
-              <a:t>7/20/2011</a:t>
+              <a:t>7/26/2011</a:t>
             </a:fld>
             <a:endParaRPr lang="en-GB"/>
           </a:p>
@@ -9715,7 +9709,7 @@
     </p:spTree>
     <p:extLst>
       <p:ext uri="{BB962C8B-B14F-4D97-AF65-F5344CB8AC3E}">
-        <p14:creationId xmlns:p14="http://schemas.microsoft.com/office/powerpoint/2010/main" xmlns="" val="585871984"/>
+        <p14:creationId xmlns="" xmlns:p14="http://schemas.microsoft.com/office/powerpoint/2010/main" val="3357694366"/>
       </p:ext>
     </p:extLst>
   </p:cSld>
@@ -9754,131 +9748,66 @@
         </p:nvSpPr>
         <p:spPr/>
         <p:txBody>
+          <a:bodyPr/>
+          <a:lstStyle/>
+          <a:p>
+            <a:r>
+              <a:rPr lang="en-GB" dirty="0" smtClean="0"/>
+              <a:t>Our Suggestions (1 of 4)</a:t>
+            </a:r>
+            <a:endParaRPr lang="en-GB" dirty="0"/>
+          </a:p>
+        </p:txBody>
+      </p:sp>
+      <p:sp>
+        <p:nvSpPr>
+          <p:cNvPr id="3" name="Content Placeholder 2"/>
+          <p:cNvSpPr>
+            <a:spLocks noGrp="1"/>
+          </p:cNvSpPr>
+          <p:nvPr>
+            <p:ph idx="1"/>
+          </p:nvPr>
+        </p:nvSpPr>
+        <p:spPr/>
+        <p:txBody>
           <a:bodyPr>
-            <a:normAutofit/>
+            <a:normAutofit fontScale="92500"/>
           </a:bodyPr>
           <a:lstStyle/>
           <a:p>
             <a:r>
               <a:rPr lang="en-GB" dirty="0" smtClean="0"/>
-              <a:t>Our Suggestions (3 of 4)</a:t>
-            </a:r>
-            <a:endParaRPr lang="en-GB" dirty="0"/>
-          </a:p>
-        </p:txBody>
-      </p:sp>
-      <p:sp>
-        <p:nvSpPr>
-          <p:cNvPr id="3" name="Content Placeholder 2"/>
-          <p:cNvSpPr>
-            <a:spLocks noGrp="1"/>
-          </p:cNvSpPr>
-          <p:nvPr>
-            <p:ph idx="1"/>
-          </p:nvPr>
-        </p:nvSpPr>
-        <p:spPr/>
-        <p:txBody>
-          <a:bodyPr/>
-          <a:lstStyle/>
-          <a:p>
+              <a:t>Full text SPARQL Support – dotNetRDF.Sparql.FullText.dll</a:t>
+            </a:r>
+          </a:p>
+          <a:p>
+            <a:pPr lvl="1"/>
+            <a:r>
+              <a:rPr lang="en-GB" dirty="0" smtClean="0"/>
+              <a:t>Use </a:t>
+            </a:r>
             <a:r>
               <a:rPr lang="en-GB" dirty="0" err="1" smtClean="0"/>
-              <a:t>rdfEditor</a:t>
-            </a:r>
-            <a:r>
-              <a:rPr lang="en-GB" dirty="0" smtClean="0"/>
-              <a:t> Core – </a:t>
-            </a:r>
-            <a:r>
-              <a:rPr lang="en-GB" dirty="0" err="1" smtClean="0"/>
-              <a:t>rdfEditor.Core.dll</a:t>
-            </a:r>
-            <a:endParaRPr lang="en-GB" dirty="0" smtClean="0"/>
+              <a:t>Lucene.Net</a:t>
+            </a:r>
+            <a:r>
+              <a:rPr lang="en-GB" dirty="0" smtClean="0"/>
+              <a:t> to provide full text search capabilities</a:t>
+            </a:r>
           </a:p>
           <a:p>
             <a:pPr lvl="1"/>
             <a:r>
               <a:rPr lang="en-GB" dirty="0" smtClean="0"/>
-              <a:t>Abstraction </a:t>
-            </a:r>
-            <a:r>
-              <a:rPr lang="en-GB" dirty="0" smtClean="0"/>
-              <a:t>of much of the core functionality into a separate library </a:t>
-            </a:r>
-            <a:r>
-              <a:rPr lang="en-GB" dirty="0" err="1" smtClean="0"/>
-              <a:t>rdfEditor.Core</a:t>
-            </a:r>
-            <a:endParaRPr lang="en-GB" dirty="0" smtClean="0"/>
+              <a:t>Syntax compatible with other implementations as far as possible</a:t>
+            </a:r>
           </a:p>
           <a:p>
             <a:pPr lvl="1"/>
             <a:r>
               <a:rPr lang="en-GB" dirty="0" smtClean="0"/>
-              <a:t>Alternative GUI implementation </a:t>
-            </a:r>
-            <a:r>
-              <a:rPr lang="en-GB" dirty="0" smtClean="0"/>
-              <a:t>of </a:t>
-            </a:r>
-            <a:r>
-              <a:rPr lang="en-GB" dirty="0" err="1" smtClean="0"/>
-              <a:t>rdfEditor</a:t>
-            </a:r>
-            <a:r>
-              <a:rPr lang="en-GB" dirty="0" smtClean="0"/>
-              <a:t> using this new library</a:t>
-            </a:r>
-          </a:p>
-          <a:p>
-            <a:pPr lvl="2"/>
-            <a:r>
-              <a:rPr lang="en-GB" dirty="0" smtClean="0"/>
-              <a:t>Will use a GUI that is works on Mono and non-Windows systems </a:t>
-            </a:r>
-            <a:r>
-              <a:rPr lang="en-GB" dirty="0" err="1" smtClean="0"/>
-              <a:t>e.g</a:t>
-            </a:r>
-            <a:r>
-              <a:rPr lang="en-GB" dirty="0" smtClean="0"/>
-              <a:t> </a:t>
-            </a:r>
-            <a:r>
-              <a:rPr lang="en-GB" dirty="0" err="1" smtClean="0"/>
-              <a:t>MonoDevelop’s</a:t>
-            </a:r>
-            <a:r>
-              <a:rPr lang="en-GB" dirty="0" smtClean="0"/>
-              <a:t> GTK# based editor</a:t>
-            </a:r>
-          </a:p>
-          <a:p>
-            <a:pPr lvl="1"/>
-            <a:r>
-              <a:rPr lang="en-GB" dirty="0" smtClean="0"/>
-              <a:t>Existing WPF version of </a:t>
-            </a:r>
-            <a:r>
-              <a:rPr lang="en-GB" dirty="0" err="1" smtClean="0"/>
-              <a:t>rdfEditor</a:t>
-            </a:r>
-            <a:r>
-              <a:rPr lang="en-GB" dirty="0" smtClean="0"/>
-              <a:t> will be </a:t>
-            </a:r>
-            <a:r>
-              <a:rPr lang="en-GB" dirty="0" err="1" smtClean="0"/>
-              <a:t>refactored</a:t>
-            </a:r>
-            <a:r>
-              <a:rPr lang="en-GB" dirty="0" smtClean="0"/>
-              <a:t> to use </a:t>
-            </a:r>
-            <a:r>
-              <a:rPr lang="en-GB" dirty="0" smtClean="0"/>
-              <a:t>this</a:t>
+              <a:t>Will be implemented as a new library since as per the architecture proposal it is a non core feature and requires additional dependencies</a:t>
             </a:r>
             <a:endParaRPr lang="en-GB" dirty="0"/>
           </a:p>
@@ -9902,9 +9831,9 @@
             <a:fld id="{CDAEE9B0-25E7-4C28-AF1D-B3DDCE7EBBDB}" type="datetime1">
               <a:rPr lang="en-US" smtClean="0"/>
               <a:pPr/>
-              <a:t>7/20/2011</a:t>
+              <a:t>7/26/2011</a:t>
             </a:fld>
-            <a:endParaRPr lang="en-GB" dirty="0"/>
+            <a:endParaRPr lang="en-GB"/>
           </a:p>
         </p:txBody>
       </p:sp>
@@ -9924,10 +9853,10 @@
           <a:lstStyle/>
           <a:p>
             <a:r>
-              <a:rPr lang="en-GB" dirty="0" smtClean="0"/>
+              <a:rPr lang="en-GB" smtClean="0"/>
               <a:t>http://www.dotnetrdf.org</a:t>
             </a:r>
-            <a:endParaRPr lang="en-GB" dirty="0"/>
+            <a:endParaRPr lang="en-GB"/>
           </a:p>
         </p:txBody>
       </p:sp>
@@ -9956,6 +9885,11 @@
         </p:txBody>
       </p:sp>
     </p:spTree>
+    <p:extLst>
+      <p:ext uri="{BB962C8B-B14F-4D97-AF65-F5344CB8AC3E}">
+        <p14:creationId xmlns="" xmlns:p14="http://schemas.microsoft.com/office/powerpoint/2010/main" val="912609684"/>
+      </p:ext>
+    </p:extLst>
   </p:cSld>
   <p:clrMapOvr>
     <a:masterClrMapping/>
@@ -9997,7 +9931,7 @@
           <a:p>
             <a:r>
               <a:rPr lang="en-GB" dirty="0" smtClean="0"/>
-              <a:t>Our Suggestions (4 of 4)</a:t>
+              <a:t>Our Suggestions (2 of 4)</a:t>
             </a:r>
             <a:endParaRPr lang="en-GB" dirty="0"/>
           </a:p>
@@ -10020,58 +9954,34 @@
           <a:p>
             <a:r>
               <a:rPr lang="en-GB" dirty="0" err="1" smtClean="0"/>
-              <a:t>rdfEditor.Core</a:t>
-            </a:r>
-            <a:r>
-              <a:rPr lang="en-GB" smtClean="0"/>
-              <a:t> will provide </a:t>
-            </a:r>
-            <a:r>
-              <a:rPr lang="en-GB" dirty="0" smtClean="0"/>
-              <a:t>the following:</a:t>
+              <a:t>GeoSPARQL</a:t>
+            </a:r>
+            <a:r>
+              <a:rPr lang="en-GB" dirty="0" smtClean="0"/>
+              <a:t> Support – dotNetRDF.Sparql.Geo.dll</a:t>
             </a:r>
           </a:p>
           <a:p>
             <a:pPr lvl="1"/>
             <a:r>
               <a:rPr lang="en-GB" dirty="0" smtClean="0"/>
-              <a:t>Cleaner and reusable shared code based between different GUI frontends</a:t>
+              <a:t>Provide an implementation of the OGC </a:t>
+            </a:r>
+            <a:r>
+              <a:rPr lang="en-GB" dirty="0" err="1" smtClean="0"/>
+              <a:t>GeoSPARQL</a:t>
+            </a:r>
+            <a:r>
+              <a:rPr lang="en-GB" dirty="0" smtClean="0"/>
+              <a:t> standard</a:t>
             </a:r>
           </a:p>
           <a:p>
             <a:pPr lvl="1"/>
             <a:r>
               <a:rPr lang="en-GB" dirty="0" smtClean="0"/>
-              <a:t>Support for multiple document editing</a:t>
-            </a:r>
-          </a:p>
-          <a:p>
-            <a:pPr lvl="1"/>
-            <a:r>
-              <a:rPr lang="en-GB" dirty="0" smtClean="0"/>
-              <a:t>Improved support for conversion between formats</a:t>
-            </a:r>
-          </a:p>
-          <a:p>
-            <a:pPr lvl="1"/>
-            <a:r>
-              <a:rPr lang="en-GB" dirty="0" smtClean="0"/>
-              <a:t>Extensible </a:t>
-            </a:r>
-            <a:r>
-              <a:rPr lang="en-GB" dirty="0" err="1" smtClean="0"/>
-              <a:t>plugin</a:t>
-            </a:r>
-            <a:r>
-              <a:rPr lang="en-GB" dirty="0" smtClean="0"/>
-              <a:t> system</a:t>
-            </a:r>
-          </a:p>
-          <a:p>
-            <a:pPr lvl="1"/>
-            <a:endParaRPr lang="en-GB" dirty="0" smtClean="0"/>
-          </a:p>
-          <a:p>
+              <a:t>As with full text SPARQL will be implemented as a new library as is as non-core feature</a:t>
+            </a:r>
             <a:endParaRPr lang="en-GB" dirty="0"/>
           </a:p>
         </p:txBody>
@@ -10094,7 +10004,7 @@
             <a:fld id="{CDAEE9B0-25E7-4C28-AF1D-B3DDCE7EBBDB}" type="datetime1">
               <a:rPr lang="en-US" smtClean="0"/>
               <a:pPr/>
-              <a:t>7/20/2011</a:t>
+              <a:t>7/26/2011</a:t>
             </a:fld>
             <a:endParaRPr lang="en-GB"/>
           </a:p>
@@ -10148,6 +10058,11 @@
         </p:txBody>
       </p:sp>
     </p:spTree>
+    <p:extLst>
+      <p:ext uri="{BB962C8B-B14F-4D97-AF65-F5344CB8AC3E}">
+        <p14:creationId xmlns="" xmlns:p14="http://schemas.microsoft.com/office/powerpoint/2010/main" val="585871984"/>
+      </p:ext>
+    </p:extLst>
   </p:cSld>
   <p:clrMapOvr>
     <a:masterClrMapping/>
@@ -10184,12 +10099,14 @@
         </p:nvSpPr>
         <p:spPr/>
         <p:txBody>
-          <a:bodyPr/>
-          <a:lstStyle/>
-          <a:p>
-            <a:r>
-              <a:rPr lang="en-GB" dirty="0" smtClean="0"/>
-              <a:t>Existing Community Suggestions</a:t>
+          <a:bodyPr>
+            <a:normAutofit/>
+          </a:bodyPr>
+          <a:lstStyle/>
+          <a:p>
+            <a:r>
+              <a:rPr lang="en-GB" dirty="0" smtClean="0"/>
+              <a:t>Our Suggestions (3 of 4)</a:t>
             </a:r>
             <a:endParaRPr lang="en-GB" dirty="0"/>
           </a:p>
@@ -10210,52 +10127,91 @@
           <a:bodyPr/>
           <a:lstStyle/>
           <a:p>
-            <a:r>
-              <a:rPr lang="en-GB" dirty="0" smtClean="0"/>
-              <a:t>Currently the following features have been suggested/requested by the community:</a:t>
-            </a:r>
-          </a:p>
-          <a:p>
-            <a:pPr lvl="1"/>
-            <a:r>
-              <a:rPr lang="en-GB" dirty="0" err="1" smtClean="0"/>
-              <a:t>.Net</a:t>
-            </a:r>
-            <a:r>
-              <a:rPr lang="en-GB" dirty="0" smtClean="0"/>
-              <a:t> Serialization support</a:t>
-            </a:r>
-          </a:p>
-          <a:p>
-            <a:pPr lvl="1"/>
-            <a:r>
-              <a:rPr lang="en-GB" dirty="0" smtClean="0"/>
-              <a:t>SPIN (SPARQL Inferencing Notation) Support</a:t>
-            </a:r>
-          </a:p>
-          <a:p>
-            <a:pPr lvl="1"/>
             <a:r>
               <a:rPr lang="en-GB" dirty="0" err="1" smtClean="0"/>
               <a:t>rdfEditor</a:t>
             </a:r>
             <a:r>
               <a:rPr lang="en-GB" dirty="0" smtClean="0"/>
-              <a:t> for non-Windows systems</a:t>
+              <a:t> Core – </a:t>
+            </a:r>
+            <a:r>
+              <a:rPr lang="en-GB" dirty="0" err="1" smtClean="0"/>
+              <a:t>rdfEditor.Core.dll</a:t>
+            </a:r>
+            <a:endParaRPr lang="en-GB" dirty="0" smtClean="0"/>
+          </a:p>
+          <a:p>
+            <a:pPr lvl="1"/>
+            <a:r>
+              <a:rPr lang="en-GB" dirty="0" smtClean="0"/>
+              <a:t>Abstraction of much of the core functionality into a separate library </a:t>
+            </a:r>
+            <a:r>
+              <a:rPr lang="en-GB" dirty="0" err="1" smtClean="0"/>
+              <a:t>rdfEditor.Core</a:t>
+            </a:r>
+            <a:endParaRPr lang="en-GB" dirty="0" smtClean="0"/>
+          </a:p>
+          <a:p>
+            <a:pPr lvl="1"/>
+            <a:r>
+              <a:rPr lang="en-GB" dirty="0" smtClean="0"/>
+              <a:t>Alternative GUI implementation of </a:t>
+            </a:r>
+            <a:r>
+              <a:rPr lang="en-GB" dirty="0" err="1" smtClean="0"/>
+              <a:t>rdfEditor</a:t>
+            </a:r>
+            <a:r>
+              <a:rPr lang="en-GB" dirty="0" smtClean="0"/>
+              <a:t> using this new library</a:t>
             </a:r>
           </a:p>
           <a:p>
             <a:pPr lvl="2"/>
             <a:r>
               <a:rPr lang="en-GB" dirty="0" smtClean="0"/>
-              <a:t>As it is WPF based it does not run under Mono which limits it to Windows only currently</a:t>
+              <a:t>Will use a GUI that is works on Mono and non-Windows systems </a:t>
+            </a:r>
+            <a:r>
+              <a:rPr lang="en-GB" dirty="0" err="1" smtClean="0"/>
+              <a:t>e.g</a:t>
+            </a:r>
+            <a:r>
+              <a:rPr lang="en-GB" dirty="0" smtClean="0"/>
+              <a:t> </a:t>
+            </a:r>
+            <a:r>
+              <a:rPr lang="en-GB" dirty="0" err="1" smtClean="0"/>
+              <a:t>MonoDevelop’s</a:t>
+            </a:r>
+            <a:r>
+              <a:rPr lang="en-GB" dirty="0" smtClean="0"/>
+              <a:t> GTK# based editor</a:t>
             </a:r>
           </a:p>
           <a:p>
             <a:pPr lvl="1"/>
             <a:r>
               <a:rPr lang="en-GB" dirty="0" smtClean="0"/>
-              <a:t>Additional JSON format support</a:t>
+              <a:t>Existing WPF version of </a:t>
+            </a:r>
+            <a:r>
+              <a:rPr lang="en-GB" dirty="0" err="1" smtClean="0"/>
+              <a:t>rdfEditor</a:t>
+            </a:r>
+            <a:r>
+              <a:rPr lang="en-GB" dirty="0" smtClean="0"/>
+              <a:t> will be </a:t>
+            </a:r>
+            <a:r>
+              <a:rPr lang="en-GB" dirty="0" err="1" smtClean="0"/>
+              <a:t>refactored</a:t>
+            </a:r>
+            <a:r>
+              <a:rPr lang="en-GB" dirty="0" smtClean="0"/>
+              <a:t> to use this</a:t>
             </a:r>
             <a:endParaRPr lang="en-GB" dirty="0"/>
           </a:p>
@@ -10279,9 +10235,9 @@
             <a:fld id="{CDAEE9B0-25E7-4C28-AF1D-B3DDCE7EBBDB}" type="datetime1">
               <a:rPr lang="en-US" smtClean="0"/>
               <a:pPr/>
-              <a:t>7/20/2011</a:t>
+              <a:t>7/26/2011</a:t>
             </a:fld>
-            <a:endParaRPr lang="en-GB"/>
+            <a:endParaRPr lang="en-GB" dirty="0"/>
           </a:p>
         </p:txBody>
       </p:sp>
@@ -10301,10 +10257,10 @@
           <a:lstStyle/>
           <a:p>
             <a:r>
-              <a:rPr lang="en-GB" smtClean="0"/>
+              <a:rPr lang="en-GB" dirty="0" smtClean="0"/>
               <a:t>http://www.dotnetrdf.org</a:t>
             </a:r>
-            <a:endParaRPr lang="en-GB"/>
+            <a:endParaRPr lang="en-GB" dirty="0"/>
           </a:p>
         </p:txBody>
       </p:sp>
@@ -10333,11 +10289,6 @@
         </p:txBody>
       </p:sp>
     </p:spTree>
-    <p:extLst>
-      <p:ext uri="{BB962C8B-B14F-4D97-AF65-F5344CB8AC3E}">
-        <p14:creationId xmlns:p14="http://schemas.microsoft.com/office/powerpoint/2010/main" xmlns="" val="2152085500"/>
-      </p:ext>
-    </p:extLst>
   </p:cSld>
   <p:clrMapOvr>
     <a:masterClrMapping/>
@@ -10364,7 +10315,7 @@
       </p:grpSpPr>
       <p:sp>
         <p:nvSpPr>
-          <p:cNvPr id="7" name="Title 6"/>
+          <p:cNvPr id="2" name="Title 1"/>
           <p:cNvSpPr>
             <a:spLocks noGrp="1"/>
           </p:cNvSpPr>
@@ -10379,8 +10330,81 @@
           <a:p>
             <a:r>
               <a:rPr lang="en-GB" dirty="0" smtClean="0"/>
-              <a:t>Get Involved</a:t>
-            </a:r>
+              <a:t>Our Suggestions (4 of 4)</a:t>
+            </a:r>
+            <a:endParaRPr lang="en-GB" dirty="0"/>
+          </a:p>
+        </p:txBody>
+      </p:sp>
+      <p:sp>
+        <p:nvSpPr>
+          <p:cNvPr id="3" name="Content Placeholder 2"/>
+          <p:cNvSpPr>
+            <a:spLocks noGrp="1"/>
+          </p:cNvSpPr>
+          <p:nvPr>
+            <p:ph idx="1"/>
+          </p:nvPr>
+        </p:nvSpPr>
+        <p:spPr/>
+        <p:txBody>
+          <a:bodyPr/>
+          <a:lstStyle/>
+          <a:p>
+            <a:r>
+              <a:rPr lang="en-GB" dirty="0" err="1" smtClean="0"/>
+              <a:t>rdfEditor.Core</a:t>
+            </a:r>
+            <a:r>
+              <a:rPr lang="en-GB" smtClean="0"/>
+              <a:t> will provide </a:t>
+            </a:r>
+            <a:r>
+              <a:rPr lang="en-GB" dirty="0" smtClean="0"/>
+              <a:t>the following:</a:t>
+            </a:r>
+          </a:p>
+          <a:p>
+            <a:pPr lvl="1"/>
+            <a:r>
+              <a:rPr lang="en-GB" dirty="0" smtClean="0"/>
+              <a:t>Cleaner and reusable shared code based between different GUI frontends</a:t>
+            </a:r>
+          </a:p>
+          <a:p>
+            <a:pPr lvl="1"/>
+            <a:r>
+              <a:rPr lang="en-GB" dirty="0" smtClean="0"/>
+              <a:t>Support for multiple document editing</a:t>
+            </a:r>
+          </a:p>
+          <a:p>
+            <a:pPr lvl="1"/>
+            <a:r>
+              <a:rPr lang="en-GB" dirty="0" smtClean="0"/>
+              <a:t>Improved support for conversion between formats</a:t>
+            </a:r>
+          </a:p>
+          <a:p>
+            <a:pPr lvl="1"/>
+            <a:r>
+              <a:rPr lang="en-GB" dirty="0" smtClean="0"/>
+              <a:t>Extensible </a:t>
+            </a:r>
+            <a:r>
+              <a:rPr lang="en-GB" dirty="0" err="1" smtClean="0"/>
+              <a:t>plugin</a:t>
+            </a:r>
+            <a:r>
+              <a:rPr lang="en-GB" dirty="0" smtClean="0"/>
+              <a:t> system</a:t>
+            </a:r>
+          </a:p>
+          <a:p>
+            <a:pPr lvl="1"/>
+            <a:endParaRPr lang="en-GB" dirty="0" smtClean="0"/>
+          </a:p>
+          <a:p>
             <a:endParaRPr lang="en-GB" dirty="0"/>
           </a:p>
         </p:txBody>
@@ -10403,7 +10427,7 @@
             <a:fld id="{CDAEE9B0-25E7-4C28-AF1D-B3DDCE7EBBDB}" type="datetime1">
               <a:rPr lang="en-US" smtClean="0"/>
               <a:pPr/>
-              <a:t>7/20/2011</a:t>
+              <a:t>7/26/2011</a:t>
             </a:fld>
             <a:endParaRPr lang="en-GB"/>
           </a:p>
@@ -10457,11 +10481,6 @@
         </p:txBody>
       </p:sp>
     </p:spTree>
-    <p:extLst>
-      <p:ext uri="{BB962C8B-B14F-4D97-AF65-F5344CB8AC3E}">
-        <p14:creationId xmlns:p14="http://schemas.microsoft.com/office/powerpoint/2010/main" xmlns="" val="3258641840"/>
-      </p:ext>
-    </p:extLst>
   </p:cSld>
   <p:clrMapOvr>
     <a:masterClrMapping/>
@@ -10503,7 +10522,7 @@
           <a:p>
             <a:r>
               <a:rPr lang="en-GB" dirty="0" smtClean="0"/>
-              <a:t>Get Involved</a:t>
+              <a:t>Existing Community Suggestions</a:t>
             </a:r>
             <a:endParaRPr lang="en-GB" dirty="0"/>
           </a:p>
@@ -10521,63 +10540,57 @@
         </p:nvSpPr>
         <p:spPr/>
         <p:txBody>
-          <a:bodyPr>
-            <a:normAutofit/>
-          </a:bodyPr>
-          <a:lstStyle/>
-          <a:p>
-            <a:r>
-              <a:rPr lang="en-GB" dirty="0" smtClean="0"/>
-              <a:t>Suggestions and feedback on this roadmap are solicited and welcomed</a:t>
-            </a:r>
-          </a:p>
-          <a:p>
-            <a:r>
-              <a:rPr lang="en-GB" dirty="0" smtClean="0"/>
-              <a:t>Via email:</a:t>
+          <a:bodyPr/>
+          <a:lstStyle/>
+          <a:p>
+            <a:r>
+              <a:rPr lang="en-GB" dirty="0" smtClean="0"/>
+              <a:t>Currently the following features have been suggested/requested by the community:</a:t>
             </a:r>
           </a:p>
           <a:p>
             <a:pPr lvl="1"/>
             <a:r>
-              <a:rPr lang="en-GB" dirty="0" smtClean="0"/>
-              <a:t>Mailing List – </a:t>
-            </a:r>
-            <a:r>
-              <a:rPr lang="en-GB" dirty="0" smtClean="0">
-                <a:hlinkClick r:id="rId2"/>
-              </a:rPr>
-              <a:t>dotnetrdf-develop@lists.sf.net</a:t>
-            </a:r>
-            <a:endParaRPr lang="en-GB" dirty="0" smtClean="0"/>
+              <a:rPr lang="en-GB" dirty="0" err="1" smtClean="0"/>
+              <a:t>.Net</a:t>
+            </a:r>
+            <a:r>
+              <a:rPr lang="en-GB" dirty="0" smtClean="0"/>
+              <a:t> Serialization support</a:t>
+            </a:r>
           </a:p>
           <a:p>
             <a:pPr lvl="1"/>
             <a:r>
               <a:rPr lang="en-GB" dirty="0" smtClean="0"/>
-              <a:t>Direct Email – </a:t>
-            </a:r>
-            <a:r>
-              <a:rPr lang="en-GB" dirty="0" smtClean="0">
-                <a:hlinkClick r:id="rId3"/>
-              </a:rPr>
-              <a:t>rvesse@dotnetrdf.org</a:t>
-            </a:r>
-            <a:endParaRPr lang="en-GB" dirty="0" smtClean="0"/>
-          </a:p>
-          <a:p>
-            <a:r>
-              <a:rPr lang="en-GB" dirty="0" smtClean="0"/>
-              <a:t>Via Skype (</a:t>
-            </a:r>
+              <a:t>SPIN (SPARQL Inferencing Notation) Support</a:t>
+            </a:r>
+          </a:p>
+          <a:p>
+            <a:pPr lvl="1"/>
             <a:r>
               <a:rPr lang="en-GB" dirty="0" err="1" smtClean="0"/>
-              <a:t>rvesse</a:t>
-            </a:r>
-            <a:r>
-              <a:rPr lang="en-GB" dirty="0" smtClean="0"/>
-              <a:t>) – please email first to arrange a meeting</a:t>
-            </a:r>
+              <a:t>rdfEditor</a:t>
+            </a:r>
+            <a:r>
+              <a:rPr lang="en-GB" dirty="0" smtClean="0"/>
+              <a:t> for non-Windows systems</a:t>
+            </a:r>
+          </a:p>
+          <a:p>
+            <a:pPr lvl="2"/>
+            <a:r>
+              <a:rPr lang="en-GB" dirty="0" smtClean="0"/>
+              <a:t>As it is WPF based it does not run under Mono which limits it to Windows only currently</a:t>
+            </a:r>
+          </a:p>
+          <a:p>
+            <a:pPr lvl="1"/>
+            <a:r>
+              <a:rPr lang="en-GB" dirty="0" smtClean="0"/>
+              <a:t>Additional JSON format support</a:t>
+            </a:r>
+            <a:endParaRPr lang="en-GB" dirty="0"/>
           </a:p>
         </p:txBody>
       </p:sp>
@@ -10599,7 +10612,7 @@
             <a:fld id="{CDAEE9B0-25E7-4C28-AF1D-B3DDCE7EBBDB}" type="datetime1">
               <a:rPr lang="en-US" smtClean="0"/>
               <a:pPr/>
-              <a:t>7/20/2011</a:t>
+              <a:t>7/26/2011</a:t>
             </a:fld>
             <a:endParaRPr lang="en-GB"/>
           </a:p>
@@ -10655,7 +10668,7 @@
     </p:spTree>
     <p:extLst>
       <p:ext uri="{BB962C8B-B14F-4D97-AF65-F5344CB8AC3E}">
-        <p14:creationId xmlns:p14="http://schemas.microsoft.com/office/powerpoint/2010/main" xmlns="" val="1264147251"/>
+        <p14:creationId xmlns="" xmlns:p14="http://schemas.microsoft.com/office/powerpoint/2010/main" val="2152085500"/>
       </p:ext>
     </p:extLst>
   </p:cSld>
@@ -10684,7 +10697,7 @@
       </p:grpSpPr>
       <p:sp>
         <p:nvSpPr>
-          <p:cNvPr id="2" name="Title 1"/>
+          <p:cNvPr id="7" name="Title 6"/>
           <p:cNvSpPr>
             <a:spLocks noGrp="1"/>
           </p:cNvSpPr>
@@ -10699,84 +10712,12 @@
           <a:p>
             <a:r>
               <a:rPr lang="en-GB" dirty="0" smtClean="0"/>
-              <a:t>Get Involved</a:t>
-            </a:r>
-            <a:endParaRPr lang="en-GB" dirty="0"/>
-          </a:p>
-        </p:txBody>
-      </p:sp>
-      <p:sp>
-        <p:nvSpPr>
-          <p:cNvPr id="3" name="Content Placeholder 2"/>
-          <p:cNvSpPr>
-            <a:spLocks noGrp="1"/>
-          </p:cNvSpPr>
-          <p:nvPr>
-            <p:ph idx="1"/>
-          </p:nvPr>
-        </p:nvSpPr>
-        <p:spPr/>
-        <p:txBody>
-          <a:bodyPr/>
-          <a:lstStyle/>
-          <a:p>
-            <a:r>
-              <a:rPr lang="en-GB" dirty="0"/>
-              <a:t>Face to Face </a:t>
-            </a:r>
-          </a:p>
-          <a:p>
-            <a:pPr lvl="1"/>
-            <a:r>
-              <a:rPr lang="en-GB" dirty="0"/>
-              <a:t>Conferences – contact me via email to see what conferences I plain on attending later this year</a:t>
-            </a:r>
-          </a:p>
-          <a:p>
-            <a:pPr lvl="1"/>
-            <a:r>
-              <a:rPr lang="en-GB" dirty="0" err="1"/>
-              <a:t>Meetup</a:t>
-            </a:r>
-            <a:r>
-              <a:rPr lang="en-GB" dirty="0"/>
-              <a:t> – I attend the London </a:t>
-            </a:r>
-            <a:r>
-              <a:rPr lang="en-GB" dirty="0" err="1"/>
-              <a:t>SemWeb</a:t>
-            </a:r>
-            <a:r>
-              <a:rPr lang="en-GB" dirty="0"/>
-              <a:t> </a:t>
-            </a:r>
-            <a:r>
-              <a:rPr lang="en-GB" dirty="0" err="1" smtClean="0"/>
-              <a:t>Meetup</a:t>
-            </a:r>
-            <a:r>
-              <a:rPr lang="en-GB" dirty="0" smtClean="0"/>
-              <a:t>, please check with me via email whether I will be at a specific </a:t>
-            </a:r>
-            <a:r>
-              <a:rPr lang="en-GB" dirty="0" err="1" smtClean="0"/>
-              <a:t>meetup</a:t>
-            </a:r>
-            <a:endParaRPr lang="en-GB" dirty="0"/>
-          </a:p>
-          <a:p>
-            <a:pPr lvl="1"/>
-            <a:r>
-              <a:rPr lang="en-GB" dirty="0"/>
-              <a:t>Meetings – If you are based in the </a:t>
-            </a:r>
-            <a:r>
-              <a:rPr lang="en-GB" dirty="0" smtClean="0"/>
-              <a:t>south of the UK I am happy to arrange meetings via email</a:t>
-            </a:r>
-            <a:endParaRPr lang="en-GB" dirty="0"/>
-          </a:p>
-          <a:p>
+              <a:t>Getting </a:t>
+            </a:r>
+            <a:r>
+              <a:rPr lang="en-GB" dirty="0" smtClean="0"/>
+              <a:t>Involved</a:t>
+            </a:r>
             <a:endParaRPr lang="en-GB" dirty="0"/>
           </a:p>
         </p:txBody>
@@ -10799,7 +10740,7 @@
             <a:fld id="{CDAEE9B0-25E7-4C28-AF1D-B3DDCE7EBBDB}" type="datetime1">
               <a:rPr lang="en-US" smtClean="0"/>
               <a:pPr/>
-              <a:t>7/20/2011</a:t>
+              <a:t>7/26/2011</a:t>
             </a:fld>
             <a:endParaRPr lang="en-GB"/>
           </a:p>
@@ -10855,7 +10796,7 @@
     </p:spTree>
     <p:extLst>
       <p:ext uri="{BB962C8B-B14F-4D97-AF65-F5344CB8AC3E}">
-        <p14:creationId xmlns:p14="http://schemas.microsoft.com/office/powerpoint/2010/main" xmlns="" val="798761902"/>
+        <p14:creationId xmlns="" xmlns:p14="http://schemas.microsoft.com/office/powerpoint/2010/main" val="3258641840"/>
       </p:ext>
     </p:extLst>
   </p:cSld>
@@ -10980,7 +10921,7 @@
             <a:fld id="{CDAEE9B0-25E7-4C28-AF1D-B3DDCE7EBBDB}" type="datetime1">
               <a:rPr lang="en-US" smtClean="0"/>
               <a:pPr/>
-              <a:t>7/20/2011</a:t>
+              <a:t>7/26/2011</a:t>
             </a:fld>
             <a:endParaRPr lang="en-GB"/>
           </a:p>
@@ -11036,9 +10977,1018 @@
     </p:spTree>
     <p:extLst>
       <p:ext uri="{BB962C8B-B14F-4D97-AF65-F5344CB8AC3E}">
-        <p14:creationId xmlns:p14="http://schemas.microsoft.com/office/powerpoint/2010/main" xmlns="" val="685525953"/>
+        <p14:creationId xmlns="" xmlns:p14="http://schemas.microsoft.com/office/powerpoint/2010/main" val="685525953"/>
       </p:ext>
     </p:extLst>
+  </p:cSld>
+  <p:clrMapOvr>
+    <a:masterClrMapping/>
+  </p:clrMapOvr>
+</p:sld>
+</file>
+
+<file path=ppt/slides/slide50.xml><?xml version="1.0" encoding="utf-8"?>
+<p:sld xmlns:a="http://schemas.openxmlformats.org/drawingml/2006/main" xmlns:r="http://schemas.openxmlformats.org/officeDocument/2006/relationships" xmlns:p="http://schemas.openxmlformats.org/presentationml/2006/main">
+  <p:cSld>
+    <p:spTree>
+      <p:nvGrpSpPr>
+        <p:cNvPr id="1" name=""/>
+        <p:cNvGrpSpPr/>
+        <p:nvPr/>
+      </p:nvGrpSpPr>
+      <p:grpSpPr>
+        <a:xfrm>
+          <a:off x="0" y="0"/>
+          <a:ext cx="0" cy="0"/>
+          <a:chOff x="0" y="0"/>
+          <a:chExt cx="0" cy="0"/>
+        </a:xfrm>
+      </p:grpSpPr>
+      <p:sp>
+        <p:nvSpPr>
+          <p:cNvPr id="2" name="Title 1"/>
+          <p:cNvSpPr>
+            <a:spLocks noGrp="1"/>
+          </p:cNvSpPr>
+          <p:nvPr>
+            <p:ph type="title"/>
+          </p:nvPr>
+        </p:nvSpPr>
+        <p:spPr/>
+        <p:txBody>
+          <a:bodyPr/>
+          <a:lstStyle/>
+          <a:p>
+            <a:r>
+              <a:rPr lang="en-GB" dirty="0" smtClean="0"/>
+              <a:t>Get </a:t>
+            </a:r>
+            <a:r>
+              <a:rPr lang="en-GB" dirty="0" smtClean="0"/>
+              <a:t>Involved (1 of 3)</a:t>
+            </a:r>
+            <a:endParaRPr lang="en-GB" dirty="0"/>
+          </a:p>
+        </p:txBody>
+      </p:sp>
+      <p:sp>
+        <p:nvSpPr>
+          <p:cNvPr id="3" name="Content Placeholder 2"/>
+          <p:cNvSpPr>
+            <a:spLocks noGrp="1"/>
+          </p:cNvSpPr>
+          <p:nvPr>
+            <p:ph idx="1"/>
+          </p:nvPr>
+        </p:nvSpPr>
+        <p:spPr/>
+        <p:txBody>
+          <a:bodyPr>
+            <a:normAutofit/>
+          </a:bodyPr>
+          <a:lstStyle/>
+          <a:p>
+            <a:r>
+              <a:rPr lang="en-GB" dirty="0" smtClean="0"/>
+              <a:t>Suggestions and feedback on this roadmap are solicited and welcomed</a:t>
+            </a:r>
+          </a:p>
+          <a:p>
+            <a:r>
+              <a:rPr lang="en-GB" dirty="0" smtClean="0"/>
+              <a:t>Via email:</a:t>
+            </a:r>
+          </a:p>
+          <a:p>
+            <a:pPr lvl="1"/>
+            <a:r>
+              <a:rPr lang="en-GB" dirty="0" smtClean="0"/>
+              <a:t>Mailing List – </a:t>
+            </a:r>
+            <a:r>
+              <a:rPr lang="en-GB" dirty="0" smtClean="0">
+                <a:hlinkClick r:id="rId2"/>
+              </a:rPr>
+              <a:t>dotnetrdf-develop@lists.sf.net</a:t>
+            </a:r>
+            <a:endParaRPr lang="en-GB" dirty="0" smtClean="0"/>
+          </a:p>
+          <a:p>
+            <a:pPr lvl="1"/>
+            <a:r>
+              <a:rPr lang="en-GB" dirty="0" smtClean="0"/>
+              <a:t>Direct Email – </a:t>
+            </a:r>
+            <a:r>
+              <a:rPr lang="en-GB" dirty="0" smtClean="0">
+                <a:hlinkClick r:id="rId3"/>
+              </a:rPr>
+              <a:t>rvesse@dotnetrdf.org</a:t>
+            </a:r>
+            <a:endParaRPr lang="en-GB" dirty="0" smtClean="0"/>
+          </a:p>
+          <a:p>
+            <a:r>
+              <a:rPr lang="en-GB" dirty="0" smtClean="0"/>
+              <a:t>Via Skype (</a:t>
+            </a:r>
+            <a:r>
+              <a:rPr lang="en-GB" dirty="0" err="1" smtClean="0"/>
+              <a:t>rvesse</a:t>
+            </a:r>
+            <a:r>
+              <a:rPr lang="en-GB" dirty="0" smtClean="0"/>
+              <a:t>) – please email first to arrange a meeting</a:t>
+            </a:r>
+          </a:p>
+        </p:txBody>
+      </p:sp>
+      <p:sp>
+        <p:nvSpPr>
+          <p:cNvPr id="4" name="Date Placeholder 3"/>
+          <p:cNvSpPr>
+            <a:spLocks noGrp="1"/>
+          </p:cNvSpPr>
+          <p:nvPr>
+            <p:ph type="dt" sz="half" idx="10"/>
+          </p:nvPr>
+        </p:nvSpPr>
+        <p:spPr/>
+        <p:txBody>
+          <a:bodyPr/>
+          <a:lstStyle/>
+          <a:p>
+            <a:fld id="{CDAEE9B0-25E7-4C28-AF1D-B3DDCE7EBBDB}" type="datetime1">
+              <a:rPr lang="en-US" smtClean="0"/>
+              <a:pPr/>
+              <a:t>7/26/2011</a:t>
+            </a:fld>
+            <a:endParaRPr lang="en-GB"/>
+          </a:p>
+        </p:txBody>
+      </p:sp>
+      <p:sp>
+        <p:nvSpPr>
+          <p:cNvPr id="5" name="Footer Placeholder 4"/>
+          <p:cNvSpPr>
+            <a:spLocks noGrp="1"/>
+          </p:cNvSpPr>
+          <p:nvPr>
+            <p:ph type="ftr" sz="quarter" idx="11"/>
+          </p:nvPr>
+        </p:nvSpPr>
+        <p:spPr/>
+        <p:txBody>
+          <a:bodyPr/>
+          <a:lstStyle/>
+          <a:p>
+            <a:r>
+              <a:rPr lang="en-GB" smtClean="0"/>
+              <a:t>http://www.dotnetrdf.org</a:t>
+            </a:r>
+            <a:endParaRPr lang="en-GB"/>
+          </a:p>
+        </p:txBody>
+      </p:sp>
+      <p:sp>
+        <p:nvSpPr>
+          <p:cNvPr id="6" name="Slide Number Placeholder 5"/>
+          <p:cNvSpPr>
+            <a:spLocks noGrp="1"/>
+          </p:cNvSpPr>
+          <p:nvPr>
+            <p:ph type="sldNum" sz="quarter" idx="12"/>
+          </p:nvPr>
+        </p:nvSpPr>
+        <p:spPr/>
+        <p:txBody>
+          <a:bodyPr/>
+          <a:lstStyle/>
+          <a:p>
+            <a:fld id="{35128F56-7434-487A-8B29-0C024560A5F4}" type="slidenum">
+              <a:rPr lang="en-GB" smtClean="0"/>
+              <a:pPr/>
+              <a:t>50</a:t>
+            </a:fld>
+            <a:endParaRPr lang="en-GB"/>
+          </a:p>
+        </p:txBody>
+      </p:sp>
+    </p:spTree>
+    <p:extLst>
+      <p:ext uri="{BB962C8B-B14F-4D97-AF65-F5344CB8AC3E}">
+        <p14:creationId xmlns="" xmlns:p14="http://schemas.microsoft.com/office/powerpoint/2010/main" val="1264147251"/>
+      </p:ext>
+    </p:extLst>
+  </p:cSld>
+  <p:clrMapOvr>
+    <a:masterClrMapping/>
+  </p:clrMapOvr>
+</p:sld>
+</file>
+
+<file path=ppt/slides/slide51.xml><?xml version="1.0" encoding="utf-8"?>
+<p:sld xmlns:a="http://schemas.openxmlformats.org/drawingml/2006/main" xmlns:r="http://schemas.openxmlformats.org/officeDocument/2006/relationships" xmlns:p="http://schemas.openxmlformats.org/presentationml/2006/main">
+  <p:cSld>
+    <p:spTree>
+      <p:nvGrpSpPr>
+        <p:cNvPr id="1" name=""/>
+        <p:cNvGrpSpPr/>
+        <p:nvPr/>
+      </p:nvGrpSpPr>
+      <p:grpSpPr>
+        <a:xfrm>
+          <a:off x="0" y="0"/>
+          <a:ext cx="0" cy="0"/>
+          <a:chOff x="0" y="0"/>
+          <a:chExt cx="0" cy="0"/>
+        </a:xfrm>
+      </p:grpSpPr>
+      <p:sp>
+        <p:nvSpPr>
+          <p:cNvPr id="2" name="Title 1"/>
+          <p:cNvSpPr>
+            <a:spLocks noGrp="1"/>
+          </p:cNvSpPr>
+          <p:nvPr>
+            <p:ph type="title"/>
+          </p:nvPr>
+        </p:nvSpPr>
+        <p:spPr/>
+        <p:txBody>
+          <a:bodyPr/>
+          <a:lstStyle/>
+          <a:p>
+            <a:r>
+              <a:rPr lang="en-GB" dirty="0" smtClean="0"/>
+              <a:t>Get Involved (2 of 3)</a:t>
+            </a:r>
+            <a:endParaRPr lang="en-GB" dirty="0"/>
+          </a:p>
+        </p:txBody>
+      </p:sp>
+      <p:sp>
+        <p:nvSpPr>
+          <p:cNvPr id="3" name="Content Placeholder 2"/>
+          <p:cNvSpPr>
+            <a:spLocks noGrp="1"/>
+          </p:cNvSpPr>
+          <p:nvPr>
+            <p:ph idx="1"/>
+          </p:nvPr>
+        </p:nvSpPr>
+        <p:spPr/>
+        <p:txBody>
+          <a:bodyPr/>
+          <a:lstStyle/>
+          <a:p>
+            <a:r>
+              <a:rPr lang="en-GB" dirty="0" smtClean="0"/>
+              <a:t>Use the Issue Tracker – </a:t>
+            </a:r>
+            <a:r>
+              <a:rPr lang="en-GB" dirty="0" smtClean="0">
+                <a:hlinkClick r:id="rId2"/>
+              </a:rPr>
+              <a:t>http://www.dotnetrdf.org/tracker/</a:t>
+            </a:r>
+            <a:endParaRPr lang="en-GB" dirty="0" smtClean="0"/>
+          </a:p>
+          <a:p>
+            <a:pPr lvl="1"/>
+            <a:r>
+              <a:rPr lang="en-GB" dirty="0" smtClean="0"/>
+              <a:t>Report Bugs</a:t>
+            </a:r>
+          </a:p>
+          <a:p>
+            <a:pPr lvl="1"/>
+            <a:r>
+              <a:rPr lang="en-GB" dirty="0" smtClean="0"/>
+              <a:t>Request/Propose Features</a:t>
+            </a:r>
+          </a:p>
+          <a:p>
+            <a:pPr lvl="1"/>
+            <a:r>
+              <a:rPr lang="en-GB" dirty="0" smtClean="0"/>
+              <a:t>Contribute Patches etc</a:t>
+            </a:r>
+            <a:endParaRPr lang="en-GB" dirty="0"/>
+          </a:p>
+        </p:txBody>
+      </p:sp>
+      <p:sp>
+        <p:nvSpPr>
+          <p:cNvPr id="4" name="Date Placeholder 3"/>
+          <p:cNvSpPr>
+            <a:spLocks noGrp="1"/>
+          </p:cNvSpPr>
+          <p:nvPr>
+            <p:ph type="dt" sz="half" idx="10"/>
+          </p:nvPr>
+        </p:nvSpPr>
+        <p:spPr/>
+        <p:txBody>
+          <a:bodyPr/>
+          <a:lstStyle/>
+          <a:p>
+            <a:fld id="{CDAEE9B0-25E7-4C28-AF1D-B3DDCE7EBBDB}" type="datetime1">
+              <a:rPr lang="en-US" smtClean="0"/>
+              <a:pPr/>
+              <a:t>7/26/2011</a:t>
+            </a:fld>
+            <a:endParaRPr lang="en-GB"/>
+          </a:p>
+        </p:txBody>
+      </p:sp>
+      <p:sp>
+        <p:nvSpPr>
+          <p:cNvPr id="5" name="Footer Placeholder 4"/>
+          <p:cNvSpPr>
+            <a:spLocks noGrp="1"/>
+          </p:cNvSpPr>
+          <p:nvPr>
+            <p:ph type="ftr" sz="quarter" idx="11"/>
+          </p:nvPr>
+        </p:nvSpPr>
+        <p:spPr/>
+        <p:txBody>
+          <a:bodyPr/>
+          <a:lstStyle/>
+          <a:p>
+            <a:r>
+              <a:rPr lang="en-GB" smtClean="0"/>
+              <a:t>http://www.dotnetrdf.org</a:t>
+            </a:r>
+            <a:endParaRPr lang="en-GB"/>
+          </a:p>
+        </p:txBody>
+      </p:sp>
+      <p:sp>
+        <p:nvSpPr>
+          <p:cNvPr id="6" name="Slide Number Placeholder 5"/>
+          <p:cNvSpPr>
+            <a:spLocks noGrp="1"/>
+          </p:cNvSpPr>
+          <p:nvPr>
+            <p:ph type="sldNum" sz="quarter" idx="12"/>
+          </p:nvPr>
+        </p:nvSpPr>
+        <p:spPr/>
+        <p:txBody>
+          <a:bodyPr/>
+          <a:lstStyle/>
+          <a:p>
+            <a:fld id="{35128F56-7434-487A-8B29-0C024560A5F4}" type="slidenum">
+              <a:rPr lang="en-GB" smtClean="0"/>
+              <a:pPr/>
+              <a:t>51</a:t>
+            </a:fld>
+            <a:endParaRPr lang="en-GB"/>
+          </a:p>
+        </p:txBody>
+      </p:sp>
+    </p:spTree>
+  </p:cSld>
+  <p:clrMapOvr>
+    <a:masterClrMapping/>
+  </p:clrMapOvr>
+</p:sld>
+</file>
+
+<file path=ppt/slides/slide52.xml><?xml version="1.0" encoding="utf-8"?>
+<p:sld xmlns:a="http://schemas.openxmlformats.org/drawingml/2006/main" xmlns:r="http://schemas.openxmlformats.org/officeDocument/2006/relationships" xmlns:p="http://schemas.openxmlformats.org/presentationml/2006/main">
+  <p:cSld>
+    <p:spTree>
+      <p:nvGrpSpPr>
+        <p:cNvPr id="1" name=""/>
+        <p:cNvGrpSpPr/>
+        <p:nvPr/>
+      </p:nvGrpSpPr>
+      <p:grpSpPr>
+        <a:xfrm>
+          <a:off x="0" y="0"/>
+          <a:ext cx="0" cy="0"/>
+          <a:chOff x="0" y="0"/>
+          <a:chExt cx="0" cy="0"/>
+        </a:xfrm>
+      </p:grpSpPr>
+      <p:sp>
+        <p:nvSpPr>
+          <p:cNvPr id="2" name="Title 1"/>
+          <p:cNvSpPr>
+            <a:spLocks noGrp="1"/>
+          </p:cNvSpPr>
+          <p:nvPr>
+            <p:ph type="title"/>
+          </p:nvPr>
+        </p:nvSpPr>
+        <p:spPr/>
+        <p:txBody>
+          <a:bodyPr/>
+          <a:lstStyle/>
+          <a:p>
+            <a:r>
+              <a:rPr lang="en-GB" dirty="0" smtClean="0"/>
+              <a:t>Get </a:t>
+            </a:r>
+            <a:r>
+              <a:rPr lang="en-GB" dirty="0" smtClean="0"/>
+              <a:t>Involved (3 of 3)</a:t>
+            </a:r>
+            <a:endParaRPr lang="en-GB" dirty="0"/>
+          </a:p>
+        </p:txBody>
+      </p:sp>
+      <p:sp>
+        <p:nvSpPr>
+          <p:cNvPr id="3" name="Content Placeholder 2"/>
+          <p:cNvSpPr>
+            <a:spLocks noGrp="1"/>
+          </p:cNvSpPr>
+          <p:nvPr>
+            <p:ph idx="1"/>
+          </p:nvPr>
+        </p:nvSpPr>
+        <p:spPr/>
+        <p:txBody>
+          <a:bodyPr/>
+          <a:lstStyle/>
+          <a:p>
+            <a:r>
+              <a:rPr lang="en-GB" dirty="0"/>
+              <a:t>Face to Face </a:t>
+            </a:r>
+          </a:p>
+          <a:p>
+            <a:pPr lvl="1"/>
+            <a:r>
+              <a:rPr lang="en-GB" dirty="0"/>
+              <a:t>Conferences – contact me via email to see what conferences I plain on attending later this year</a:t>
+            </a:r>
+          </a:p>
+          <a:p>
+            <a:pPr lvl="1"/>
+            <a:r>
+              <a:rPr lang="en-GB" dirty="0" err="1"/>
+              <a:t>Meetup</a:t>
+            </a:r>
+            <a:r>
+              <a:rPr lang="en-GB" dirty="0"/>
+              <a:t> – I attend the London </a:t>
+            </a:r>
+            <a:r>
+              <a:rPr lang="en-GB" dirty="0" err="1"/>
+              <a:t>SemWeb</a:t>
+            </a:r>
+            <a:r>
+              <a:rPr lang="en-GB" dirty="0"/>
+              <a:t> </a:t>
+            </a:r>
+            <a:r>
+              <a:rPr lang="en-GB" dirty="0" err="1" smtClean="0"/>
+              <a:t>Meetup</a:t>
+            </a:r>
+            <a:r>
+              <a:rPr lang="en-GB" dirty="0" smtClean="0"/>
+              <a:t>, please check with me via email whether I will be at a specific </a:t>
+            </a:r>
+            <a:r>
+              <a:rPr lang="en-GB" dirty="0" err="1" smtClean="0"/>
+              <a:t>meetup</a:t>
+            </a:r>
+            <a:endParaRPr lang="en-GB" dirty="0"/>
+          </a:p>
+          <a:p>
+            <a:pPr lvl="1"/>
+            <a:r>
+              <a:rPr lang="en-GB" dirty="0"/>
+              <a:t>Meetings – If you are based in the </a:t>
+            </a:r>
+            <a:r>
+              <a:rPr lang="en-GB" dirty="0" smtClean="0"/>
+              <a:t>south of the UK I am happy to arrange meetings via email</a:t>
+            </a:r>
+            <a:endParaRPr lang="en-GB" dirty="0"/>
+          </a:p>
+          <a:p>
+            <a:endParaRPr lang="en-GB" dirty="0"/>
+          </a:p>
+        </p:txBody>
+      </p:sp>
+      <p:sp>
+        <p:nvSpPr>
+          <p:cNvPr id="4" name="Date Placeholder 3"/>
+          <p:cNvSpPr>
+            <a:spLocks noGrp="1"/>
+          </p:cNvSpPr>
+          <p:nvPr>
+            <p:ph type="dt" sz="half" idx="10"/>
+          </p:nvPr>
+        </p:nvSpPr>
+        <p:spPr/>
+        <p:txBody>
+          <a:bodyPr/>
+          <a:lstStyle/>
+          <a:p>
+            <a:fld id="{CDAEE9B0-25E7-4C28-AF1D-B3DDCE7EBBDB}" type="datetime1">
+              <a:rPr lang="en-US" smtClean="0"/>
+              <a:pPr/>
+              <a:t>7/26/2011</a:t>
+            </a:fld>
+            <a:endParaRPr lang="en-GB"/>
+          </a:p>
+        </p:txBody>
+      </p:sp>
+      <p:sp>
+        <p:nvSpPr>
+          <p:cNvPr id="5" name="Footer Placeholder 4"/>
+          <p:cNvSpPr>
+            <a:spLocks noGrp="1"/>
+          </p:cNvSpPr>
+          <p:nvPr>
+            <p:ph type="ftr" sz="quarter" idx="11"/>
+          </p:nvPr>
+        </p:nvSpPr>
+        <p:spPr/>
+        <p:txBody>
+          <a:bodyPr/>
+          <a:lstStyle/>
+          <a:p>
+            <a:r>
+              <a:rPr lang="en-GB" smtClean="0"/>
+              <a:t>http://www.dotnetrdf.org</a:t>
+            </a:r>
+            <a:endParaRPr lang="en-GB"/>
+          </a:p>
+        </p:txBody>
+      </p:sp>
+      <p:sp>
+        <p:nvSpPr>
+          <p:cNvPr id="6" name="Slide Number Placeholder 5"/>
+          <p:cNvSpPr>
+            <a:spLocks noGrp="1"/>
+          </p:cNvSpPr>
+          <p:nvPr>
+            <p:ph type="sldNum" sz="quarter" idx="12"/>
+          </p:nvPr>
+        </p:nvSpPr>
+        <p:spPr/>
+        <p:txBody>
+          <a:bodyPr/>
+          <a:lstStyle/>
+          <a:p>
+            <a:fld id="{35128F56-7434-487A-8B29-0C024560A5F4}" type="slidenum">
+              <a:rPr lang="en-GB" smtClean="0"/>
+              <a:pPr/>
+              <a:t>52</a:t>
+            </a:fld>
+            <a:endParaRPr lang="en-GB"/>
+          </a:p>
+        </p:txBody>
+      </p:sp>
+    </p:spTree>
+    <p:extLst>
+      <p:ext uri="{BB962C8B-B14F-4D97-AF65-F5344CB8AC3E}">
+        <p14:creationId xmlns="" xmlns:p14="http://schemas.microsoft.com/office/powerpoint/2010/main" val="798761902"/>
+      </p:ext>
+    </p:extLst>
+  </p:cSld>
+  <p:clrMapOvr>
+    <a:masterClrMapping/>
+  </p:clrMapOvr>
+</p:sld>
+</file>
+
+<file path=ppt/slides/slide53.xml><?xml version="1.0" encoding="utf-8"?>
+<p:sld xmlns:a="http://schemas.openxmlformats.org/drawingml/2006/main" xmlns:r="http://schemas.openxmlformats.org/officeDocument/2006/relationships" xmlns:p="http://schemas.openxmlformats.org/presentationml/2006/main">
+  <p:cSld>
+    <p:spTree>
+      <p:nvGrpSpPr>
+        <p:cNvPr id="1" name=""/>
+        <p:cNvGrpSpPr/>
+        <p:nvPr/>
+      </p:nvGrpSpPr>
+      <p:grpSpPr>
+        <a:xfrm>
+          <a:off x="0" y="0"/>
+          <a:ext cx="0" cy="0"/>
+          <a:chOff x="0" y="0"/>
+          <a:chExt cx="0" cy="0"/>
+        </a:xfrm>
+      </p:grpSpPr>
+      <p:sp>
+        <p:nvSpPr>
+          <p:cNvPr id="2" name="Title 1"/>
+          <p:cNvSpPr>
+            <a:spLocks noGrp="1"/>
+          </p:cNvSpPr>
+          <p:nvPr>
+            <p:ph type="title"/>
+          </p:nvPr>
+        </p:nvSpPr>
+        <p:spPr/>
+        <p:txBody>
+          <a:bodyPr/>
+          <a:lstStyle/>
+          <a:p>
+            <a:r>
+              <a:rPr lang="en-GB" dirty="0" smtClean="0"/>
+              <a:t>Steering Committee</a:t>
+            </a:r>
+            <a:endParaRPr lang="en-GB" dirty="0"/>
+          </a:p>
+        </p:txBody>
+      </p:sp>
+      <p:sp>
+        <p:nvSpPr>
+          <p:cNvPr id="3" name="Content Placeholder 2"/>
+          <p:cNvSpPr>
+            <a:spLocks noGrp="1"/>
+          </p:cNvSpPr>
+          <p:nvPr>
+            <p:ph idx="1"/>
+          </p:nvPr>
+        </p:nvSpPr>
+        <p:spPr/>
+        <p:txBody>
+          <a:bodyPr/>
+          <a:lstStyle/>
+          <a:p>
+            <a:r>
+              <a:rPr lang="en-GB" dirty="0" smtClean="0"/>
+              <a:t>May form an informal steering committee</a:t>
+            </a:r>
+          </a:p>
+          <a:p>
+            <a:pPr lvl="1"/>
+            <a:r>
+              <a:rPr lang="en-GB" dirty="0" smtClean="0"/>
+              <a:t>Would provide oversight and design input into the project development</a:t>
+            </a:r>
+          </a:p>
+          <a:p>
+            <a:pPr lvl="1"/>
+            <a:r>
+              <a:rPr lang="en-GB" dirty="0" smtClean="0"/>
+              <a:t>Ideally formed of community members and contributors</a:t>
+            </a:r>
+          </a:p>
+          <a:p>
+            <a:pPr lvl="1"/>
+            <a:r>
+              <a:rPr lang="en-GB" dirty="0" smtClean="0"/>
+              <a:t>Help ensure the project goes where the community needs it to</a:t>
+            </a:r>
+          </a:p>
+          <a:p>
+            <a:pPr lvl="1"/>
+            <a:r>
+              <a:rPr lang="en-GB" dirty="0" smtClean="0"/>
+              <a:t>If you are interested please get in touch</a:t>
+            </a:r>
+          </a:p>
+          <a:p>
+            <a:endParaRPr lang="en-GB" dirty="0"/>
+          </a:p>
+        </p:txBody>
+      </p:sp>
+      <p:sp>
+        <p:nvSpPr>
+          <p:cNvPr id="4" name="Date Placeholder 3"/>
+          <p:cNvSpPr>
+            <a:spLocks noGrp="1"/>
+          </p:cNvSpPr>
+          <p:nvPr>
+            <p:ph type="dt" sz="half" idx="10"/>
+          </p:nvPr>
+        </p:nvSpPr>
+        <p:spPr/>
+        <p:txBody>
+          <a:bodyPr/>
+          <a:lstStyle/>
+          <a:p>
+            <a:fld id="{CDAEE9B0-25E7-4C28-AF1D-B3DDCE7EBBDB}" type="datetime1">
+              <a:rPr lang="en-US" smtClean="0"/>
+              <a:pPr/>
+              <a:t>7/26/2011</a:t>
+            </a:fld>
+            <a:endParaRPr lang="en-GB"/>
+          </a:p>
+        </p:txBody>
+      </p:sp>
+      <p:sp>
+        <p:nvSpPr>
+          <p:cNvPr id="5" name="Footer Placeholder 4"/>
+          <p:cNvSpPr>
+            <a:spLocks noGrp="1"/>
+          </p:cNvSpPr>
+          <p:nvPr>
+            <p:ph type="ftr" sz="quarter" idx="11"/>
+          </p:nvPr>
+        </p:nvSpPr>
+        <p:spPr/>
+        <p:txBody>
+          <a:bodyPr/>
+          <a:lstStyle/>
+          <a:p>
+            <a:r>
+              <a:rPr lang="en-GB" smtClean="0"/>
+              <a:t>http://www.dotnetrdf.org</a:t>
+            </a:r>
+            <a:endParaRPr lang="en-GB"/>
+          </a:p>
+        </p:txBody>
+      </p:sp>
+      <p:sp>
+        <p:nvSpPr>
+          <p:cNvPr id="6" name="Slide Number Placeholder 5"/>
+          <p:cNvSpPr>
+            <a:spLocks noGrp="1"/>
+          </p:cNvSpPr>
+          <p:nvPr>
+            <p:ph type="sldNum" sz="quarter" idx="12"/>
+          </p:nvPr>
+        </p:nvSpPr>
+        <p:spPr/>
+        <p:txBody>
+          <a:bodyPr/>
+          <a:lstStyle/>
+          <a:p>
+            <a:fld id="{35128F56-7434-487A-8B29-0C024560A5F4}" type="slidenum">
+              <a:rPr lang="en-GB" smtClean="0"/>
+              <a:pPr/>
+              <a:t>53</a:t>
+            </a:fld>
+            <a:endParaRPr lang="en-GB"/>
+          </a:p>
+        </p:txBody>
+      </p:sp>
+    </p:spTree>
+  </p:cSld>
+  <p:clrMapOvr>
+    <a:masterClrMapping/>
+  </p:clrMapOvr>
+</p:sld>
+</file>
+
+<file path=ppt/slides/slide54.xml><?xml version="1.0" encoding="utf-8"?>
+<p:sld xmlns:a="http://schemas.openxmlformats.org/drawingml/2006/main" xmlns:r="http://schemas.openxmlformats.org/officeDocument/2006/relationships" xmlns:p="http://schemas.openxmlformats.org/presentationml/2006/main">
+  <p:cSld>
+    <p:spTree>
+      <p:nvGrpSpPr>
+        <p:cNvPr id="1" name=""/>
+        <p:cNvGrpSpPr/>
+        <p:nvPr/>
+      </p:nvGrpSpPr>
+      <p:grpSpPr>
+        <a:xfrm>
+          <a:off x="0" y="0"/>
+          <a:ext cx="0" cy="0"/>
+          <a:chOff x="0" y="0"/>
+          <a:chExt cx="0" cy="0"/>
+        </a:xfrm>
+      </p:grpSpPr>
+      <p:sp>
+        <p:nvSpPr>
+          <p:cNvPr id="2" name="Title 1"/>
+          <p:cNvSpPr>
+            <a:spLocks noGrp="1"/>
+          </p:cNvSpPr>
+          <p:nvPr>
+            <p:ph type="title"/>
+          </p:nvPr>
+        </p:nvSpPr>
+        <p:spPr/>
+        <p:txBody>
+          <a:bodyPr/>
+          <a:lstStyle/>
+          <a:p>
+            <a:r>
+              <a:rPr lang="en-GB" dirty="0" smtClean="0"/>
+              <a:t>Acknowledgements</a:t>
+            </a:r>
+            <a:endParaRPr lang="en-GB" dirty="0"/>
+          </a:p>
+        </p:txBody>
+      </p:sp>
+      <p:sp>
+        <p:nvSpPr>
+          <p:cNvPr id="3" name="Content Placeholder 2"/>
+          <p:cNvSpPr>
+            <a:spLocks noGrp="1"/>
+          </p:cNvSpPr>
+          <p:nvPr>
+            <p:ph idx="1"/>
+          </p:nvPr>
+        </p:nvSpPr>
+        <p:spPr/>
+        <p:txBody>
+          <a:bodyPr/>
+          <a:lstStyle/>
+          <a:p>
+            <a:r>
+              <a:rPr lang="en-GB" dirty="0" smtClean="0"/>
+              <a:t>Thanks to the many people who have already contributed to the project in various ways:</a:t>
+            </a:r>
+          </a:p>
+          <a:p>
+            <a:pPr lvl="1"/>
+            <a:r>
+              <a:rPr lang="en-GB" sz="1600" dirty="0" err="1" smtClean="0"/>
+              <a:t>Eamon</a:t>
+            </a:r>
+            <a:r>
+              <a:rPr lang="en-GB" sz="1600" dirty="0" smtClean="0"/>
+              <a:t> </a:t>
+            </a:r>
+            <a:r>
+              <a:rPr lang="en-GB" sz="1600" dirty="0" err="1" smtClean="0"/>
+              <a:t>Nerbonne</a:t>
+            </a:r>
+            <a:r>
+              <a:rPr lang="en-GB" sz="1600" dirty="0" smtClean="0"/>
+              <a:t>, Hugh Williams, Jacqui Hand, Toby Inkster, </a:t>
+            </a:r>
+            <a:r>
+              <a:rPr lang="en-GB" sz="1600" dirty="0" err="1" smtClean="0"/>
+              <a:t>Marek</a:t>
+            </a:r>
+            <a:r>
+              <a:rPr lang="en-GB" sz="1600" dirty="0" smtClean="0"/>
+              <a:t> Safar, Andy Seaborne, Steve Harris, Peter </a:t>
+            </a:r>
+            <a:r>
+              <a:rPr lang="en-GB" sz="1600" dirty="0" err="1" smtClean="0"/>
+              <a:t>Kahle</a:t>
+            </a:r>
+            <a:r>
+              <a:rPr lang="en-GB" sz="1600" dirty="0" smtClean="0"/>
+              <a:t>, Paul Hermans, Graham Moore, Laurent </a:t>
+            </a:r>
+            <a:r>
+              <a:rPr lang="en-GB" sz="1600" dirty="0" err="1" smtClean="0"/>
+              <a:t>Lefort</a:t>
+            </a:r>
+            <a:r>
+              <a:rPr lang="en-GB" sz="1600" dirty="0" smtClean="0"/>
+              <a:t>, Tana Isaac, Koos </a:t>
+            </a:r>
+            <a:r>
+              <a:rPr lang="en-GB" sz="1600" dirty="0" err="1" smtClean="0"/>
+              <a:t>Strydoom</a:t>
+            </a:r>
+            <a:r>
+              <a:rPr lang="en-GB" sz="1600" dirty="0" smtClean="0"/>
+              <a:t>, Alexander Sidorov, Michael </a:t>
+            </a:r>
+            <a:r>
+              <a:rPr lang="en-GB" sz="1600" dirty="0" err="1" smtClean="0"/>
+              <a:t>Friis</a:t>
+            </a:r>
+            <a:r>
+              <a:rPr lang="en-GB" sz="1600" dirty="0" smtClean="0"/>
+              <a:t>, Bob </a:t>
+            </a:r>
+            <a:r>
+              <a:rPr lang="en-GB" sz="1600" dirty="0" err="1" smtClean="0"/>
+              <a:t>DuCharme</a:t>
+            </a:r>
+            <a:r>
+              <a:rPr lang="en-GB" sz="1600" dirty="0" smtClean="0"/>
+              <a:t>, Alexander </a:t>
+            </a:r>
+            <a:r>
+              <a:rPr lang="en-GB" sz="1600" dirty="0" err="1" smtClean="0"/>
+              <a:t>Zapirov</a:t>
+            </a:r>
+            <a:r>
+              <a:rPr lang="en-GB" sz="1600" dirty="0" smtClean="0"/>
+              <a:t>, Sergey Novikov, </a:t>
+            </a:r>
+            <a:r>
+              <a:rPr lang="en-GB" sz="1600" dirty="0" err="1" smtClean="0"/>
+              <a:t>Jeen</a:t>
+            </a:r>
+            <a:r>
+              <a:rPr lang="en-GB" sz="1600" dirty="0" smtClean="0"/>
+              <a:t> </a:t>
+            </a:r>
+            <a:r>
+              <a:rPr lang="en-GB" sz="1600" dirty="0" err="1" smtClean="0"/>
+              <a:t>Broekstra</a:t>
+            </a:r>
+            <a:r>
+              <a:rPr lang="en-GB" sz="1600" dirty="0" smtClean="0"/>
+              <a:t>, Robert DeCarlo, Clive Emberey, Anton </a:t>
+            </a:r>
+            <a:r>
+              <a:rPr lang="en-GB" sz="1600" dirty="0" err="1" smtClean="0"/>
+              <a:t>Adreev</a:t>
+            </a:r>
+            <a:r>
+              <a:rPr lang="en-GB" sz="1600" dirty="0" smtClean="0"/>
+              <a:t>, Steve </a:t>
+            </a:r>
+            <a:r>
+              <a:rPr lang="en-GB" sz="1600" dirty="0" err="1" smtClean="0"/>
+              <a:t>Fraleigh</a:t>
+            </a:r>
+            <a:r>
+              <a:rPr lang="en-GB" sz="1600" dirty="0" smtClean="0"/>
+              <a:t>, Felipe Santos, Bob Morris, Daniel Bittencourt, Rodrigo de Castro Reis, Rafael Dias </a:t>
+            </a:r>
+            <a:r>
+              <a:rPr lang="en-GB" sz="1600" dirty="0" err="1" smtClean="0"/>
+              <a:t>Araujo</a:t>
+            </a:r>
+            <a:r>
+              <a:rPr lang="en-GB" sz="1600" dirty="0" smtClean="0"/>
+              <a:t>, Jim Rhyne, Kendall Clark, Michael Grove, Ben Lavender</a:t>
+            </a:r>
+          </a:p>
+          <a:p>
+            <a:r>
+              <a:rPr lang="en-GB" dirty="0" smtClean="0"/>
+              <a:t>Apologies to anyone I have missed from the list</a:t>
+            </a:r>
+            <a:endParaRPr lang="en-GB" dirty="0"/>
+          </a:p>
+        </p:txBody>
+      </p:sp>
+      <p:sp>
+        <p:nvSpPr>
+          <p:cNvPr id="4" name="Date Placeholder 3"/>
+          <p:cNvSpPr>
+            <a:spLocks noGrp="1"/>
+          </p:cNvSpPr>
+          <p:nvPr>
+            <p:ph type="dt" sz="half" idx="10"/>
+          </p:nvPr>
+        </p:nvSpPr>
+        <p:spPr/>
+        <p:txBody>
+          <a:bodyPr/>
+          <a:lstStyle/>
+          <a:p>
+            <a:fld id="{CDAEE9B0-25E7-4C28-AF1D-B3DDCE7EBBDB}" type="datetime1">
+              <a:rPr lang="en-US" smtClean="0"/>
+              <a:pPr/>
+              <a:t>7/26/2011</a:t>
+            </a:fld>
+            <a:endParaRPr lang="en-GB"/>
+          </a:p>
+        </p:txBody>
+      </p:sp>
+      <p:sp>
+        <p:nvSpPr>
+          <p:cNvPr id="5" name="Footer Placeholder 4"/>
+          <p:cNvSpPr>
+            <a:spLocks noGrp="1"/>
+          </p:cNvSpPr>
+          <p:nvPr>
+            <p:ph type="ftr" sz="quarter" idx="11"/>
+          </p:nvPr>
+        </p:nvSpPr>
+        <p:spPr/>
+        <p:txBody>
+          <a:bodyPr/>
+          <a:lstStyle/>
+          <a:p>
+            <a:r>
+              <a:rPr lang="en-GB" smtClean="0"/>
+              <a:t>http://www.dotnetrdf.org</a:t>
+            </a:r>
+            <a:endParaRPr lang="en-GB"/>
+          </a:p>
+        </p:txBody>
+      </p:sp>
+      <p:sp>
+        <p:nvSpPr>
+          <p:cNvPr id="6" name="Slide Number Placeholder 5"/>
+          <p:cNvSpPr>
+            <a:spLocks noGrp="1"/>
+          </p:cNvSpPr>
+          <p:nvPr>
+            <p:ph type="sldNum" sz="quarter" idx="12"/>
+          </p:nvPr>
+        </p:nvSpPr>
+        <p:spPr/>
+        <p:txBody>
+          <a:bodyPr/>
+          <a:lstStyle/>
+          <a:p>
+            <a:fld id="{35128F56-7434-487A-8B29-0C024560A5F4}" type="slidenum">
+              <a:rPr lang="en-GB" smtClean="0"/>
+              <a:pPr/>
+              <a:t>54</a:t>
+            </a:fld>
+            <a:endParaRPr lang="en-GB"/>
+          </a:p>
+        </p:txBody>
+      </p:sp>
+    </p:spTree>
   </p:cSld>
   <p:clrMapOvr>
     <a:masterClrMapping/>
@@ -11104,7 +12054,7 @@
             <a:fld id="{EA5D455B-ECD0-44E3-BA0C-3649A3FCD15C}" type="datetime1">
               <a:rPr lang="en-US" smtClean="0"/>
               <a:pPr/>
-              <a:t>7/20/2011</a:t>
+              <a:t>7/26/2011</a:t>
             </a:fld>
             <a:endParaRPr lang="en-GB"/>
           </a:p>
@@ -11160,7 +12110,7 @@
     </p:spTree>
     <p:extLst>
       <p:ext uri="{BB962C8B-B14F-4D97-AF65-F5344CB8AC3E}">
-        <p14:creationId xmlns:p14="http://schemas.microsoft.com/office/powerpoint/2010/main" xmlns="" val="2062332550"/>
+        <p14:creationId xmlns="" xmlns:p14="http://schemas.microsoft.com/office/powerpoint/2010/main" val="2062332550"/>
       </p:ext>
     </p:extLst>
   </p:cSld>
@@ -11266,7 +12216,7 @@
             <a:fld id="{CDAEE9B0-25E7-4C28-AF1D-B3DDCE7EBBDB}" type="datetime1">
               <a:rPr lang="en-US" smtClean="0"/>
               <a:pPr/>
-              <a:t>7/20/2011</a:t>
+              <a:t>7/26/2011</a:t>
             </a:fld>
             <a:endParaRPr lang="en-GB"/>
           </a:p>
@@ -11322,7 +12272,7 @@
     </p:spTree>
     <p:extLst>
       <p:ext uri="{BB962C8B-B14F-4D97-AF65-F5344CB8AC3E}">
-        <p14:creationId xmlns:p14="http://schemas.microsoft.com/office/powerpoint/2010/main" xmlns="" val="2752513629"/>
+        <p14:creationId xmlns="" xmlns:p14="http://schemas.microsoft.com/office/powerpoint/2010/main" val="2752513629"/>
       </p:ext>
     </p:extLst>
   </p:cSld>
@@ -11403,14 +12353,27 @@
             <a:pPr lvl="1"/>
             <a:r>
               <a:rPr lang="en-GB" dirty="0" smtClean="0"/>
-              <a:t>Beta phase – Version 0.4.x up to Version 0.6.x</a:t>
-            </a:r>
+              <a:t>Beta phase – Version 0.4.x up to Version </a:t>
+            </a:r>
+            <a:r>
+              <a:rPr lang="en-GB" dirty="0" smtClean="0"/>
+              <a:t>0.7.x</a:t>
+            </a:r>
+            <a:endParaRPr lang="en-GB" dirty="0" smtClean="0"/>
           </a:p>
           <a:p>
             <a:pPr lvl="1"/>
             <a:r>
               <a:rPr lang="en-GB" dirty="0" smtClean="0"/>
-              <a:t>Release Candidate phase – Versions 0.7.0 onwards</a:t>
+              <a:t>Release Candidate phase – Versions </a:t>
+            </a:r>
+            <a:r>
+              <a:rPr lang="en-GB" dirty="0" smtClean="0"/>
+              <a:t>0.8.0 </a:t>
+            </a:r>
+            <a:r>
+              <a:rPr lang="en-GB" dirty="0" smtClean="0"/>
+              <a:t>onwards</a:t>
             </a:r>
           </a:p>
           <a:p>
@@ -11446,7 +12409,7 @@
             <a:fld id="{CDAEE9B0-25E7-4C28-AF1D-B3DDCE7EBBDB}" type="datetime1">
               <a:rPr lang="en-US" smtClean="0"/>
               <a:pPr/>
-              <a:t>7/20/2011</a:t>
+              <a:t>7/26/2011</a:t>
             </a:fld>
             <a:endParaRPr lang="en-GB"/>
           </a:p>
@@ -11502,7 +12465,7 @@
     </p:spTree>
     <p:extLst>
       <p:ext uri="{BB962C8B-B14F-4D97-AF65-F5344CB8AC3E}">
-        <p14:creationId xmlns:p14="http://schemas.microsoft.com/office/powerpoint/2010/main" xmlns="" val="1884836899"/>
+        <p14:creationId xmlns="" xmlns:p14="http://schemas.microsoft.com/office/powerpoint/2010/main" val="1884836899"/>
       </p:ext>
     </p:extLst>
   </p:cSld>
@@ -11599,7 +12562,7 @@
             <a:fld id="{CDAEE9B0-25E7-4C28-AF1D-B3DDCE7EBBDB}" type="datetime1">
               <a:rPr lang="en-US" smtClean="0"/>
               <a:pPr/>
-              <a:t>7/20/2011</a:t>
+              <a:t>7/26/2011</a:t>
             </a:fld>
             <a:endParaRPr lang="en-GB"/>
           </a:p>
@@ -11655,7 +12618,7 @@
     </p:spTree>
     <p:extLst>
       <p:ext uri="{BB962C8B-B14F-4D97-AF65-F5344CB8AC3E}">
-        <p14:creationId xmlns:p14="http://schemas.microsoft.com/office/powerpoint/2010/main" xmlns="" val="1547614895"/>
+        <p14:creationId xmlns="" xmlns:p14="http://schemas.microsoft.com/office/powerpoint/2010/main" val="1547614895"/>
       </p:ext>
     </p:extLst>
   </p:cSld>

</xml_diff>